<commit_message>
Add Introduction section to Idea Eval Slides
</commit_message>
<xml_diff>
--- a/4- Idea Evaluation/Idea Evaluation Slides (Filled).pptx
+++ b/4- Idea Evaluation/Idea Evaluation Slides (Filled).pptx
@@ -8,15 +8,22 @@
     <p:sldId id="258" r:id="rId2"/>
     <p:sldId id="259" r:id="rId3"/>
     <p:sldId id="260" r:id="rId4"/>
-    <p:sldId id="263" r:id="rId5"/>
-    <p:sldId id="264" r:id="rId6"/>
-    <p:sldId id="265" r:id="rId7"/>
-    <p:sldId id="262" r:id="rId8"/>
-    <p:sldId id="266" r:id="rId9"/>
-    <p:sldId id="267" r:id="rId10"/>
-    <p:sldId id="268" r:id="rId11"/>
-    <p:sldId id="261" r:id="rId12"/>
-    <p:sldId id="269" r:id="rId13"/>
+    <p:sldId id="270" r:id="rId5"/>
+    <p:sldId id="272" r:id="rId6"/>
+    <p:sldId id="263" r:id="rId7"/>
+    <p:sldId id="273" r:id="rId8"/>
+    <p:sldId id="274" r:id="rId9"/>
+    <p:sldId id="275" r:id="rId10"/>
+    <p:sldId id="276" r:id="rId11"/>
+    <p:sldId id="277" r:id="rId12"/>
+    <p:sldId id="264" r:id="rId13"/>
+    <p:sldId id="265" r:id="rId14"/>
+    <p:sldId id="262" r:id="rId15"/>
+    <p:sldId id="266" r:id="rId16"/>
+    <p:sldId id="267" r:id="rId17"/>
+    <p:sldId id="268" r:id="rId18"/>
+    <p:sldId id="261" r:id="rId19"/>
+    <p:sldId id="269" r:id="rId20"/>
   </p:sldIdLst>
   <p:sldSz cx="12192000" cy="6858000"/>
   <p:notesSz cx="6858000" cy="9144000"/>
@@ -252,7 +259,7 @@
           <a:p>
             <a:fld id="{0F5A5E6E-0E5C-41E1-A40C-15B94255FA15}" type="datetimeFigureOut">
               <a:rPr lang="en-US" smtClean="0"/>
-              <a:t>9/15/2024</a:t>
+              <a:t>9/23/2024</a:t>
             </a:fld>
             <a:endParaRPr lang="en-US"/>
           </a:p>
@@ -420,7 +427,7 @@
           <a:p>
             <a:fld id="{0F5A5E6E-0E5C-41E1-A40C-15B94255FA15}" type="datetimeFigureOut">
               <a:rPr lang="en-US" smtClean="0"/>
-              <a:t>9/15/2024</a:t>
+              <a:t>9/23/2024</a:t>
             </a:fld>
             <a:endParaRPr lang="en-US"/>
           </a:p>
@@ -598,7 +605,7 @@
           <a:p>
             <a:fld id="{0F5A5E6E-0E5C-41E1-A40C-15B94255FA15}" type="datetimeFigureOut">
               <a:rPr lang="en-US" smtClean="0"/>
-              <a:t>9/15/2024</a:t>
+              <a:t>9/23/2024</a:t>
             </a:fld>
             <a:endParaRPr lang="en-US"/>
           </a:p>
@@ -766,7 +773,7 @@
           <a:p>
             <a:fld id="{0F5A5E6E-0E5C-41E1-A40C-15B94255FA15}" type="datetimeFigureOut">
               <a:rPr lang="en-US" smtClean="0"/>
-              <a:t>9/15/2024</a:t>
+              <a:t>9/23/2024</a:t>
             </a:fld>
             <a:endParaRPr lang="en-US"/>
           </a:p>
@@ -1011,7 +1018,7 @@
           <a:p>
             <a:fld id="{0F5A5E6E-0E5C-41E1-A40C-15B94255FA15}" type="datetimeFigureOut">
               <a:rPr lang="en-US" smtClean="0"/>
-              <a:t>9/15/2024</a:t>
+              <a:t>9/23/2024</a:t>
             </a:fld>
             <a:endParaRPr lang="en-US"/>
           </a:p>
@@ -1240,7 +1247,7 @@
           <a:p>
             <a:fld id="{0F5A5E6E-0E5C-41E1-A40C-15B94255FA15}" type="datetimeFigureOut">
               <a:rPr lang="en-US" smtClean="0"/>
-              <a:t>9/15/2024</a:t>
+              <a:t>9/23/2024</a:t>
             </a:fld>
             <a:endParaRPr lang="en-US"/>
           </a:p>
@@ -1604,7 +1611,7 @@
           <a:p>
             <a:fld id="{0F5A5E6E-0E5C-41E1-A40C-15B94255FA15}" type="datetimeFigureOut">
               <a:rPr lang="en-US" smtClean="0"/>
-              <a:t>9/15/2024</a:t>
+              <a:t>9/23/2024</a:t>
             </a:fld>
             <a:endParaRPr lang="en-US"/>
           </a:p>
@@ -1721,7 +1728,7 @@
           <a:p>
             <a:fld id="{0F5A5E6E-0E5C-41E1-A40C-15B94255FA15}" type="datetimeFigureOut">
               <a:rPr lang="en-US" smtClean="0"/>
-              <a:t>9/15/2024</a:t>
+              <a:t>9/23/2024</a:t>
             </a:fld>
             <a:endParaRPr lang="en-US"/>
           </a:p>
@@ -1816,7 +1823,7 @@
           <a:p>
             <a:fld id="{0F5A5E6E-0E5C-41E1-A40C-15B94255FA15}" type="datetimeFigureOut">
               <a:rPr lang="en-US" smtClean="0"/>
-              <a:t>9/15/2024</a:t>
+              <a:t>9/23/2024</a:t>
             </a:fld>
             <a:endParaRPr lang="en-US"/>
           </a:p>
@@ -2091,7 +2098,7 @@
           <a:p>
             <a:fld id="{0F5A5E6E-0E5C-41E1-A40C-15B94255FA15}" type="datetimeFigureOut">
               <a:rPr lang="en-US" smtClean="0"/>
-              <a:t>9/15/2024</a:t>
+              <a:t>9/23/2024</a:t>
             </a:fld>
             <a:endParaRPr lang="en-US"/>
           </a:p>
@@ -2343,7 +2350,7 @@
           <a:p>
             <a:fld id="{0F5A5E6E-0E5C-41E1-A40C-15B94255FA15}" type="datetimeFigureOut">
               <a:rPr lang="en-US" smtClean="0"/>
-              <a:t>9/15/2024</a:t>
+              <a:t>9/23/2024</a:t>
             </a:fld>
             <a:endParaRPr lang="en-US"/>
           </a:p>
@@ -2554,7 +2561,7 @@
           <a:p>
             <a:fld id="{0F5A5E6E-0E5C-41E1-A40C-15B94255FA15}" type="datetimeFigureOut">
               <a:rPr lang="en-US" smtClean="0"/>
-              <a:t>9/15/2024</a:t>
+              <a:t>9/23/2024</a:t>
             </a:fld>
             <a:endParaRPr lang="en-US"/>
           </a:p>
@@ -2982,9 +2989,7 @@
             <a:r>
               <a:rPr lang="en-US" b="1" dirty="0">
                 <a:solidFill>
-                  <a:schemeClr val="accent1">
-                    <a:lumMod val="75000"/>
-                  </a:schemeClr>
+                  <a:srgbClr val="36ABF3"/>
                 </a:solidFill>
               </a:rPr>
               <a:t>Constituency Connect</a:t>
@@ -3345,9 +3350,7 @@
             <a:r>
               <a:rPr lang="en-US" sz="3000" b="1" dirty="0">
                 <a:solidFill>
-                  <a:schemeClr val="accent6">
-                    <a:lumMod val="50000"/>
-                  </a:schemeClr>
+                  <a:srgbClr val="F8981C"/>
                 </a:solidFill>
                 <a:latin typeface="Bahnschrift SemiBold" panose="020B0502040204020203" pitchFamily="34" charset="0"/>
                 <a:ea typeface="Calibri" panose="020F0502020204030204" pitchFamily="34" charset="0"/>
@@ -3357,9 +3360,7 @@
             </a:r>
             <a:endParaRPr lang="en-US" sz="3000" dirty="0">
               <a:solidFill>
-                <a:schemeClr val="accent6">
-                  <a:lumMod val="50000"/>
-                </a:schemeClr>
+                <a:srgbClr val="F8981C"/>
               </a:solidFill>
               <a:effectLst/>
               <a:latin typeface="Calibri" panose="020F0502020204030204" pitchFamily="34" charset="0"/>
@@ -3409,7 +3410,12 @@
             <p:ph type="title"/>
           </p:nvPr>
         </p:nvSpPr>
-        <p:spPr/>
+        <p:spPr>
+          <a:xfrm>
+            <a:off x="838200" y="365125"/>
+            <a:ext cx="10515600" cy="980959"/>
+          </a:xfrm>
+        </p:spPr>
         <p:txBody>
           <a:bodyPr/>
           <a:lstStyle/>
@@ -3417,12 +3423,10 @@
             <a:r>
               <a:rPr lang="en-US" b="1" dirty="0">
                 <a:solidFill>
-                  <a:schemeClr val="accent1">
-                    <a:lumMod val="75000"/>
-                  </a:schemeClr>
+                  <a:srgbClr val="36ABF3"/>
                 </a:solidFill>
               </a:rPr>
-              <a:t>Final Outcome</a:t>
+              <a:t>Literature Review</a:t>
             </a:r>
           </a:p>
         </p:txBody>
@@ -3437,22 +3441,116 @@
             <p:ph idx="1"/>
           </p:nvPr>
         </p:nvSpPr>
-        <p:spPr/>
-        <p:txBody>
-          <a:bodyPr/>
+        <p:spPr>
+          <a:xfrm>
+            <a:off x="838200" y="1990166"/>
+            <a:ext cx="10515600" cy="4867834"/>
+          </a:xfrm>
+        </p:spPr>
+        <p:txBody>
+          <a:bodyPr>
+            <a:normAutofit/>
+          </a:bodyPr>
           <a:lstStyle/>
           <a:p>
             <a:pPr algn="just"/>
-            <a:r>
-              <a:rPr lang="en-US" dirty="0"/>
-              <a:t>Describe shortly the nature of your project outcome. </a:t>
-            </a:r>
-          </a:p>
-          <a:p>
-            <a:pPr algn="just"/>
-            <a:r>
-              <a:rPr lang="en-US" dirty="0"/>
-              <a:t>Whether it’s a Advance Technology/ Product / Framework/ Solution to the existing Problem or a novel research, etc. </a:t>
+            <a:endParaRPr lang="en-US" dirty="0"/>
+          </a:p>
+        </p:txBody>
+      </p:sp>
+      <p:cxnSp>
+        <p:nvCxnSpPr>
+          <p:cNvPr id="10" name="Straight Connector 9">
+            <a:extLst>
+              <a:ext uri="{FF2B5EF4-FFF2-40B4-BE49-F238E27FC236}">
+                <a16:creationId xmlns:a16="http://schemas.microsoft.com/office/drawing/2014/main" id="{5C4D56EA-8905-CAFF-FA8B-91B461D57C36}"/>
+              </a:ext>
+            </a:extLst>
+          </p:cNvPr>
+          <p:cNvCxnSpPr>
+            <a:cxnSpLocks/>
+          </p:cNvCxnSpPr>
+          <p:nvPr/>
+        </p:nvCxnSpPr>
+        <p:spPr>
+          <a:xfrm>
+            <a:off x="929640" y="1237129"/>
+            <a:ext cx="10332720" cy="0"/>
+          </a:xfrm>
+          <a:prstGeom prst="line">
+            <a:avLst/>
+          </a:prstGeom>
+          <a:ln w="28575"/>
+        </p:spPr>
+        <p:style>
+          <a:lnRef idx="3">
+            <a:schemeClr val="dk1"/>
+          </a:lnRef>
+          <a:fillRef idx="0">
+            <a:schemeClr val="dk1"/>
+          </a:fillRef>
+          <a:effectRef idx="2">
+            <a:schemeClr val="dk1"/>
+          </a:effectRef>
+          <a:fontRef idx="minor">
+            <a:schemeClr val="tx1"/>
+          </a:fontRef>
+        </p:style>
+      </p:cxnSp>
+      <p:sp>
+        <p:nvSpPr>
+          <p:cNvPr id="4" name="Title 1">
+            <a:extLst>
+              <a:ext uri="{FF2B5EF4-FFF2-40B4-BE49-F238E27FC236}">
+                <a16:creationId xmlns:a16="http://schemas.microsoft.com/office/drawing/2014/main" id="{7ED9CE21-68A5-DE6F-C9B3-F22A1957B184}"/>
+              </a:ext>
+            </a:extLst>
+          </p:cNvPr>
+          <p:cNvSpPr txBox="1">
+            <a:spLocks/>
+          </p:cNvSpPr>
+          <p:nvPr/>
+        </p:nvSpPr>
+        <p:spPr>
+          <a:xfrm>
+            <a:off x="838200" y="1150051"/>
+            <a:ext cx="10515600" cy="959083"/>
+          </a:xfrm>
+          <a:prstGeom prst="rect">
+            <a:avLst/>
+          </a:prstGeom>
+        </p:spPr>
+        <p:txBody>
+          <a:bodyPr vert="horz" lIns="91440" tIns="45720" rIns="91440" bIns="45720" rtlCol="0" anchor="ctr">
+            <a:normAutofit/>
+          </a:bodyPr>
+          <a:lstStyle>
+            <a:lvl1pPr algn="l" defTabSz="914400" rtl="0" eaLnBrk="1" latinLnBrk="0" hangingPunct="1">
+              <a:lnSpc>
+                <a:spcPct val="90000"/>
+              </a:lnSpc>
+              <a:spcBef>
+                <a:spcPct val="0"/>
+              </a:spcBef>
+              <a:buNone/>
+              <a:defRPr sz="4400" kern="1200">
+                <a:solidFill>
+                  <a:schemeClr val="tx1"/>
+                </a:solidFill>
+                <a:latin typeface="+mj-lt"/>
+                <a:ea typeface="+mj-ea"/>
+                <a:cs typeface="+mj-cs"/>
+              </a:defRPr>
+            </a:lvl1pPr>
+          </a:lstStyle>
+          <a:p>
+            <a:r>
+              <a:rPr lang="en-US" sz="3600" b="1" dirty="0">
+                <a:solidFill>
+                  <a:srgbClr val="F8981C"/>
+                </a:solidFill>
+              </a:rPr>
+              <a:t>K</a:t>
             </a:r>
           </a:p>
         </p:txBody>
@@ -3460,7 +3558,7 @@
     </p:spTree>
     <p:extLst>
       <p:ext uri="{BB962C8B-B14F-4D97-AF65-F5344CB8AC3E}">
-        <p14:creationId xmlns:p14="http://schemas.microsoft.com/office/powerpoint/2010/main" val="1857402067"/>
+        <p14:creationId xmlns:p14="http://schemas.microsoft.com/office/powerpoint/2010/main" val="4035673482"/>
       </p:ext>
     </p:extLst>
   </p:cSld>
@@ -3497,6 +3595,746 @@
             <p:ph type="title"/>
           </p:nvPr>
         </p:nvSpPr>
+        <p:spPr>
+          <a:xfrm>
+            <a:off x="838200" y="365125"/>
+            <a:ext cx="10515600" cy="980959"/>
+          </a:xfrm>
+        </p:spPr>
+        <p:txBody>
+          <a:bodyPr/>
+          <a:lstStyle/>
+          <a:p>
+            <a:r>
+              <a:rPr lang="en-US" b="1" dirty="0">
+                <a:solidFill>
+                  <a:srgbClr val="36ABF3"/>
+                </a:solidFill>
+              </a:rPr>
+              <a:t>Literature Review</a:t>
+            </a:r>
+          </a:p>
+        </p:txBody>
+      </p:sp>
+      <p:sp>
+        <p:nvSpPr>
+          <p:cNvPr id="3" name="Content Placeholder 2"/>
+          <p:cNvSpPr>
+            <a:spLocks noGrp="1"/>
+          </p:cNvSpPr>
+          <p:nvPr>
+            <p:ph idx="1"/>
+          </p:nvPr>
+        </p:nvSpPr>
+        <p:spPr>
+          <a:xfrm>
+            <a:off x="838200" y="1990166"/>
+            <a:ext cx="10515600" cy="4867834"/>
+          </a:xfrm>
+        </p:spPr>
+        <p:txBody>
+          <a:bodyPr>
+            <a:normAutofit/>
+          </a:bodyPr>
+          <a:lstStyle/>
+          <a:p>
+            <a:pPr algn="just"/>
+            <a:endParaRPr lang="en-US" dirty="0"/>
+          </a:p>
+        </p:txBody>
+      </p:sp>
+      <p:cxnSp>
+        <p:nvCxnSpPr>
+          <p:cNvPr id="10" name="Straight Connector 9">
+            <a:extLst>
+              <a:ext uri="{FF2B5EF4-FFF2-40B4-BE49-F238E27FC236}">
+                <a16:creationId xmlns:a16="http://schemas.microsoft.com/office/drawing/2014/main" id="{5C4D56EA-8905-CAFF-FA8B-91B461D57C36}"/>
+              </a:ext>
+            </a:extLst>
+          </p:cNvPr>
+          <p:cNvCxnSpPr>
+            <a:cxnSpLocks/>
+          </p:cNvCxnSpPr>
+          <p:nvPr/>
+        </p:nvCxnSpPr>
+        <p:spPr>
+          <a:xfrm>
+            <a:off x="929640" y="1237129"/>
+            <a:ext cx="10332720" cy="0"/>
+          </a:xfrm>
+          <a:prstGeom prst="line">
+            <a:avLst/>
+          </a:prstGeom>
+          <a:ln w="28575"/>
+        </p:spPr>
+        <p:style>
+          <a:lnRef idx="3">
+            <a:schemeClr val="dk1"/>
+          </a:lnRef>
+          <a:fillRef idx="0">
+            <a:schemeClr val="dk1"/>
+          </a:fillRef>
+          <a:effectRef idx="2">
+            <a:schemeClr val="dk1"/>
+          </a:effectRef>
+          <a:fontRef idx="minor">
+            <a:schemeClr val="tx1"/>
+          </a:fontRef>
+        </p:style>
+      </p:cxnSp>
+      <p:sp>
+        <p:nvSpPr>
+          <p:cNvPr id="4" name="Title 1">
+            <a:extLst>
+              <a:ext uri="{FF2B5EF4-FFF2-40B4-BE49-F238E27FC236}">
+                <a16:creationId xmlns:a16="http://schemas.microsoft.com/office/drawing/2014/main" id="{7ED9CE21-68A5-DE6F-C9B3-F22A1957B184}"/>
+              </a:ext>
+            </a:extLst>
+          </p:cNvPr>
+          <p:cNvSpPr txBox="1">
+            <a:spLocks/>
+          </p:cNvSpPr>
+          <p:nvPr/>
+        </p:nvSpPr>
+        <p:spPr>
+          <a:xfrm>
+            <a:off x="838200" y="1150051"/>
+            <a:ext cx="10515600" cy="959083"/>
+          </a:xfrm>
+          <a:prstGeom prst="rect">
+            <a:avLst/>
+          </a:prstGeom>
+        </p:spPr>
+        <p:txBody>
+          <a:bodyPr vert="horz" lIns="91440" tIns="45720" rIns="91440" bIns="45720" rtlCol="0" anchor="ctr">
+            <a:normAutofit/>
+          </a:bodyPr>
+          <a:lstStyle>
+            <a:lvl1pPr algn="l" defTabSz="914400" rtl="0" eaLnBrk="1" latinLnBrk="0" hangingPunct="1">
+              <a:lnSpc>
+                <a:spcPct val="90000"/>
+              </a:lnSpc>
+              <a:spcBef>
+                <a:spcPct val="0"/>
+              </a:spcBef>
+              <a:buNone/>
+              <a:defRPr sz="4400" kern="1200">
+                <a:solidFill>
+                  <a:schemeClr val="tx1"/>
+                </a:solidFill>
+                <a:latin typeface="+mj-lt"/>
+                <a:ea typeface="+mj-ea"/>
+                <a:cs typeface="+mj-cs"/>
+              </a:defRPr>
+            </a:lvl1pPr>
+          </a:lstStyle>
+          <a:p>
+            <a:r>
+              <a:rPr lang="en-US" sz="3600" b="1" dirty="0">
+                <a:solidFill>
+                  <a:srgbClr val="F8981C"/>
+                </a:solidFill>
+              </a:rPr>
+              <a:t>K</a:t>
+            </a:r>
+          </a:p>
+        </p:txBody>
+      </p:sp>
+    </p:spTree>
+    <p:extLst>
+      <p:ext uri="{BB962C8B-B14F-4D97-AF65-F5344CB8AC3E}">
+        <p14:creationId xmlns:p14="http://schemas.microsoft.com/office/powerpoint/2010/main" val="4109786924"/>
+      </p:ext>
+    </p:extLst>
+  </p:cSld>
+  <p:clrMapOvr>
+    <a:masterClrMapping/>
+  </p:clrMapOvr>
+</p:sld>
+</file>
+
+<file path=ppt/slides/slide12.xml><?xml version="1.0" encoding="utf-8"?>
+<p:sld xmlns:a="http://schemas.openxmlformats.org/drawingml/2006/main" xmlns:r="http://schemas.openxmlformats.org/officeDocument/2006/relationships" xmlns:p="http://schemas.openxmlformats.org/presentationml/2006/main">
+  <p:cSld>
+    <p:spTree>
+      <p:nvGrpSpPr>
+        <p:cNvPr id="1" name=""/>
+        <p:cNvGrpSpPr/>
+        <p:nvPr/>
+      </p:nvGrpSpPr>
+      <p:grpSpPr>
+        <a:xfrm>
+          <a:off x="0" y="0"/>
+          <a:ext cx="0" cy="0"/>
+          <a:chOff x="0" y="0"/>
+          <a:chExt cx="0" cy="0"/>
+        </a:xfrm>
+      </p:grpSpPr>
+      <p:sp>
+        <p:nvSpPr>
+          <p:cNvPr id="2" name="Title 1"/>
+          <p:cNvSpPr>
+            <a:spLocks noGrp="1"/>
+          </p:cNvSpPr>
+          <p:nvPr>
+            <p:ph type="title"/>
+          </p:nvPr>
+        </p:nvSpPr>
+        <p:spPr/>
+        <p:txBody>
+          <a:bodyPr/>
+          <a:lstStyle/>
+          <a:p>
+            <a:r>
+              <a:rPr lang="en-US" b="1" dirty="0">
+                <a:solidFill>
+                  <a:schemeClr val="accent1">
+                    <a:lumMod val="75000"/>
+                  </a:schemeClr>
+                </a:solidFill>
+              </a:rPr>
+              <a:t>Benchmarking</a:t>
+            </a:r>
+          </a:p>
+        </p:txBody>
+      </p:sp>
+      <p:sp>
+        <p:nvSpPr>
+          <p:cNvPr id="3" name="Content Placeholder 2"/>
+          <p:cNvSpPr>
+            <a:spLocks noGrp="1"/>
+          </p:cNvSpPr>
+          <p:nvPr>
+            <p:ph idx="1"/>
+          </p:nvPr>
+        </p:nvSpPr>
+        <p:spPr/>
+        <p:txBody>
+          <a:bodyPr/>
+          <a:lstStyle/>
+          <a:p>
+            <a:pPr algn="just"/>
+            <a:r>
+              <a:rPr lang="en-US" dirty="0"/>
+              <a:t>Once you cover basic understanding of problem, now you will map them in the form of a </a:t>
+            </a:r>
+            <a:r>
+              <a:rPr lang="en-US" b="1" dirty="0"/>
+              <a:t>table</a:t>
+            </a:r>
+            <a:r>
+              <a:rPr lang="en-US" dirty="0"/>
+              <a:t> to narrow down your problem.</a:t>
+            </a:r>
+          </a:p>
+        </p:txBody>
+      </p:sp>
+      <p:pic>
+        <p:nvPicPr>
+          <p:cNvPr id="4" name="Picture 3"/>
+          <p:cNvPicPr>
+            <a:picLocks noChangeAspect="1"/>
+          </p:cNvPicPr>
+          <p:nvPr/>
+        </p:nvPicPr>
+        <p:blipFill>
+          <a:blip r:embed="rId2"/>
+          <a:stretch>
+            <a:fillRect/>
+          </a:stretch>
+        </p:blipFill>
+        <p:spPr>
+          <a:xfrm>
+            <a:off x="3308279" y="2978076"/>
+            <a:ext cx="6078608" cy="3492341"/>
+          </a:xfrm>
+          <a:prstGeom prst="rect">
+            <a:avLst/>
+          </a:prstGeom>
+        </p:spPr>
+      </p:pic>
+    </p:spTree>
+    <p:extLst>
+      <p:ext uri="{BB962C8B-B14F-4D97-AF65-F5344CB8AC3E}">
+        <p14:creationId xmlns:p14="http://schemas.microsoft.com/office/powerpoint/2010/main" val="1318971552"/>
+      </p:ext>
+    </p:extLst>
+  </p:cSld>
+  <p:clrMapOvr>
+    <a:masterClrMapping/>
+  </p:clrMapOvr>
+</p:sld>
+</file>
+
+<file path=ppt/slides/slide13.xml><?xml version="1.0" encoding="utf-8"?>
+<p:sld xmlns:a="http://schemas.openxmlformats.org/drawingml/2006/main" xmlns:r="http://schemas.openxmlformats.org/officeDocument/2006/relationships" xmlns:p="http://schemas.openxmlformats.org/presentationml/2006/main">
+  <p:cSld>
+    <p:spTree>
+      <p:nvGrpSpPr>
+        <p:cNvPr id="1" name=""/>
+        <p:cNvGrpSpPr/>
+        <p:nvPr/>
+      </p:nvGrpSpPr>
+      <p:grpSpPr>
+        <a:xfrm>
+          <a:off x="0" y="0"/>
+          <a:ext cx="0" cy="0"/>
+          <a:chOff x="0" y="0"/>
+          <a:chExt cx="0" cy="0"/>
+        </a:xfrm>
+      </p:grpSpPr>
+      <p:sp>
+        <p:nvSpPr>
+          <p:cNvPr id="2" name="Title 1"/>
+          <p:cNvSpPr>
+            <a:spLocks noGrp="1"/>
+          </p:cNvSpPr>
+          <p:nvPr>
+            <p:ph type="title"/>
+          </p:nvPr>
+        </p:nvSpPr>
+        <p:spPr/>
+        <p:txBody>
+          <a:bodyPr/>
+          <a:lstStyle/>
+          <a:p>
+            <a:r>
+              <a:rPr lang="en-US" b="1" dirty="0">
+                <a:solidFill>
+                  <a:schemeClr val="accent1">
+                    <a:lumMod val="75000"/>
+                  </a:schemeClr>
+                </a:solidFill>
+              </a:rPr>
+              <a:t>Problem Statement</a:t>
+            </a:r>
+          </a:p>
+        </p:txBody>
+      </p:sp>
+      <p:sp>
+        <p:nvSpPr>
+          <p:cNvPr id="3" name="Content Placeholder 2"/>
+          <p:cNvSpPr>
+            <a:spLocks noGrp="1"/>
+          </p:cNvSpPr>
+          <p:nvPr>
+            <p:ph idx="1"/>
+          </p:nvPr>
+        </p:nvSpPr>
+        <p:spPr/>
+        <p:txBody>
+          <a:bodyPr/>
+          <a:lstStyle/>
+          <a:p>
+            <a:pPr algn="just"/>
+            <a:r>
+              <a:rPr lang="en-US" dirty="0"/>
+              <a:t>Define your problem in one paragraph keep in mind your literature review limitations and the gaps identified in the benchmarking table.</a:t>
+            </a:r>
+          </a:p>
+        </p:txBody>
+      </p:sp>
+    </p:spTree>
+    <p:extLst>
+      <p:ext uri="{BB962C8B-B14F-4D97-AF65-F5344CB8AC3E}">
+        <p14:creationId xmlns:p14="http://schemas.microsoft.com/office/powerpoint/2010/main" val="2109580635"/>
+      </p:ext>
+    </p:extLst>
+  </p:cSld>
+  <p:clrMapOvr>
+    <a:masterClrMapping/>
+  </p:clrMapOvr>
+</p:sld>
+</file>
+
+<file path=ppt/slides/slide14.xml><?xml version="1.0" encoding="utf-8"?>
+<p:sld xmlns:a="http://schemas.openxmlformats.org/drawingml/2006/main" xmlns:r="http://schemas.openxmlformats.org/officeDocument/2006/relationships" xmlns:p="http://schemas.openxmlformats.org/presentationml/2006/main">
+  <p:cSld>
+    <p:spTree>
+      <p:nvGrpSpPr>
+        <p:cNvPr id="1" name=""/>
+        <p:cNvGrpSpPr/>
+        <p:nvPr/>
+      </p:nvGrpSpPr>
+      <p:grpSpPr>
+        <a:xfrm>
+          <a:off x="0" y="0"/>
+          <a:ext cx="0" cy="0"/>
+          <a:chOff x="0" y="0"/>
+          <a:chExt cx="0" cy="0"/>
+        </a:xfrm>
+      </p:grpSpPr>
+      <p:sp>
+        <p:nvSpPr>
+          <p:cNvPr id="2" name="Title 1"/>
+          <p:cNvSpPr>
+            <a:spLocks noGrp="1"/>
+          </p:cNvSpPr>
+          <p:nvPr>
+            <p:ph type="title"/>
+          </p:nvPr>
+        </p:nvSpPr>
+        <p:spPr/>
+        <p:txBody>
+          <a:bodyPr/>
+          <a:lstStyle/>
+          <a:p>
+            <a:r>
+              <a:rPr lang="en-US" b="1" dirty="0">
+                <a:solidFill>
+                  <a:schemeClr val="accent1">
+                    <a:lumMod val="75000"/>
+                  </a:schemeClr>
+                </a:solidFill>
+              </a:rPr>
+              <a:t>Proposed Model</a:t>
+            </a:r>
+          </a:p>
+        </p:txBody>
+      </p:sp>
+      <p:sp>
+        <p:nvSpPr>
+          <p:cNvPr id="3" name="Content Placeholder 2"/>
+          <p:cNvSpPr>
+            <a:spLocks noGrp="1"/>
+          </p:cNvSpPr>
+          <p:nvPr>
+            <p:ph idx="1"/>
+          </p:nvPr>
+        </p:nvSpPr>
+        <p:spPr/>
+        <p:txBody>
+          <a:bodyPr/>
+          <a:lstStyle/>
+          <a:p>
+            <a:pPr algn="just"/>
+            <a:r>
+              <a:rPr lang="en-US" dirty="0"/>
+              <a:t>Write down abstract idea of your project, and add its model diagram</a:t>
+            </a:r>
+          </a:p>
+        </p:txBody>
+      </p:sp>
+      <p:pic>
+        <p:nvPicPr>
+          <p:cNvPr id="4" name="Picture 3"/>
+          <p:cNvPicPr>
+            <a:picLocks noChangeAspect="1"/>
+          </p:cNvPicPr>
+          <p:nvPr/>
+        </p:nvPicPr>
+        <p:blipFill>
+          <a:blip r:embed="rId2">
+            <a:extLst>
+              <a:ext uri="{28A0092B-C50C-407E-A947-70E740481C1C}">
+                <a14:useLocalDpi xmlns:a14="http://schemas.microsoft.com/office/drawing/2010/main" val="0"/>
+              </a:ext>
+            </a:extLst>
+          </a:blip>
+          <a:stretch>
+            <a:fillRect/>
+          </a:stretch>
+        </p:blipFill>
+        <p:spPr>
+          <a:xfrm>
+            <a:off x="2578814" y="2849960"/>
+            <a:ext cx="6598710" cy="3093793"/>
+          </a:xfrm>
+          <a:prstGeom prst="rect">
+            <a:avLst/>
+          </a:prstGeom>
+        </p:spPr>
+      </p:pic>
+    </p:spTree>
+    <p:extLst>
+      <p:ext uri="{BB962C8B-B14F-4D97-AF65-F5344CB8AC3E}">
+        <p14:creationId xmlns:p14="http://schemas.microsoft.com/office/powerpoint/2010/main" val="4175500007"/>
+      </p:ext>
+    </p:extLst>
+  </p:cSld>
+  <p:clrMapOvr>
+    <a:masterClrMapping/>
+  </p:clrMapOvr>
+</p:sld>
+</file>
+
+<file path=ppt/slides/slide15.xml><?xml version="1.0" encoding="utf-8"?>
+<p:sld xmlns:a="http://schemas.openxmlformats.org/drawingml/2006/main" xmlns:r="http://schemas.openxmlformats.org/officeDocument/2006/relationships" xmlns:p="http://schemas.openxmlformats.org/presentationml/2006/main">
+  <p:cSld>
+    <p:spTree>
+      <p:nvGrpSpPr>
+        <p:cNvPr id="1" name=""/>
+        <p:cNvGrpSpPr/>
+        <p:nvPr/>
+      </p:nvGrpSpPr>
+      <p:grpSpPr>
+        <a:xfrm>
+          <a:off x="0" y="0"/>
+          <a:ext cx="0" cy="0"/>
+          <a:chOff x="0" y="0"/>
+          <a:chExt cx="0" cy="0"/>
+        </a:xfrm>
+      </p:grpSpPr>
+      <p:sp>
+        <p:nvSpPr>
+          <p:cNvPr id="2" name="Title 1"/>
+          <p:cNvSpPr>
+            <a:spLocks noGrp="1"/>
+          </p:cNvSpPr>
+          <p:nvPr>
+            <p:ph type="title"/>
+          </p:nvPr>
+        </p:nvSpPr>
+        <p:spPr/>
+        <p:txBody>
+          <a:bodyPr/>
+          <a:lstStyle/>
+          <a:p>
+            <a:r>
+              <a:rPr lang="en-US" b="1" dirty="0">
+                <a:solidFill>
+                  <a:schemeClr val="accent1">
+                    <a:lumMod val="75000"/>
+                  </a:schemeClr>
+                </a:solidFill>
+              </a:rPr>
+              <a:t>Scope of your Project</a:t>
+            </a:r>
+          </a:p>
+        </p:txBody>
+      </p:sp>
+      <p:sp>
+        <p:nvSpPr>
+          <p:cNvPr id="3" name="Content Placeholder 2"/>
+          <p:cNvSpPr>
+            <a:spLocks noGrp="1"/>
+          </p:cNvSpPr>
+          <p:nvPr>
+            <p:ph idx="1"/>
+          </p:nvPr>
+        </p:nvSpPr>
+        <p:spPr/>
+        <p:txBody>
+          <a:bodyPr/>
+          <a:lstStyle/>
+          <a:p>
+            <a:pPr algn="just"/>
+            <a:r>
+              <a:rPr lang="en-US" dirty="0"/>
+              <a:t>Properly write the scope of your project. Avoid general solutions. </a:t>
+            </a:r>
+          </a:p>
+        </p:txBody>
+      </p:sp>
+    </p:spTree>
+    <p:extLst>
+      <p:ext uri="{BB962C8B-B14F-4D97-AF65-F5344CB8AC3E}">
+        <p14:creationId xmlns:p14="http://schemas.microsoft.com/office/powerpoint/2010/main" val="1236339636"/>
+      </p:ext>
+    </p:extLst>
+  </p:cSld>
+  <p:clrMapOvr>
+    <a:masterClrMapping/>
+  </p:clrMapOvr>
+</p:sld>
+</file>
+
+<file path=ppt/slides/slide16.xml><?xml version="1.0" encoding="utf-8"?>
+<p:sld xmlns:a="http://schemas.openxmlformats.org/drawingml/2006/main" xmlns:r="http://schemas.openxmlformats.org/officeDocument/2006/relationships" xmlns:p="http://schemas.openxmlformats.org/presentationml/2006/main">
+  <p:cSld>
+    <p:spTree>
+      <p:nvGrpSpPr>
+        <p:cNvPr id="1" name=""/>
+        <p:cNvGrpSpPr/>
+        <p:nvPr/>
+      </p:nvGrpSpPr>
+      <p:grpSpPr>
+        <a:xfrm>
+          <a:off x="0" y="0"/>
+          <a:ext cx="0" cy="0"/>
+          <a:chOff x="0" y="0"/>
+          <a:chExt cx="0" cy="0"/>
+        </a:xfrm>
+      </p:grpSpPr>
+      <p:sp>
+        <p:nvSpPr>
+          <p:cNvPr id="2" name="Title 1"/>
+          <p:cNvSpPr>
+            <a:spLocks noGrp="1"/>
+          </p:cNvSpPr>
+          <p:nvPr>
+            <p:ph type="title"/>
+          </p:nvPr>
+        </p:nvSpPr>
+        <p:spPr/>
+        <p:txBody>
+          <a:bodyPr/>
+          <a:lstStyle/>
+          <a:p>
+            <a:r>
+              <a:rPr lang="en-US" b="1" dirty="0">
+                <a:solidFill>
+                  <a:schemeClr val="accent1">
+                    <a:lumMod val="75000"/>
+                  </a:schemeClr>
+                </a:solidFill>
+              </a:rPr>
+              <a:t>Tools and Technologies (Market Base)</a:t>
+            </a:r>
+          </a:p>
+        </p:txBody>
+      </p:sp>
+      <p:sp>
+        <p:nvSpPr>
+          <p:cNvPr id="3" name="Content Placeholder 2"/>
+          <p:cNvSpPr>
+            <a:spLocks noGrp="1"/>
+          </p:cNvSpPr>
+          <p:nvPr>
+            <p:ph idx="1"/>
+          </p:nvPr>
+        </p:nvSpPr>
+        <p:spPr/>
+        <p:txBody>
+          <a:bodyPr/>
+          <a:lstStyle/>
+          <a:p>
+            <a:pPr algn="just"/>
+            <a:r>
+              <a:rPr lang="en-US" dirty="0"/>
+              <a:t>List down tools and technologies, you want to use for development purposes. Avoid old ones, explore market oriented tools and technologies. </a:t>
+            </a:r>
+          </a:p>
+        </p:txBody>
+      </p:sp>
+    </p:spTree>
+    <p:extLst>
+      <p:ext uri="{BB962C8B-B14F-4D97-AF65-F5344CB8AC3E}">
+        <p14:creationId xmlns:p14="http://schemas.microsoft.com/office/powerpoint/2010/main" val="1034597514"/>
+      </p:ext>
+    </p:extLst>
+  </p:cSld>
+  <p:clrMapOvr>
+    <a:masterClrMapping/>
+  </p:clrMapOvr>
+</p:sld>
+</file>
+
+<file path=ppt/slides/slide17.xml><?xml version="1.0" encoding="utf-8"?>
+<p:sld xmlns:a="http://schemas.openxmlformats.org/drawingml/2006/main" xmlns:r="http://schemas.openxmlformats.org/officeDocument/2006/relationships" xmlns:p="http://schemas.openxmlformats.org/presentationml/2006/main">
+  <p:cSld>
+    <p:spTree>
+      <p:nvGrpSpPr>
+        <p:cNvPr id="1" name=""/>
+        <p:cNvGrpSpPr/>
+        <p:nvPr/>
+      </p:nvGrpSpPr>
+      <p:grpSpPr>
+        <a:xfrm>
+          <a:off x="0" y="0"/>
+          <a:ext cx="0" cy="0"/>
+          <a:chOff x="0" y="0"/>
+          <a:chExt cx="0" cy="0"/>
+        </a:xfrm>
+      </p:grpSpPr>
+      <p:sp>
+        <p:nvSpPr>
+          <p:cNvPr id="2" name="Title 1"/>
+          <p:cNvSpPr>
+            <a:spLocks noGrp="1"/>
+          </p:cNvSpPr>
+          <p:nvPr>
+            <p:ph type="title"/>
+          </p:nvPr>
+        </p:nvSpPr>
+        <p:spPr/>
+        <p:txBody>
+          <a:bodyPr/>
+          <a:lstStyle/>
+          <a:p>
+            <a:r>
+              <a:rPr lang="en-US" b="1" dirty="0">
+                <a:solidFill>
+                  <a:schemeClr val="accent1">
+                    <a:lumMod val="75000"/>
+                  </a:schemeClr>
+                </a:solidFill>
+              </a:rPr>
+              <a:t>Final Outcome</a:t>
+            </a:r>
+          </a:p>
+        </p:txBody>
+      </p:sp>
+      <p:sp>
+        <p:nvSpPr>
+          <p:cNvPr id="3" name="Content Placeholder 2"/>
+          <p:cNvSpPr>
+            <a:spLocks noGrp="1"/>
+          </p:cNvSpPr>
+          <p:nvPr>
+            <p:ph idx="1"/>
+          </p:nvPr>
+        </p:nvSpPr>
+        <p:spPr/>
+        <p:txBody>
+          <a:bodyPr/>
+          <a:lstStyle/>
+          <a:p>
+            <a:pPr algn="just"/>
+            <a:r>
+              <a:rPr lang="en-US" dirty="0"/>
+              <a:t>Describe shortly the nature of your project outcome. </a:t>
+            </a:r>
+          </a:p>
+          <a:p>
+            <a:pPr algn="just"/>
+            <a:r>
+              <a:rPr lang="en-US" dirty="0"/>
+              <a:t>Whether it’s a Advance Technology/ Product / Framework/ Solution to the existing Problem or a novel research, etc. </a:t>
+            </a:r>
+          </a:p>
+        </p:txBody>
+      </p:sp>
+    </p:spTree>
+    <p:extLst>
+      <p:ext uri="{BB962C8B-B14F-4D97-AF65-F5344CB8AC3E}">
+        <p14:creationId xmlns:p14="http://schemas.microsoft.com/office/powerpoint/2010/main" val="1857402067"/>
+      </p:ext>
+    </p:extLst>
+  </p:cSld>
+  <p:clrMapOvr>
+    <a:masterClrMapping/>
+  </p:clrMapOvr>
+</p:sld>
+</file>
+
+<file path=ppt/slides/slide18.xml><?xml version="1.0" encoding="utf-8"?>
+<p:sld xmlns:a="http://schemas.openxmlformats.org/drawingml/2006/main" xmlns:r="http://schemas.openxmlformats.org/officeDocument/2006/relationships" xmlns:p="http://schemas.openxmlformats.org/presentationml/2006/main">
+  <p:cSld>
+    <p:spTree>
+      <p:nvGrpSpPr>
+        <p:cNvPr id="1" name=""/>
+        <p:cNvGrpSpPr/>
+        <p:nvPr/>
+      </p:nvGrpSpPr>
+      <p:grpSpPr>
+        <a:xfrm>
+          <a:off x="0" y="0"/>
+          <a:ext cx="0" cy="0"/>
+          <a:chOff x="0" y="0"/>
+          <a:chExt cx="0" cy="0"/>
+        </a:xfrm>
+      </p:grpSpPr>
+      <p:sp>
+        <p:nvSpPr>
+          <p:cNvPr id="2" name="Title 1"/>
+          <p:cNvSpPr>
+            <a:spLocks noGrp="1"/>
+          </p:cNvSpPr>
+          <p:nvPr>
+            <p:ph type="title"/>
+          </p:nvPr>
+        </p:nvSpPr>
         <p:spPr/>
         <p:txBody>
           <a:bodyPr/>
@@ -3592,7 +4430,7 @@
 </p:sld>
 </file>
 
-<file path=ppt/slides/slide12.xml><?xml version="1.0" encoding="utf-8"?>
+<file path=ppt/slides/slide19.xml><?xml version="1.0" encoding="utf-8"?>
 <p:sld xmlns:a="http://schemas.openxmlformats.org/drawingml/2006/main" xmlns:r="http://schemas.openxmlformats.org/officeDocument/2006/relationships" xmlns:p="http://schemas.openxmlformats.org/presentationml/2006/main">
   <p:cSld>
     <p:spTree>
@@ -3681,9 +4519,7 @@
             <a:r>
               <a:rPr lang="en-US" b="1" dirty="0">
                 <a:solidFill>
-                  <a:schemeClr val="accent1">
-                    <a:lumMod val="75000"/>
-                  </a:schemeClr>
+                  <a:srgbClr val="36ABF3"/>
                 </a:solidFill>
               </a:rPr>
               <a:t>Table of Contents</a:t>
@@ -3892,7 +4728,12 @@
             <p:ph type="title"/>
           </p:nvPr>
         </p:nvSpPr>
-        <p:spPr/>
+        <p:spPr>
+          <a:xfrm>
+            <a:off x="838200" y="365125"/>
+            <a:ext cx="10515600" cy="980959"/>
+          </a:xfrm>
+        </p:spPr>
         <p:txBody>
           <a:bodyPr/>
           <a:lstStyle/>
@@ -3900,12 +4741,10 @@
             <a:r>
               <a:rPr lang="en-US" b="1" dirty="0">
                 <a:solidFill>
-                  <a:schemeClr val="accent1">
-                    <a:lumMod val="75000"/>
-                  </a:schemeClr>
+                  <a:srgbClr val="36ABF3"/>
                 </a:solidFill>
               </a:rPr>
-              <a:t>Literature Review</a:t>
+              <a:t>Introduction</a:t>
             </a:r>
           </a:p>
         </p:txBody>
@@ -3920,30 +4759,358 @@
             <p:ph idx="1"/>
           </p:nvPr>
         </p:nvSpPr>
-        <p:spPr/>
-        <p:txBody>
-          <a:bodyPr/>
+        <p:spPr>
+          <a:xfrm>
+            <a:off x="838200" y="1346085"/>
+            <a:ext cx="10515600" cy="2970422"/>
+          </a:xfrm>
+        </p:spPr>
+        <p:txBody>
+          <a:bodyPr>
+            <a:normAutofit/>
+          </a:bodyPr>
           <a:lstStyle/>
           <a:p>
             <a:pPr algn="just"/>
             <a:r>
               <a:rPr lang="en-US" dirty="0"/>
-              <a:t>Prepare at-least five (5) slides and develop a base for your project starting from initial technology/research. </a:t>
+              <a:t>Constituency Connect is a web-based application designed to improve communication between constituents (citizens) and their elected representatives.</a:t>
             </a:r>
           </a:p>
           <a:p>
             <a:pPr algn="just"/>
             <a:r>
               <a:rPr lang="en-US" dirty="0"/>
-              <a:t>Properly reference previously used tools and technologies [3].</a:t>
-            </a:r>
-          </a:p>
-        </p:txBody>
-      </p:sp>
+              <a:t>The platform enables users to report complaints, participate in surveys, track performance, and engage with representatives through real-time updates and virtual meetups.</a:t>
+            </a:r>
+          </a:p>
+          <a:p>
+            <a:pPr algn="just"/>
+            <a:endParaRPr lang="en-US" dirty="0"/>
+          </a:p>
+          <a:p>
+            <a:pPr algn="just"/>
+            <a:endParaRPr lang="en-US" dirty="0"/>
+          </a:p>
+        </p:txBody>
+      </p:sp>
+      <p:sp>
+        <p:nvSpPr>
+          <p:cNvPr id="6" name="Content Placeholder 2">
+            <a:extLst>
+              <a:ext uri="{FF2B5EF4-FFF2-40B4-BE49-F238E27FC236}">
+                <a16:creationId xmlns:a16="http://schemas.microsoft.com/office/drawing/2014/main" id="{BD5E65B9-5C72-B453-20CA-2F0511A73FD6}"/>
+              </a:ext>
+            </a:extLst>
+          </p:cNvPr>
+          <p:cNvSpPr txBox="1">
+            <a:spLocks/>
+          </p:cNvSpPr>
+          <p:nvPr/>
+        </p:nvSpPr>
+        <p:spPr>
+          <a:xfrm>
+            <a:off x="838198" y="4631483"/>
+            <a:ext cx="10515601" cy="1325564"/>
+          </a:xfrm>
+          <a:prstGeom prst="rect">
+            <a:avLst/>
+          </a:prstGeom>
+        </p:spPr>
+        <p:txBody>
+          <a:bodyPr vert="horz" lIns="91440" tIns="45720" rIns="91440" bIns="45720" rtlCol="0">
+            <a:normAutofit/>
+          </a:bodyPr>
+          <a:lstStyle>
+            <a:lvl1pPr marL="228600" indent="-228600" algn="l" defTabSz="914400" rtl="0" eaLnBrk="1" latinLnBrk="0" hangingPunct="1">
+              <a:lnSpc>
+                <a:spcPct val="90000"/>
+              </a:lnSpc>
+              <a:spcBef>
+                <a:spcPts val="1000"/>
+              </a:spcBef>
+              <a:buFont typeface="Arial" panose="020B0604020202020204" pitchFamily="34" charset="0"/>
+              <a:buChar char="•"/>
+              <a:defRPr sz="2800" kern="1200">
+                <a:solidFill>
+                  <a:schemeClr val="tx1"/>
+                </a:solidFill>
+                <a:latin typeface="+mn-lt"/>
+                <a:ea typeface="+mn-ea"/>
+                <a:cs typeface="+mn-cs"/>
+              </a:defRPr>
+            </a:lvl1pPr>
+            <a:lvl2pPr marL="685800" indent="-228600" algn="l" defTabSz="914400" rtl="0" eaLnBrk="1" latinLnBrk="0" hangingPunct="1">
+              <a:lnSpc>
+                <a:spcPct val="90000"/>
+              </a:lnSpc>
+              <a:spcBef>
+                <a:spcPts val="500"/>
+              </a:spcBef>
+              <a:buFont typeface="Arial" panose="020B0604020202020204" pitchFamily="34" charset="0"/>
+              <a:buChar char="•"/>
+              <a:defRPr sz="2400" kern="1200">
+                <a:solidFill>
+                  <a:schemeClr val="tx1"/>
+                </a:solidFill>
+                <a:latin typeface="+mn-lt"/>
+                <a:ea typeface="+mn-ea"/>
+                <a:cs typeface="+mn-cs"/>
+              </a:defRPr>
+            </a:lvl2pPr>
+            <a:lvl3pPr marL="1143000" indent="-228600" algn="l" defTabSz="914400" rtl="0" eaLnBrk="1" latinLnBrk="0" hangingPunct="1">
+              <a:lnSpc>
+                <a:spcPct val="90000"/>
+              </a:lnSpc>
+              <a:spcBef>
+                <a:spcPts val="500"/>
+              </a:spcBef>
+              <a:buFont typeface="Arial" panose="020B0604020202020204" pitchFamily="34" charset="0"/>
+              <a:buChar char="•"/>
+              <a:defRPr sz="2000" kern="1200">
+                <a:solidFill>
+                  <a:schemeClr val="tx1"/>
+                </a:solidFill>
+                <a:latin typeface="+mn-lt"/>
+                <a:ea typeface="+mn-ea"/>
+                <a:cs typeface="+mn-cs"/>
+              </a:defRPr>
+            </a:lvl3pPr>
+            <a:lvl4pPr marL="1600200" indent="-228600" algn="l" defTabSz="914400" rtl="0" eaLnBrk="1" latinLnBrk="0" hangingPunct="1">
+              <a:lnSpc>
+                <a:spcPct val="90000"/>
+              </a:lnSpc>
+              <a:spcBef>
+                <a:spcPts val="500"/>
+              </a:spcBef>
+              <a:buFont typeface="Arial" panose="020B0604020202020204" pitchFamily="34" charset="0"/>
+              <a:buChar char="•"/>
+              <a:defRPr sz="1800" kern="1200">
+                <a:solidFill>
+                  <a:schemeClr val="tx1"/>
+                </a:solidFill>
+                <a:latin typeface="+mn-lt"/>
+                <a:ea typeface="+mn-ea"/>
+                <a:cs typeface="+mn-cs"/>
+              </a:defRPr>
+            </a:lvl4pPr>
+            <a:lvl5pPr marL="2057400" indent="-228600" algn="l" defTabSz="914400" rtl="0" eaLnBrk="1" latinLnBrk="0" hangingPunct="1">
+              <a:lnSpc>
+                <a:spcPct val="90000"/>
+              </a:lnSpc>
+              <a:spcBef>
+                <a:spcPts val="500"/>
+              </a:spcBef>
+              <a:buFont typeface="Arial" panose="020B0604020202020204" pitchFamily="34" charset="0"/>
+              <a:buChar char="•"/>
+              <a:defRPr sz="1800" kern="1200">
+                <a:solidFill>
+                  <a:schemeClr val="tx1"/>
+                </a:solidFill>
+                <a:latin typeface="+mn-lt"/>
+                <a:ea typeface="+mn-ea"/>
+                <a:cs typeface="+mn-cs"/>
+              </a:defRPr>
+            </a:lvl5pPr>
+            <a:lvl6pPr marL="2514600" indent="-228600" algn="l" defTabSz="914400" rtl="0" eaLnBrk="1" latinLnBrk="0" hangingPunct="1">
+              <a:lnSpc>
+                <a:spcPct val="90000"/>
+              </a:lnSpc>
+              <a:spcBef>
+                <a:spcPts val="500"/>
+              </a:spcBef>
+              <a:buFont typeface="Arial" panose="020B0604020202020204" pitchFamily="34" charset="0"/>
+              <a:buChar char="•"/>
+              <a:defRPr sz="1800" kern="1200">
+                <a:solidFill>
+                  <a:schemeClr val="tx1"/>
+                </a:solidFill>
+                <a:latin typeface="+mn-lt"/>
+                <a:ea typeface="+mn-ea"/>
+                <a:cs typeface="+mn-cs"/>
+              </a:defRPr>
+            </a:lvl6pPr>
+            <a:lvl7pPr marL="2971800" indent="-228600" algn="l" defTabSz="914400" rtl="0" eaLnBrk="1" latinLnBrk="0" hangingPunct="1">
+              <a:lnSpc>
+                <a:spcPct val="90000"/>
+              </a:lnSpc>
+              <a:spcBef>
+                <a:spcPts val="500"/>
+              </a:spcBef>
+              <a:buFont typeface="Arial" panose="020B0604020202020204" pitchFamily="34" charset="0"/>
+              <a:buChar char="•"/>
+              <a:defRPr sz="1800" kern="1200">
+                <a:solidFill>
+                  <a:schemeClr val="tx1"/>
+                </a:solidFill>
+                <a:latin typeface="+mn-lt"/>
+                <a:ea typeface="+mn-ea"/>
+                <a:cs typeface="+mn-cs"/>
+              </a:defRPr>
+            </a:lvl7pPr>
+            <a:lvl8pPr marL="3429000" indent="-228600" algn="l" defTabSz="914400" rtl="0" eaLnBrk="1" latinLnBrk="0" hangingPunct="1">
+              <a:lnSpc>
+                <a:spcPct val="90000"/>
+              </a:lnSpc>
+              <a:spcBef>
+                <a:spcPts val="500"/>
+              </a:spcBef>
+              <a:buFont typeface="Arial" panose="020B0604020202020204" pitchFamily="34" charset="0"/>
+              <a:buChar char="•"/>
+              <a:defRPr sz="1800" kern="1200">
+                <a:solidFill>
+                  <a:schemeClr val="tx1"/>
+                </a:solidFill>
+                <a:latin typeface="+mn-lt"/>
+                <a:ea typeface="+mn-ea"/>
+                <a:cs typeface="+mn-cs"/>
+              </a:defRPr>
+            </a:lvl8pPr>
+            <a:lvl9pPr marL="3886200" indent="-228600" algn="l" defTabSz="914400" rtl="0" eaLnBrk="1" latinLnBrk="0" hangingPunct="1">
+              <a:lnSpc>
+                <a:spcPct val="90000"/>
+              </a:lnSpc>
+              <a:spcBef>
+                <a:spcPts val="500"/>
+              </a:spcBef>
+              <a:buFont typeface="Arial" panose="020B0604020202020204" pitchFamily="34" charset="0"/>
+              <a:buChar char="•"/>
+              <a:defRPr sz="1800" kern="1200">
+                <a:solidFill>
+                  <a:schemeClr val="tx1"/>
+                </a:solidFill>
+                <a:latin typeface="+mn-lt"/>
+                <a:ea typeface="+mn-ea"/>
+                <a:cs typeface="+mn-cs"/>
+              </a:defRPr>
+            </a:lvl9pPr>
+          </a:lstStyle>
+          <a:p>
+            <a:pPr algn="just"/>
+            <a:r>
+              <a:rPr lang="en-US" dirty="0"/>
+              <a:t>Provide a seamless, transparent, and efficient channel for citizens to voice their concerns, track issues, and hold representatives accountable for actions and resolutions.</a:t>
+            </a:r>
+          </a:p>
+        </p:txBody>
+      </p:sp>
+      <p:sp>
+        <p:nvSpPr>
+          <p:cNvPr id="8" name="Title 1">
+            <a:extLst>
+              <a:ext uri="{FF2B5EF4-FFF2-40B4-BE49-F238E27FC236}">
+                <a16:creationId xmlns:a16="http://schemas.microsoft.com/office/drawing/2014/main" id="{D4FFCC61-5DC3-8DFB-FA08-74CB9D7C9781}"/>
+              </a:ext>
+            </a:extLst>
+          </p:cNvPr>
+          <p:cNvSpPr txBox="1">
+            <a:spLocks/>
+          </p:cNvSpPr>
+          <p:nvPr/>
+        </p:nvSpPr>
+        <p:spPr>
+          <a:xfrm>
+            <a:off x="838199" y="3836964"/>
+            <a:ext cx="10515600" cy="959083"/>
+          </a:xfrm>
+          <a:prstGeom prst="rect">
+            <a:avLst/>
+          </a:prstGeom>
+        </p:spPr>
+        <p:txBody>
+          <a:bodyPr vert="horz" lIns="91440" tIns="45720" rIns="91440" bIns="45720" rtlCol="0" anchor="ctr">
+            <a:normAutofit/>
+          </a:bodyPr>
+          <a:lstStyle>
+            <a:lvl1pPr algn="l" defTabSz="914400" rtl="0" eaLnBrk="1" latinLnBrk="0" hangingPunct="1">
+              <a:lnSpc>
+                <a:spcPct val="90000"/>
+              </a:lnSpc>
+              <a:spcBef>
+                <a:spcPct val="0"/>
+              </a:spcBef>
+              <a:buNone/>
+              <a:defRPr sz="4400" kern="1200">
+                <a:solidFill>
+                  <a:schemeClr val="tx1"/>
+                </a:solidFill>
+                <a:latin typeface="+mj-lt"/>
+                <a:ea typeface="+mj-ea"/>
+                <a:cs typeface="+mj-cs"/>
+              </a:defRPr>
+            </a:lvl1pPr>
+          </a:lstStyle>
+          <a:p>
+            <a:r>
+              <a:rPr lang="en-US" sz="3600" b="1" dirty="0">
+                <a:solidFill>
+                  <a:srgbClr val="F8981C"/>
+                </a:solidFill>
+              </a:rPr>
+              <a:t>Core</a:t>
+            </a:r>
+            <a:r>
+              <a:rPr lang="en-US" sz="3600" b="1" dirty="0"/>
+              <a:t> </a:t>
+            </a:r>
+            <a:r>
+              <a:rPr lang="en-US" sz="3600" b="1" dirty="0">
+                <a:solidFill>
+                  <a:srgbClr val="F8981C"/>
+                </a:solidFill>
+              </a:rPr>
+              <a:t>Idea</a:t>
+            </a:r>
+            <a:r>
+              <a:rPr lang="en-US" sz="3600" b="1" dirty="0"/>
+              <a:t>:</a:t>
+            </a:r>
+          </a:p>
+        </p:txBody>
+      </p:sp>
+      <p:cxnSp>
+        <p:nvCxnSpPr>
+          <p:cNvPr id="10" name="Straight Connector 9">
+            <a:extLst>
+              <a:ext uri="{FF2B5EF4-FFF2-40B4-BE49-F238E27FC236}">
+                <a16:creationId xmlns:a16="http://schemas.microsoft.com/office/drawing/2014/main" id="{5C4D56EA-8905-CAFF-FA8B-91B461D57C36}"/>
+              </a:ext>
+            </a:extLst>
+          </p:cNvPr>
+          <p:cNvCxnSpPr>
+            <a:cxnSpLocks/>
+          </p:cNvCxnSpPr>
+          <p:nvPr/>
+        </p:nvCxnSpPr>
+        <p:spPr>
+          <a:xfrm>
+            <a:off x="929640" y="1237129"/>
+            <a:ext cx="10332720" cy="0"/>
+          </a:xfrm>
+          <a:prstGeom prst="line">
+            <a:avLst/>
+          </a:prstGeom>
+          <a:ln w="28575"/>
+        </p:spPr>
+        <p:style>
+          <a:lnRef idx="3">
+            <a:schemeClr val="dk1"/>
+          </a:lnRef>
+          <a:fillRef idx="0">
+            <a:schemeClr val="dk1"/>
+          </a:fillRef>
+          <a:effectRef idx="2">
+            <a:schemeClr val="dk1"/>
+          </a:effectRef>
+          <a:fontRef idx="minor">
+            <a:schemeClr val="tx1"/>
+          </a:fontRef>
+        </p:style>
+      </p:cxnSp>
     </p:spTree>
     <p:extLst>
       <p:ext uri="{BB962C8B-B14F-4D97-AF65-F5344CB8AC3E}">
-        <p14:creationId xmlns:p14="http://schemas.microsoft.com/office/powerpoint/2010/main" val="1249639538"/>
+        <p14:creationId xmlns:p14="http://schemas.microsoft.com/office/powerpoint/2010/main" val="4184228135"/>
       </p:ext>
     </p:extLst>
   </p:cSld>
@@ -3980,83 +5147,186 @@
             <p:ph type="title"/>
           </p:nvPr>
         </p:nvSpPr>
-        <p:spPr/>
-        <p:txBody>
-          <a:bodyPr/>
-          <a:lstStyle/>
-          <a:p>
-            <a:r>
-              <a:rPr lang="en-US" b="1" dirty="0">
-                <a:solidFill>
-                  <a:schemeClr val="accent1">
-                    <a:lumMod val="75000"/>
-                  </a:schemeClr>
-                </a:solidFill>
-              </a:rPr>
-              <a:t>Benchmarking</a:t>
-            </a:r>
-          </a:p>
-        </p:txBody>
-      </p:sp>
-      <p:sp>
-        <p:nvSpPr>
-          <p:cNvPr id="3" name="Content Placeholder 2"/>
-          <p:cNvSpPr>
-            <a:spLocks noGrp="1"/>
-          </p:cNvSpPr>
-          <p:nvPr>
-            <p:ph idx="1"/>
-          </p:nvPr>
-        </p:nvSpPr>
-        <p:spPr/>
-        <p:txBody>
-          <a:bodyPr/>
-          <a:lstStyle/>
-          <a:p>
-            <a:pPr algn="just"/>
-            <a:r>
-              <a:rPr lang="en-US" dirty="0"/>
-              <a:t>Once you cover basic understanding of problem, now you will map them in the form of a </a:t>
-            </a:r>
-            <a:r>
-              <a:rPr lang="en-US" b="1" dirty="0"/>
-              <a:t>table</a:t>
-            </a:r>
-            <a:r>
-              <a:rPr lang="en-US" dirty="0"/>
-              <a:t> to narrow down your problem.</a:t>
-            </a:r>
-          </a:p>
-        </p:txBody>
-      </p:sp>
-      <p:pic>
-        <p:nvPicPr>
-          <p:cNvPr id="4" name="Picture 3"/>
-          <p:cNvPicPr>
-            <a:picLocks noChangeAspect="1"/>
-          </p:cNvPicPr>
-          <p:nvPr/>
-        </p:nvPicPr>
-        <p:blipFill>
-          <a:blip r:embed="rId2"/>
-          <a:stretch>
-            <a:fillRect/>
-          </a:stretch>
-        </p:blipFill>
         <p:spPr>
           <a:xfrm>
-            <a:off x="3308279" y="2978076"/>
-            <a:ext cx="6078608" cy="3492341"/>
+            <a:off x="838200" y="365125"/>
+            <a:ext cx="10515600" cy="980959"/>
+          </a:xfrm>
+        </p:spPr>
+        <p:txBody>
+          <a:bodyPr/>
+          <a:lstStyle/>
+          <a:p>
+            <a:r>
+              <a:rPr lang="en-US" b="1" dirty="0">
+                <a:solidFill>
+                  <a:srgbClr val="36ABF3"/>
+                </a:solidFill>
+              </a:rPr>
+              <a:t>Introduction</a:t>
+            </a:r>
+          </a:p>
+        </p:txBody>
+      </p:sp>
+      <p:sp>
+        <p:nvSpPr>
+          <p:cNvPr id="3" name="Content Placeholder 2"/>
+          <p:cNvSpPr>
+            <a:spLocks noGrp="1"/>
+          </p:cNvSpPr>
+          <p:nvPr>
+            <p:ph idx="1"/>
+          </p:nvPr>
+        </p:nvSpPr>
+        <p:spPr>
+          <a:xfrm>
+            <a:off x="838200" y="1990166"/>
+            <a:ext cx="10515600" cy="4867834"/>
+          </a:xfrm>
+        </p:spPr>
+        <p:txBody>
+          <a:bodyPr>
+            <a:normAutofit/>
+          </a:bodyPr>
+          <a:lstStyle/>
+          <a:p>
+            <a:pPr algn="just"/>
+            <a:r>
+              <a:rPr lang="en-US" dirty="0"/>
+              <a:t>Complaint Reporting: Allows users to file complaints and track progress.</a:t>
+            </a:r>
+          </a:p>
+          <a:p>
+            <a:pPr algn="just"/>
+            <a:r>
+              <a:rPr lang="en-US" dirty="0"/>
+              <a:t>Performance Tracking: Track the performance of representatives with data visualizations.</a:t>
+            </a:r>
+          </a:p>
+          <a:p>
+            <a:pPr algn="just"/>
+            <a:r>
+              <a:rPr lang="en-US" dirty="0"/>
+              <a:t>Real-Time Updates: Stay informed with live updates on complaint statuses, event notifications, etc.</a:t>
+            </a:r>
+          </a:p>
+          <a:p>
+            <a:pPr algn="just"/>
+            <a:r>
+              <a:rPr lang="en-US" dirty="0"/>
+              <a:t>Virtual Meetups: Enable citizens to engage in video conferencing sessions with representatives.</a:t>
+            </a:r>
+          </a:p>
+          <a:p>
+            <a:pPr algn="just"/>
+            <a:r>
+              <a:rPr lang="en-US" dirty="0"/>
+              <a:t>Surveys and Polls: Gather feedback on public issues through interactive surveys and polls.</a:t>
+            </a:r>
+          </a:p>
+        </p:txBody>
+      </p:sp>
+      <p:cxnSp>
+        <p:nvCxnSpPr>
+          <p:cNvPr id="10" name="Straight Connector 9">
+            <a:extLst>
+              <a:ext uri="{FF2B5EF4-FFF2-40B4-BE49-F238E27FC236}">
+                <a16:creationId xmlns:a16="http://schemas.microsoft.com/office/drawing/2014/main" id="{5C4D56EA-8905-CAFF-FA8B-91B461D57C36}"/>
+              </a:ext>
+            </a:extLst>
+          </p:cNvPr>
+          <p:cNvCxnSpPr>
+            <a:cxnSpLocks/>
+          </p:cNvCxnSpPr>
+          <p:nvPr/>
+        </p:nvCxnSpPr>
+        <p:spPr>
+          <a:xfrm>
+            <a:off x="929640" y="1237129"/>
+            <a:ext cx="10332720" cy="0"/>
+          </a:xfrm>
+          <a:prstGeom prst="line">
+            <a:avLst/>
+          </a:prstGeom>
+          <a:ln w="28575"/>
+        </p:spPr>
+        <p:style>
+          <a:lnRef idx="3">
+            <a:schemeClr val="dk1"/>
+          </a:lnRef>
+          <a:fillRef idx="0">
+            <a:schemeClr val="dk1"/>
+          </a:fillRef>
+          <a:effectRef idx="2">
+            <a:schemeClr val="dk1"/>
+          </a:effectRef>
+          <a:fontRef idx="minor">
+            <a:schemeClr val="tx1"/>
+          </a:fontRef>
+        </p:style>
+      </p:cxnSp>
+      <p:sp>
+        <p:nvSpPr>
+          <p:cNvPr id="4" name="Title 1">
+            <a:extLst>
+              <a:ext uri="{FF2B5EF4-FFF2-40B4-BE49-F238E27FC236}">
+                <a16:creationId xmlns:a16="http://schemas.microsoft.com/office/drawing/2014/main" id="{7ED9CE21-68A5-DE6F-C9B3-F22A1957B184}"/>
+              </a:ext>
+            </a:extLst>
+          </p:cNvPr>
+          <p:cNvSpPr txBox="1">
+            <a:spLocks/>
+          </p:cNvSpPr>
+          <p:nvPr/>
+        </p:nvSpPr>
+        <p:spPr>
+          <a:xfrm>
+            <a:off x="838200" y="1150051"/>
+            <a:ext cx="10515600" cy="959083"/>
           </a:xfrm>
           <a:prstGeom prst="rect">
             <a:avLst/>
           </a:prstGeom>
         </p:spPr>
-      </p:pic>
+        <p:txBody>
+          <a:bodyPr vert="horz" lIns="91440" tIns="45720" rIns="91440" bIns="45720" rtlCol="0" anchor="ctr">
+            <a:normAutofit/>
+          </a:bodyPr>
+          <a:lstStyle>
+            <a:lvl1pPr algn="l" defTabSz="914400" rtl="0" eaLnBrk="1" latinLnBrk="0" hangingPunct="1">
+              <a:lnSpc>
+                <a:spcPct val="90000"/>
+              </a:lnSpc>
+              <a:spcBef>
+                <a:spcPct val="0"/>
+              </a:spcBef>
+              <a:buNone/>
+              <a:defRPr sz="4400" kern="1200">
+                <a:solidFill>
+                  <a:schemeClr val="tx1"/>
+                </a:solidFill>
+                <a:latin typeface="+mj-lt"/>
+                <a:ea typeface="+mj-ea"/>
+                <a:cs typeface="+mj-cs"/>
+              </a:defRPr>
+            </a:lvl1pPr>
+          </a:lstStyle>
+          <a:p>
+            <a:r>
+              <a:rPr lang="en-US" sz="3600" b="1" dirty="0">
+                <a:solidFill>
+                  <a:srgbClr val="F8981C"/>
+                </a:solidFill>
+              </a:rPr>
+              <a:t>Key Features:</a:t>
+            </a:r>
+          </a:p>
+        </p:txBody>
+      </p:sp>
     </p:spTree>
     <p:extLst>
       <p:ext uri="{BB962C8B-B14F-4D97-AF65-F5344CB8AC3E}">
-        <p14:creationId xmlns:p14="http://schemas.microsoft.com/office/powerpoint/2010/main" val="1318971552"/>
+        <p14:creationId xmlns:p14="http://schemas.microsoft.com/office/powerpoint/2010/main" val="1833708666"/>
       </p:ext>
     </p:extLst>
   </p:cSld>
@@ -4106,7 +5376,7 @@
                   </a:schemeClr>
                 </a:solidFill>
               </a:rPr>
-              <a:t>Problem Statement</a:t>
+              <a:t>Literature Review</a:t>
             </a:r>
           </a:p>
         </p:txBody>
@@ -4129,7 +5399,14 @@
             <a:pPr algn="just"/>
             <a:r>
               <a:rPr lang="en-US" dirty="0"/>
-              <a:t>Define your problem in one paragraph keep in mind your literature review limitations and the gaps identified in the benchmarking table.</a:t>
+              <a:t>Prepare at-least five (5) slides and develop a base for your project starting from initial technology/research. </a:t>
+            </a:r>
+          </a:p>
+          <a:p>
+            <a:pPr algn="just"/>
+            <a:r>
+              <a:rPr lang="en-US" dirty="0"/>
+              <a:t>Properly reference previously used tools and technologies [3].</a:t>
             </a:r>
           </a:p>
         </p:txBody>
@@ -4137,7 +5414,7 @@
     </p:spTree>
     <p:extLst>
       <p:ext uri="{BB962C8B-B14F-4D97-AF65-F5344CB8AC3E}">
-        <p14:creationId xmlns:p14="http://schemas.microsoft.com/office/powerpoint/2010/main" val="2109580635"/>
+        <p14:creationId xmlns:p14="http://schemas.microsoft.com/office/powerpoint/2010/main" val="1249639538"/>
       </p:ext>
     </p:extLst>
   </p:cSld>
@@ -4174,7 +5451,12 @@
             <p:ph type="title"/>
           </p:nvPr>
         </p:nvSpPr>
-        <p:spPr/>
+        <p:spPr>
+          <a:xfrm>
+            <a:off x="838200" y="365125"/>
+            <a:ext cx="10515600" cy="980959"/>
+          </a:xfrm>
+        </p:spPr>
         <p:txBody>
           <a:bodyPr/>
           <a:lstStyle/>
@@ -4182,12 +5464,10 @@
             <a:r>
               <a:rPr lang="en-US" b="1" dirty="0">
                 <a:solidFill>
-                  <a:schemeClr val="accent1">
-                    <a:lumMod val="75000"/>
-                  </a:schemeClr>
+                  <a:srgbClr val="36ABF3"/>
                 </a:solidFill>
               </a:rPr>
-              <a:t>Proposed Model</a:t>
+              <a:t>Literature Review</a:t>
             </a:r>
           </a:p>
         </p:txBody>
@@ -4202,53 +5482,124 @@
             <p:ph idx="1"/>
           </p:nvPr>
         </p:nvSpPr>
-        <p:spPr/>
-        <p:txBody>
-          <a:bodyPr/>
+        <p:spPr>
+          <a:xfrm>
+            <a:off x="838200" y="1990166"/>
+            <a:ext cx="10515600" cy="4867834"/>
+          </a:xfrm>
+        </p:spPr>
+        <p:txBody>
+          <a:bodyPr>
+            <a:normAutofit/>
+          </a:bodyPr>
           <a:lstStyle/>
           <a:p>
             <a:pPr algn="just"/>
-            <a:r>
-              <a:rPr lang="en-US" dirty="0"/>
-              <a:t>Write down abstract idea of your project, and add its model diagram</a:t>
-            </a:r>
-          </a:p>
-        </p:txBody>
-      </p:sp>
-      <p:pic>
-        <p:nvPicPr>
-          <p:cNvPr id="4" name="Picture 3"/>
-          <p:cNvPicPr>
-            <a:picLocks noChangeAspect="1"/>
-          </p:cNvPicPr>
-          <p:nvPr/>
-        </p:nvPicPr>
-        <p:blipFill>
-          <a:blip r:embed="rId2">
+            <a:endParaRPr lang="en-US" dirty="0"/>
+          </a:p>
+        </p:txBody>
+      </p:sp>
+      <p:cxnSp>
+        <p:nvCxnSpPr>
+          <p:cNvPr id="10" name="Straight Connector 9">
             <a:extLst>
-              <a:ext uri="{28A0092B-C50C-407E-A947-70E740481C1C}">
-                <a14:useLocalDpi xmlns:a14="http://schemas.microsoft.com/office/drawing/2010/main" val="0"/>
+              <a:ext uri="{FF2B5EF4-FFF2-40B4-BE49-F238E27FC236}">
+                <a16:creationId xmlns:a16="http://schemas.microsoft.com/office/drawing/2014/main" id="{5C4D56EA-8905-CAFF-FA8B-91B461D57C36}"/>
               </a:ext>
             </a:extLst>
-          </a:blip>
-          <a:stretch>
-            <a:fillRect/>
-          </a:stretch>
-        </p:blipFill>
+          </p:cNvPr>
+          <p:cNvCxnSpPr>
+            <a:cxnSpLocks/>
+          </p:cNvCxnSpPr>
+          <p:nvPr/>
+        </p:nvCxnSpPr>
         <p:spPr>
           <a:xfrm>
-            <a:off x="2578814" y="2849960"/>
-            <a:ext cx="6598710" cy="3093793"/>
+            <a:off x="929640" y="1237129"/>
+            <a:ext cx="10332720" cy="0"/>
+          </a:xfrm>
+          <a:prstGeom prst="line">
+            <a:avLst/>
+          </a:prstGeom>
+          <a:ln w="28575"/>
+        </p:spPr>
+        <p:style>
+          <a:lnRef idx="3">
+            <a:schemeClr val="dk1"/>
+          </a:lnRef>
+          <a:fillRef idx="0">
+            <a:schemeClr val="dk1"/>
+          </a:fillRef>
+          <a:effectRef idx="2">
+            <a:schemeClr val="dk1"/>
+          </a:effectRef>
+          <a:fontRef idx="minor">
+            <a:schemeClr val="tx1"/>
+          </a:fontRef>
+        </p:style>
+      </p:cxnSp>
+      <p:sp>
+        <p:nvSpPr>
+          <p:cNvPr id="4" name="Title 1">
+            <a:extLst>
+              <a:ext uri="{FF2B5EF4-FFF2-40B4-BE49-F238E27FC236}">
+                <a16:creationId xmlns:a16="http://schemas.microsoft.com/office/drawing/2014/main" id="{7ED9CE21-68A5-DE6F-C9B3-F22A1957B184}"/>
+              </a:ext>
+            </a:extLst>
+          </p:cNvPr>
+          <p:cNvSpPr txBox="1">
+            <a:spLocks/>
+          </p:cNvSpPr>
+          <p:nvPr/>
+        </p:nvSpPr>
+        <p:spPr>
+          <a:xfrm>
+            <a:off x="838200" y="1150051"/>
+            <a:ext cx="10515600" cy="959083"/>
           </a:xfrm>
           <a:prstGeom prst="rect">
             <a:avLst/>
           </a:prstGeom>
         </p:spPr>
-      </p:pic>
+        <p:txBody>
+          <a:bodyPr vert="horz" lIns="91440" tIns="45720" rIns="91440" bIns="45720" rtlCol="0" anchor="ctr">
+            <a:normAutofit/>
+          </a:bodyPr>
+          <a:lstStyle>
+            <a:lvl1pPr algn="l" defTabSz="914400" rtl="0" eaLnBrk="1" latinLnBrk="0" hangingPunct="1">
+              <a:lnSpc>
+                <a:spcPct val="90000"/>
+              </a:lnSpc>
+              <a:spcBef>
+                <a:spcPct val="0"/>
+              </a:spcBef>
+              <a:buNone/>
+              <a:defRPr sz="4400" kern="1200">
+                <a:solidFill>
+                  <a:schemeClr val="tx1"/>
+                </a:solidFill>
+                <a:latin typeface="+mj-lt"/>
+                <a:ea typeface="+mj-ea"/>
+                <a:cs typeface="+mj-cs"/>
+              </a:defRPr>
+            </a:lvl1pPr>
+          </a:lstStyle>
+          <a:p>
+            <a:r>
+              <a:rPr lang="en-US" sz="3600" b="1" dirty="0">
+                <a:solidFill>
+                  <a:srgbClr val="F8981C"/>
+                </a:solidFill>
+              </a:rPr>
+              <a:t>K</a:t>
+            </a:r>
+          </a:p>
+        </p:txBody>
+      </p:sp>
     </p:spTree>
     <p:extLst>
       <p:ext uri="{BB962C8B-B14F-4D97-AF65-F5344CB8AC3E}">
-        <p14:creationId xmlns:p14="http://schemas.microsoft.com/office/powerpoint/2010/main" val="4175500007"/>
+        <p14:creationId xmlns:p14="http://schemas.microsoft.com/office/powerpoint/2010/main" val="3980791"/>
       </p:ext>
     </p:extLst>
   </p:cSld>
@@ -4285,7 +5636,12 @@
             <p:ph type="title"/>
           </p:nvPr>
         </p:nvSpPr>
-        <p:spPr/>
+        <p:spPr>
+          <a:xfrm>
+            <a:off x="838200" y="365125"/>
+            <a:ext cx="10515600" cy="980959"/>
+          </a:xfrm>
+        </p:spPr>
         <p:txBody>
           <a:bodyPr/>
           <a:lstStyle/>
@@ -4293,12 +5649,10 @@
             <a:r>
               <a:rPr lang="en-US" b="1" dirty="0">
                 <a:solidFill>
-                  <a:schemeClr val="accent1">
-                    <a:lumMod val="75000"/>
-                  </a:schemeClr>
+                  <a:srgbClr val="36ABF3"/>
                 </a:solidFill>
               </a:rPr>
-              <a:t>Scope of your Project</a:t>
+              <a:t>Literature Review</a:t>
             </a:r>
           </a:p>
         </p:txBody>
@@ -4313,15 +5667,116 @@
             <p:ph idx="1"/>
           </p:nvPr>
         </p:nvSpPr>
-        <p:spPr/>
-        <p:txBody>
-          <a:bodyPr/>
+        <p:spPr>
+          <a:xfrm>
+            <a:off x="838200" y="1990166"/>
+            <a:ext cx="10515600" cy="4867834"/>
+          </a:xfrm>
+        </p:spPr>
+        <p:txBody>
+          <a:bodyPr>
+            <a:normAutofit/>
+          </a:bodyPr>
           <a:lstStyle/>
           <a:p>
             <a:pPr algn="just"/>
-            <a:r>
-              <a:rPr lang="en-US" dirty="0"/>
-              <a:t>Properly write the scope of your project. Avoid general solutions. </a:t>
+            <a:endParaRPr lang="en-US" dirty="0"/>
+          </a:p>
+        </p:txBody>
+      </p:sp>
+      <p:cxnSp>
+        <p:nvCxnSpPr>
+          <p:cNvPr id="10" name="Straight Connector 9">
+            <a:extLst>
+              <a:ext uri="{FF2B5EF4-FFF2-40B4-BE49-F238E27FC236}">
+                <a16:creationId xmlns:a16="http://schemas.microsoft.com/office/drawing/2014/main" id="{5C4D56EA-8905-CAFF-FA8B-91B461D57C36}"/>
+              </a:ext>
+            </a:extLst>
+          </p:cNvPr>
+          <p:cNvCxnSpPr>
+            <a:cxnSpLocks/>
+          </p:cNvCxnSpPr>
+          <p:nvPr/>
+        </p:nvCxnSpPr>
+        <p:spPr>
+          <a:xfrm>
+            <a:off x="929640" y="1237129"/>
+            <a:ext cx="10332720" cy="0"/>
+          </a:xfrm>
+          <a:prstGeom prst="line">
+            <a:avLst/>
+          </a:prstGeom>
+          <a:ln w="28575"/>
+        </p:spPr>
+        <p:style>
+          <a:lnRef idx="3">
+            <a:schemeClr val="dk1"/>
+          </a:lnRef>
+          <a:fillRef idx="0">
+            <a:schemeClr val="dk1"/>
+          </a:fillRef>
+          <a:effectRef idx="2">
+            <a:schemeClr val="dk1"/>
+          </a:effectRef>
+          <a:fontRef idx="minor">
+            <a:schemeClr val="tx1"/>
+          </a:fontRef>
+        </p:style>
+      </p:cxnSp>
+      <p:sp>
+        <p:nvSpPr>
+          <p:cNvPr id="4" name="Title 1">
+            <a:extLst>
+              <a:ext uri="{FF2B5EF4-FFF2-40B4-BE49-F238E27FC236}">
+                <a16:creationId xmlns:a16="http://schemas.microsoft.com/office/drawing/2014/main" id="{7ED9CE21-68A5-DE6F-C9B3-F22A1957B184}"/>
+              </a:ext>
+            </a:extLst>
+          </p:cNvPr>
+          <p:cNvSpPr txBox="1">
+            <a:spLocks/>
+          </p:cNvSpPr>
+          <p:nvPr/>
+        </p:nvSpPr>
+        <p:spPr>
+          <a:xfrm>
+            <a:off x="838200" y="1150051"/>
+            <a:ext cx="10515600" cy="959083"/>
+          </a:xfrm>
+          <a:prstGeom prst="rect">
+            <a:avLst/>
+          </a:prstGeom>
+        </p:spPr>
+        <p:txBody>
+          <a:bodyPr vert="horz" lIns="91440" tIns="45720" rIns="91440" bIns="45720" rtlCol="0" anchor="ctr">
+            <a:normAutofit/>
+          </a:bodyPr>
+          <a:lstStyle>
+            <a:lvl1pPr algn="l" defTabSz="914400" rtl="0" eaLnBrk="1" latinLnBrk="0" hangingPunct="1">
+              <a:lnSpc>
+                <a:spcPct val="90000"/>
+              </a:lnSpc>
+              <a:spcBef>
+                <a:spcPct val="0"/>
+              </a:spcBef>
+              <a:buNone/>
+              <a:defRPr sz="4400" kern="1200">
+                <a:solidFill>
+                  <a:schemeClr val="tx1"/>
+                </a:solidFill>
+                <a:latin typeface="+mj-lt"/>
+                <a:ea typeface="+mj-ea"/>
+                <a:cs typeface="+mj-cs"/>
+              </a:defRPr>
+            </a:lvl1pPr>
+          </a:lstStyle>
+          <a:p>
+            <a:r>
+              <a:rPr lang="en-US" sz="3600" b="1" dirty="0">
+                <a:solidFill>
+                  <a:srgbClr val="F8981C"/>
+                </a:solidFill>
+              </a:rPr>
+              <a:t>K</a:t>
             </a:r>
           </a:p>
         </p:txBody>
@@ -4329,7 +5784,7 @@
     </p:spTree>
     <p:extLst>
       <p:ext uri="{BB962C8B-B14F-4D97-AF65-F5344CB8AC3E}">
-        <p14:creationId xmlns:p14="http://schemas.microsoft.com/office/powerpoint/2010/main" val="1236339636"/>
+        <p14:creationId xmlns:p14="http://schemas.microsoft.com/office/powerpoint/2010/main" val="2543601590"/>
       </p:ext>
     </p:extLst>
   </p:cSld>
@@ -4366,7 +5821,12 @@
             <p:ph type="title"/>
           </p:nvPr>
         </p:nvSpPr>
-        <p:spPr/>
+        <p:spPr>
+          <a:xfrm>
+            <a:off x="838200" y="365125"/>
+            <a:ext cx="10515600" cy="980959"/>
+          </a:xfrm>
+        </p:spPr>
         <p:txBody>
           <a:bodyPr/>
           <a:lstStyle/>
@@ -4374,12 +5834,10 @@
             <a:r>
               <a:rPr lang="en-US" b="1" dirty="0">
                 <a:solidFill>
-                  <a:schemeClr val="accent1">
-                    <a:lumMod val="75000"/>
-                  </a:schemeClr>
+                  <a:srgbClr val="36ABF3"/>
                 </a:solidFill>
               </a:rPr>
-              <a:t>Tools and Technologies (Market Base)</a:t>
+              <a:t>Literature Review</a:t>
             </a:r>
           </a:p>
         </p:txBody>
@@ -4394,15 +5852,116 @@
             <p:ph idx="1"/>
           </p:nvPr>
         </p:nvSpPr>
-        <p:spPr/>
-        <p:txBody>
-          <a:bodyPr/>
+        <p:spPr>
+          <a:xfrm>
+            <a:off x="838200" y="1990166"/>
+            <a:ext cx="10515600" cy="4867834"/>
+          </a:xfrm>
+        </p:spPr>
+        <p:txBody>
+          <a:bodyPr>
+            <a:normAutofit/>
+          </a:bodyPr>
           <a:lstStyle/>
           <a:p>
             <a:pPr algn="just"/>
-            <a:r>
-              <a:rPr lang="en-US" dirty="0"/>
-              <a:t>List down tools and technologies, you want to use for development purposes. Avoid old ones, explore market oriented tools and technologies. </a:t>
+            <a:endParaRPr lang="en-US" dirty="0"/>
+          </a:p>
+        </p:txBody>
+      </p:sp>
+      <p:cxnSp>
+        <p:nvCxnSpPr>
+          <p:cNvPr id="10" name="Straight Connector 9">
+            <a:extLst>
+              <a:ext uri="{FF2B5EF4-FFF2-40B4-BE49-F238E27FC236}">
+                <a16:creationId xmlns:a16="http://schemas.microsoft.com/office/drawing/2014/main" id="{5C4D56EA-8905-CAFF-FA8B-91B461D57C36}"/>
+              </a:ext>
+            </a:extLst>
+          </p:cNvPr>
+          <p:cNvCxnSpPr>
+            <a:cxnSpLocks/>
+          </p:cNvCxnSpPr>
+          <p:nvPr/>
+        </p:nvCxnSpPr>
+        <p:spPr>
+          <a:xfrm>
+            <a:off x="929640" y="1237129"/>
+            <a:ext cx="10332720" cy="0"/>
+          </a:xfrm>
+          <a:prstGeom prst="line">
+            <a:avLst/>
+          </a:prstGeom>
+          <a:ln w="28575"/>
+        </p:spPr>
+        <p:style>
+          <a:lnRef idx="3">
+            <a:schemeClr val="dk1"/>
+          </a:lnRef>
+          <a:fillRef idx="0">
+            <a:schemeClr val="dk1"/>
+          </a:fillRef>
+          <a:effectRef idx="2">
+            <a:schemeClr val="dk1"/>
+          </a:effectRef>
+          <a:fontRef idx="minor">
+            <a:schemeClr val="tx1"/>
+          </a:fontRef>
+        </p:style>
+      </p:cxnSp>
+      <p:sp>
+        <p:nvSpPr>
+          <p:cNvPr id="4" name="Title 1">
+            <a:extLst>
+              <a:ext uri="{FF2B5EF4-FFF2-40B4-BE49-F238E27FC236}">
+                <a16:creationId xmlns:a16="http://schemas.microsoft.com/office/drawing/2014/main" id="{7ED9CE21-68A5-DE6F-C9B3-F22A1957B184}"/>
+              </a:ext>
+            </a:extLst>
+          </p:cNvPr>
+          <p:cNvSpPr txBox="1">
+            <a:spLocks/>
+          </p:cNvSpPr>
+          <p:nvPr/>
+        </p:nvSpPr>
+        <p:spPr>
+          <a:xfrm>
+            <a:off x="838200" y="1150051"/>
+            <a:ext cx="10515600" cy="959083"/>
+          </a:xfrm>
+          <a:prstGeom prst="rect">
+            <a:avLst/>
+          </a:prstGeom>
+        </p:spPr>
+        <p:txBody>
+          <a:bodyPr vert="horz" lIns="91440" tIns="45720" rIns="91440" bIns="45720" rtlCol="0" anchor="ctr">
+            <a:normAutofit/>
+          </a:bodyPr>
+          <a:lstStyle>
+            <a:lvl1pPr algn="l" defTabSz="914400" rtl="0" eaLnBrk="1" latinLnBrk="0" hangingPunct="1">
+              <a:lnSpc>
+                <a:spcPct val="90000"/>
+              </a:lnSpc>
+              <a:spcBef>
+                <a:spcPct val="0"/>
+              </a:spcBef>
+              <a:buNone/>
+              <a:defRPr sz="4400" kern="1200">
+                <a:solidFill>
+                  <a:schemeClr val="tx1"/>
+                </a:solidFill>
+                <a:latin typeface="+mj-lt"/>
+                <a:ea typeface="+mj-ea"/>
+                <a:cs typeface="+mj-cs"/>
+              </a:defRPr>
+            </a:lvl1pPr>
+          </a:lstStyle>
+          <a:p>
+            <a:r>
+              <a:rPr lang="en-US" sz="3600" b="1" dirty="0">
+                <a:solidFill>
+                  <a:srgbClr val="F8981C"/>
+                </a:solidFill>
+              </a:rPr>
+              <a:t>K</a:t>
             </a:r>
           </a:p>
         </p:txBody>
@@ -4410,7 +5969,7 @@
     </p:spTree>
     <p:extLst>
       <p:ext uri="{BB962C8B-B14F-4D97-AF65-F5344CB8AC3E}">
-        <p14:creationId xmlns:p14="http://schemas.microsoft.com/office/powerpoint/2010/main" val="1034597514"/>
+        <p14:creationId xmlns:p14="http://schemas.microsoft.com/office/powerpoint/2010/main" val="1279104145"/>
       </p:ext>
     </p:extLst>
   </p:cSld>

</xml_diff>

<commit_message>
Add Literature Review in Idea Evaluation Slides
</commit_message>
<xml_diff>
--- a/4- Idea Evaluation/Idea Evaluation Slides (Filled).pptx
+++ b/4- Idea Evaluation/Idea Evaluation Slides (Filled).pptx
@@ -4,6 +4,9 @@
   <p:sldMasterIdLst>
     <p:sldMasterId id="2147483648" r:id="rId1"/>
   </p:sldMasterIdLst>
+  <p:notesMasterIdLst>
+    <p:notesMasterId r:id="rId26"/>
+  </p:notesMasterIdLst>
   <p:sldIdLst>
     <p:sldId id="258" r:id="rId2"/>
     <p:sldId id="259" r:id="rId3"/>
@@ -13,17 +16,22 @@
     <p:sldId id="263" r:id="rId7"/>
     <p:sldId id="273" r:id="rId8"/>
     <p:sldId id="274" r:id="rId9"/>
-    <p:sldId id="275" r:id="rId10"/>
-    <p:sldId id="276" r:id="rId11"/>
-    <p:sldId id="277" r:id="rId12"/>
-    <p:sldId id="264" r:id="rId13"/>
-    <p:sldId id="265" r:id="rId14"/>
-    <p:sldId id="262" r:id="rId15"/>
-    <p:sldId id="266" r:id="rId16"/>
-    <p:sldId id="267" r:id="rId17"/>
-    <p:sldId id="268" r:id="rId18"/>
-    <p:sldId id="261" r:id="rId19"/>
-    <p:sldId id="269" r:id="rId20"/>
+    <p:sldId id="276" r:id="rId10"/>
+    <p:sldId id="277" r:id="rId11"/>
+    <p:sldId id="278" r:id="rId12"/>
+    <p:sldId id="281" r:id="rId13"/>
+    <p:sldId id="280" r:id="rId14"/>
+    <p:sldId id="279" r:id="rId15"/>
+    <p:sldId id="282" r:id="rId16"/>
+    <p:sldId id="264" r:id="rId17"/>
+    <p:sldId id="283" r:id="rId18"/>
+    <p:sldId id="265" r:id="rId19"/>
+    <p:sldId id="262" r:id="rId20"/>
+    <p:sldId id="266" r:id="rId21"/>
+    <p:sldId id="267" r:id="rId22"/>
+    <p:sldId id="268" r:id="rId23"/>
+    <p:sldId id="261" r:id="rId24"/>
+    <p:sldId id="269" r:id="rId25"/>
   </p:sldIdLst>
   <p:sldSz cx="12192000" cy="6858000"/>
   <p:notesSz cx="6858000" cy="9144000"/>
@@ -130,6 +138,439 @@
 </p:presentation>
 </file>
 
+<file path=ppt/notesMasters/notesMaster1.xml><?xml version="1.0" encoding="utf-8"?>
+<p:notesMaster xmlns:a="http://schemas.openxmlformats.org/drawingml/2006/main" xmlns:r="http://schemas.openxmlformats.org/officeDocument/2006/relationships" xmlns:p="http://schemas.openxmlformats.org/presentationml/2006/main">
+  <p:cSld>
+    <p:bg>
+      <p:bgRef idx="1001">
+        <a:schemeClr val="bg1"/>
+      </p:bgRef>
+    </p:bg>
+    <p:spTree>
+      <p:nvGrpSpPr>
+        <p:cNvPr id="1" name=""/>
+        <p:cNvGrpSpPr/>
+        <p:nvPr/>
+      </p:nvGrpSpPr>
+      <p:grpSpPr>
+        <a:xfrm>
+          <a:off x="0" y="0"/>
+          <a:ext cx="0" cy="0"/>
+          <a:chOff x="0" y="0"/>
+          <a:chExt cx="0" cy="0"/>
+        </a:xfrm>
+      </p:grpSpPr>
+      <p:sp>
+        <p:nvSpPr>
+          <p:cNvPr id="2" name="Header Placeholder 1"/>
+          <p:cNvSpPr>
+            <a:spLocks noGrp="1"/>
+          </p:cNvSpPr>
+          <p:nvPr>
+            <p:ph type="hdr" sz="quarter"/>
+          </p:nvPr>
+        </p:nvSpPr>
+        <p:spPr>
+          <a:xfrm>
+            <a:off x="0" y="0"/>
+            <a:ext cx="2971800" cy="458788"/>
+          </a:xfrm>
+          <a:prstGeom prst="rect">
+            <a:avLst/>
+          </a:prstGeom>
+        </p:spPr>
+        <p:txBody>
+          <a:bodyPr vert="horz" lIns="91440" tIns="45720" rIns="91440" bIns="45720" rtlCol="0"/>
+          <a:lstStyle>
+            <a:lvl1pPr algn="l">
+              <a:defRPr sz="1200"/>
+            </a:lvl1pPr>
+          </a:lstStyle>
+          <a:p>
+            <a:endParaRPr lang="en-US"/>
+          </a:p>
+        </p:txBody>
+      </p:sp>
+      <p:sp>
+        <p:nvSpPr>
+          <p:cNvPr id="3" name="Date Placeholder 2"/>
+          <p:cNvSpPr>
+            <a:spLocks noGrp="1"/>
+          </p:cNvSpPr>
+          <p:nvPr>
+            <p:ph type="dt" idx="1"/>
+          </p:nvPr>
+        </p:nvSpPr>
+        <p:spPr>
+          <a:xfrm>
+            <a:off x="3884613" y="0"/>
+            <a:ext cx="2971800" cy="458788"/>
+          </a:xfrm>
+          <a:prstGeom prst="rect">
+            <a:avLst/>
+          </a:prstGeom>
+        </p:spPr>
+        <p:txBody>
+          <a:bodyPr vert="horz" lIns="91440" tIns="45720" rIns="91440" bIns="45720" rtlCol="0"/>
+          <a:lstStyle>
+            <a:lvl1pPr algn="r">
+              <a:defRPr sz="1200"/>
+            </a:lvl1pPr>
+          </a:lstStyle>
+          <a:p>
+            <a:fld id="{EF96ACE9-C9FC-4287-B6B2-A985566C0C1D}" type="datetimeFigureOut">
+              <a:rPr lang="en-US" smtClean="0"/>
+              <a:t>9/26/2024</a:t>
+            </a:fld>
+            <a:endParaRPr lang="en-US"/>
+          </a:p>
+        </p:txBody>
+      </p:sp>
+      <p:sp>
+        <p:nvSpPr>
+          <p:cNvPr id="4" name="Slide Image Placeholder 3"/>
+          <p:cNvSpPr>
+            <a:spLocks noGrp="1" noRot="1" noChangeAspect="1"/>
+          </p:cNvSpPr>
+          <p:nvPr>
+            <p:ph type="sldImg" idx="2"/>
+          </p:nvPr>
+        </p:nvSpPr>
+        <p:spPr>
+          <a:xfrm>
+            <a:off x="685800" y="1143000"/>
+            <a:ext cx="5486400" cy="3086100"/>
+          </a:xfrm>
+          <a:prstGeom prst="rect">
+            <a:avLst/>
+          </a:prstGeom>
+          <a:noFill/>
+          <a:ln w="12700">
+            <a:solidFill>
+              <a:prstClr val="black"/>
+            </a:solidFill>
+          </a:ln>
+        </p:spPr>
+        <p:txBody>
+          <a:bodyPr vert="horz" lIns="91440" tIns="45720" rIns="91440" bIns="45720" rtlCol="0" anchor="ctr"/>
+          <a:lstStyle/>
+          <a:p>
+            <a:endParaRPr lang="en-US"/>
+          </a:p>
+        </p:txBody>
+      </p:sp>
+      <p:sp>
+        <p:nvSpPr>
+          <p:cNvPr id="5" name="Notes Placeholder 4"/>
+          <p:cNvSpPr>
+            <a:spLocks noGrp="1"/>
+          </p:cNvSpPr>
+          <p:nvPr>
+            <p:ph type="body" sz="quarter" idx="3"/>
+          </p:nvPr>
+        </p:nvSpPr>
+        <p:spPr>
+          <a:xfrm>
+            <a:off x="685800" y="4400550"/>
+            <a:ext cx="5486400" cy="3600450"/>
+          </a:xfrm>
+          <a:prstGeom prst="rect">
+            <a:avLst/>
+          </a:prstGeom>
+        </p:spPr>
+        <p:txBody>
+          <a:bodyPr vert="horz" lIns="91440" tIns="45720" rIns="91440" bIns="45720" rtlCol="0"/>
+          <a:lstStyle/>
+          <a:p>
+            <a:pPr lvl="0"/>
+            <a:r>
+              <a:rPr lang="en-US"/>
+              <a:t>Click to edit Master text styles</a:t>
+            </a:r>
+          </a:p>
+          <a:p>
+            <a:pPr lvl="1"/>
+            <a:r>
+              <a:rPr lang="en-US"/>
+              <a:t>Second level</a:t>
+            </a:r>
+          </a:p>
+          <a:p>
+            <a:pPr lvl="2"/>
+            <a:r>
+              <a:rPr lang="en-US"/>
+              <a:t>Third level</a:t>
+            </a:r>
+          </a:p>
+          <a:p>
+            <a:pPr lvl="3"/>
+            <a:r>
+              <a:rPr lang="en-US"/>
+              <a:t>Fourth level</a:t>
+            </a:r>
+          </a:p>
+          <a:p>
+            <a:pPr lvl="4"/>
+            <a:r>
+              <a:rPr lang="en-US"/>
+              <a:t>Fifth level</a:t>
+            </a:r>
+          </a:p>
+        </p:txBody>
+      </p:sp>
+      <p:sp>
+        <p:nvSpPr>
+          <p:cNvPr id="6" name="Footer Placeholder 5"/>
+          <p:cNvSpPr>
+            <a:spLocks noGrp="1"/>
+          </p:cNvSpPr>
+          <p:nvPr>
+            <p:ph type="ftr" sz="quarter" idx="4"/>
+          </p:nvPr>
+        </p:nvSpPr>
+        <p:spPr>
+          <a:xfrm>
+            <a:off x="0" y="8685213"/>
+            <a:ext cx="2971800" cy="458787"/>
+          </a:xfrm>
+          <a:prstGeom prst="rect">
+            <a:avLst/>
+          </a:prstGeom>
+        </p:spPr>
+        <p:txBody>
+          <a:bodyPr vert="horz" lIns="91440" tIns="45720" rIns="91440" bIns="45720" rtlCol="0" anchor="b"/>
+          <a:lstStyle>
+            <a:lvl1pPr algn="l">
+              <a:defRPr sz="1200"/>
+            </a:lvl1pPr>
+          </a:lstStyle>
+          <a:p>
+            <a:endParaRPr lang="en-US"/>
+          </a:p>
+        </p:txBody>
+      </p:sp>
+      <p:sp>
+        <p:nvSpPr>
+          <p:cNvPr id="7" name="Slide Number Placeholder 6"/>
+          <p:cNvSpPr>
+            <a:spLocks noGrp="1"/>
+          </p:cNvSpPr>
+          <p:nvPr>
+            <p:ph type="sldNum" sz="quarter" idx="5"/>
+          </p:nvPr>
+        </p:nvSpPr>
+        <p:spPr>
+          <a:xfrm>
+            <a:off x="3884613" y="8685213"/>
+            <a:ext cx="2971800" cy="458787"/>
+          </a:xfrm>
+          <a:prstGeom prst="rect">
+            <a:avLst/>
+          </a:prstGeom>
+        </p:spPr>
+        <p:txBody>
+          <a:bodyPr vert="horz" lIns="91440" tIns="45720" rIns="91440" bIns="45720" rtlCol="0" anchor="b"/>
+          <a:lstStyle>
+            <a:lvl1pPr algn="r">
+              <a:defRPr sz="1200"/>
+            </a:lvl1pPr>
+          </a:lstStyle>
+          <a:p>
+            <a:fld id="{3971591C-8B9F-454A-AEBF-720C7958788B}" type="slidenum">
+              <a:rPr lang="en-US" smtClean="0"/>
+              <a:t>‹#›</a:t>
+            </a:fld>
+            <a:endParaRPr lang="en-US"/>
+          </a:p>
+        </p:txBody>
+      </p:sp>
+    </p:spTree>
+    <p:extLst>
+      <p:ext uri="{BB962C8B-B14F-4D97-AF65-F5344CB8AC3E}">
+        <p14:creationId xmlns:p14="http://schemas.microsoft.com/office/powerpoint/2010/main" val="20281324"/>
+      </p:ext>
+    </p:extLst>
+  </p:cSld>
+  <p:clrMap bg1="lt1" tx1="dk1" bg2="lt2" tx2="dk2" accent1="accent1" accent2="accent2" accent3="accent3" accent4="accent4" accent5="accent5" accent6="accent6" hlink="hlink" folHlink="folHlink"/>
+  <p:notesStyle>
+    <a:lvl1pPr marL="0" algn="l" defTabSz="914400" rtl="0" eaLnBrk="1" latinLnBrk="0" hangingPunct="1">
+      <a:defRPr sz="1200" kern="1200">
+        <a:solidFill>
+          <a:schemeClr val="tx1"/>
+        </a:solidFill>
+        <a:latin typeface="+mn-lt"/>
+        <a:ea typeface="+mn-ea"/>
+        <a:cs typeface="+mn-cs"/>
+      </a:defRPr>
+    </a:lvl1pPr>
+    <a:lvl2pPr marL="457200" algn="l" defTabSz="914400" rtl="0" eaLnBrk="1" latinLnBrk="0" hangingPunct="1">
+      <a:defRPr sz="1200" kern="1200">
+        <a:solidFill>
+          <a:schemeClr val="tx1"/>
+        </a:solidFill>
+        <a:latin typeface="+mn-lt"/>
+        <a:ea typeface="+mn-ea"/>
+        <a:cs typeface="+mn-cs"/>
+      </a:defRPr>
+    </a:lvl2pPr>
+    <a:lvl3pPr marL="914400" algn="l" defTabSz="914400" rtl="0" eaLnBrk="1" latinLnBrk="0" hangingPunct="1">
+      <a:defRPr sz="1200" kern="1200">
+        <a:solidFill>
+          <a:schemeClr val="tx1"/>
+        </a:solidFill>
+        <a:latin typeface="+mn-lt"/>
+        <a:ea typeface="+mn-ea"/>
+        <a:cs typeface="+mn-cs"/>
+      </a:defRPr>
+    </a:lvl3pPr>
+    <a:lvl4pPr marL="1371600" algn="l" defTabSz="914400" rtl="0" eaLnBrk="1" latinLnBrk="0" hangingPunct="1">
+      <a:defRPr sz="1200" kern="1200">
+        <a:solidFill>
+          <a:schemeClr val="tx1"/>
+        </a:solidFill>
+        <a:latin typeface="+mn-lt"/>
+        <a:ea typeface="+mn-ea"/>
+        <a:cs typeface="+mn-cs"/>
+      </a:defRPr>
+    </a:lvl4pPr>
+    <a:lvl5pPr marL="1828800" algn="l" defTabSz="914400" rtl="0" eaLnBrk="1" latinLnBrk="0" hangingPunct="1">
+      <a:defRPr sz="1200" kern="1200">
+        <a:solidFill>
+          <a:schemeClr val="tx1"/>
+        </a:solidFill>
+        <a:latin typeface="+mn-lt"/>
+        <a:ea typeface="+mn-ea"/>
+        <a:cs typeface="+mn-cs"/>
+      </a:defRPr>
+    </a:lvl5pPr>
+    <a:lvl6pPr marL="2286000" algn="l" defTabSz="914400" rtl="0" eaLnBrk="1" latinLnBrk="0" hangingPunct="1">
+      <a:defRPr sz="1200" kern="1200">
+        <a:solidFill>
+          <a:schemeClr val="tx1"/>
+        </a:solidFill>
+        <a:latin typeface="+mn-lt"/>
+        <a:ea typeface="+mn-ea"/>
+        <a:cs typeface="+mn-cs"/>
+      </a:defRPr>
+    </a:lvl6pPr>
+    <a:lvl7pPr marL="2743200" algn="l" defTabSz="914400" rtl="0" eaLnBrk="1" latinLnBrk="0" hangingPunct="1">
+      <a:defRPr sz="1200" kern="1200">
+        <a:solidFill>
+          <a:schemeClr val="tx1"/>
+        </a:solidFill>
+        <a:latin typeface="+mn-lt"/>
+        <a:ea typeface="+mn-ea"/>
+        <a:cs typeface="+mn-cs"/>
+      </a:defRPr>
+    </a:lvl7pPr>
+    <a:lvl8pPr marL="3200400" algn="l" defTabSz="914400" rtl="0" eaLnBrk="1" latinLnBrk="0" hangingPunct="1">
+      <a:defRPr sz="1200" kern="1200">
+        <a:solidFill>
+          <a:schemeClr val="tx1"/>
+        </a:solidFill>
+        <a:latin typeface="+mn-lt"/>
+        <a:ea typeface="+mn-ea"/>
+        <a:cs typeface="+mn-cs"/>
+      </a:defRPr>
+    </a:lvl8pPr>
+    <a:lvl9pPr marL="3657600" algn="l" defTabSz="914400" rtl="0" eaLnBrk="1" latinLnBrk="0" hangingPunct="1">
+      <a:defRPr sz="1200" kern="1200">
+        <a:solidFill>
+          <a:schemeClr val="tx1"/>
+        </a:solidFill>
+        <a:latin typeface="+mn-lt"/>
+        <a:ea typeface="+mn-ea"/>
+        <a:cs typeface="+mn-cs"/>
+      </a:defRPr>
+    </a:lvl9pPr>
+  </p:notesStyle>
+</p:notesMaster>
+</file>
+
+<file path=ppt/notesSlides/notesSlide1.xml><?xml version="1.0" encoding="utf-8"?>
+<p:notes xmlns:a="http://schemas.openxmlformats.org/drawingml/2006/main" xmlns:r="http://schemas.openxmlformats.org/officeDocument/2006/relationships" xmlns:p="http://schemas.openxmlformats.org/presentationml/2006/main">
+  <p:cSld>
+    <p:spTree>
+      <p:nvGrpSpPr>
+        <p:cNvPr id="1" name=""/>
+        <p:cNvGrpSpPr/>
+        <p:nvPr/>
+      </p:nvGrpSpPr>
+      <p:grpSpPr>
+        <a:xfrm>
+          <a:off x="0" y="0"/>
+          <a:ext cx="0" cy="0"/>
+          <a:chOff x="0" y="0"/>
+          <a:chExt cx="0" cy="0"/>
+        </a:xfrm>
+      </p:grpSpPr>
+      <p:sp>
+        <p:nvSpPr>
+          <p:cNvPr id="2" name="Slide Image Placeholder 1"/>
+          <p:cNvSpPr>
+            <a:spLocks noGrp="1" noRot="1" noChangeAspect="1"/>
+          </p:cNvSpPr>
+          <p:nvPr>
+            <p:ph type="sldImg"/>
+          </p:nvPr>
+        </p:nvSpPr>
+        <p:spPr/>
+      </p:sp>
+      <p:sp>
+        <p:nvSpPr>
+          <p:cNvPr id="3" name="Notes Placeholder 2"/>
+          <p:cNvSpPr>
+            <a:spLocks noGrp="1"/>
+          </p:cNvSpPr>
+          <p:nvPr>
+            <p:ph type="body" idx="1"/>
+          </p:nvPr>
+        </p:nvSpPr>
+        <p:spPr/>
+        <p:txBody>
+          <a:bodyPr/>
+          <a:lstStyle/>
+          <a:p>
+            <a:endParaRPr lang="en-US" dirty="0"/>
+          </a:p>
+        </p:txBody>
+      </p:sp>
+      <p:sp>
+        <p:nvSpPr>
+          <p:cNvPr id="4" name="Slide Number Placeholder 3"/>
+          <p:cNvSpPr>
+            <a:spLocks noGrp="1"/>
+          </p:cNvSpPr>
+          <p:nvPr>
+            <p:ph type="sldNum" sz="quarter" idx="5"/>
+          </p:nvPr>
+        </p:nvSpPr>
+        <p:spPr/>
+        <p:txBody>
+          <a:bodyPr/>
+          <a:lstStyle/>
+          <a:p>
+            <a:fld id="{3971591C-8B9F-454A-AEBF-720C7958788B}" type="slidenum">
+              <a:rPr lang="en-US" smtClean="0"/>
+              <a:t>6</a:t>
+            </a:fld>
+            <a:endParaRPr lang="en-US"/>
+          </a:p>
+        </p:txBody>
+      </p:sp>
+    </p:spTree>
+    <p:extLst>
+      <p:ext uri="{BB962C8B-B14F-4D97-AF65-F5344CB8AC3E}">
+        <p14:creationId xmlns:p14="http://schemas.microsoft.com/office/powerpoint/2010/main" val="656494689"/>
+      </p:ext>
+    </p:extLst>
+  </p:cSld>
+  <p:clrMapOvr>
+    <a:masterClrMapping/>
+  </p:clrMapOvr>
+</p:notes>
+</file>
+
 <file path=ppt/slideLayouts/slideLayout1.xml><?xml version="1.0" encoding="utf-8"?>
 <p:sldLayout xmlns:a="http://schemas.openxmlformats.org/drawingml/2006/main" xmlns:r="http://schemas.openxmlformats.org/officeDocument/2006/relationships" xmlns:p="http://schemas.openxmlformats.org/presentationml/2006/main" type="title" preserve="1">
   <p:cSld name="Title Slide">
@@ -259,7 +700,7 @@
           <a:p>
             <a:fld id="{0F5A5E6E-0E5C-41E1-A40C-15B94255FA15}" type="datetimeFigureOut">
               <a:rPr lang="en-US" smtClean="0"/>
-              <a:t>9/23/2024</a:t>
+              <a:t>9/26/2024</a:t>
             </a:fld>
             <a:endParaRPr lang="en-US"/>
           </a:p>
@@ -427,7 +868,7 @@
           <a:p>
             <a:fld id="{0F5A5E6E-0E5C-41E1-A40C-15B94255FA15}" type="datetimeFigureOut">
               <a:rPr lang="en-US" smtClean="0"/>
-              <a:t>9/23/2024</a:t>
+              <a:t>9/26/2024</a:t>
             </a:fld>
             <a:endParaRPr lang="en-US"/>
           </a:p>
@@ -605,7 +1046,7 @@
           <a:p>
             <a:fld id="{0F5A5E6E-0E5C-41E1-A40C-15B94255FA15}" type="datetimeFigureOut">
               <a:rPr lang="en-US" smtClean="0"/>
-              <a:t>9/23/2024</a:t>
+              <a:t>9/26/2024</a:t>
             </a:fld>
             <a:endParaRPr lang="en-US"/>
           </a:p>
@@ -773,7 +1214,7 @@
           <a:p>
             <a:fld id="{0F5A5E6E-0E5C-41E1-A40C-15B94255FA15}" type="datetimeFigureOut">
               <a:rPr lang="en-US" smtClean="0"/>
-              <a:t>9/23/2024</a:t>
+              <a:t>9/26/2024</a:t>
             </a:fld>
             <a:endParaRPr lang="en-US"/>
           </a:p>
@@ -1018,7 +1459,7 @@
           <a:p>
             <a:fld id="{0F5A5E6E-0E5C-41E1-A40C-15B94255FA15}" type="datetimeFigureOut">
               <a:rPr lang="en-US" smtClean="0"/>
-              <a:t>9/23/2024</a:t>
+              <a:t>9/26/2024</a:t>
             </a:fld>
             <a:endParaRPr lang="en-US"/>
           </a:p>
@@ -1247,7 +1688,7 @@
           <a:p>
             <a:fld id="{0F5A5E6E-0E5C-41E1-A40C-15B94255FA15}" type="datetimeFigureOut">
               <a:rPr lang="en-US" smtClean="0"/>
-              <a:t>9/23/2024</a:t>
+              <a:t>9/26/2024</a:t>
             </a:fld>
             <a:endParaRPr lang="en-US"/>
           </a:p>
@@ -1611,7 +2052,7 @@
           <a:p>
             <a:fld id="{0F5A5E6E-0E5C-41E1-A40C-15B94255FA15}" type="datetimeFigureOut">
               <a:rPr lang="en-US" smtClean="0"/>
-              <a:t>9/23/2024</a:t>
+              <a:t>9/26/2024</a:t>
             </a:fld>
             <a:endParaRPr lang="en-US"/>
           </a:p>
@@ -1728,7 +2169,7 @@
           <a:p>
             <a:fld id="{0F5A5E6E-0E5C-41E1-A40C-15B94255FA15}" type="datetimeFigureOut">
               <a:rPr lang="en-US" smtClean="0"/>
-              <a:t>9/23/2024</a:t>
+              <a:t>9/26/2024</a:t>
             </a:fld>
             <a:endParaRPr lang="en-US"/>
           </a:p>
@@ -1823,7 +2264,7 @@
           <a:p>
             <a:fld id="{0F5A5E6E-0E5C-41E1-A40C-15B94255FA15}" type="datetimeFigureOut">
               <a:rPr lang="en-US" smtClean="0"/>
-              <a:t>9/23/2024</a:t>
+              <a:t>9/26/2024</a:t>
             </a:fld>
             <a:endParaRPr lang="en-US"/>
           </a:p>
@@ -2098,7 +2539,7 @@
           <a:p>
             <a:fld id="{0F5A5E6E-0E5C-41E1-A40C-15B94255FA15}" type="datetimeFigureOut">
               <a:rPr lang="en-US" smtClean="0"/>
-              <a:t>9/23/2024</a:t>
+              <a:t>9/26/2024</a:t>
             </a:fld>
             <a:endParaRPr lang="en-US"/>
           </a:p>
@@ -2350,7 +2791,7 @@
           <a:p>
             <a:fld id="{0F5A5E6E-0E5C-41E1-A40C-15B94255FA15}" type="datetimeFigureOut">
               <a:rPr lang="en-US" smtClean="0"/>
-              <a:t>9/23/2024</a:t>
+              <a:t>9/26/2024</a:t>
             </a:fld>
             <a:endParaRPr lang="en-US"/>
           </a:p>
@@ -2561,7 +3002,7 @@
           <a:p>
             <a:fld id="{0F5A5E6E-0E5C-41E1-A40C-15B94255FA15}" type="datetimeFigureOut">
               <a:rPr lang="en-US" smtClean="0"/>
-              <a:t>9/23/2024</a:t>
+              <a:t>9/26/2024</a:t>
             </a:fld>
             <a:endParaRPr lang="en-US"/>
           </a:p>
@@ -3443,8 +3884,8 @@
         </p:nvSpPr>
         <p:spPr>
           <a:xfrm>
-            <a:off x="838200" y="1990166"/>
-            <a:ext cx="10515600" cy="4867834"/>
+            <a:off x="838200" y="1346083"/>
+            <a:ext cx="10515600" cy="5511915"/>
           </a:xfrm>
         </p:spPr>
         <p:txBody>
@@ -3452,6 +3893,79 @@
             <a:normAutofit/>
           </a:bodyPr>
           <a:lstStyle/>
+          <a:p>
+            <a:pPr marL="0" indent="0">
+              <a:buNone/>
+            </a:pPr>
+            <a:r>
+              <a:rPr lang="en-US" b="1" dirty="0"/>
+              <a:t>Shortcomings:</a:t>
+            </a:r>
+            <a:endParaRPr lang="en-US" dirty="0"/>
+          </a:p>
+          <a:p>
+            <a:pPr>
+              <a:buFont typeface="Arial" panose="020B0604020202020204" pitchFamily="34" charset="0"/>
+              <a:buChar char="•"/>
+            </a:pPr>
+            <a:r>
+              <a:rPr lang="en-US" dirty="0"/>
+              <a:t>Primarily focuses on physical infrastructure issues rather than broader civic engagement.</a:t>
+            </a:r>
+          </a:p>
+          <a:p>
+            <a:pPr>
+              <a:buFont typeface="Arial" panose="020B0604020202020204" pitchFamily="34" charset="0"/>
+              <a:buChar char="•"/>
+            </a:pPr>
+            <a:r>
+              <a:rPr lang="en-US" dirty="0"/>
+              <a:t>Lacks features for virtual engagement (like virtual meetups / surveys).</a:t>
+            </a:r>
+          </a:p>
+          <a:p>
+            <a:pPr>
+              <a:buFont typeface="Arial" panose="020B0604020202020204" pitchFamily="34" charset="0"/>
+              <a:buChar char="•"/>
+            </a:pPr>
+            <a:r>
+              <a:rPr lang="en-US" dirty="0"/>
+              <a:t>Limited feedback mechanisms for performance tracking</a:t>
+            </a:r>
+          </a:p>
+          <a:p>
+            <a:pPr marL="0" indent="0">
+              <a:buNone/>
+            </a:pPr>
+            <a:r>
+              <a:rPr lang="en-US" b="1" dirty="0"/>
+              <a:t>Technologies:</a:t>
+            </a:r>
+          </a:p>
+          <a:p>
+            <a:r>
+              <a:rPr lang="en-US" dirty="0"/>
+              <a:t>Bootstrap</a:t>
+            </a:r>
+          </a:p>
+          <a:p>
+            <a:r>
+              <a:rPr lang="en-US" dirty="0"/>
+              <a:t>jQuery</a:t>
+            </a:r>
+          </a:p>
+          <a:p>
+            <a:r>
+              <a:rPr lang="en-US" dirty="0"/>
+              <a:t>Ruby on Rails</a:t>
+            </a:r>
+          </a:p>
+          <a:p>
+            <a:r>
+              <a:rPr lang="en-US" dirty="0"/>
+              <a:t>Nginx</a:t>
+            </a:r>
+          </a:p>
           <a:p>
             <a:pPr algn="just"/>
             <a:endParaRPr lang="en-US" dirty="0"/>
@@ -3497,68 +4011,10 @@
           </a:fontRef>
         </p:style>
       </p:cxnSp>
-      <p:sp>
-        <p:nvSpPr>
-          <p:cNvPr id="4" name="Title 1">
-            <a:extLst>
-              <a:ext uri="{FF2B5EF4-FFF2-40B4-BE49-F238E27FC236}">
-                <a16:creationId xmlns:a16="http://schemas.microsoft.com/office/drawing/2014/main" id="{7ED9CE21-68A5-DE6F-C9B3-F22A1957B184}"/>
-              </a:ext>
-            </a:extLst>
-          </p:cNvPr>
-          <p:cNvSpPr txBox="1">
-            <a:spLocks/>
-          </p:cNvSpPr>
-          <p:nvPr/>
-        </p:nvSpPr>
-        <p:spPr>
-          <a:xfrm>
-            <a:off x="838200" y="1150051"/>
-            <a:ext cx="10515600" cy="959083"/>
-          </a:xfrm>
-          <a:prstGeom prst="rect">
-            <a:avLst/>
-          </a:prstGeom>
-        </p:spPr>
-        <p:txBody>
-          <a:bodyPr vert="horz" lIns="91440" tIns="45720" rIns="91440" bIns="45720" rtlCol="0" anchor="ctr">
-            <a:normAutofit/>
-          </a:bodyPr>
-          <a:lstStyle>
-            <a:lvl1pPr algn="l" defTabSz="914400" rtl="0" eaLnBrk="1" latinLnBrk="0" hangingPunct="1">
-              <a:lnSpc>
-                <a:spcPct val="90000"/>
-              </a:lnSpc>
-              <a:spcBef>
-                <a:spcPct val="0"/>
-              </a:spcBef>
-              <a:buNone/>
-              <a:defRPr sz="4400" kern="1200">
-                <a:solidFill>
-                  <a:schemeClr val="tx1"/>
-                </a:solidFill>
-                <a:latin typeface="+mj-lt"/>
-                <a:ea typeface="+mj-ea"/>
-                <a:cs typeface="+mj-cs"/>
-              </a:defRPr>
-            </a:lvl1pPr>
-          </a:lstStyle>
-          <a:p>
-            <a:r>
-              <a:rPr lang="en-US" sz="3600" b="1" dirty="0">
-                <a:solidFill>
-                  <a:srgbClr val="F8981C"/>
-                </a:solidFill>
-              </a:rPr>
-              <a:t>K</a:t>
-            </a:r>
-          </a:p>
-        </p:txBody>
-      </p:sp>
     </p:spTree>
     <p:extLst>
       <p:ext uri="{BB962C8B-B14F-4D97-AF65-F5344CB8AC3E}">
-        <p14:creationId xmlns:p14="http://schemas.microsoft.com/office/powerpoint/2010/main" val="4035673482"/>
+        <p14:creationId xmlns:p14="http://schemas.microsoft.com/office/powerpoint/2010/main" val="4109786924"/>
       </p:ext>
     </p:extLst>
   </p:cSld>
@@ -3638,8 +4094,57 @@
           </a:bodyPr>
           <a:lstStyle/>
           <a:p>
-            <a:pPr algn="just"/>
+            <a:pPr marL="0" indent="0" algn="just">
+              <a:buNone/>
+            </a:pPr>
+            <a:r>
+              <a:rPr lang="en-US" b="1" dirty="0"/>
+              <a:t>Neighbourland</a:t>
+            </a:r>
+            <a:r>
+              <a:rPr lang="en-US" dirty="0"/>
+              <a:t> is a civic engagement tool that empowers residents to collaborate on ideas for improving public spaces and local governance.</a:t>
+            </a:r>
+          </a:p>
+          <a:p>
+            <a:pPr marL="0" indent="0" algn="just">
+              <a:buNone/>
+            </a:pPr>
+            <a:r>
+              <a:rPr lang="en-US" b="1" dirty="0"/>
+              <a:t>Features:</a:t>
+            </a:r>
             <a:endParaRPr lang="en-US" dirty="0"/>
+          </a:p>
+          <a:p>
+            <a:pPr algn="just">
+              <a:buFont typeface="Arial" panose="020B0604020202020204" pitchFamily="34" charset="0"/>
+              <a:buChar char="•"/>
+            </a:pPr>
+            <a:r>
+              <a:rPr lang="en-US" dirty="0"/>
+              <a:t>Citizens can propose and discuss ideas to improve their neighborhoods, helping to shape government projects and decisions.</a:t>
+            </a:r>
+          </a:p>
+          <a:p>
+            <a:pPr algn="just">
+              <a:buFont typeface="Arial" panose="020B0604020202020204" pitchFamily="34" charset="0"/>
+              <a:buChar char="•"/>
+            </a:pPr>
+            <a:r>
+              <a:rPr lang="en-US" dirty="0"/>
+              <a:t>Surveys and polls for gathering community opinions.</a:t>
+            </a:r>
+          </a:p>
+          <a:p>
+            <a:pPr algn="just">
+              <a:buFont typeface="Arial" panose="020B0604020202020204" pitchFamily="34" charset="0"/>
+              <a:buChar char="•"/>
+            </a:pPr>
+            <a:r>
+              <a:rPr lang="en-US" dirty="0"/>
+              <a:t>Focuses on community-driven projects, allowing citizens to follow the progress of initiatives they care about.</a:t>
+            </a:r>
           </a:p>
         </p:txBody>
       </p:sp>
@@ -3735,7 +4240,7 @@
                   <a:srgbClr val="F8981C"/>
                 </a:solidFill>
               </a:rPr>
-              <a:t>K</a:t>
+              <a:t>Neighbourland</a:t>
             </a:r>
           </a:p>
         </p:txBody>
@@ -3743,7 +4248,7 @@
     </p:spTree>
     <p:extLst>
       <p:ext uri="{BB962C8B-B14F-4D97-AF65-F5344CB8AC3E}">
-        <p14:creationId xmlns:p14="http://schemas.microsoft.com/office/powerpoint/2010/main" val="4109786924"/>
+        <p14:creationId xmlns:p14="http://schemas.microsoft.com/office/powerpoint/2010/main" val="4045273008"/>
       </p:ext>
     </p:extLst>
   </p:cSld>
@@ -3754,6 +4259,882 @@
 </file>
 
 <file path=ppt/slides/slide12.xml><?xml version="1.0" encoding="utf-8"?>
+<p:sld xmlns:a="http://schemas.openxmlformats.org/drawingml/2006/main" xmlns:r="http://schemas.openxmlformats.org/officeDocument/2006/relationships" xmlns:p="http://schemas.openxmlformats.org/presentationml/2006/main">
+  <p:cSld>
+    <p:spTree>
+      <p:nvGrpSpPr>
+        <p:cNvPr id="1" name=""/>
+        <p:cNvGrpSpPr/>
+        <p:nvPr/>
+      </p:nvGrpSpPr>
+      <p:grpSpPr>
+        <a:xfrm>
+          <a:off x="0" y="0"/>
+          <a:ext cx="0" cy="0"/>
+          <a:chOff x="0" y="0"/>
+          <a:chExt cx="0" cy="0"/>
+        </a:xfrm>
+      </p:grpSpPr>
+      <p:sp>
+        <p:nvSpPr>
+          <p:cNvPr id="2" name="Title 1"/>
+          <p:cNvSpPr>
+            <a:spLocks noGrp="1"/>
+          </p:cNvSpPr>
+          <p:nvPr>
+            <p:ph type="title"/>
+          </p:nvPr>
+        </p:nvSpPr>
+        <p:spPr>
+          <a:xfrm>
+            <a:off x="838200" y="365125"/>
+            <a:ext cx="10515600" cy="980959"/>
+          </a:xfrm>
+        </p:spPr>
+        <p:txBody>
+          <a:bodyPr/>
+          <a:lstStyle/>
+          <a:p>
+            <a:r>
+              <a:rPr lang="en-US" b="1" dirty="0">
+                <a:solidFill>
+                  <a:srgbClr val="36ABF3"/>
+                </a:solidFill>
+              </a:rPr>
+              <a:t>Literature Review</a:t>
+            </a:r>
+          </a:p>
+        </p:txBody>
+      </p:sp>
+      <p:sp>
+        <p:nvSpPr>
+          <p:cNvPr id="3" name="Content Placeholder 2"/>
+          <p:cNvSpPr>
+            <a:spLocks noGrp="1"/>
+          </p:cNvSpPr>
+          <p:nvPr>
+            <p:ph idx="1"/>
+          </p:nvPr>
+        </p:nvSpPr>
+        <p:spPr>
+          <a:xfrm>
+            <a:off x="838200" y="1346083"/>
+            <a:ext cx="10515600" cy="5511915"/>
+          </a:xfrm>
+        </p:spPr>
+        <p:txBody>
+          <a:bodyPr>
+            <a:normAutofit/>
+          </a:bodyPr>
+          <a:lstStyle/>
+          <a:p>
+            <a:pPr marL="0" indent="0">
+              <a:buNone/>
+            </a:pPr>
+            <a:r>
+              <a:rPr lang="en-US" b="1" dirty="0"/>
+              <a:t>Shortcomings:</a:t>
+            </a:r>
+            <a:endParaRPr lang="en-US" dirty="0"/>
+          </a:p>
+          <a:p>
+            <a:pPr>
+              <a:buFont typeface="Arial" panose="020B0604020202020204" pitchFamily="34" charset="0"/>
+              <a:buChar char="•"/>
+            </a:pPr>
+            <a:r>
+              <a:rPr lang="en-US" dirty="0"/>
+              <a:t>Focuses more on long-term project-based collaboration rather than short-term problem reporting or complaint resolution.</a:t>
+            </a:r>
+          </a:p>
+          <a:p>
+            <a:pPr>
+              <a:buFont typeface="Arial" panose="020B0604020202020204" pitchFamily="34" charset="0"/>
+              <a:buChar char="•"/>
+            </a:pPr>
+            <a:r>
+              <a:rPr lang="en-US" dirty="0"/>
+              <a:t>Lacks real-time features such as live tracking or updates.</a:t>
+            </a:r>
+          </a:p>
+          <a:p>
+            <a:pPr>
+              <a:buFont typeface="Arial" panose="020B0604020202020204" pitchFamily="34" charset="0"/>
+              <a:buChar char="•"/>
+            </a:pPr>
+            <a:r>
+              <a:rPr lang="en-US" dirty="0"/>
+              <a:t>No Role-Based Access Control(RBAC) or performance monitoring for local representatives.</a:t>
+            </a:r>
+          </a:p>
+          <a:p>
+            <a:pPr marL="0" indent="0">
+              <a:buNone/>
+            </a:pPr>
+            <a:r>
+              <a:rPr lang="en-US" b="1" dirty="0"/>
+              <a:t>Technologies:</a:t>
+            </a:r>
+          </a:p>
+          <a:p>
+            <a:r>
+              <a:rPr lang="en-US" dirty="0"/>
+              <a:t>Typescript</a:t>
+            </a:r>
+          </a:p>
+          <a:p>
+            <a:r>
+              <a:rPr lang="en-US" dirty="0"/>
+              <a:t>Apollo JS</a:t>
+            </a:r>
+          </a:p>
+          <a:p>
+            <a:r>
+              <a:rPr lang="en-US" dirty="0"/>
+              <a:t>Node JS</a:t>
+            </a:r>
+          </a:p>
+          <a:p>
+            <a:r>
+              <a:rPr lang="en-US" dirty="0"/>
+              <a:t>Nginx</a:t>
+            </a:r>
+          </a:p>
+          <a:p>
+            <a:pPr algn="just"/>
+            <a:endParaRPr lang="en-US" dirty="0"/>
+          </a:p>
+        </p:txBody>
+      </p:sp>
+      <p:cxnSp>
+        <p:nvCxnSpPr>
+          <p:cNvPr id="10" name="Straight Connector 9">
+            <a:extLst>
+              <a:ext uri="{FF2B5EF4-FFF2-40B4-BE49-F238E27FC236}">
+                <a16:creationId xmlns:a16="http://schemas.microsoft.com/office/drawing/2014/main" id="{5C4D56EA-8905-CAFF-FA8B-91B461D57C36}"/>
+              </a:ext>
+            </a:extLst>
+          </p:cNvPr>
+          <p:cNvCxnSpPr>
+            <a:cxnSpLocks/>
+          </p:cNvCxnSpPr>
+          <p:nvPr/>
+        </p:nvCxnSpPr>
+        <p:spPr>
+          <a:xfrm>
+            <a:off x="929640" y="1237129"/>
+            <a:ext cx="10332720" cy="0"/>
+          </a:xfrm>
+          <a:prstGeom prst="line">
+            <a:avLst/>
+          </a:prstGeom>
+          <a:ln w="28575"/>
+        </p:spPr>
+        <p:style>
+          <a:lnRef idx="3">
+            <a:schemeClr val="dk1"/>
+          </a:lnRef>
+          <a:fillRef idx="0">
+            <a:schemeClr val="dk1"/>
+          </a:fillRef>
+          <a:effectRef idx="2">
+            <a:schemeClr val="dk1"/>
+          </a:effectRef>
+          <a:fontRef idx="minor">
+            <a:schemeClr val="tx1"/>
+          </a:fontRef>
+        </p:style>
+      </p:cxnSp>
+    </p:spTree>
+    <p:extLst>
+      <p:ext uri="{BB962C8B-B14F-4D97-AF65-F5344CB8AC3E}">
+        <p14:creationId xmlns:p14="http://schemas.microsoft.com/office/powerpoint/2010/main" val="2255706877"/>
+      </p:ext>
+    </p:extLst>
+  </p:cSld>
+  <p:clrMapOvr>
+    <a:masterClrMapping/>
+  </p:clrMapOvr>
+</p:sld>
+</file>
+
+<file path=ppt/slides/slide13.xml><?xml version="1.0" encoding="utf-8"?>
+<p:sld xmlns:a="http://schemas.openxmlformats.org/drawingml/2006/main" xmlns:r="http://schemas.openxmlformats.org/officeDocument/2006/relationships" xmlns:p="http://schemas.openxmlformats.org/presentationml/2006/main">
+  <p:cSld>
+    <p:spTree>
+      <p:nvGrpSpPr>
+        <p:cNvPr id="1" name=""/>
+        <p:cNvGrpSpPr/>
+        <p:nvPr/>
+      </p:nvGrpSpPr>
+      <p:grpSpPr>
+        <a:xfrm>
+          <a:off x="0" y="0"/>
+          <a:ext cx="0" cy="0"/>
+          <a:chOff x="0" y="0"/>
+          <a:chExt cx="0" cy="0"/>
+        </a:xfrm>
+      </p:grpSpPr>
+      <p:sp>
+        <p:nvSpPr>
+          <p:cNvPr id="2" name="Title 1"/>
+          <p:cNvSpPr>
+            <a:spLocks noGrp="1"/>
+          </p:cNvSpPr>
+          <p:nvPr>
+            <p:ph type="title"/>
+          </p:nvPr>
+        </p:nvSpPr>
+        <p:spPr>
+          <a:xfrm>
+            <a:off x="838200" y="365125"/>
+            <a:ext cx="10515600" cy="980959"/>
+          </a:xfrm>
+        </p:spPr>
+        <p:txBody>
+          <a:bodyPr/>
+          <a:lstStyle/>
+          <a:p>
+            <a:r>
+              <a:rPr lang="en-US" b="1" dirty="0">
+                <a:solidFill>
+                  <a:srgbClr val="36ABF3"/>
+                </a:solidFill>
+              </a:rPr>
+              <a:t>Literature Review</a:t>
+            </a:r>
+          </a:p>
+        </p:txBody>
+      </p:sp>
+      <p:sp>
+        <p:nvSpPr>
+          <p:cNvPr id="3" name="Content Placeholder 2"/>
+          <p:cNvSpPr>
+            <a:spLocks noGrp="1"/>
+          </p:cNvSpPr>
+          <p:nvPr>
+            <p:ph idx="1"/>
+          </p:nvPr>
+        </p:nvSpPr>
+        <p:spPr>
+          <a:xfrm>
+            <a:off x="838200" y="1990166"/>
+            <a:ext cx="10515600" cy="4867834"/>
+          </a:xfrm>
+        </p:spPr>
+        <p:txBody>
+          <a:bodyPr>
+            <a:normAutofit/>
+          </a:bodyPr>
+          <a:lstStyle/>
+          <a:p>
+            <a:pPr marL="0" indent="0" algn="just">
+              <a:buNone/>
+            </a:pPr>
+            <a:r>
+              <a:rPr lang="en-US" dirty="0"/>
+              <a:t>The </a:t>
+            </a:r>
+            <a:r>
+              <a:rPr lang="en-US" b="1" dirty="0"/>
+              <a:t>PM Citizen Portal</a:t>
+            </a:r>
+            <a:r>
+              <a:rPr lang="en-US" dirty="0"/>
+              <a:t> is a government-run platform in local landscape designed for citizens to submit complaints and track their resolution by relevant departments.</a:t>
+            </a:r>
+          </a:p>
+          <a:p>
+            <a:pPr marL="0" indent="0" algn="just">
+              <a:buNone/>
+            </a:pPr>
+            <a:r>
+              <a:rPr lang="en-US" b="1" dirty="0"/>
+              <a:t>Features:</a:t>
+            </a:r>
+          </a:p>
+          <a:p>
+            <a:pPr algn="just"/>
+            <a:r>
+              <a:rPr lang="en-US" dirty="0"/>
+              <a:t>Provides a single point for citizens to submit complaints on various issues.</a:t>
+            </a:r>
+          </a:p>
+          <a:p>
+            <a:pPr algn="just">
+              <a:buFont typeface="Arial" panose="020B0604020202020204" pitchFamily="34" charset="0"/>
+              <a:buChar char="•"/>
+            </a:pPr>
+            <a:r>
+              <a:rPr lang="en-US" dirty="0"/>
+              <a:t>Citizens can track the status of their complaints and receive updates when an issue is resolved.</a:t>
+            </a:r>
+          </a:p>
+          <a:p>
+            <a:pPr algn="just">
+              <a:buFont typeface="Arial" panose="020B0604020202020204" pitchFamily="34" charset="0"/>
+              <a:buChar char="•"/>
+            </a:pPr>
+            <a:r>
+              <a:rPr lang="en-US" dirty="0"/>
+              <a:t>Integrated with multiple government departments for quick resolution.</a:t>
+            </a:r>
+          </a:p>
+        </p:txBody>
+      </p:sp>
+      <p:cxnSp>
+        <p:nvCxnSpPr>
+          <p:cNvPr id="10" name="Straight Connector 9">
+            <a:extLst>
+              <a:ext uri="{FF2B5EF4-FFF2-40B4-BE49-F238E27FC236}">
+                <a16:creationId xmlns:a16="http://schemas.microsoft.com/office/drawing/2014/main" id="{5C4D56EA-8905-CAFF-FA8B-91B461D57C36}"/>
+              </a:ext>
+            </a:extLst>
+          </p:cNvPr>
+          <p:cNvCxnSpPr>
+            <a:cxnSpLocks/>
+          </p:cNvCxnSpPr>
+          <p:nvPr/>
+        </p:nvCxnSpPr>
+        <p:spPr>
+          <a:xfrm>
+            <a:off x="929640" y="1237129"/>
+            <a:ext cx="10332720" cy="0"/>
+          </a:xfrm>
+          <a:prstGeom prst="line">
+            <a:avLst/>
+          </a:prstGeom>
+          <a:ln w="28575"/>
+        </p:spPr>
+        <p:style>
+          <a:lnRef idx="3">
+            <a:schemeClr val="dk1"/>
+          </a:lnRef>
+          <a:fillRef idx="0">
+            <a:schemeClr val="dk1"/>
+          </a:fillRef>
+          <a:effectRef idx="2">
+            <a:schemeClr val="dk1"/>
+          </a:effectRef>
+          <a:fontRef idx="minor">
+            <a:schemeClr val="tx1"/>
+          </a:fontRef>
+        </p:style>
+      </p:cxnSp>
+      <p:sp>
+        <p:nvSpPr>
+          <p:cNvPr id="4" name="Title 1">
+            <a:extLst>
+              <a:ext uri="{FF2B5EF4-FFF2-40B4-BE49-F238E27FC236}">
+                <a16:creationId xmlns:a16="http://schemas.microsoft.com/office/drawing/2014/main" id="{7ED9CE21-68A5-DE6F-C9B3-F22A1957B184}"/>
+              </a:ext>
+            </a:extLst>
+          </p:cNvPr>
+          <p:cNvSpPr txBox="1">
+            <a:spLocks/>
+          </p:cNvSpPr>
+          <p:nvPr/>
+        </p:nvSpPr>
+        <p:spPr>
+          <a:xfrm>
+            <a:off x="838200" y="1150051"/>
+            <a:ext cx="10515600" cy="959083"/>
+          </a:xfrm>
+          <a:prstGeom prst="rect">
+            <a:avLst/>
+          </a:prstGeom>
+        </p:spPr>
+        <p:txBody>
+          <a:bodyPr vert="horz" lIns="91440" tIns="45720" rIns="91440" bIns="45720" rtlCol="0" anchor="ctr">
+            <a:normAutofit/>
+          </a:bodyPr>
+          <a:lstStyle>
+            <a:lvl1pPr algn="l" defTabSz="914400" rtl="0" eaLnBrk="1" latinLnBrk="0" hangingPunct="1">
+              <a:lnSpc>
+                <a:spcPct val="90000"/>
+              </a:lnSpc>
+              <a:spcBef>
+                <a:spcPct val="0"/>
+              </a:spcBef>
+              <a:buNone/>
+              <a:defRPr sz="4400" kern="1200">
+                <a:solidFill>
+                  <a:schemeClr val="tx1"/>
+                </a:solidFill>
+                <a:latin typeface="+mj-lt"/>
+                <a:ea typeface="+mj-ea"/>
+                <a:cs typeface="+mj-cs"/>
+              </a:defRPr>
+            </a:lvl1pPr>
+          </a:lstStyle>
+          <a:p>
+            <a:r>
+              <a:rPr lang="en-US" sz="3600" b="1" dirty="0">
+                <a:solidFill>
+                  <a:srgbClr val="F8981C"/>
+                </a:solidFill>
+              </a:rPr>
+              <a:t>PM Citizen Portal</a:t>
+            </a:r>
+          </a:p>
+        </p:txBody>
+      </p:sp>
+    </p:spTree>
+    <p:extLst>
+      <p:ext uri="{BB962C8B-B14F-4D97-AF65-F5344CB8AC3E}">
+        <p14:creationId xmlns:p14="http://schemas.microsoft.com/office/powerpoint/2010/main" val="2550895870"/>
+      </p:ext>
+    </p:extLst>
+  </p:cSld>
+  <p:clrMapOvr>
+    <a:masterClrMapping/>
+  </p:clrMapOvr>
+</p:sld>
+</file>
+
+<file path=ppt/slides/slide14.xml><?xml version="1.0" encoding="utf-8"?>
+<p:sld xmlns:a="http://schemas.openxmlformats.org/drawingml/2006/main" xmlns:r="http://schemas.openxmlformats.org/officeDocument/2006/relationships" xmlns:p="http://schemas.openxmlformats.org/presentationml/2006/main">
+  <p:cSld>
+    <p:spTree>
+      <p:nvGrpSpPr>
+        <p:cNvPr id="1" name=""/>
+        <p:cNvGrpSpPr/>
+        <p:nvPr/>
+      </p:nvGrpSpPr>
+      <p:grpSpPr>
+        <a:xfrm>
+          <a:off x="0" y="0"/>
+          <a:ext cx="0" cy="0"/>
+          <a:chOff x="0" y="0"/>
+          <a:chExt cx="0" cy="0"/>
+        </a:xfrm>
+      </p:grpSpPr>
+      <p:sp>
+        <p:nvSpPr>
+          <p:cNvPr id="2" name="Title 1"/>
+          <p:cNvSpPr>
+            <a:spLocks noGrp="1"/>
+          </p:cNvSpPr>
+          <p:nvPr>
+            <p:ph type="title"/>
+          </p:nvPr>
+        </p:nvSpPr>
+        <p:spPr>
+          <a:xfrm>
+            <a:off x="838200" y="365125"/>
+            <a:ext cx="10515600" cy="980959"/>
+          </a:xfrm>
+        </p:spPr>
+        <p:txBody>
+          <a:bodyPr/>
+          <a:lstStyle/>
+          <a:p>
+            <a:r>
+              <a:rPr lang="en-US" b="1" dirty="0">
+                <a:solidFill>
+                  <a:srgbClr val="36ABF3"/>
+                </a:solidFill>
+              </a:rPr>
+              <a:t>Literature Review</a:t>
+            </a:r>
+          </a:p>
+        </p:txBody>
+      </p:sp>
+      <p:sp>
+        <p:nvSpPr>
+          <p:cNvPr id="3" name="Content Placeholder 2"/>
+          <p:cNvSpPr>
+            <a:spLocks noGrp="1"/>
+          </p:cNvSpPr>
+          <p:nvPr>
+            <p:ph idx="1"/>
+          </p:nvPr>
+        </p:nvSpPr>
+        <p:spPr>
+          <a:xfrm>
+            <a:off x="838200" y="1346083"/>
+            <a:ext cx="10515600" cy="5511915"/>
+          </a:xfrm>
+        </p:spPr>
+        <p:txBody>
+          <a:bodyPr>
+            <a:normAutofit lnSpcReduction="10000"/>
+          </a:bodyPr>
+          <a:lstStyle/>
+          <a:p>
+            <a:pPr marL="0" indent="0">
+              <a:buNone/>
+            </a:pPr>
+            <a:r>
+              <a:rPr lang="en-US" b="1" dirty="0"/>
+              <a:t>Shortcomings:</a:t>
+            </a:r>
+            <a:endParaRPr lang="en-US" dirty="0"/>
+          </a:p>
+          <a:p>
+            <a:pPr>
+              <a:buFont typeface="Arial" panose="020B0604020202020204" pitchFamily="34" charset="0"/>
+              <a:buChar char="•"/>
+            </a:pPr>
+            <a:r>
+              <a:rPr lang="en-US" dirty="0"/>
+              <a:t>Lacks real-time notifications and transparency features like performance dashboards for representatives.</a:t>
+            </a:r>
+          </a:p>
+          <a:p>
+            <a:pPr>
+              <a:buFont typeface="Arial" panose="020B0604020202020204" pitchFamily="34" charset="0"/>
+              <a:buChar char="•"/>
+            </a:pPr>
+            <a:r>
+              <a:rPr lang="en-US" dirty="0"/>
+              <a:t>Offers basic reporting but lacks detailed analytics and customizable reports for data-driven decision-making.</a:t>
+            </a:r>
+          </a:p>
+          <a:p>
+            <a:pPr>
+              <a:buFont typeface="Arial" panose="020B0604020202020204" pitchFamily="34" charset="0"/>
+              <a:buChar char="•"/>
+            </a:pPr>
+            <a:r>
+              <a:rPr lang="en-US" dirty="0"/>
+              <a:t>Unlike more modern platforms, it does not offer virtual meetups, or survey tools to foster direct communication between citizens and representatives.</a:t>
+            </a:r>
+          </a:p>
+          <a:p>
+            <a:pPr marL="0" indent="0">
+              <a:buNone/>
+            </a:pPr>
+            <a:r>
+              <a:rPr lang="en-US" b="1" dirty="0"/>
+              <a:t>Technologies:</a:t>
+            </a:r>
+          </a:p>
+          <a:p>
+            <a:r>
+              <a:rPr lang="en-US" dirty="0"/>
+              <a:t>Bootstrap</a:t>
+            </a:r>
+          </a:p>
+          <a:p>
+            <a:r>
+              <a:rPr lang="en-US" dirty="0"/>
+              <a:t>jQuery</a:t>
+            </a:r>
+          </a:p>
+          <a:p>
+            <a:r>
+              <a:rPr lang="en-US" dirty="0" err="1"/>
+              <a:t>php</a:t>
+            </a:r>
+            <a:endParaRPr lang="en-US" dirty="0"/>
+          </a:p>
+          <a:p>
+            <a:pPr algn="just"/>
+            <a:endParaRPr lang="en-US" dirty="0"/>
+          </a:p>
+        </p:txBody>
+      </p:sp>
+      <p:cxnSp>
+        <p:nvCxnSpPr>
+          <p:cNvPr id="10" name="Straight Connector 9">
+            <a:extLst>
+              <a:ext uri="{FF2B5EF4-FFF2-40B4-BE49-F238E27FC236}">
+                <a16:creationId xmlns:a16="http://schemas.microsoft.com/office/drawing/2014/main" id="{5C4D56EA-8905-CAFF-FA8B-91B461D57C36}"/>
+              </a:ext>
+            </a:extLst>
+          </p:cNvPr>
+          <p:cNvCxnSpPr>
+            <a:cxnSpLocks/>
+          </p:cNvCxnSpPr>
+          <p:nvPr/>
+        </p:nvCxnSpPr>
+        <p:spPr>
+          <a:xfrm>
+            <a:off x="929640" y="1237129"/>
+            <a:ext cx="10332720" cy="0"/>
+          </a:xfrm>
+          <a:prstGeom prst="line">
+            <a:avLst/>
+          </a:prstGeom>
+          <a:ln w="28575"/>
+        </p:spPr>
+        <p:style>
+          <a:lnRef idx="3">
+            <a:schemeClr val="dk1"/>
+          </a:lnRef>
+          <a:fillRef idx="0">
+            <a:schemeClr val="dk1"/>
+          </a:fillRef>
+          <a:effectRef idx="2">
+            <a:schemeClr val="dk1"/>
+          </a:effectRef>
+          <a:fontRef idx="minor">
+            <a:schemeClr val="tx1"/>
+          </a:fontRef>
+        </p:style>
+      </p:cxnSp>
+    </p:spTree>
+    <p:extLst>
+      <p:ext uri="{BB962C8B-B14F-4D97-AF65-F5344CB8AC3E}">
+        <p14:creationId xmlns:p14="http://schemas.microsoft.com/office/powerpoint/2010/main" val="436104353"/>
+      </p:ext>
+    </p:extLst>
+  </p:cSld>
+  <p:clrMapOvr>
+    <a:masterClrMapping/>
+  </p:clrMapOvr>
+</p:sld>
+</file>
+
+<file path=ppt/slides/slide15.xml><?xml version="1.0" encoding="utf-8"?>
+<p:sld xmlns:a="http://schemas.openxmlformats.org/drawingml/2006/main" xmlns:r="http://schemas.openxmlformats.org/officeDocument/2006/relationships" xmlns:p="http://schemas.openxmlformats.org/presentationml/2006/main">
+  <p:cSld>
+    <p:spTree>
+      <p:nvGrpSpPr>
+        <p:cNvPr id="1" name=""/>
+        <p:cNvGrpSpPr/>
+        <p:nvPr/>
+      </p:nvGrpSpPr>
+      <p:grpSpPr>
+        <a:xfrm>
+          <a:off x="0" y="0"/>
+          <a:ext cx="0" cy="0"/>
+          <a:chOff x="0" y="0"/>
+          <a:chExt cx="0" cy="0"/>
+        </a:xfrm>
+      </p:grpSpPr>
+      <p:sp>
+        <p:nvSpPr>
+          <p:cNvPr id="2" name="Title 1"/>
+          <p:cNvSpPr>
+            <a:spLocks noGrp="1"/>
+          </p:cNvSpPr>
+          <p:nvPr>
+            <p:ph type="title"/>
+          </p:nvPr>
+        </p:nvSpPr>
+        <p:spPr>
+          <a:xfrm>
+            <a:off x="838200" y="365125"/>
+            <a:ext cx="10515600" cy="980959"/>
+          </a:xfrm>
+        </p:spPr>
+        <p:txBody>
+          <a:bodyPr/>
+          <a:lstStyle/>
+          <a:p>
+            <a:r>
+              <a:rPr lang="en-US" b="1" dirty="0">
+                <a:solidFill>
+                  <a:srgbClr val="36ABF3"/>
+                </a:solidFill>
+              </a:rPr>
+              <a:t>Literature Review</a:t>
+            </a:r>
+          </a:p>
+        </p:txBody>
+      </p:sp>
+      <p:sp>
+        <p:nvSpPr>
+          <p:cNvPr id="3" name="Content Placeholder 2"/>
+          <p:cNvSpPr>
+            <a:spLocks noGrp="1"/>
+          </p:cNvSpPr>
+          <p:nvPr>
+            <p:ph idx="1"/>
+          </p:nvPr>
+        </p:nvSpPr>
+        <p:spPr>
+          <a:xfrm>
+            <a:off x="838200" y="1990166"/>
+            <a:ext cx="10515600" cy="4867834"/>
+          </a:xfrm>
+        </p:spPr>
+        <p:txBody>
+          <a:bodyPr>
+            <a:normAutofit/>
+          </a:bodyPr>
+          <a:lstStyle/>
+          <a:p>
+            <a:pPr>
+              <a:buFont typeface="Arial" panose="020B0604020202020204" pitchFamily="34" charset="0"/>
+              <a:buChar char="•"/>
+            </a:pPr>
+            <a:r>
+              <a:rPr lang="en-US" dirty="0"/>
+              <a:t>While each system offers valuable civic engagement tools, none fully combine the features of real-time tracking, virtual engagement (meetups, surveys), and performance analytics.</a:t>
+            </a:r>
+          </a:p>
+          <a:p>
+            <a:pPr>
+              <a:buFont typeface="Arial" panose="020B0604020202020204" pitchFamily="34" charset="0"/>
+              <a:buChar char="•"/>
+            </a:pPr>
+            <a:r>
+              <a:rPr lang="en-US" b="1" dirty="0"/>
+              <a:t>FixMyStreet</a:t>
+            </a:r>
+            <a:r>
+              <a:rPr lang="en-US" dirty="0"/>
+              <a:t> and </a:t>
+            </a:r>
+            <a:r>
+              <a:rPr lang="en-US" b="1" dirty="0"/>
+              <a:t>SeeClickFix</a:t>
+            </a:r>
+            <a:r>
+              <a:rPr lang="en-US" dirty="0"/>
+              <a:t> focus on public service infrastructure issues but miss the broader aspects of civic engagement and representative accountability.</a:t>
+            </a:r>
+          </a:p>
+          <a:p>
+            <a:pPr>
+              <a:buFont typeface="Arial" panose="020B0604020202020204" pitchFamily="34" charset="0"/>
+              <a:buChar char="•"/>
+            </a:pPr>
+            <a:r>
+              <a:rPr lang="en-US" b="1" dirty="0"/>
+              <a:t>Neighbourland</a:t>
+            </a:r>
+            <a:r>
+              <a:rPr lang="en-US" dirty="0"/>
+              <a:t> fosters long-term collaboration on public projects but lacks features for addressing immediate concerns or complaints.</a:t>
+            </a:r>
+          </a:p>
+          <a:p>
+            <a:pPr>
+              <a:buFont typeface="Arial" panose="020B0604020202020204" pitchFamily="34" charset="0"/>
+              <a:buChar char="•"/>
+            </a:pPr>
+            <a:r>
+              <a:rPr lang="en-US" b="1" dirty="0"/>
+              <a:t>PM Citizen Portal</a:t>
+            </a:r>
+            <a:r>
+              <a:rPr lang="en-US" dirty="0"/>
+              <a:t> provides a centralized complaint system but misses out on modern features like real-time updates, detailed analytics, and dynamic civic engagement tools.</a:t>
+            </a:r>
+          </a:p>
+          <a:p>
+            <a:pPr marL="0" indent="0" algn="just">
+              <a:buNone/>
+            </a:pPr>
+            <a:endParaRPr lang="en-US" dirty="0"/>
+          </a:p>
+        </p:txBody>
+      </p:sp>
+      <p:cxnSp>
+        <p:nvCxnSpPr>
+          <p:cNvPr id="10" name="Straight Connector 9">
+            <a:extLst>
+              <a:ext uri="{FF2B5EF4-FFF2-40B4-BE49-F238E27FC236}">
+                <a16:creationId xmlns:a16="http://schemas.microsoft.com/office/drawing/2014/main" id="{5C4D56EA-8905-CAFF-FA8B-91B461D57C36}"/>
+              </a:ext>
+            </a:extLst>
+          </p:cNvPr>
+          <p:cNvCxnSpPr>
+            <a:cxnSpLocks/>
+          </p:cNvCxnSpPr>
+          <p:nvPr/>
+        </p:nvCxnSpPr>
+        <p:spPr>
+          <a:xfrm>
+            <a:off x="929640" y="1237129"/>
+            <a:ext cx="10332720" cy="0"/>
+          </a:xfrm>
+          <a:prstGeom prst="line">
+            <a:avLst/>
+          </a:prstGeom>
+          <a:ln w="28575"/>
+        </p:spPr>
+        <p:style>
+          <a:lnRef idx="3">
+            <a:schemeClr val="dk1"/>
+          </a:lnRef>
+          <a:fillRef idx="0">
+            <a:schemeClr val="dk1"/>
+          </a:fillRef>
+          <a:effectRef idx="2">
+            <a:schemeClr val="dk1"/>
+          </a:effectRef>
+          <a:fontRef idx="minor">
+            <a:schemeClr val="tx1"/>
+          </a:fontRef>
+        </p:style>
+      </p:cxnSp>
+      <p:sp>
+        <p:nvSpPr>
+          <p:cNvPr id="4" name="Title 1">
+            <a:extLst>
+              <a:ext uri="{FF2B5EF4-FFF2-40B4-BE49-F238E27FC236}">
+                <a16:creationId xmlns:a16="http://schemas.microsoft.com/office/drawing/2014/main" id="{7ED9CE21-68A5-DE6F-C9B3-F22A1957B184}"/>
+              </a:ext>
+            </a:extLst>
+          </p:cNvPr>
+          <p:cNvSpPr txBox="1">
+            <a:spLocks/>
+          </p:cNvSpPr>
+          <p:nvPr/>
+        </p:nvSpPr>
+        <p:spPr>
+          <a:xfrm>
+            <a:off x="838200" y="1150051"/>
+            <a:ext cx="10515600" cy="959083"/>
+          </a:xfrm>
+          <a:prstGeom prst="rect">
+            <a:avLst/>
+          </a:prstGeom>
+        </p:spPr>
+        <p:txBody>
+          <a:bodyPr vert="horz" lIns="91440" tIns="45720" rIns="91440" bIns="45720" rtlCol="0" anchor="ctr">
+            <a:normAutofit/>
+          </a:bodyPr>
+          <a:lstStyle>
+            <a:lvl1pPr algn="l" defTabSz="914400" rtl="0" eaLnBrk="1" latinLnBrk="0" hangingPunct="1">
+              <a:lnSpc>
+                <a:spcPct val="90000"/>
+              </a:lnSpc>
+              <a:spcBef>
+                <a:spcPct val="0"/>
+              </a:spcBef>
+              <a:buNone/>
+              <a:defRPr sz="4400" kern="1200">
+                <a:solidFill>
+                  <a:schemeClr val="tx1"/>
+                </a:solidFill>
+                <a:latin typeface="+mj-lt"/>
+                <a:ea typeface="+mj-ea"/>
+                <a:cs typeface="+mj-cs"/>
+              </a:defRPr>
+            </a:lvl1pPr>
+          </a:lstStyle>
+          <a:p>
+            <a:r>
+              <a:rPr lang="en-US" sz="3600" b="1" dirty="0">
+                <a:solidFill>
+                  <a:srgbClr val="F8981C"/>
+                </a:solidFill>
+              </a:rPr>
+              <a:t>Conclusion</a:t>
+            </a:r>
+          </a:p>
+        </p:txBody>
+      </p:sp>
+    </p:spTree>
+    <p:extLst>
+      <p:ext uri="{BB962C8B-B14F-4D97-AF65-F5344CB8AC3E}">
+        <p14:creationId xmlns:p14="http://schemas.microsoft.com/office/powerpoint/2010/main" val="3363154380"/>
+      </p:ext>
+    </p:extLst>
+  </p:cSld>
+  <p:clrMapOvr>
+    <a:masterClrMapping/>
+  </p:clrMapOvr>
+</p:sld>
+</file>
+
+<file path=ppt/slides/slide16.xml><?xml version="1.0" encoding="utf-8"?>
 <p:sld xmlns:a="http://schemas.openxmlformats.org/drawingml/2006/main" xmlns:r="http://schemas.openxmlformats.org/officeDocument/2006/relationships" xmlns:p="http://schemas.openxmlformats.org/presentationml/2006/main">
   <p:cSld>
     <p:spTree>
@@ -3866,7 +5247,7 @@
 </p:sld>
 </file>
 
-<file path=ppt/slides/slide13.xml><?xml version="1.0" encoding="utf-8"?>
+<file path=ppt/slides/slide17.xml><?xml version="1.0" encoding="utf-8"?>
 <p:sld xmlns:a="http://schemas.openxmlformats.org/drawingml/2006/main" xmlns:r="http://schemas.openxmlformats.org/officeDocument/2006/relationships" xmlns:p="http://schemas.openxmlformats.org/presentationml/2006/main">
   <p:cSld>
     <p:spTree>
@@ -3893,6 +5274,805 @@
             <p:ph type="title"/>
           </p:nvPr>
         </p:nvSpPr>
+        <p:spPr>
+          <a:xfrm>
+            <a:off x="838200" y="365125"/>
+            <a:ext cx="10515600" cy="980959"/>
+          </a:xfrm>
+        </p:spPr>
+        <p:txBody>
+          <a:bodyPr/>
+          <a:lstStyle/>
+          <a:p>
+            <a:r>
+              <a:rPr lang="en-US" b="1" dirty="0">
+                <a:solidFill>
+                  <a:srgbClr val="36ABF3"/>
+                </a:solidFill>
+              </a:rPr>
+              <a:t>Benchmarking</a:t>
+            </a:r>
+          </a:p>
+        </p:txBody>
+      </p:sp>
+      <p:graphicFrame>
+        <p:nvGraphicFramePr>
+          <p:cNvPr id="5" name="Content Placeholder 4">
+            <a:extLst>
+              <a:ext uri="{FF2B5EF4-FFF2-40B4-BE49-F238E27FC236}">
+                <a16:creationId xmlns:a16="http://schemas.microsoft.com/office/drawing/2014/main" id="{82F2BE2C-2958-41A8-41FB-506B7431BA4D}"/>
+              </a:ext>
+            </a:extLst>
+          </p:cNvPr>
+          <p:cNvGraphicFramePr>
+            <a:graphicFrameLocks noGrp="1"/>
+          </p:cNvGraphicFramePr>
+          <p:nvPr>
+            <p:ph idx="1"/>
+            <p:extLst>
+              <p:ext uri="{D42A27DB-BD31-4B8C-83A1-F6EECF244321}">
+                <p14:modId xmlns:p14="http://schemas.microsoft.com/office/powerpoint/2010/main" val="710420908"/>
+              </p:ext>
+            </p:extLst>
+          </p:nvPr>
+        </p:nvGraphicFramePr>
+        <p:xfrm>
+          <a:off x="838200" y="1825625"/>
+          <a:ext cx="10672482" cy="3474720"/>
+        </p:xfrm>
+        <a:graphic>
+          <a:graphicData uri="http://schemas.openxmlformats.org/drawingml/2006/table">
+            <a:tbl>
+              <a:tblPr firstRow="1" bandRow="1">
+                <a:tableStyleId>{21E4AEA4-8DFA-4A89-87EB-49C32662AFE0}</a:tableStyleId>
+              </a:tblPr>
+              <a:tblGrid>
+                <a:gridCol w="1778747">
+                  <a:extLst>
+                    <a:ext uri="{9D8B030D-6E8A-4147-A177-3AD203B41FA5}">
+                      <a16:colId xmlns:a16="http://schemas.microsoft.com/office/drawing/2014/main" val="1846051769"/>
+                    </a:ext>
+                  </a:extLst>
+                </a:gridCol>
+                <a:gridCol w="1778747">
+                  <a:extLst>
+                    <a:ext uri="{9D8B030D-6E8A-4147-A177-3AD203B41FA5}">
+                      <a16:colId xmlns:a16="http://schemas.microsoft.com/office/drawing/2014/main" val="2195972948"/>
+                    </a:ext>
+                  </a:extLst>
+                </a:gridCol>
+                <a:gridCol w="1778747">
+                  <a:extLst>
+                    <a:ext uri="{9D8B030D-6E8A-4147-A177-3AD203B41FA5}">
+                      <a16:colId xmlns:a16="http://schemas.microsoft.com/office/drawing/2014/main" val="2505003229"/>
+                    </a:ext>
+                  </a:extLst>
+                </a:gridCol>
+                <a:gridCol w="1778747">
+                  <a:extLst>
+                    <a:ext uri="{9D8B030D-6E8A-4147-A177-3AD203B41FA5}">
+                      <a16:colId xmlns:a16="http://schemas.microsoft.com/office/drawing/2014/main" val="443625132"/>
+                    </a:ext>
+                  </a:extLst>
+                </a:gridCol>
+                <a:gridCol w="1778747">
+                  <a:extLst>
+                    <a:ext uri="{9D8B030D-6E8A-4147-A177-3AD203B41FA5}">
+                      <a16:colId xmlns:a16="http://schemas.microsoft.com/office/drawing/2014/main" val="1501022799"/>
+                    </a:ext>
+                  </a:extLst>
+                </a:gridCol>
+                <a:gridCol w="1778747">
+                  <a:extLst>
+                    <a:ext uri="{9D8B030D-6E8A-4147-A177-3AD203B41FA5}">
+                      <a16:colId xmlns:a16="http://schemas.microsoft.com/office/drawing/2014/main" val="582787935"/>
+                    </a:ext>
+                  </a:extLst>
+                </a:gridCol>
+              </a:tblGrid>
+              <a:tr h="370840">
+                <a:tc>
+                  <a:txBody>
+                    <a:bodyPr/>
+                    <a:lstStyle/>
+                    <a:p>
+                      <a:pPr algn="ctr"/>
+                      <a:r>
+                        <a:rPr lang="en-US" sz="2000" dirty="0"/>
+                        <a:t>Features</a:t>
+                      </a:r>
+                    </a:p>
+                  </a:txBody>
+                  <a:tcPr anchor="ctr"/>
+                </a:tc>
+                <a:tc>
+                  <a:txBody>
+                    <a:bodyPr/>
+                    <a:lstStyle/>
+                    <a:p>
+                      <a:pPr algn="ctr"/>
+                      <a:r>
+                        <a:rPr lang="en-US" sz="2000" dirty="0"/>
+                        <a:t>Constituency Connect</a:t>
+                      </a:r>
+                    </a:p>
+                  </a:txBody>
+                  <a:tcPr anchor="ctr"/>
+                </a:tc>
+                <a:tc>
+                  <a:txBody>
+                    <a:bodyPr/>
+                    <a:lstStyle/>
+                    <a:p>
+                      <a:pPr algn="ctr"/>
+                      <a:r>
+                        <a:rPr lang="en-US" sz="2000" dirty="0"/>
+                        <a:t>PM Citizen Portal</a:t>
+                      </a:r>
+                    </a:p>
+                  </a:txBody>
+                  <a:tcPr anchor="ctr"/>
+                </a:tc>
+                <a:tc>
+                  <a:txBody>
+                    <a:bodyPr/>
+                    <a:lstStyle/>
+                    <a:p>
+                      <a:pPr algn="ctr"/>
+                      <a:r>
+                        <a:rPr lang="en-US" sz="1800" b="1" kern="1200">
+                          <a:solidFill>
+                            <a:schemeClr val="lt1"/>
+                          </a:solidFill>
+                          <a:effectLst/>
+                          <a:latin typeface="+mn-lt"/>
+                          <a:ea typeface="+mn-ea"/>
+                          <a:cs typeface="+mn-cs"/>
+                        </a:rPr>
+                        <a:t>FixMyStreet</a:t>
+                      </a:r>
+                      <a:endParaRPr lang="en-US" sz="2000" dirty="0"/>
+                    </a:p>
+                  </a:txBody>
+                  <a:tcPr anchor="ctr"/>
+                </a:tc>
+                <a:tc>
+                  <a:txBody>
+                    <a:bodyPr/>
+                    <a:lstStyle/>
+                    <a:p>
+                      <a:pPr algn="ctr"/>
+                      <a:r>
+                        <a:rPr lang="en-US" sz="1800" b="1" kern="1200" dirty="0">
+                          <a:solidFill>
+                            <a:schemeClr val="lt1"/>
+                          </a:solidFill>
+                          <a:effectLst/>
+                          <a:latin typeface="+mn-lt"/>
+                          <a:ea typeface="+mn-ea"/>
+                          <a:cs typeface="+mn-cs"/>
+                        </a:rPr>
+                        <a:t>SeeClickFix</a:t>
+                      </a:r>
+                      <a:endParaRPr lang="en-US" sz="2000" dirty="0"/>
+                    </a:p>
+                  </a:txBody>
+                  <a:tcPr anchor="ctr"/>
+                </a:tc>
+                <a:tc>
+                  <a:txBody>
+                    <a:bodyPr/>
+                    <a:lstStyle/>
+                    <a:p>
+                      <a:pPr algn="ctr"/>
+                      <a:r>
+                        <a:rPr lang="en-US" sz="2000" dirty="0"/>
+                        <a:t>Neighbourland</a:t>
+                      </a:r>
+                    </a:p>
+                  </a:txBody>
+                  <a:tcPr anchor="ctr"/>
+                </a:tc>
+                <a:extLst>
+                  <a:ext uri="{0D108BD9-81ED-4DB2-BD59-A6C34878D82A}">
+                    <a16:rowId xmlns:a16="http://schemas.microsoft.com/office/drawing/2014/main" val="1793337449"/>
+                  </a:ext>
+                </a:extLst>
+              </a:tr>
+              <a:tr h="370840">
+                <a:tc>
+                  <a:txBody>
+                    <a:bodyPr/>
+                    <a:lstStyle/>
+                    <a:p>
+                      <a:pPr algn="ctr"/>
+                      <a:endParaRPr lang="en-US" sz="2000" dirty="0"/>
+                    </a:p>
+                  </a:txBody>
+                  <a:tcPr anchor="ctr"/>
+                </a:tc>
+                <a:tc>
+                  <a:txBody>
+                    <a:bodyPr/>
+                    <a:lstStyle/>
+                    <a:p>
+                      <a:pPr algn="ctr"/>
+                      <a:endParaRPr lang="en-US" sz="2000"/>
+                    </a:p>
+                  </a:txBody>
+                  <a:tcPr anchor="ctr"/>
+                </a:tc>
+                <a:tc>
+                  <a:txBody>
+                    <a:bodyPr/>
+                    <a:lstStyle/>
+                    <a:p>
+                      <a:pPr algn="ctr"/>
+                      <a:endParaRPr lang="en-US" sz="2000"/>
+                    </a:p>
+                  </a:txBody>
+                  <a:tcPr anchor="ctr"/>
+                </a:tc>
+                <a:tc>
+                  <a:txBody>
+                    <a:bodyPr/>
+                    <a:lstStyle/>
+                    <a:p>
+                      <a:pPr algn="ctr"/>
+                      <a:endParaRPr lang="en-US" sz="2000"/>
+                    </a:p>
+                  </a:txBody>
+                  <a:tcPr anchor="ctr"/>
+                </a:tc>
+                <a:tc>
+                  <a:txBody>
+                    <a:bodyPr/>
+                    <a:lstStyle/>
+                    <a:p>
+                      <a:pPr algn="ctr"/>
+                      <a:endParaRPr lang="en-US" sz="2000"/>
+                    </a:p>
+                  </a:txBody>
+                  <a:tcPr anchor="ctr"/>
+                </a:tc>
+                <a:tc>
+                  <a:txBody>
+                    <a:bodyPr/>
+                    <a:lstStyle/>
+                    <a:p>
+                      <a:pPr algn="ctr"/>
+                      <a:endParaRPr lang="en-US" sz="2000"/>
+                    </a:p>
+                  </a:txBody>
+                  <a:tcPr anchor="ctr"/>
+                </a:tc>
+                <a:extLst>
+                  <a:ext uri="{0D108BD9-81ED-4DB2-BD59-A6C34878D82A}">
+                    <a16:rowId xmlns:a16="http://schemas.microsoft.com/office/drawing/2014/main" val="247484941"/>
+                  </a:ext>
+                </a:extLst>
+              </a:tr>
+              <a:tr h="370840">
+                <a:tc>
+                  <a:txBody>
+                    <a:bodyPr/>
+                    <a:lstStyle/>
+                    <a:p>
+                      <a:pPr algn="ctr"/>
+                      <a:endParaRPr lang="en-US" sz="2000"/>
+                    </a:p>
+                  </a:txBody>
+                  <a:tcPr anchor="ctr"/>
+                </a:tc>
+                <a:tc>
+                  <a:txBody>
+                    <a:bodyPr/>
+                    <a:lstStyle/>
+                    <a:p>
+                      <a:pPr algn="ctr"/>
+                      <a:endParaRPr lang="en-US" sz="2000"/>
+                    </a:p>
+                  </a:txBody>
+                  <a:tcPr anchor="ctr"/>
+                </a:tc>
+                <a:tc>
+                  <a:txBody>
+                    <a:bodyPr/>
+                    <a:lstStyle/>
+                    <a:p>
+                      <a:pPr algn="ctr"/>
+                      <a:endParaRPr lang="en-US" sz="2000"/>
+                    </a:p>
+                  </a:txBody>
+                  <a:tcPr anchor="ctr"/>
+                </a:tc>
+                <a:tc>
+                  <a:txBody>
+                    <a:bodyPr/>
+                    <a:lstStyle/>
+                    <a:p>
+                      <a:pPr algn="ctr"/>
+                      <a:endParaRPr lang="en-US" sz="2000"/>
+                    </a:p>
+                  </a:txBody>
+                  <a:tcPr anchor="ctr"/>
+                </a:tc>
+                <a:tc>
+                  <a:txBody>
+                    <a:bodyPr/>
+                    <a:lstStyle/>
+                    <a:p>
+                      <a:pPr algn="ctr"/>
+                      <a:endParaRPr lang="en-US" sz="2000"/>
+                    </a:p>
+                  </a:txBody>
+                  <a:tcPr anchor="ctr"/>
+                </a:tc>
+                <a:tc>
+                  <a:txBody>
+                    <a:bodyPr/>
+                    <a:lstStyle/>
+                    <a:p>
+                      <a:pPr algn="ctr"/>
+                      <a:endParaRPr lang="en-US" sz="2000"/>
+                    </a:p>
+                  </a:txBody>
+                  <a:tcPr anchor="ctr"/>
+                </a:tc>
+                <a:extLst>
+                  <a:ext uri="{0D108BD9-81ED-4DB2-BD59-A6C34878D82A}">
+                    <a16:rowId xmlns:a16="http://schemas.microsoft.com/office/drawing/2014/main" val="3478162553"/>
+                  </a:ext>
+                </a:extLst>
+              </a:tr>
+              <a:tr h="370840">
+                <a:tc>
+                  <a:txBody>
+                    <a:bodyPr/>
+                    <a:lstStyle/>
+                    <a:p>
+                      <a:pPr algn="ctr"/>
+                      <a:endParaRPr lang="en-US" sz="2000"/>
+                    </a:p>
+                  </a:txBody>
+                  <a:tcPr anchor="ctr"/>
+                </a:tc>
+                <a:tc>
+                  <a:txBody>
+                    <a:bodyPr/>
+                    <a:lstStyle/>
+                    <a:p>
+                      <a:pPr algn="ctr"/>
+                      <a:endParaRPr lang="en-US" sz="2000"/>
+                    </a:p>
+                  </a:txBody>
+                  <a:tcPr anchor="ctr"/>
+                </a:tc>
+                <a:tc>
+                  <a:txBody>
+                    <a:bodyPr/>
+                    <a:lstStyle/>
+                    <a:p>
+                      <a:pPr algn="ctr"/>
+                      <a:endParaRPr lang="en-US" sz="2000"/>
+                    </a:p>
+                  </a:txBody>
+                  <a:tcPr anchor="ctr"/>
+                </a:tc>
+                <a:tc>
+                  <a:txBody>
+                    <a:bodyPr/>
+                    <a:lstStyle/>
+                    <a:p>
+                      <a:pPr algn="ctr"/>
+                      <a:endParaRPr lang="en-US" sz="2000"/>
+                    </a:p>
+                  </a:txBody>
+                  <a:tcPr anchor="ctr"/>
+                </a:tc>
+                <a:tc>
+                  <a:txBody>
+                    <a:bodyPr/>
+                    <a:lstStyle/>
+                    <a:p>
+                      <a:pPr algn="ctr"/>
+                      <a:endParaRPr lang="en-US" sz="2000"/>
+                    </a:p>
+                  </a:txBody>
+                  <a:tcPr anchor="ctr"/>
+                </a:tc>
+                <a:tc>
+                  <a:txBody>
+                    <a:bodyPr/>
+                    <a:lstStyle/>
+                    <a:p>
+                      <a:pPr algn="ctr"/>
+                      <a:endParaRPr lang="en-US" sz="2000"/>
+                    </a:p>
+                  </a:txBody>
+                  <a:tcPr anchor="ctr"/>
+                </a:tc>
+                <a:extLst>
+                  <a:ext uri="{0D108BD9-81ED-4DB2-BD59-A6C34878D82A}">
+                    <a16:rowId xmlns:a16="http://schemas.microsoft.com/office/drawing/2014/main" val="3443586111"/>
+                  </a:ext>
+                </a:extLst>
+              </a:tr>
+              <a:tr h="370840">
+                <a:tc>
+                  <a:txBody>
+                    <a:bodyPr/>
+                    <a:lstStyle/>
+                    <a:p>
+                      <a:pPr algn="ctr"/>
+                      <a:endParaRPr lang="en-US" sz="2000"/>
+                    </a:p>
+                  </a:txBody>
+                  <a:tcPr anchor="ctr"/>
+                </a:tc>
+                <a:tc>
+                  <a:txBody>
+                    <a:bodyPr/>
+                    <a:lstStyle/>
+                    <a:p>
+                      <a:pPr algn="ctr"/>
+                      <a:endParaRPr lang="en-US" sz="2000"/>
+                    </a:p>
+                  </a:txBody>
+                  <a:tcPr anchor="ctr"/>
+                </a:tc>
+                <a:tc>
+                  <a:txBody>
+                    <a:bodyPr/>
+                    <a:lstStyle/>
+                    <a:p>
+                      <a:pPr algn="ctr"/>
+                      <a:endParaRPr lang="en-US" sz="2000"/>
+                    </a:p>
+                  </a:txBody>
+                  <a:tcPr anchor="ctr"/>
+                </a:tc>
+                <a:tc>
+                  <a:txBody>
+                    <a:bodyPr/>
+                    <a:lstStyle/>
+                    <a:p>
+                      <a:pPr algn="ctr"/>
+                      <a:endParaRPr lang="en-US" sz="2000"/>
+                    </a:p>
+                  </a:txBody>
+                  <a:tcPr anchor="ctr"/>
+                </a:tc>
+                <a:tc>
+                  <a:txBody>
+                    <a:bodyPr/>
+                    <a:lstStyle/>
+                    <a:p>
+                      <a:pPr algn="ctr"/>
+                      <a:endParaRPr lang="en-US" sz="2000"/>
+                    </a:p>
+                  </a:txBody>
+                  <a:tcPr anchor="ctr"/>
+                </a:tc>
+                <a:tc>
+                  <a:txBody>
+                    <a:bodyPr/>
+                    <a:lstStyle/>
+                    <a:p>
+                      <a:pPr algn="ctr"/>
+                      <a:endParaRPr lang="en-US" sz="2000"/>
+                    </a:p>
+                  </a:txBody>
+                  <a:tcPr anchor="ctr"/>
+                </a:tc>
+                <a:extLst>
+                  <a:ext uri="{0D108BD9-81ED-4DB2-BD59-A6C34878D82A}">
+                    <a16:rowId xmlns:a16="http://schemas.microsoft.com/office/drawing/2014/main" val="711552493"/>
+                  </a:ext>
+                </a:extLst>
+              </a:tr>
+              <a:tr h="370840">
+                <a:tc>
+                  <a:txBody>
+                    <a:bodyPr/>
+                    <a:lstStyle/>
+                    <a:p>
+                      <a:pPr algn="ctr"/>
+                      <a:endParaRPr lang="en-US" sz="2000"/>
+                    </a:p>
+                  </a:txBody>
+                  <a:tcPr anchor="ctr"/>
+                </a:tc>
+                <a:tc>
+                  <a:txBody>
+                    <a:bodyPr/>
+                    <a:lstStyle/>
+                    <a:p>
+                      <a:pPr algn="ctr"/>
+                      <a:endParaRPr lang="en-US" sz="2000"/>
+                    </a:p>
+                  </a:txBody>
+                  <a:tcPr anchor="ctr"/>
+                </a:tc>
+                <a:tc>
+                  <a:txBody>
+                    <a:bodyPr/>
+                    <a:lstStyle/>
+                    <a:p>
+                      <a:pPr algn="ctr"/>
+                      <a:endParaRPr lang="en-US" sz="2000"/>
+                    </a:p>
+                  </a:txBody>
+                  <a:tcPr anchor="ctr"/>
+                </a:tc>
+                <a:tc>
+                  <a:txBody>
+                    <a:bodyPr/>
+                    <a:lstStyle/>
+                    <a:p>
+                      <a:pPr algn="ctr"/>
+                      <a:endParaRPr lang="en-US" sz="2000"/>
+                    </a:p>
+                  </a:txBody>
+                  <a:tcPr anchor="ctr"/>
+                </a:tc>
+                <a:tc>
+                  <a:txBody>
+                    <a:bodyPr/>
+                    <a:lstStyle/>
+                    <a:p>
+                      <a:pPr algn="ctr"/>
+                      <a:endParaRPr lang="en-US" sz="2000"/>
+                    </a:p>
+                  </a:txBody>
+                  <a:tcPr anchor="ctr"/>
+                </a:tc>
+                <a:tc>
+                  <a:txBody>
+                    <a:bodyPr/>
+                    <a:lstStyle/>
+                    <a:p>
+                      <a:pPr algn="ctr"/>
+                      <a:endParaRPr lang="en-US" sz="2000"/>
+                    </a:p>
+                  </a:txBody>
+                  <a:tcPr anchor="ctr"/>
+                </a:tc>
+                <a:extLst>
+                  <a:ext uri="{0D108BD9-81ED-4DB2-BD59-A6C34878D82A}">
+                    <a16:rowId xmlns:a16="http://schemas.microsoft.com/office/drawing/2014/main" val="4142631091"/>
+                  </a:ext>
+                </a:extLst>
+              </a:tr>
+              <a:tr h="370840">
+                <a:tc>
+                  <a:txBody>
+                    <a:bodyPr/>
+                    <a:lstStyle/>
+                    <a:p>
+                      <a:pPr algn="ctr"/>
+                      <a:endParaRPr lang="en-US" sz="2000"/>
+                    </a:p>
+                  </a:txBody>
+                  <a:tcPr anchor="ctr"/>
+                </a:tc>
+                <a:tc>
+                  <a:txBody>
+                    <a:bodyPr/>
+                    <a:lstStyle/>
+                    <a:p>
+                      <a:pPr algn="ctr"/>
+                      <a:endParaRPr lang="en-US" sz="2000" dirty="0"/>
+                    </a:p>
+                  </a:txBody>
+                  <a:tcPr anchor="ctr"/>
+                </a:tc>
+                <a:tc>
+                  <a:txBody>
+                    <a:bodyPr/>
+                    <a:lstStyle/>
+                    <a:p>
+                      <a:pPr algn="ctr"/>
+                      <a:endParaRPr lang="en-US" sz="2000"/>
+                    </a:p>
+                  </a:txBody>
+                  <a:tcPr anchor="ctr"/>
+                </a:tc>
+                <a:tc>
+                  <a:txBody>
+                    <a:bodyPr/>
+                    <a:lstStyle/>
+                    <a:p>
+                      <a:pPr algn="ctr"/>
+                      <a:endParaRPr lang="en-US" sz="2000"/>
+                    </a:p>
+                  </a:txBody>
+                  <a:tcPr anchor="ctr"/>
+                </a:tc>
+                <a:tc>
+                  <a:txBody>
+                    <a:bodyPr/>
+                    <a:lstStyle/>
+                    <a:p>
+                      <a:pPr algn="ctr"/>
+                      <a:endParaRPr lang="en-US" sz="2000"/>
+                    </a:p>
+                  </a:txBody>
+                  <a:tcPr anchor="ctr"/>
+                </a:tc>
+                <a:tc>
+                  <a:txBody>
+                    <a:bodyPr/>
+                    <a:lstStyle/>
+                    <a:p>
+                      <a:pPr algn="ctr"/>
+                      <a:endParaRPr lang="en-US" sz="2000"/>
+                    </a:p>
+                  </a:txBody>
+                  <a:tcPr anchor="ctr"/>
+                </a:tc>
+                <a:extLst>
+                  <a:ext uri="{0D108BD9-81ED-4DB2-BD59-A6C34878D82A}">
+                    <a16:rowId xmlns:a16="http://schemas.microsoft.com/office/drawing/2014/main" val="1316529050"/>
+                  </a:ext>
+                </a:extLst>
+              </a:tr>
+              <a:tr h="370840">
+                <a:tc>
+                  <a:txBody>
+                    <a:bodyPr/>
+                    <a:lstStyle/>
+                    <a:p>
+                      <a:pPr algn="ctr"/>
+                      <a:endParaRPr lang="en-US" sz="2000" dirty="0"/>
+                    </a:p>
+                  </a:txBody>
+                  <a:tcPr anchor="ctr"/>
+                </a:tc>
+                <a:tc>
+                  <a:txBody>
+                    <a:bodyPr/>
+                    <a:lstStyle/>
+                    <a:p>
+                      <a:pPr algn="ctr"/>
+                      <a:endParaRPr lang="en-US" sz="2000"/>
+                    </a:p>
+                  </a:txBody>
+                  <a:tcPr anchor="ctr"/>
+                </a:tc>
+                <a:tc>
+                  <a:txBody>
+                    <a:bodyPr/>
+                    <a:lstStyle/>
+                    <a:p>
+                      <a:pPr algn="ctr"/>
+                      <a:endParaRPr lang="en-US" sz="2000"/>
+                    </a:p>
+                  </a:txBody>
+                  <a:tcPr anchor="ctr"/>
+                </a:tc>
+                <a:tc>
+                  <a:txBody>
+                    <a:bodyPr/>
+                    <a:lstStyle/>
+                    <a:p>
+                      <a:pPr algn="ctr"/>
+                      <a:endParaRPr lang="en-US" sz="2000"/>
+                    </a:p>
+                  </a:txBody>
+                  <a:tcPr anchor="ctr"/>
+                </a:tc>
+                <a:tc>
+                  <a:txBody>
+                    <a:bodyPr/>
+                    <a:lstStyle/>
+                    <a:p>
+                      <a:pPr algn="ctr"/>
+                      <a:endParaRPr lang="en-US" sz="2000"/>
+                    </a:p>
+                  </a:txBody>
+                  <a:tcPr anchor="ctr"/>
+                </a:tc>
+                <a:tc>
+                  <a:txBody>
+                    <a:bodyPr/>
+                    <a:lstStyle/>
+                    <a:p>
+                      <a:pPr algn="ctr"/>
+                      <a:endParaRPr lang="en-US" sz="2000" dirty="0"/>
+                    </a:p>
+                  </a:txBody>
+                  <a:tcPr anchor="ctr"/>
+                </a:tc>
+                <a:extLst>
+                  <a:ext uri="{0D108BD9-81ED-4DB2-BD59-A6C34878D82A}">
+                    <a16:rowId xmlns:a16="http://schemas.microsoft.com/office/drawing/2014/main" val="174174269"/>
+                  </a:ext>
+                </a:extLst>
+              </a:tr>
+            </a:tbl>
+          </a:graphicData>
+        </a:graphic>
+      </p:graphicFrame>
+      <p:cxnSp>
+        <p:nvCxnSpPr>
+          <p:cNvPr id="10" name="Straight Connector 9">
+            <a:extLst>
+              <a:ext uri="{FF2B5EF4-FFF2-40B4-BE49-F238E27FC236}">
+                <a16:creationId xmlns:a16="http://schemas.microsoft.com/office/drawing/2014/main" id="{5C4D56EA-8905-CAFF-FA8B-91B461D57C36}"/>
+              </a:ext>
+            </a:extLst>
+          </p:cNvPr>
+          <p:cNvCxnSpPr>
+            <a:cxnSpLocks/>
+          </p:cNvCxnSpPr>
+          <p:nvPr/>
+        </p:nvCxnSpPr>
+        <p:spPr>
+          <a:xfrm>
+            <a:off x="929640" y="1237129"/>
+            <a:ext cx="10332720" cy="0"/>
+          </a:xfrm>
+          <a:prstGeom prst="line">
+            <a:avLst/>
+          </a:prstGeom>
+          <a:ln w="28575"/>
+        </p:spPr>
+        <p:style>
+          <a:lnRef idx="3">
+            <a:schemeClr val="dk1"/>
+          </a:lnRef>
+          <a:fillRef idx="0">
+            <a:schemeClr val="dk1"/>
+          </a:fillRef>
+          <a:effectRef idx="2">
+            <a:schemeClr val="dk1"/>
+          </a:effectRef>
+          <a:fontRef idx="minor">
+            <a:schemeClr val="tx1"/>
+          </a:fontRef>
+        </p:style>
+      </p:cxnSp>
+    </p:spTree>
+    <p:extLst>
+      <p:ext uri="{BB962C8B-B14F-4D97-AF65-F5344CB8AC3E}">
+        <p14:creationId xmlns:p14="http://schemas.microsoft.com/office/powerpoint/2010/main" val="2789557926"/>
+      </p:ext>
+    </p:extLst>
+  </p:cSld>
+  <p:clrMapOvr>
+    <a:masterClrMapping/>
+  </p:clrMapOvr>
+</p:sld>
+</file>
+
+<file path=ppt/slides/slide18.xml><?xml version="1.0" encoding="utf-8"?>
+<p:sld xmlns:a="http://schemas.openxmlformats.org/drawingml/2006/main" xmlns:r="http://schemas.openxmlformats.org/officeDocument/2006/relationships" xmlns:p="http://schemas.openxmlformats.org/presentationml/2006/main">
+  <p:cSld>
+    <p:spTree>
+      <p:nvGrpSpPr>
+        <p:cNvPr id="1" name=""/>
+        <p:cNvGrpSpPr/>
+        <p:nvPr/>
+      </p:nvGrpSpPr>
+      <p:grpSpPr>
+        <a:xfrm>
+          <a:off x="0" y="0"/>
+          <a:ext cx="0" cy="0"/>
+          <a:chOff x="0" y="0"/>
+          <a:chExt cx="0" cy="0"/>
+        </a:xfrm>
+      </p:grpSpPr>
+      <p:sp>
+        <p:nvSpPr>
+          <p:cNvPr id="2" name="Title 1"/>
+          <p:cNvSpPr>
+            <a:spLocks noGrp="1"/>
+          </p:cNvSpPr>
+          <p:nvPr>
+            <p:ph type="title"/>
+          </p:nvPr>
+        </p:nvSpPr>
         <p:spPr/>
         <p:txBody>
           <a:bodyPr/>
@@ -3947,7 +6127,7 @@
 </p:sld>
 </file>
 
-<file path=ppt/slides/slide14.xml><?xml version="1.0" encoding="utf-8"?>
+<file path=ppt/slides/slide19.xml><?xml version="1.0" encoding="utf-8"?>
 <p:sld xmlns:a="http://schemas.openxmlformats.org/drawingml/2006/main" xmlns:r="http://schemas.openxmlformats.org/officeDocument/2006/relationships" xmlns:p="http://schemas.openxmlformats.org/presentationml/2006/main">
   <p:cSld>
     <p:spTree>
@@ -4058,7 +6238,7 @@
 </p:sld>
 </file>
 
-<file path=ppt/slides/slide15.xml><?xml version="1.0" encoding="utf-8"?>
+<file path=ppt/slides/slide2.xml><?xml version="1.0" encoding="utf-8"?>
 <p:sld xmlns:a="http://schemas.openxmlformats.org/drawingml/2006/main" xmlns:r="http://schemas.openxmlformats.org/officeDocument/2006/relationships" xmlns:p="http://schemas.openxmlformats.org/presentationml/2006/main">
   <p:cSld>
     <p:spTree>
@@ -4093,12 +6273,10 @@
             <a:r>
               <a:rPr lang="en-US" b="1" dirty="0">
                 <a:solidFill>
-                  <a:schemeClr val="accent1">
-                    <a:lumMod val="75000"/>
-                  </a:schemeClr>
+                  <a:srgbClr val="36ABF3"/>
                 </a:solidFill>
               </a:rPr>
-              <a:t>Scope of your Project</a:t>
+              <a:t>Table of Contents</a:t>
             </a:r>
           </a:p>
         </p:txBody>
@@ -4115,13 +6293,56 @@
         </p:nvSpPr>
         <p:spPr/>
         <p:txBody>
-          <a:bodyPr/>
-          <a:lstStyle/>
-          <a:p>
-            <a:pPr algn="just"/>
+          <a:bodyPr>
+            <a:normAutofit/>
+          </a:bodyPr>
+          <a:lstStyle/>
+          <a:p>
             <a:r>
               <a:rPr lang="en-US" dirty="0"/>
-              <a:t>Properly write the scope of your project. Avoid general solutions. </a:t>
+              <a:t>Introduction</a:t>
+            </a:r>
+          </a:p>
+          <a:p>
+            <a:r>
+              <a:rPr lang="en-US" dirty="0"/>
+              <a:t>Literature Review</a:t>
+            </a:r>
+          </a:p>
+          <a:p>
+            <a:r>
+              <a:rPr lang="en-US" dirty="0"/>
+              <a:t>Benchmarking</a:t>
+            </a:r>
+          </a:p>
+          <a:p>
+            <a:r>
+              <a:rPr lang="en-US" dirty="0"/>
+              <a:t>Problem Statement</a:t>
+            </a:r>
+          </a:p>
+          <a:p>
+            <a:r>
+              <a:rPr lang="en-US" dirty="0"/>
+              <a:t>Proposed Model/Solution</a:t>
+            </a:r>
+          </a:p>
+          <a:p>
+            <a:r>
+              <a:rPr lang="en-US" dirty="0"/>
+              <a:t>Scope</a:t>
+            </a:r>
+          </a:p>
+          <a:p>
+            <a:r>
+              <a:rPr lang="en-US" dirty="0"/>
+              <a:t>Tools and Technologies (Market Based)</a:t>
+            </a:r>
+          </a:p>
+          <a:p>
+            <a:r>
+              <a:rPr lang="en-US" dirty="0"/>
+              <a:t>Final Outcome</a:t>
             </a:r>
           </a:p>
         </p:txBody>
@@ -4129,7 +6350,7 @@
     </p:spTree>
     <p:extLst>
       <p:ext uri="{BB962C8B-B14F-4D97-AF65-F5344CB8AC3E}">
-        <p14:creationId xmlns:p14="http://schemas.microsoft.com/office/powerpoint/2010/main" val="1236339636"/>
+        <p14:creationId xmlns:p14="http://schemas.microsoft.com/office/powerpoint/2010/main" val="2345955974"/>
       </p:ext>
     </p:extLst>
   </p:cSld>
@@ -4139,7 +6360,7 @@
 </p:sld>
 </file>
 
-<file path=ppt/slides/slide16.xml><?xml version="1.0" encoding="utf-8"?>
+<file path=ppt/slides/slide20.xml><?xml version="1.0" encoding="utf-8"?>
 <p:sld xmlns:a="http://schemas.openxmlformats.org/drawingml/2006/main" xmlns:r="http://schemas.openxmlformats.org/officeDocument/2006/relationships" xmlns:p="http://schemas.openxmlformats.org/presentationml/2006/main">
   <p:cSld>
     <p:spTree>
@@ -4179,7 +6400,7 @@
                   </a:schemeClr>
                 </a:solidFill>
               </a:rPr>
-              <a:t>Tools and Technologies (Market Base)</a:t>
+              <a:t>Scope of your Project</a:t>
             </a:r>
           </a:p>
         </p:txBody>
@@ -4202,7 +6423,7 @@
             <a:pPr algn="just"/>
             <a:r>
               <a:rPr lang="en-US" dirty="0"/>
-              <a:t>List down tools and technologies, you want to use for development purposes. Avoid old ones, explore market oriented tools and technologies. </a:t>
+              <a:t>Properly write the scope of your project. Avoid general solutions. </a:t>
             </a:r>
           </a:p>
         </p:txBody>
@@ -4210,7 +6431,7 @@
     </p:spTree>
     <p:extLst>
       <p:ext uri="{BB962C8B-B14F-4D97-AF65-F5344CB8AC3E}">
-        <p14:creationId xmlns:p14="http://schemas.microsoft.com/office/powerpoint/2010/main" val="1034597514"/>
+        <p14:creationId xmlns:p14="http://schemas.microsoft.com/office/powerpoint/2010/main" val="1236339636"/>
       </p:ext>
     </p:extLst>
   </p:cSld>
@@ -4220,7 +6441,7 @@
 </p:sld>
 </file>
 
-<file path=ppt/slides/slide17.xml><?xml version="1.0" encoding="utf-8"?>
+<file path=ppt/slides/slide21.xml><?xml version="1.0" encoding="utf-8"?>
 <p:sld xmlns:a="http://schemas.openxmlformats.org/drawingml/2006/main" xmlns:r="http://schemas.openxmlformats.org/officeDocument/2006/relationships" xmlns:p="http://schemas.openxmlformats.org/presentationml/2006/main">
   <p:cSld>
     <p:spTree>
@@ -4260,7 +6481,7 @@
                   </a:schemeClr>
                 </a:solidFill>
               </a:rPr>
-              <a:t>Final Outcome</a:t>
+              <a:t>Tools and Technologies (Market Base)</a:t>
             </a:r>
           </a:p>
         </p:txBody>
@@ -4283,14 +6504,7 @@
             <a:pPr algn="just"/>
             <a:r>
               <a:rPr lang="en-US" dirty="0"/>
-              <a:t>Describe shortly the nature of your project outcome. </a:t>
-            </a:r>
-          </a:p>
-          <a:p>
-            <a:pPr algn="just"/>
-            <a:r>
-              <a:rPr lang="en-US" dirty="0"/>
-              <a:t>Whether it’s a Advance Technology/ Product / Framework/ Solution to the existing Problem or a novel research, etc. </a:t>
+              <a:t>List down tools and technologies, you want to use for development purposes. Avoid old ones, explore market oriented tools and technologies. </a:t>
             </a:r>
           </a:p>
         </p:txBody>
@@ -4298,7 +6512,7 @@
     </p:spTree>
     <p:extLst>
       <p:ext uri="{BB962C8B-B14F-4D97-AF65-F5344CB8AC3E}">
-        <p14:creationId xmlns:p14="http://schemas.microsoft.com/office/powerpoint/2010/main" val="1857402067"/>
+        <p14:creationId xmlns:p14="http://schemas.microsoft.com/office/powerpoint/2010/main" val="1034597514"/>
       </p:ext>
     </p:extLst>
   </p:cSld>
@@ -4308,7 +6522,7 @@
 </p:sld>
 </file>
 
-<file path=ppt/slides/slide18.xml><?xml version="1.0" encoding="utf-8"?>
+<file path=ppt/slides/slide22.xml><?xml version="1.0" encoding="utf-8"?>
 <p:sld xmlns:a="http://schemas.openxmlformats.org/drawingml/2006/main" xmlns:r="http://schemas.openxmlformats.org/officeDocument/2006/relationships" xmlns:p="http://schemas.openxmlformats.org/presentationml/2006/main">
   <p:cSld>
     <p:spTree>
@@ -4348,6 +6562,94 @@
                   </a:schemeClr>
                 </a:solidFill>
               </a:rPr>
+              <a:t>Final Outcome</a:t>
+            </a:r>
+          </a:p>
+        </p:txBody>
+      </p:sp>
+      <p:sp>
+        <p:nvSpPr>
+          <p:cNvPr id="3" name="Content Placeholder 2"/>
+          <p:cNvSpPr>
+            <a:spLocks noGrp="1"/>
+          </p:cNvSpPr>
+          <p:nvPr>
+            <p:ph idx="1"/>
+          </p:nvPr>
+        </p:nvSpPr>
+        <p:spPr/>
+        <p:txBody>
+          <a:bodyPr/>
+          <a:lstStyle/>
+          <a:p>
+            <a:pPr algn="just"/>
+            <a:r>
+              <a:rPr lang="en-US" dirty="0"/>
+              <a:t>Describe shortly the nature of your project outcome. </a:t>
+            </a:r>
+          </a:p>
+          <a:p>
+            <a:pPr algn="just"/>
+            <a:r>
+              <a:rPr lang="en-US" dirty="0"/>
+              <a:t>Whether it’s a Advance Technology/ Product / Framework/ Solution to the existing Problem or a novel research, etc. </a:t>
+            </a:r>
+          </a:p>
+        </p:txBody>
+      </p:sp>
+    </p:spTree>
+    <p:extLst>
+      <p:ext uri="{BB962C8B-B14F-4D97-AF65-F5344CB8AC3E}">
+        <p14:creationId xmlns:p14="http://schemas.microsoft.com/office/powerpoint/2010/main" val="1857402067"/>
+      </p:ext>
+    </p:extLst>
+  </p:cSld>
+  <p:clrMapOvr>
+    <a:masterClrMapping/>
+  </p:clrMapOvr>
+</p:sld>
+</file>
+
+<file path=ppt/slides/slide23.xml><?xml version="1.0" encoding="utf-8"?>
+<p:sld xmlns:a="http://schemas.openxmlformats.org/drawingml/2006/main" xmlns:r="http://schemas.openxmlformats.org/officeDocument/2006/relationships" xmlns:p="http://schemas.openxmlformats.org/presentationml/2006/main">
+  <p:cSld>
+    <p:spTree>
+      <p:nvGrpSpPr>
+        <p:cNvPr id="1" name=""/>
+        <p:cNvGrpSpPr/>
+        <p:nvPr/>
+      </p:nvGrpSpPr>
+      <p:grpSpPr>
+        <a:xfrm>
+          <a:off x="0" y="0"/>
+          <a:ext cx="0" cy="0"/>
+          <a:chOff x="0" y="0"/>
+          <a:chExt cx="0" cy="0"/>
+        </a:xfrm>
+      </p:grpSpPr>
+      <p:sp>
+        <p:nvSpPr>
+          <p:cNvPr id="2" name="Title 1"/>
+          <p:cNvSpPr>
+            <a:spLocks noGrp="1"/>
+          </p:cNvSpPr>
+          <p:nvPr>
+            <p:ph type="title"/>
+          </p:nvPr>
+        </p:nvSpPr>
+        <p:spPr/>
+        <p:txBody>
+          <a:bodyPr/>
+          <a:lstStyle/>
+          <a:p>
+            <a:r>
+              <a:rPr lang="en-US" b="1" dirty="0">
+                <a:solidFill>
+                  <a:schemeClr val="accent1">
+                    <a:lumMod val="75000"/>
+                  </a:schemeClr>
+                </a:solidFill>
+              </a:rPr>
               <a:t>References</a:t>
             </a:r>
           </a:p>
@@ -4430,7 +6732,7 @@
 </p:sld>
 </file>
 
-<file path=ppt/slides/slide19.xml><?xml version="1.0" encoding="utf-8"?>
+<file path=ppt/slides/slide24.xml><?xml version="1.0" encoding="utf-8"?>
 <p:sld xmlns:a="http://schemas.openxmlformats.org/drawingml/2006/main" xmlns:r="http://schemas.openxmlformats.org/officeDocument/2006/relationships" xmlns:p="http://schemas.openxmlformats.org/presentationml/2006/main">
   <p:cSld>
     <p:spTree>
@@ -4475,128 +6777,6 @@
     <p:extLst>
       <p:ext uri="{BB962C8B-B14F-4D97-AF65-F5344CB8AC3E}">
         <p14:creationId xmlns:p14="http://schemas.microsoft.com/office/powerpoint/2010/main" val="642724012"/>
-      </p:ext>
-    </p:extLst>
-  </p:cSld>
-  <p:clrMapOvr>
-    <a:masterClrMapping/>
-  </p:clrMapOvr>
-</p:sld>
-</file>
-
-<file path=ppt/slides/slide2.xml><?xml version="1.0" encoding="utf-8"?>
-<p:sld xmlns:a="http://schemas.openxmlformats.org/drawingml/2006/main" xmlns:r="http://schemas.openxmlformats.org/officeDocument/2006/relationships" xmlns:p="http://schemas.openxmlformats.org/presentationml/2006/main">
-  <p:cSld>
-    <p:spTree>
-      <p:nvGrpSpPr>
-        <p:cNvPr id="1" name=""/>
-        <p:cNvGrpSpPr/>
-        <p:nvPr/>
-      </p:nvGrpSpPr>
-      <p:grpSpPr>
-        <a:xfrm>
-          <a:off x="0" y="0"/>
-          <a:ext cx="0" cy="0"/>
-          <a:chOff x="0" y="0"/>
-          <a:chExt cx="0" cy="0"/>
-        </a:xfrm>
-      </p:grpSpPr>
-      <p:sp>
-        <p:nvSpPr>
-          <p:cNvPr id="2" name="Title 1"/>
-          <p:cNvSpPr>
-            <a:spLocks noGrp="1"/>
-          </p:cNvSpPr>
-          <p:nvPr>
-            <p:ph type="title"/>
-          </p:nvPr>
-        </p:nvSpPr>
-        <p:spPr/>
-        <p:txBody>
-          <a:bodyPr/>
-          <a:lstStyle/>
-          <a:p>
-            <a:r>
-              <a:rPr lang="en-US" b="1" dirty="0">
-                <a:solidFill>
-                  <a:srgbClr val="36ABF3"/>
-                </a:solidFill>
-              </a:rPr>
-              <a:t>Table of Contents</a:t>
-            </a:r>
-          </a:p>
-        </p:txBody>
-      </p:sp>
-      <p:sp>
-        <p:nvSpPr>
-          <p:cNvPr id="3" name="Content Placeholder 2"/>
-          <p:cNvSpPr>
-            <a:spLocks noGrp="1"/>
-          </p:cNvSpPr>
-          <p:nvPr>
-            <p:ph idx="1"/>
-          </p:nvPr>
-        </p:nvSpPr>
-        <p:spPr/>
-        <p:txBody>
-          <a:bodyPr>
-            <a:normAutofit/>
-          </a:bodyPr>
-          <a:lstStyle/>
-          <a:p>
-            <a:r>
-              <a:rPr lang="en-US" dirty="0"/>
-              <a:t>Introduction</a:t>
-            </a:r>
-          </a:p>
-          <a:p>
-            <a:r>
-              <a:rPr lang="en-US" dirty="0"/>
-              <a:t>Literature Review</a:t>
-            </a:r>
-          </a:p>
-          <a:p>
-            <a:r>
-              <a:rPr lang="en-US" dirty="0"/>
-              <a:t>Benchmarking</a:t>
-            </a:r>
-          </a:p>
-          <a:p>
-            <a:r>
-              <a:rPr lang="en-US" dirty="0"/>
-              <a:t>Problem Statement</a:t>
-            </a:r>
-          </a:p>
-          <a:p>
-            <a:r>
-              <a:rPr lang="en-US" dirty="0"/>
-              <a:t>Proposed Model/Solution</a:t>
-            </a:r>
-          </a:p>
-          <a:p>
-            <a:r>
-              <a:rPr lang="en-US" dirty="0"/>
-              <a:t>Scope</a:t>
-            </a:r>
-          </a:p>
-          <a:p>
-            <a:r>
-              <a:rPr lang="en-US" dirty="0"/>
-              <a:t>Tools and Technologies (Market Based)</a:t>
-            </a:r>
-          </a:p>
-          <a:p>
-            <a:r>
-              <a:rPr lang="en-US" dirty="0"/>
-              <a:t>Final Outcome</a:t>
-            </a:r>
-          </a:p>
-        </p:txBody>
-      </p:sp>
-    </p:spTree>
-    <p:extLst>
-      <p:ext uri="{BB962C8B-B14F-4D97-AF65-F5344CB8AC3E}">
-        <p14:creationId xmlns:p14="http://schemas.microsoft.com/office/powerpoint/2010/main" val="2345955974"/>
       </p:ext>
     </p:extLst>
   </p:cSld>
@@ -5494,7 +7674,72 @@
           </a:bodyPr>
           <a:lstStyle/>
           <a:p>
-            <a:pPr algn="just"/>
+            <a:pPr marL="0" indent="0" algn="just">
+              <a:buNone/>
+            </a:pPr>
+            <a:r>
+              <a:rPr lang="en-US" b="1" dirty="0"/>
+              <a:t>FixMyStreet</a:t>
+            </a:r>
+            <a:r>
+              <a:rPr lang="en-US" dirty="0"/>
+              <a:t> is a web-based platform that allows citizens to report public service issues (potholes, streetlights, etc.) directly to local authorities, improving local governance and transparency.</a:t>
+            </a:r>
+          </a:p>
+          <a:p>
+            <a:pPr marL="0" indent="0" algn="just">
+              <a:buNone/>
+            </a:pPr>
+            <a:r>
+              <a:rPr lang="en-US" b="1" dirty="0"/>
+              <a:t>Features:</a:t>
+            </a:r>
+            <a:endParaRPr lang="en-US" dirty="0"/>
+          </a:p>
+          <a:p>
+            <a:pPr algn="just">
+              <a:buFont typeface="Arial" panose="020B0604020202020204" pitchFamily="34" charset="0"/>
+              <a:buChar char="•"/>
+            </a:pPr>
+            <a:r>
+              <a:rPr lang="en-US" dirty="0"/>
+              <a:t>Location-based reporting</a:t>
+            </a:r>
+          </a:p>
+          <a:p>
+            <a:pPr algn="just">
+              <a:buFont typeface="Arial" panose="020B0604020202020204" pitchFamily="34" charset="0"/>
+              <a:buChar char="•"/>
+            </a:pPr>
+            <a:r>
+              <a:rPr lang="en-US" dirty="0"/>
+              <a:t>Reports are visible to everyone, encouraging public accountability.</a:t>
+            </a:r>
+          </a:p>
+          <a:p>
+            <a:pPr algn="just">
+              <a:buFont typeface="Arial" panose="020B0604020202020204" pitchFamily="34" charset="0"/>
+              <a:buChar char="•"/>
+            </a:pPr>
+            <a:r>
+              <a:rPr lang="en-US" dirty="0"/>
+              <a:t>Easy-to-use interface for submitting complaints. </a:t>
+            </a:r>
+          </a:p>
+          <a:p>
+            <a:pPr algn="just">
+              <a:buFont typeface="Arial" panose="020B0604020202020204" pitchFamily="34" charset="0"/>
+              <a:buChar char="•"/>
+            </a:pPr>
+            <a:r>
+              <a:rPr lang="en-US" dirty="0"/>
+              <a:t>Many local authorities integrate FixMyStreet into their internal systems, allowing for automated workflows and streamlined complaint handling.</a:t>
+            </a:r>
+          </a:p>
+          <a:p>
+            <a:pPr marL="0" indent="0" algn="just">
+              <a:buNone/>
+            </a:pPr>
             <a:endParaRPr lang="en-US" dirty="0"/>
           </a:p>
         </p:txBody>
@@ -5591,7 +7836,7 @@
                   <a:srgbClr val="F8981C"/>
                 </a:solidFill>
               </a:rPr>
-              <a:t>K</a:t>
+              <a:t>FixMyStreet:</a:t>
             </a:r>
           </a:p>
         </p:txBody>
@@ -5669,8 +7914,8 @@
         </p:nvSpPr>
         <p:spPr>
           <a:xfrm>
-            <a:off x="838200" y="1990166"/>
-            <a:ext cx="10515600" cy="4867834"/>
+            <a:off x="838200" y="1346084"/>
+            <a:ext cx="10515600" cy="5511916"/>
           </a:xfrm>
         </p:spPr>
         <p:txBody>
@@ -5679,8 +7924,62 @@
           </a:bodyPr>
           <a:lstStyle/>
           <a:p>
-            <a:pPr algn="just"/>
+            <a:pPr marL="0" indent="0">
+              <a:buNone/>
+            </a:pPr>
+            <a:r>
+              <a:rPr lang="en-US" b="1" dirty="0"/>
+              <a:t>Shortcomings:</a:t>
+            </a:r>
             <a:endParaRPr lang="en-US" dirty="0"/>
+          </a:p>
+          <a:p>
+            <a:pPr>
+              <a:buFont typeface="Arial" panose="020B0604020202020204" pitchFamily="34" charset="0"/>
+              <a:buChar char="•"/>
+            </a:pPr>
+            <a:r>
+              <a:rPr lang="en-US" dirty="0"/>
+              <a:t>Focus mainly on infrastructure problems, missing broader community engagement features like surveys or virtual meetups.</a:t>
+            </a:r>
+          </a:p>
+          <a:p>
+            <a:pPr>
+              <a:buFont typeface="Arial" panose="020B0604020202020204" pitchFamily="34" charset="0"/>
+              <a:buChar char="•"/>
+            </a:pPr>
+            <a:r>
+              <a:rPr lang="en-US" dirty="0"/>
+              <a:t>Does not offer real-time updates and performance tracking for representatives.</a:t>
+            </a:r>
+          </a:p>
+          <a:p>
+            <a:pPr marL="0" indent="0">
+              <a:buNone/>
+            </a:pPr>
+            <a:r>
+              <a:rPr lang="en-US" b="1" dirty="0"/>
+              <a:t>Technologies:</a:t>
+            </a:r>
+          </a:p>
+          <a:p>
+            <a:r>
+              <a:rPr lang="en-US" dirty="0"/>
+              <a:t>jQuery</a:t>
+            </a:r>
+          </a:p>
+          <a:p>
+            <a:r>
+              <a:rPr lang="en-US" dirty="0" err="1"/>
+              <a:t>RequireJS</a:t>
+            </a:r>
+            <a:endParaRPr lang="en-US" dirty="0"/>
+          </a:p>
+          <a:p>
+            <a:r>
+              <a:rPr lang="en-US" dirty="0"/>
+              <a:t>Nginx</a:t>
+            </a:r>
           </a:p>
         </p:txBody>
       </p:sp>
@@ -5723,64 +8022,6 @@
           </a:fontRef>
         </p:style>
       </p:cxnSp>
-      <p:sp>
-        <p:nvSpPr>
-          <p:cNvPr id="4" name="Title 1">
-            <a:extLst>
-              <a:ext uri="{FF2B5EF4-FFF2-40B4-BE49-F238E27FC236}">
-                <a16:creationId xmlns:a16="http://schemas.microsoft.com/office/drawing/2014/main" id="{7ED9CE21-68A5-DE6F-C9B3-F22A1957B184}"/>
-              </a:ext>
-            </a:extLst>
-          </p:cNvPr>
-          <p:cNvSpPr txBox="1">
-            <a:spLocks/>
-          </p:cNvSpPr>
-          <p:nvPr/>
-        </p:nvSpPr>
-        <p:spPr>
-          <a:xfrm>
-            <a:off x="838200" y="1150051"/>
-            <a:ext cx="10515600" cy="959083"/>
-          </a:xfrm>
-          <a:prstGeom prst="rect">
-            <a:avLst/>
-          </a:prstGeom>
-        </p:spPr>
-        <p:txBody>
-          <a:bodyPr vert="horz" lIns="91440" tIns="45720" rIns="91440" bIns="45720" rtlCol="0" anchor="ctr">
-            <a:normAutofit/>
-          </a:bodyPr>
-          <a:lstStyle>
-            <a:lvl1pPr algn="l" defTabSz="914400" rtl="0" eaLnBrk="1" latinLnBrk="0" hangingPunct="1">
-              <a:lnSpc>
-                <a:spcPct val="90000"/>
-              </a:lnSpc>
-              <a:spcBef>
-                <a:spcPct val="0"/>
-              </a:spcBef>
-              <a:buNone/>
-              <a:defRPr sz="4400" kern="1200">
-                <a:solidFill>
-                  <a:schemeClr val="tx1"/>
-                </a:solidFill>
-                <a:latin typeface="+mj-lt"/>
-                <a:ea typeface="+mj-ea"/>
-                <a:cs typeface="+mj-cs"/>
-              </a:defRPr>
-            </a:lvl1pPr>
-          </a:lstStyle>
-          <a:p>
-            <a:r>
-              <a:rPr lang="en-US" sz="3600" b="1" dirty="0">
-                <a:solidFill>
-                  <a:srgbClr val="F8981C"/>
-                </a:solidFill>
-              </a:rPr>
-              <a:t>K</a:t>
-            </a:r>
-          </a:p>
-        </p:txBody>
-      </p:sp>
     </p:spTree>
     <p:extLst>
       <p:ext uri="{BB962C8B-B14F-4D97-AF65-F5344CB8AC3E}">
@@ -5864,8 +8105,57 @@
           </a:bodyPr>
           <a:lstStyle/>
           <a:p>
-            <a:pPr algn="just"/>
+            <a:pPr marL="0" indent="0" algn="just">
+              <a:buNone/>
+            </a:pPr>
+            <a:r>
+              <a:rPr lang="en-US" b="1" dirty="0"/>
+              <a:t>SeeClickFix</a:t>
+            </a:r>
+            <a:r>
+              <a:rPr lang="en-US" dirty="0"/>
+              <a:t> is a platform that allows citizens to report non-emergency issues in their neighborhoods and engage with local governments for resolution.</a:t>
+            </a:r>
+          </a:p>
+          <a:p>
+            <a:pPr marL="0" indent="0" algn="just">
+              <a:buNone/>
+            </a:pPr>
+            <a:r>
+              <a:rPr lang="en-US" b="1" dirty="0"/>
+              <a:t>Features:</a:t>
+            </a:r>
             <a:endParaRPr lang="en-US" dirty="0"/>
+          </a:p>
+          <a:p>
+            <a:pPr algn="just">
+              <a:buFont typeface="Arial" panose="020B0604020202020204" pitchFamily="34" charset="0"/>
+              <a:buChar char="•"/>
+            </a:pPr>
+            <a:r>
+              <a:rPr lang="en-US" dirty="0"/>
+              <a:t>Mobile and Web App for easy access and issue reporting.</a:t>
+            </a:r>
+          </a:p>
+          <a:p>
+            <a:pPr algn="just">
+              <a:buFont typeface="Arial" panose="020B0604020202020204" pitchFamily="34" charset="0"/>
+              <a:buChar char="•"/>
+            </a:pPr>
+            <a:r>
+              <a:rPr lang="en-US" dirty="0"/>
+              <a:t>Direct interaction between citizens and officials, allowing users to receive feedback on the progress of their complaints. </a:t>
+            </a:r>
+          </a:p>
+          <a:p>
+            <a:pPr algn="just">
+              <a:buFont typeface="Arial" panose="020B0604020202020204" pitchFamily="34" charset="0"/>
+              <a:buChar char="•"/>
+            </a:pPr>
+            <a:r>
+              <a:rPr lang="en-US" dirty="0"/>
+              <a:t>Map-based tracking of problems.</a:t>
+            </a:r>
           </a:p>
         </p:txBody>
       </p:sp>
@@ -5961,7 +8251,7 @@
                   <a:srgbClr val="F8981C"/>
                 </a:solidFill>
               </a:rPr>
-              <a:t>K</a:t>
+              <a:t>SeeClickFix</a:t>
             </a:r>
           </a:p>
         </p:txBody>
@@ -5969,7 +8259,7 @@
     </p:spTree>
     <p:extLst>
       <p:ext uri="{BB962C8B-B14F-4D97-AF65-F5344CB8AC3E}">
-        <p14:creationId xmlns:p14="http://schemas.microsoft.com/office/powerpoint/2010/main" val="1279104145"/>
+        <p14:creationId xmlns:p14="http://schemas.microsoft.com/office/powerpoint/2010/main" val="4035673482"/>
       </p:ext>
     </p:extLst>
   </p:cSld>
@@ -6238,4 +8528,319 @@
     </a:ext>
   </a:extLst>
 </a:theme>
+</file>
+
+<file path=ppt/theme/theme2.xml><?xml version="1.0" encoding="utf-8"?>
+<a:theme xmlns:a="http://schemas.openxmlformats.org/drawingml/2006/main" name="Office Theme">
+  <a:themeElements>
+    <a:clrScheme name="Office">
+      <a:dk1>
+        <a:sysClr val="windowText" lastClr="000000"/>
+      </a:dk1>
+      <a:lt1>
+        <a:sysClr val="window" lastClr="FFFFFF"/>
+      </a:lt1>
+      <a:dk2>
+        <a:srgbClr val="0E2841"/>
+      </a:dk2>
+      <a:lt2>
+        <a:srgbClr val="E8E8E8"/>
+      </a:lt2>
+      <a:accent1>
+        <a:srgbClr val="156082"/>
+      </a:accent1>
+      <a:accent2>
+        <a:srgbClr val="E97132"/>
+      </a:accent2>
+      <a:accent3>
+        <a:srgbClr val="196B24"/>
+      </a:accent3>
+      <a:accent4>
+        <a:srgbClr val="0F9ED5"/>
+      </a:accent4>
+      <a:accent5>
+        <a:srgbClr val="A02B93"/>
+      </a:accent5>
+      <a:accent6>
+        <a:srgbClr val="4EA72E"/>
+      </a:accent6>
+      <a:hlink>
+        <a:srgbClr val="467886"/>
+      </a:hlink>
+      <a:folHlink>
+        <a:srgbClr val="96607D"/>
+      </a:folHlink>
+    </a:clrScheme>
+    <a:fontScheme name="Office">
+      <a:majorFont>
+        <a:latin typeface="Aptos Display" panose="02110004020202020204"/>
+        <a:ea typeface=""/>
+        <a:cs typeface=""/>
+        <a:font script="Jpan" typeface="游ゴシック Light"/>
+        <a:font script="Hang" typeface="맑은 고딕"/>
+        <a:font script="Hans" typeface="等线 Light"/>
+        <a:font script="Hant" typeface="新細明體"/>
+        <a:font script="Arab" typeface="Times New Roman"/>
+        <a:font script="Hebr" typeface="Times New Roman"/>
+        <a:font script="Thai" typeface="Angsana New"/>
+        <a:font script="Ethi" typeface="Nyala"/>
+        <a:font script="Beng" typeface="Vrinda"/>
+        <a:font script="Gujr" typeface="Shruti"/>
+        <a:font script="Khmr" typeface="MoolBoran"/>
+        <a:font script="Knda" typeface="Tunga"/>
+        <a:font script="Guru" typeface="Raavi"/>
+        <a:font script="Cans" typeface="Euphemia"/>
+        <a:font script="Cher" typeface="Plantagenet Cherokee"/>
+        <a:font script="Yiii" typeface="Microsoft Yi Baiti"/>
+        <a:font script="Tibt" typeface="Microsoft Himalaya"/>
+        <a:font script="Thaa" typeface="MV Boli"/>
+        <a:font script="Deva" typeface="Mangal"/>
+        <a:font script="Telu" typeface="Gautami"/>
+        <a:font script="Taml" typeface="Latha"/>
+        <a:font script="Syrc" typeface="Estrangelo Edessa"/>
+        <a:font script="Orya" typeface="Kalinga"/>
+        <a:font script="Mlym" typeface="Kartika"/>
+        <a:font script="Laoo" typeface="DokChampa"/>
+        <a:font script="Sinh" typeface="Iskoola Pota"/>
+        <a:font script="Mong" typeface="Mongolian Baiti"/>
+        <a:font script="Viet" typeface="Times New Roman"/>
+        <a:font script="Uigh" typeface="Microsoft Uighur"/>
+        <a:font script="Geor" typeface="Sylfaen"/>
+        <a:font script="Armn" typeface="Arial"/>
+        <a:font script="Bugi" typeface="Leelawadee UI"/>
+        <a:font script="Bopo" typeface="Microsoft JhengHei"/>
+        <a:font script="Java" typeface="Javanese Text"/>
+        <a:font script="Lisu" typeface="Segoe UI"/>
+        <a:font script="Mymr" typeface="Myanmar Text"/>
+        <a:font script="Nkoo" typeface="Ebrima"/>
+        <a:font script="Olck" typeface="Nirmala UI"/>
+        <a:font script="Osma" typeface="Ebrima"/>
+        <a:font script="Phag" typeface="Phagspa"/>
+        <a:font script="Syrn" typeface="Estrangelo Edessa"/>
+        <a:font script="Syrj" typeface="Estrangelo Edessa"/>
+        <a:font script="Syre" typeface="Estrangelo Edessa"/>
+        <a:font script="Sora" typeface="Nirmala UI"/>
+        <a:font script="Tale" typeface="Microsoft Tai Le"/>
+        <a:font script="Talu" typeface="Microsoft New Tai Lue"/>
+        <a:font script="Tfng" typeface="Ebrima"/>
+      </a:majorFont>
+      <a:minorFont>
+        <a:latin typeface="Aptos" panose="02110004020202020204"/>
+        <a:ea typeface=""/>
+        <a:cs typeface=""/>
+        <a:font script="Jpan" typeface="游ゴシック"/>
+        <a:font script="Hang" typeface="맑은 고딕"/>
+        <a:font script="Hans" typeface="等线"/>
+        <a:font script="Hant" typeface="新細明體"/>
+        <a:font script="Arab" typeface="Arial"/>
+        <a:font script="Hebr" typeface="Arial"/>
+        <a:font script="Thai" typeface="Cordia New"/>
+        <a:font script="Ethi" typeface="Nyala"/>
+        <a:font script="Beng" typeface="Vrinda"/>
+        <a:font script="Gujr" typeface="Shruti"/>
+        <a:font script="Khmr" typeface="DaunPenh"/>
+        <a:font script="Knda" typeface="Tunga"/>
+        <a:font script="Guru" typeface="Raavi"/>
+        <a:font script="Cans" typeface="Euphemia"/>
+        <a:font script="Cher" typeface="Plantagenet Cherokee"/>
+        <a:font script="Yiii" typeface="Microsoft Yi Baiti"/>
+        <a:font script="Tibt" typeface="Microsoft Himalaya"/>
+        <a:font script="Thaa" typeface="MV Boli"/>
+        <a:font script="Deva" typeface="Mangal"/>
+        <a:font script="Telu" typeface="Gautami"/>
+        <a:font script="Taml" typeface="Latha"/>
+        <a:font script="Syrc" typeface="Estrangelo Edessa"/>
+        <a:font script="Orya" typeface="Kalinga"/>
+        <a:font script="Mlym" typeface="Kartika"/>
+        <a:font script="Laoo" typeface="DokChampa"/>
+        <a:font script="Sinh" typeface="Iskoola Pota"/>
+        <a:font script="Mong" typeface="Mongolian Baiti"/>
+        <a:font script="Viet" typeface="Arial"/>
+        <a:font script="Uigh" typeface="Microsoft Uighur"/>
+        <a:font script="Geor" typeface="Sylfaen"/>
+        <a:font script="Armn" typeface="Arial"/>
+        <a:font script="Bugi" typeface="Leelawadee UI"/>
+        <a:font script="Bopo" typeface="Microsoft JhengHei"/>
+        <a:font script="Java" typeface="Javanese Text"/>
+        <a:font script="Lisu" typeface="Segoe UI"/>
+        <a:font script="Mymr" typeface="Myanmar Text"/>
+        <a:font script="Nkoo" typeface="Ebrima"/>
+        <a:font script="Olck" typeface="Nirmala UI"/>
+        <a:font script="Osma" typeface="Ebrima"/>
+        <a:font script="Phag" typeface="Phagspa"/>
+        <a:font script="Syrn" typeface="Estrangelo Edessa"/>
+        <a:font script="Syrj" typeface="Estrangelo Edessa"/>
+        <a:font script="Syre" typeface="Estrangelo Edessa"/>
+        <a:font script="Sora" typeface="Nirmala UI"/>
+        <a:font script="Tale" typeface="Microsoft Tai Le"/>
+        <a:font script="Talu" typeface="Microsoft New Tai Lue"/>
+        <a:font script="Tfng" typeface="Ebrima"/>
+      </a:minorFont>
+    </a:fontScheme>
+    <a:fmtScheme name="Office">
+      <a:fillStyleLst>
+        <a:solidFill>
+          <a:schemeClr val="phClr"/>
+        </a:solidFill>
+        <a:gradFill rotWithShape="1">
+          <a:gsLst>
+            <a:gs pos="0">
+              <a:schemeClr val="phClr">
+                <a:lumMod val="110000"/>
+                <a:satMod val="105000"/>
+                <a:tint val="67000"/>
+              </a:schemeClr>
+            </a:gs>
+            <a:gs pos="50000">
+              <a:schemeClr val="phClr">
+                <a:lumMod val="105000"/>
+                <a:satMod val="103000"/>
+                <a:tint val="73000"/>
+              </a:schemeClr>
+            </a:gs>
+            <a:gs pos="100000">
+              <a:schemeClr val="phClr">
+                <a:lumMod val="105000"/>
+                <a:satMod val="109000"/>
+                <a:tint val="81000"/>
+              </a:schemeClr>
+            </a:gs>
+          </a:gsLst>
+          <a:lin ang="5400000" scaled="0"/>
+        </a:gradFill>
+        <a:gradFill rotWithShape="1">
+          <a:gsLst>
+            <a:gs pos="0">
+              <a:schemeClr val="phClr">
+                <a:satMod val="103000"/>
+                <a:lumMod val="102000"/>
+                <a:tint val="94000"/>
+              </a:schemeClr>
+            </a:gs>
+            <a:gs pos="50000">
+              <a:schemeClr val="phClr">
+                <a:satMod val="110000"/>
+                <a:lumMod val="100000"/>
+                <a:shade val="100000"/>
+              </a:schemeClr>
+            </a:gs>
+            <a:gs pos="100000">
+              <a:schemeClr val="phClr">
+                <a:lumMod val="99000"/>
+                <a:satMod val="120000"/>
+                <a:shade val="78000"/>
+              </a:schemeClr>
+            </a:gs>
+          </a:gsLst>
+          <a:lin ang="5400000" scaled="0"/>
+        </a:gradFill>
+      </a:fillStyleLst>
+      <a:lnStyleLst>
+        <a:ln w="12700" cap="flat" cmpd="sng" algn="ctr">
+          <a:solidFill>
+            <a:schemeClr val="phClr"/>
+          </a:solidFill>
+          <a:prstDash val="solid"/>
+          <a:miter lim="800000"/>
+        </a:ln>
+        <a:ln w="19050" cap="flat" cmpd="sng" algn="ctr">
+          <a:solidFill>
+            <a:schemeClr val="phClr"/>
+          </a:solidFill>
+          <a:prstDash val="solid"/>
+          <a:miter lim="800000"/>
+        </a:ln>
+        <a:ln w="25400" cap="flat" cmpd="sng" algn="ctr">
+          <a:solidFill>
+            <a:schemeClr val="phClr"/>
+          </a:solidFill>
+          <a:prstDash val="solid"/>
+          <a:miter lim="800000"/>
+        </a:ln>
+      </a:lnStyleLst>
+      <a:effectStyleLst>
+        <a:effectStyle>
+          <a:effectLst/>
+        </a:effectStyle>
+        <a:effectStyle>
+          <a:effectLst/>
+        </a:effectStyle>
+        <a:effectStyle>
+          <a:effectLst>
+            <a:outerShdw blurRad="57150" dist="19050" dir="5400000" algn="ctr" rotWithShape="0">
+              <a:srgbClr val="000000">
+                <a:alpha val="63000"/>
+              </a:srgbClr>
+            </a:outerShdw>
+          </a:effectLst>
+        </a:effectStyle>
+      </a:effectStyleLst>
+      <a:bgFillStyleLst>
+        <a:solidFill>
+          <a:schemeClr val="phClr"/>
+        </a:solidFill>
+        <a:solidFill>
+          <a:schemeClr val="phClr">
+            <a:tint val="95000"/>
+            <a:satMod val="170000"/>
+          </a:schemeClr>
+        </a:solidFill>
+        <a:gradFill rotWithShape="1">
+          <a:gsLst>
+            <a:gs pos="0">
+              <a:schemeClr val="phClr">
+                <a:tint val="93000"/>
+                <a:satMod val="150000"/>
+                <a:shade val="98000"/>
+                <a:lumMod val="102000"/>
+              </a:schemeClr>
+            </a:gs>
+            <a:gs pos="50000">
+              <a:schemeClr val="phClr">
+                <a:tint val="98000"/>
+                <a:satMod val="130000"/>
+                <a:shade val="90000"/>
+                <a:lumMod val="103000"/>
+              </a:schemeClr>
+            </a:gs>
+            <a:gs pos="100000">
+              <a:schemeClr val="phClr">
+                <a:shade val="63000"/>
+                <a:satMod val="120000"/>
+              </a:schemeClr>
+            </a:gs>
+          </a:gsLst>
+          <a:lin ang="5400000" scaled="0"/>
+        </a:gradFill>
+      </a:bgFillStyleLst>
+    </a:fmtScheme>
+  </a:themeElements>
+  <a:objectDefaults>
+    <a:lnDef>
+      <a:spPr/>
+      <a:bodyPr/>
+      <a:lstStyle/>
+      <a:style>
+        <a:lnRef idx="2">
+          <a:schemeClr val="accent1"/>
+        </a:lnRef>
+        <a:fillRef idx="0">
+          <a:schemeClr val="accent1"/>
+        </a:fillRef>
+        <a:effectRef idx="1">
+          <a:schemeClr val="accent1"/>
+        </a:effectRef>
+        <a:fontRef idx="minor">
+          <a:schemeClr val="tx1"/>
+        </a:fontRef>
+      </a:style>
+    </a:lnDef>
+  </a:objectDefaults>
+  <a:extraClrSchemeLst/>
+  <a:extLst>
+    <a:ext uri="{05A4C25C-085E-4340-85A3-A5531E510DB2}">
+      <thm15:themeFamily xmlns:thm15="http://schemas.microsoft.com/office/thememl/2012/main" name="Office Theme" id="{2E142A2C-CD16-42D6-873A-C26D2A0506FA}" vid="{1BDDFF52-6CD6-40A5-AB3C-68EB2F1E4D0A}"/>
+    </a:ext>
+  </a:extLst>
+</a:theme>
 </file>
</xml_diff>

<commit_message>
Add Benchmarking table and Tools & Technologies
</commit_message>
<xml_diff>
--- a/4- Idea Evaluation/Idea Evaluation Slides (Filled).pptx
+++ b/4- Idea Evaluation/Idea Evaluation Slides (Filled).pptx
@@ -5,7 +5,7 @@
     <p:sldMasterId id="2147483648" r:id="rId1"/>
   </p:sldMasterIdLst>
   <p:notesMasterIdLst>
-    <p:notesMasterId r:id="rId26"/>
+    <p:notesMasterId r:id="rId29"/>
   </p:notesMasterIdLst>
   <p:sldIdLst>
     <p:sldId id="258" r:id="rId2"/>
@@ -29,9 +29,12 @@
     <p:sldId id="262" r:id="rId20"/>
     <p:sldId id="266" r:id="rId21"/>
     <p:sldId id="267" r:id="rId22"/>
-    <p:sldId id="268" r:id="rId23"/>
-    <p:sldId id="261" r:id="rId24"/>
-    <p:sldId id="269" r:id="rId25"/>
+    <p:sldId id="284" r:id="rId23"/>
+    <p:sldId id="285" r:id="rId24"/>
+    <p:sldId id="286" r:id="rId25"/>
+    <p:sldId id="268" r:id="rId26"/>
+    <p:sldId id="261" r:id="rId27"/>
+    <p:sldId id="269" r:id="rId28"/>
   </p:sldIdLst>
   <p:sldSz cx="12192000" cy="6858000"/>
   <p:notesSz cx="6858000" cy="9144000"/>
@@ -220,7 +223,7 @@
           <a:p>
             <a:fld id="{EF96ACE9-C9FC-4287-B6B2-A985566C0C1D}" type="datetimeFigureOut">
               <a:rPr lang="en-US" smtClean="0"/>
-              <a:t>9/26/2024</a:t>
+              <a:t>9/27/2024</a:t>
             </a:fld>
             <a:endParaRPr lang="en-US"/>
           </a:p>
@@ -571,6 +574,90 @@
 </p:notes>
 </file>
 
+<file path=ppt/notesSlides/notesSlide2.xml><?xml version="1.0" encoding="utf-8"?>
+<p:notes xmlns:a="http://schemas.openxmlformats.org/drawingml/2006/main" xmlns:r="http://schemas.openxmlformats.org/officeDocument/2006/relationships" xmlns:p="http://schemas.openxmlformats.org/presentationml/2006/main">
+  <p:cSld>
+    <p:spTree>
+      <p:nvGrpSpPr>
+        <p:cNvPr id="1" name=""/>
+        <p:cNvGrpSpPr/>
+        <p:nvPr/>
+      </p:nvGrpSpPr>
+      <p:grpSpPr>
+        <a:xfrm>
+          <a:off x="0" y="0"/>
+          <a:ext cx="0" cy="0"/>
+          <a:chOff x="0" y="0"/>
+          <a:chExt cx="0" cy="0"/>
+        </a:xfrm>
+      </p:grpSpPr>
+      <p:sp>
+        <p:nvSpPr>
+          <p:cNvPr id="2" name="Slide Image Placeholder 1"/>
+          <p:cNvSpPr>
+            <a:spLocks noGrp="1" noRot="1" noChangeAspect="1"/>
+          </p:cNvSpPr>
+          <p:nvPr>
+            <p:ph type="sldImg"/>
+          </p:nvPr>
+        </p:nvSpPr>
+        <p:spPr/>
+      </p:sp>
+      <p:sp>
+        <p:nvSpPr>
+          <p:cNvPr id="3" name="Notes Placeholder 2"/>
+          <p:cNvSpPr>
+            <a:spLocks noGrp="1"/>
+          </p:cNvSpPr>
+          <p:nvPr>
+            <p:ph type="body" idx="1"/>
+          </p:nvPr>
+        </p:nvSpPr>
+        <p:spPr/>
+        <p:txBody>
+          <a:bodyPr/>
+          <a:lstStyle/>
+          <a:p>
+            <a:endParaRPr lang="en-US" dirty="0"/>
+          </a:p>
+        </p:txBody>
+      </p:sp>
+      <p:sp>
+        <p:nvSpPr>
+          <p:cNvPr id="4" name="Slide Number Placeholder 3"/>
+          <p:cNvSpPr>
+            <a:spLocks noGrp="1"/>
+          </p:cNvSpPr>
+          <p:nvPr>
+            <p:ph type="sldNum" sz="quarter" idx="5"/>
+          </p:nvPr>
+        </p:nvSpPr>
+        <p:spPr/>
+        <p:txBody>
+          <a:bodyPr/>
+          <a:lstStyle/>
+          <a:p>
+            <a:fld id="{3971591C-8B9F-454A-AEBF-720C7958788B}" type="slidenum">
+              <a:rPr lang="en-US" smtClean="0"/>
+              <a:t>17</a:t>
+            </a:fld>
+            <a:endParaRPr lang="en-US"/>
+          </a:p>
+        </p:txBody>
+      </p:sp>
+    </p:spTree>
+    <p:extLst>
+      <p:ext uri="{BB962C8B-B14F-4D97-AF65-F5344CB8AC3E}">
+        <p14:creationId xmlns:p14="http://schemas.microsoft.com/office/powerpoint/2010/main" val="634562930"/>
+      </p:ext>
+    </p:extLst>
+  </p:cSld>
+  <p:clrMapOvr>
+    <a:masterClrMapping/>
+  </p:clrMapOvr>
+</p:notes>
+</file>
+
 <file path=ppt/slideLayouts/slideLayout1.xml><?xml version="1.0" encoding="utf-8"?>
 <p:sldLayout xmlns:a="http://schemas.openxmlformats.org/drawingml/2006/main" xmlns:r="http://schemas.openxmlformats.org/officeDocument/2006/relationships" xmlns:p="http://schemas.openxmlformats.org/presentationml/2006/main" type="title" preserve="1">
   <p:cSld name="Title Slide">
@@ -700,7 +787,7 @@
           <a:p>
             <a:fld id="{0F5A5E6E-0E5C-41E1-A40C-15B94255FA15}" type="datetimeFigureOut">
               <a:rPr lang="en-US" smtClean="0"/>
-              <a:t>9/26/2024</a:t>
+              <a:t>9/27/2024</a:t>
             </a:fld>
             <a:endParaRPr lang="en-US"/>
           </a:p>
@@ -868,7 +955,7 @@
           <a:p>
             <a:fld id="{0F5A5E6E-0E5C-41E1-A40C-15B94255FA15}" type="datetimeFigureOut">
               <a:rPr lang="en-US" smtClean="0"/>
-              <a:t>9/26/2024</a:t>
+              <a:t>9/27/2024</a:t>
             </a:fld>
             <a:endParaRPr lang="en-US"/>
           </a:p>
@@ -1046,7 +1133,7 @@
           <a:p>
             <a:fld id="{0F5A5E6E-0E5C-41E1-A40C-15B94255FA15}" type="datetimeFigureOut">
               <a:rPr lang="en-US" smtClean="0"/>
-              <a:t>9/26/2024</a:t>
+              <a:t>9/27/2024</a:t>
             </a:fld>
             <a:endParaRPr lang="en-US"/>
           </a:p>
@@ -1214,7 +1301,7 @@
           <a:p>
             <a:fld id="{0F5A5E6E-0E5C-41E1-A40C-15B94255FA15}" type="datetimeFigureOut">
               <a:rPr lang="en-US" smtClean="0"/>
-              <a:t>9/26/2024</a:t>
+              <a:t>9/27/2024</a:t>
             </a:fld>
             <a:endParaRPr lang="en-US"/>
           </a:p>
@@ -1459,7 +1546,7 @@
           <a:p>
             <a:fld id="{0F5A5E6E-0E5C-41E1-A40C-15B94255FA15}" type="datetimeFigureOut">
               <a:rPr lang="en-US" smtClean="0"/>
-              <a:t>9/26/2024</a:t>
+              <a:t>9/27/2024</a:t>
             </a:fld>
             <a:endParaRPr lang="en-US"/>
           </a:p>
@@ -1688,7 +1775,7 @@
           <a:p>
             <a:fld id="{0F5A5E6E-0E5C-41E1-A40C-15B94255FA15}" type="datetimeFigureOut">
               <a:rPr lang="en-US" smtClean="0"/>
-              <a:t>9/26/2024</a:t>
+              <a:t>9/27/2024</a:t>
             </a:fld>
             <a:endParaRPr lang="en-US"/>
           </a:p>
@@ -2052,7 +2139,7 @@
           <a:p>
             <a:fld id="{0F5A5E6E-0E5C-41E1-A40C-15B94255FA15}" type="datetimeFigureOut">
               <a:rPr lang="en-US" smtClean="0"/>
-              <a:t>9/26/2024</a:t>
+              <a:t>9/27/2024</a:t>
             </a:fld>
             <a:endParaRPr lang="en-US"/>
           </a:p>
@@ -2169,7 +2256,7 @@
           <a:p>
             <a:fld id="{0F5A5E6E-0E5C-41E1-A40C-15B94255FA15}" type="datetimeFigureOut">
               <a:rPr lang="en-US" smtClean="0"/>
-              <a:t>9/26/2024</a:t>
+              <a:t>9/27/2024</a:t>
             </a:fld>
             <a:endParaRPr lang="en-US"/>
           </a:p>
@@ -2264,7 +2351,7 @@
           <a:p>
             <a:fld id="{0F5A5E6E-0E5C-41E1-A40C-15B94255FA15}" type="datetimeFigureOut">
               <a:rPr lang="en-US" smtClean="0"/>
-              <a:t>9/26/2024</a:t>
+              <a:t>9/27/2024</a:t>
             </a:fld>
             <a:endParaRPr lang="en-US"/>
           </a:p>
@@ -2539,7 +2626,7 @@
           <a:p>
             <a:fld id="{0F5A5E6E-0E5C-41E1-A40C-15B94255FA15}" type="datetimeFigureOut">
               <a:rPr lang="en-US" smtClean="0"/>
-              <a:t>9/26/2024</a:t>
+              <a:t>9/27/2024</a:t>
             </a:fld>
             <a:endParaRPr lang="en-US"/>
           </a:p>
@@ -2791,7 +2878,7 @@
           <a:p>
             <a:fld id="{0F5A5E6E-0E5C-41E1-A40C-15B94255FA15}" type="datetimeFigureOut">
               <a:rPr lang="en-US" smtClean="0"/>
-              <a:t>9/26/2024</a:t>
+              <a:t>9/27/2024</a:t>
             </a:fld>
             <a:endParaRPr lang="en-US"/>
           </a:p>
@@ -3002,7 +3089,7 @@
           <a:p>
             <a:fld id="{0F5A5E6E-0E5C-41E1-A40C-15B94255FA15}" type="datetimeFigureOut">
               <a:rPr lang="en-US" smtClean="0"/>
-              <a:t>9/26/2024</a:t>
+              <a:t>9/27/2024</a:t>
             </a:fld>
             <a:endParaRPr lang="en-US"/>
           </a:p>
@@ -5311,14 +5398,14 @@
             <p:ph idx="1"/>
             <p:extLst>
               <p:ext uri="{D42A27DB-BD31-4B8C-83A1-F6EECF244321}">
-                <p14:modId xmlns:p14="http://schemas.microsoft.com/office/powerpoint/2010/main" val="710420908"/>
+                <p14:modId xmlns:p14="http://schemas.microsoft.com/office/powerpoint/2010/main" val="3394945558"/>
               </p:ext>
             </p:extLst>
           </p:nvPr>
         </p:nvGraphicFramePr>
         <p:xfrm>
-          <a:off x="838200" y="1825625"/>
-          <a:ext cx="10672482" cy="3474720"/>
+          <a:off x="929640" y="1346084"/>
+          <a:ext cx="10332720" cy="5557502"/>
         </p:xfrm>
         <a:graphic>
           <a:graphicData uri="http://schemas.openxmlformats.org/drawingml/2006/table">
@@ -5327,42 +5414,42 @@
                 <a:tableStyleId>{21E4AEA4-8DFA-4A89-87EB-49C32662AFE0}</a:tableStyleId>
               </a:tblPr>
               <a:tblGrid>
-                <a:gridCol w="1778747">
+                <a:gridCol w="1848302">
                   <a:extLst>
                     <a:ext uri="{9D8B030D-6E8A-4147-A177-3AD203B41FA5}">
                       <a16:colId xmlns:a16="http://schemas.microsoft.com/office/drawing/2014/main" val="1846051769"/>
                     </a:ext>
                   </a:extLst>
                 </a:gridCol>
-                <a:gridCol w="1778747">
+                <a:gridCol w="1595938">
                   <a:extLst>
                     <a:ext uri="{9D8B030D-6E8A-4147-A177-3AD203B41FA5}">
                       <a16:colId xmlns:a16="http://schemas.microsoft.com/office/drawing/2014/main" val="2195972948"/>
                     </a:ext>
                   </a:extLst>
                 </a:gridCol>
-                <a:gridCol w="1778747">
+                <a:gridCol w="1722120">
                   <a:extLst>
                     <a:ext uri="{9D8B030D-6E8A-4147-A177-3AD203B41FA5}">
                       <a16:colId xmlns:a16="http://schemas.microsoft.com/office/drawing/2014/main" val="2505003229"/>
                     </a:ext>
                   </a:extLst>
                 </a:gridCol>
-                <a:gridCol w="1778747">
+                <a:gridCol w="1722120">
                   <a:extLst>
                     <a:ext uri="{9D8B030D-6E8A-4147-A177-3AD203B41FA5}">
                       <a16:colId xmlns:a16="http://schemas.microsoft.com/office/drawing/2014/main" val="443625132"/>
                     </a:ext>
                   </a:extLst>
                 </a:gridCol>
-                <a:gridCol w="1778747">
+                <a:gridCol w="1484283">
                   <a:extLst>
                     <a:ext uri="{9D8B030D-6E8A-4147-A177-3AD203B41FA5}">
                       <a16:colId xmlns:a16="http://schemas.microsoft.com/office/drawing/2014/main" val="1501022799"/>
                     </a:ext>
                   </a:extLst>
                 </a:gridCol>
-                <a:gridCol w="1778747">
+                <a:gridCol w="1959957">
                   <a:extLst>
                     <a:ext uri="{9D8B030D-6E8A-4147-A177-3AD203B41FA5}">
                       <a16:colId xmlns:a16="http://schemas.microsoft.com/office/drawing/2014/main" val="582787935"/>
@@ -5370,7 +5457,7 @@
                   </a:extLst>
                 </a:gridCol>
               </a:tblGrid>
-              <a:tr h="370840">
+              <a:tr h="714224">
                 <a:tc>
                   <a:txBody>
                     <a:bodyPr/>
@@ -5479,14 +5566,17 @@
                   </a:ext>
                 </a:extLst>
               </a:tr>
-              <a:tr h="370840">
+              <a:tr h="714224">
                 <a:tc>
                   <a:txBody>
                     <a:bodyPr/>
                     <a:lstStyle/>
                     <a:p>
                       <a:pPr algn="ctr"/>
-                      <a:endParaRPr lang="en-US" sz="2000" dirty="0"/>
+                      <a:r>
+                        <a:rPr lang="en-US" sz="2000" dirty="0"/>
+                        <a:t>Complaint Reporting</a:t>
+                      </a:r>
                     </a:p>
                   </a:txBody>
                   <a:tcPr anchor="ctr"/>
@@ -5497,7 +5587,10 @@
                     <a:lstStyle/>
                     <a:p>
                       <a:pPr algn="ctr"/>
-                      <a:endParaRPr lang="en-US" sz="2000"/>
+                      <a:r>
+                        <a:rPr lang="en-US" sz="2000" dirty="0"/>
+                        <a:t>Yes</a:t>
+                      </a:r>
                     </a:p>
                   </a:txBody>
                   <a:tcPr anchor="ctr"/>
@@ -5508,7 +5601,10 @@
                     <a:lstStyle/>
                     <a:p>
                       <a:pPr algn="ctr"/>
-                      <a:endParaRPr lang="en-US" sz="2000"/>
+                      <a:r>
+                        <a:rPr lang="en-US" sz="2000" dirty="0"/>
+                        <a:t>Yes</a:t>
+                      </a:r>
                     </a:p>
                   </a:txBody>
                   <a:tcPr anchor="ctr"/>
@@ -5519,7 +5615,10 @@
                     <a:lstStyle/>
                     <a:p>
                       <a:pPr algn="ctr"/>
-                      <a:endParaRPr lang="en-US" sz="2000"/>
+                      <a:r>
+                        <a:rPr lang="en-US" sz="2000" dirty="0"/>
+                        <a:t>Yes</a:t>
+                      </a:r>
                     </a:p>
                   </a:txBody>
                   <a:tcPr anchor="ctr"/>
@@ -5530,7 +5629,10 @@
                     <a:lstStyle/>
                     <a:p>
                       <a:pPr algn="ctr"/>
-                      <a:endParaRPr lang="en-US" sz="2000"/>
+                      <a:r>
+                        <a:rPr lang="en-US" sz="2000" dirty="0"/>
+                        <a:t>Yes</a:t>
+                      </a:r>
                     </a:p>
                   </a:txBody>
                   <a:tcPr anchor="ctr"/>
@@ -5541,7 +5643,10 @@
                     <a:lstStyle/>
                     <a:p>
                       <a:pPr algn="ctr"/>
-                      <a:endParaRPr lang="en-US" sz="2000"/>
+                      <a:r>
+                        <a:rPr lang="en-US" sz="2000" dirty="0"/>
+                        <a:t>No</a:t>
+                      </a:r>
                     </a:p>
                   </a:txBody>
                   <a:tcPr anchor="ctr"/>
@@ -5552,14 +5657,33 @@
                   </a:ext>
                 </a:extLst>
               </a:tr>
-              <a:tr h="370840">
+              <a:tr h="714224">
                 <a:tc>
                   <a:txBody>
                     <a:bodyPr/>
                     <a:lstStyle/>
                     <a:p>
-                      <a:pPr algn="ctr"/>
-                      <a:endParaRPr lang="en-US" sz="2000"/>
+                      <a:pPr marL="0" marR="0" lvl="0" indent="0" algn="ctr" defTabSz="914400" rtl="0" eaLnBrk="1" fontAlgn="auto" latinLnBrk="0" hangingPunct="1">
+                        <a:lnSpc>
+                          <a:spcPct val="100000"/>
+                        </a:lnSpc>
+                        <a:spcBef>
+                          <a:spcPts val="0"/>
+                        </a:spcBef>
+                        <a:spcAft>
+                          <a:spcPts val="0"/>
+                        </a:spcAft>
+                        <a:buClrTx/>
+                        <a:buSzTx/>
+                        <a:buFontTx/>
+                        <a:buNone/>
+                        <a:tabLst/>
+                        <a:defRPr/>
+                      </a:pPr>
+                      <a:r>
+                        <a:rPr lang="en-US" sz="2000" dirty="0"/>
+                        <a:t>Complaint Prioritization</a:t>
+                      </a:r>
                     </a:p>
                   </a:txBody>
                   <a:tcPr anchor="ctr"/>
@@ -5570,7 +5694,10 @@
                     <a:lstStyle/>
                     <a:p>
                       <a:pPr algn="ctr"/>
-                      <a:endParaRPr lang="en-US" sz="2000"/>
+                      <a:r>
+                        <a:rPr lang="en-US" sz="2000" dirty="0"/>
+                        <a:t>Yes</a:t>
+                      </a:r>
                     </a:p>
                   </a:txBody>
                   <a:tcPr anchor="ctr"/>
@@ -5581,7 +5708,10 @@
                     <a:lstStyle/>
                     <a:p>
                       <a:pPr algn="ctr"/>
-                      <a:endParaRPr lang="en-US" sz="2000"/>
+                      <a:r>
+                        <a:rPr lang="en-US" sz="2000" dirty="0"/>
+                        <a:t>No</a:t>
+                      </a:r>
                     </a:p>
                   </a:txBody>
                   <a:tcPr anchor="ctr"/>
@@ -5592,7 +5722,10 @@
                     <a:lstStyle/>
                     <a:p>
                       <a:pPr algn="ctr"/>
-                      <a:endParaRPr lang="en-US" sz="2000"/>
+                      <a:r>
+                        <a:rPr lang="en-US" sz="2000" dirty="0"/>
+                        <a:t>No</a:t>
+                      </a:r>
                     </a:p>
                   </a:txBody>
                   <a:tcPr anchor="ctr"/>
@@ -5603,7 +5736,10 @@
                     <a:lstStyle/>
                     <a:p>
                       <a:pPr algn="ctr"/>
-                      <a:endParaRPr lang="en-US" sz="2000"/>
+                      <a:r>
+                        <a:rPr lang="en-US" sz="2000" dirty="0"/>
+                        <a:t>No</a:t>
+                      </a:r>
                     </a:p>
                   </a:txBody>
                   <a:tcPr anchor="ctr"/>
@@ -5614,7 +5750,10 @@
                     <a:lstStyle/>
                     <a:p>
                       <a:pPr algn="ctr"/>
-                      <a:endParaRPr lang="en-US" sz="2000"/>
+                      <a:r>
+                        <a:rPr lang="en-US" sz="2000" dirty="0"/>
+                        <a:t>No</a:t>
+                      </a:r>
                     </a:p>
                   </a:txBody>
                   <a:tcPr anchor="ctr"/>
@@ -5625,14 +5764,17 @@
                   </a:ext>
                 </a:extLst>
               </a:tr>
-              <a:tr h="370840">
+              <a:tr h="655448">
                 <a:tc>
                   <a:txBody>
                     <a:bodyPr/>
                     <a:lstStyle/>
                     <a:p>
                       <a:pPr algn="ctr"/>
-                      <a:endParaRPr lang="en-US" sz="2000"/>
+                      <a:r>
+                        <a:rPr lang="en-US" sz="2000" dirty="0"/>
+                        <a:t>Virtual Meetups</a:t>
+                      </a:r>
                     </a:p>
                   </a:txBody>
                   <a:tcPr anchor="ctr"/>
@@ -5643,7 +5785,10 @@
                     <a:lstStyle/>
                     <a:p>
                       <a:pPr algn="ctr"/>
-                      <a:endParaRPr lang="en-US" sz="2000"/>
+                      <a:r>
+                        <a:rPr lang="en-US" sz="2000" dirty="0"/>
+                        <a:t>Yes</a:t>
+                      </a:r>
                     </a:p>
                   </a:txBody>
                   <a:tcPr anchor="ctr"/>
@@ -5654,7 +5799,10 @@
                     <a:lstStyle/>
                     <a:p>
                       <a:pPr algn="ctr"/>
-                      <a:endParaRPr lang="en-US" sz="2000"/>
+                      <a:r>
+                        <a:rPr lang="en-US" sz="2000" dirty="0"/>
+                        <a:t>No</a:t>
+                      </a:r>
                     </a:p>
                   </a:txBody>
                   <a:tcPr anchor="ctr"/>
@@ -5665,7 +5813,10 @@
                     <a:lstStyle/>
                     <a:p>
                       <a:pPr algn="ctr"/>
-                      <a:endParaRPr lang="en-US" sz="2000"/>
+                      <a:r>
+                        <a:rPr lang="en-US" sz="2000" dirty="0"/>
+                        <a:t>No</a:t>
+                      </a:r>
                     </a:p>
                   </a:txBody>
                   <a:tcPr anchor="ctr"/>
@@ -5676,7 +5827,10 @@
                     <a:lstStyle/>
                     <a:p>
                       <a:pPr algn="ctr"/>
-                      <a:endParaRPr lang="en-US" sz="2000"/>
+                      <a:r>
+                        <a:rPr lang="en-US" sz="2000" dirty="0"/>
+                        <a:t>No</a:t>
+                      </a:r>
                     </a:p>
                   </a:txBody>
                   <a:tcPr anchor="ctr"/>
@@ -5687,7 +5841,10 @@
                     <a:lstStyle/>
                     <a:p>
                       <a:pPr algn="ctr"/>
-                      <a:endParaRPr lang="en-US" sz="2000"/>
+                      <a:r>
+                        <a:rPr lang="en-US" sz="2000" dirty="0"/>
+                        <a:t>Yes</a:t>
+                      </a:r>
                     </a:p>
                   </a:txBody>
                   <a:tcPr anchor="ctr"/>
@@ -5698,14 +5855,17 @@
                   </a:ext>
                 </a:extLst>
               </a:tr>
-              <a:tr h="370840">
+              <a:tr h="403692">
                 <a:tc>
                   <a:txBody>
                     <a:bodyPr/>
                     <a:lstStyle/>
                     <a:p>
                       <a:pPr algn="ctr"/>
-                      <a:endParaRPr lang="en-US" sz="2000"/>
+                      <a:r>
+                        <a:rPr lang="en-US" sz="2000" dirty="0"/>
+                        <a:t>Surveys</a:t>
+                      </a:r>
                     </a:p>
                   </a:txBody>
                   <a:tcPr anchor="ctr"/>
@@ -5716,7 +5876,10 @@
                     <a:lstStyle/>
                     <a:p>
                       <a:pPr algn="ctr"/>
-                      <a:endParaRPr lang="en-US" sz="2000"/>
+                      <a:r>
+                        <a:rPr lang="en-US" sz="2000" dirty="0"/>
+                        <a:t>Yes</a:t>
+                      </a:r>
                     </a:p>
                   </a:txBody>
                   <a:tcPr anchor="ctr"/>
@@ -5727,7 +5890,10 @@
                     <a:lstStyle/>
                     <a:p>
                       <a:pPr algn="ctr"/>
-                      <a:endParaRPr lang="en-US" sz="2000"/>
+                      <a:r>
+                        <a:rPr lang="en-US" sz="2000" dirty="0"/>
+                        <a:t>No</a:t>
+                      </a:r>
                     </a:p>
                   </a:txBody>
                   <a:tcPr anchor="ctr"/>
@@ -5738,7 +5904,10 @@
                     <a:lstStyle/>
                     <a:p>
                       <a:pPr algn="ctr"/>
-                      <a:endParaRPr lang="en-US" sz="2000"/>
+                      <a:r>
+                        <a:rPr lang="en-US" sz="2000" dirty="0"/>
+                        <a:t>No</a:t>
+                      </a:r>
                     </a:p>
                   </a:txBody>
                   <a:tcPr anchor="ctr"/>
@@ -5749,7 +5918,10 @@
                     <a:lstStyle/>
                     <a:p>
                       <a:pPr algn="ctr"/>
-                      <a:endParaRPr lang="en-US" sz="2000"/>
+                      <a:r>
+                        <a:rPr lang="en-US" sz="2000" dirty="0"/>
+                        <a:t>No</a:t>
+                      </a:r>
                     </a:p>
                   </a:txBody>
                   <a:tcPr anchor="ctr"/>
@@ -5760,7 +5932,10 @@
                     <a:lstStyle/>
                     <a:p>
                       <a:pPr algn="ctr"/>
-                      <a:endParaRPr lang="en-US" sz="2000"/>
+                      <a:r>
+                        <a:rPr lang="en-US" sz="2000" dirty="0"/>
+                        <a:t>Yes</a:t>
+                      </a:r>
                     </a:p>
                   </a:txBody>
                   <a:tcPr anchor="ctr"/>
@@ -5771,14 +5946,17 @@
                   </a:ext>
                 </a:extLst>
               </a:tr>
-              <a:tr h="370840">
+              <a:tr h="655448">
                 <a:tc>
                   <a:txBody>
                     <a:bodyPr/>
                     <a:lstStyle/>
                     <a:p>
                       <a:pPr algn="ctr"/>
-                      <a:endParaRPr lang="en-US" sz="2000"/>
+                      <a:r>
+                        <a:rPr lang="en-US" sz="2000" dirty="0"/>
+                        <a:t>Event Calendar</a:t>
+                      </a:r>
                     </a:p>
                   </a:txBody>
                   <a:tcPr anchor="ctr"/>
@@ -5789,7 +5967,10 @@
                     <a:lstStyle/>
                     <a:p>
                       <a:pPr algn="ctr"/>
-                      <a:endParaRPr lang="en-US" sz="2000"/>
+                      <a:r>
+                        <a:rPr lang="en-US" sz="2000" dirty="0"/>
+                        <a:t>Yes</a:t>
+                      </a:r>
                     </a:p>
                   </a:txBody>
                   <a:tcPr anchor="ctr"/>
@@ -5800,7 +5981,10 @@
                     <a:lstStyle/>
                     <a:p>
                       <a:pPr algn="ctr"/>
-                      <a:endParaRPr lang="en-US" sz="2000"/>
+                      <a:r>
+                        <a:rPr lang="en-US" sz="2000" dirty="0"/>
+                        <a:t>No</a:t>
+                      </a:r>
                     </a:p>
                   </a:txBody>
                   <a:tcPr anchor="ctr"/>
@@ -5811,7 +5995,10 @@
                     <a:lstStyle/>
                     <a:p>
                       <a:pPr algn="ctr"/>
-                      <a:endParaRPr lang="en-US" sz="2000"/>
+                      <a:r>
+                        <a:rPr lang="en-US" sz="2000" dirty="0"/>
+                        <a:t>No</a:t>
+                      </a:r>
                     </a:p>
                   </a:txBody>
                   <a:tcPr anchor="ctr"/>
@@ -5822,7 +6009,10 @@
                     <a:lstStyle/>
                     <a:p>
                       <a:pPr algn="ctr"/>
-                      <a:endParaRPr lang="en-US" sz="2000"/>
+                      <a:r>
+                        <a:rPr lang="en-US" sz="2000" dirty="0"/>
+                        <a:t>No</a:t>
+                      </a:r>
                     </a:p>
                   </a:txBody>
                   <a:tcPr anchor="ctr"/>
@@ -5833,7 +6023,10 @@
                     <a:lstStyle/>
                     <a:p>
                       <a:pPr algn="ctr"/>
-                      <a:endParaRPr lang="en-US" sz="2000"/>
+                      <a:r>
+                        <a:rPr lang="en-US" sz="2000" dirty="0"/>
+                        <a:t>No</a:t>
+                      </a:r>
                     </a:p>
                   </a:txBody>
                   <a:tcPr anchor="ctr"/>
@@ -5844,14 +6037,17 @@
                   </a:ext>
                 </a:extLst>
               </a:tr>
-              <a:tr h="370840">
+              <a:tr h="940426">
                 <a:tc>
                   <a:txBody>
                     <a:bodyPr/>
                     <a:lstStyle/>
                     <a:p>
                       <a:pPr algn="ctr"/>
-                      <a:endParaRPr lang="en-US" sz="2000"/>
+                      <a:r>
+                        <a:rPr lang="en-US" sz="2000" dirty="0"/>
+                        <a:t>Multi Language Support </a:t>
+                      </a:r>
                     </a:p>
                   </a:txBody>
                   <a:tcPr anchor="ctr"/>
@@ -5862,7 +6058,10 @@
                     <a:lstStyle/>
                     <a:p>
                       <a:pPr algn="ctr"/>
-                      <a:endParaRPr lang="en-US" sz="2000" dirty="0"/>
+                      <a:r>
+                        <a:rPr lang="en-US" sz="2000" dirty="0"/>
+                        <a:t>Yes</a:t>
+                      </a:r>
                     </a:p>
                   </a:txBody>
                   <a:tcPr anchor="ctr"/>
@@ -5873,7 +6072,10 @@
                     <a:lstStyle/>
                     <a:p>
                       <a:pPr algn="ctr"/>
-                      <a:endParaRPr lang="en-US" sz="2000"/>
+                      <a:r>
+                        <a:rPr lang="en-US" sz="2000" dirty="0"/>
+                        <a:t>Yes</a:t>
+                      </a:r>
                     </a:p>
                   </a:txBody>
                   <a:tcPr anchor="ctr"/>
@@ -5884,7 +6086,10 @@
                     <a:lstStyle/>
                     <a:p>
                       <a:pPr algn="ctr"/>
-                      <a:endParaRPr lang="en-US" sz="2000"/>
+                      <a:r>
+                        <a:rPr lang="en-US" sz="2000" dirty="0"/>
+                        <a:t>No</a:t>
+                      </a:r>
                     </a:p>
                   </a:txBody>
                   <a:tcPr anchor="ctr"/>
@@ -5895,7 +6100,10 @@
                     <a:lstStyle/>
                     <a:p>
                       <a:pPr algn="ctr"/>
-                      <a:endParaRPr lang="en-US" sz="2000"/>
+                      <a:r>
+                        <a:rPr lang="en-US" sz="2000" dirty="0"/>
+                        <a:t>No</a:t>
+                      </a:r>
                     </a:p>
                   </a:txBody>
                   <a:tcPr anchor="ctr"/>
@@ -5906,7 +6114,10 @@
                     <a:lstStyle/>
                     <a:p>
                       <a:pPr algn="ctr"/>
-                      <a:endParaRPr lang="en-US" sz="2000"/>
+                      <a:r>
+                        <a:rPr lang="en-US" sz="2000" dirty="0"/>
+                        <a:t>No</a:t>
+                      </a:r>
                     </a:p>
                   </a:txBody>
                   <a:tcPr anchor="ctr"/>
@@ -5917,14 +6128,17 @@
                   </a:ext>
                 </a:extLst>
               </a:tr>
-              <a:tr h="370840">
+              <a:tr h="714224">
                 <a:tc>
                   <a:txBody>
                     <a:bodyPr/>
                     <a:lstStyle/>
                     <a:p>
                       <a:pPr algn="ctr"/>
-                      <a:endParaRPr lang="en-US" sz="2000" dirty="0"/>
+                      <a:r>
+                        <a:rPr lang="en-US" sz="2000" dirty="0"/>
+                        <a:t>Performance Metrics</a:t>
+                      </a:r>
                     </a:p>
                   </a:txBody>
                   <a:tcPr anchor="ctr"/>
@@ -5935,7 +6149,10 @@
                     <a:lstStyle/>
                     <a:p>
                       <a:pPr algn="ctr"/>
-                      <a:endParaRPr lang="en-US" sz="2000"/>
+                      <a:r>
+                        <a:rPr lang="en-US" sz="2000" dirty="0"/>
+                        <a:t>Yes</a:t>
+                      </a:r>
                     </a:p>
                   </a:txBody>
                   <a:tcPr anchor="ctr"/>
@@ -5946,7 +6163,10 @@
                     <a:lstStyle/>
                     <a:p>
                       <a:pPr algn="ctr"/>
-                      <a:endParaRPr lang="en-US" sz="2000"/>
+                      <a:r>
+                        <a:rPr lang="en-US" sz="2000" dirty="0"/>
+                        <a:t>No</a:t>
+                      </a:r>
                     </a:p>
                   </a:txBody>
                   <a:tcPr anchor="ctr"/>
@@ -5957,7 +6177,10 @@
                     <a:lstStyle/>
                     <a:p>
                       <a:pPr algn="ctr"/>
-                      <a:endParaRPr lang="en-US" sz="2000"/>
+                      <a:r>
+                        <a:rPr lang="en-US" sz="2000" dirty="0"/>
+                        <a:t>No</a:t>
+                      </a:r>
                     </a:p>
                   </a:txBody>
                   <a:tcPr anchor="ctr"/>
@@ -5968,7 +6191,10 @@
                     <a:lstStyle/>
                     <a:p>
                       <a:pPr algn="ctr"/>
-                      <a:endParaRPr lang="en-US" sz="2000"/>
+                      <a:r>
+                        <a:rPr lang="en-US" sz="2000" dirty="0"/>
+                        <a:t>No</a:t>
+                      </a:r>
                     </a:p>
                   </a:txBody>
                   <a:tcPr anchor="ctr"/>
@@ -5979,7 +6205,10 @@
                     <a:lstStyle/>
                     <a:p>
                       <a:pPr algn="ctr"/>
-                      <a:endParaRPr lang="en-US" sz="2000" dirty="0"/>
+                      <a:r>
+                        <a:rPr lang="en-US" sz="2000" dirty="0"/>
+                        <a:t>No</a:t>
+                      </a:r>
                     </a:p>
                   </a:txBody>
                   <a:tcPr anchor="ctr"/>
@@ -6549,7 +6778,12 @@
             <p:ph type="title"/>
           </p:nvPr>
         </p:nvSpPr>
-        <p:spPr/>
+        <p:spPr>
+          <a:xfrm>
+            <a:off x="838200" y="365125"/>
+            <a:ext cx="10515600" cy="980959"/>
+          </a:xfrm>
+        </p:spPr>
         <p:txBody>
           <a:bodyPr/>
           <a:lstStyle/>
@@ -6557,42 +6791,456 @@
             <a:r>
               <a:rPr lang="en-US" b="1" dirty="0">
                 <a:solidFill>
-                  <a:schemeClr val="accent1">
-                    <a:lumMod val="75000"/>
-                  </a:schemeClr>
+                  <a:srgbClr val="36ABF3"/>
                 </a:solidFill>
               </a:rPr>
-              <a:t>Final Outcome</a:t>
-            </a:r>
-          </a:p>
-        </p:txBody>
-      </p:sp>
-      <p:sp>
-        <p:nvSpPr>
-          <p:cNvPr id="3" name="Content Placeholder 2"/>
-          <p:cNvSpPr>
-            <a:spLocks noGrp="1"/>
+              <a:t>Tools and Technologies</a:t>
+            </a:r>
+          </a:p>
+        </p:txBody>
+      </p:sp>
+      <p:cxnSp>
+        <p:nvCxnSpPr>
+          <p:cNvPr id="10" name="Straight Connector 9">
+            <a:extLst>
+              <a:ext uri="{FF2B5EF4-FFF2-40B4-BE49-F238E27FC236}">
+                <a16:creationId xmlns:a16="http://schemas.microsoft.com/office/drawing/2014/main" id="{5C4D56EA-8905-CAFF-FA8B-91B461D57C36}"/>
+              </a:ext>
+            </a:extLst>
+          </p:cNvPr>
+          <p:cNvCxnSpPr>
+            <a:cxnSpLocks/>
+          </p:cNvCxnSpPr>
+          <p:nvPr/>
+        </p:nvCxnSpPr>
+        <p:spPr>
+          <a:xfrm>
+            <a:off x="929640" y="1237129"/>
+            <a:ext cx="10332720" cy="0"/>
+          </a:xfrm>
+          <a:prstGeom prst="line">
+            <a:avLst/>
+          </a:prstGeom>
+          <a:ln w="28575"/>
+        </p:spPr>
+        <p:style>
+          <a:lnRef idx="3">
+            <a:schemeClr val="dk1"/>
+          </a:lnRef>
+          <a:fillRef idx="0">
+            <a:schemeClr val="dk1"/>
+          </a:fillRef>
+          <a:effectRef idx="2">
+            <a:schemeClr val="dk1"/>
+          </a:effectRef>
+          <a:fontRef idx="minor">
+            <a:schemeClr val="tx1"/>
+          </a:fontRef>
+        </p:style>
+      </p:cxnSp>
+      <p:sp>
+        <p:nvSpPr>
+          <p:cNvPr id="4" name="Title 1">
+            <a:extLst>
+              <a:ext uri="{FF2B5EF4-FFF2-40B4-BE49-F238E27FC236}">
+                <a16:creationId xmlns:a16="http://schemas.microsoft.com/office/drawing/2014/main" id="{7ED9CE21-68A5-DE6F-C9B3-F22A1957B184}"/>
+              </a:ext>
+            </a:extLst>
+          </p:cNvPr>
+          <p:cNvSpPr txBox="1">
+            <a:spLocks/>
+          </p:cNvSpPr>
+          <p:nvPr/>
+        </p:nvSpPr>
+        <p:spPr>
+          <a:xfrm>
+            <a:off x="838200" y="1305381"/>
+            <a:ext cx="10515600" cy="959083"/>
+          </a:xfrm>
+          <a:prstGeom prst="rect">
+            <a:avLst/>
+          </a:prstGeom>
+        </p:spPr>
+        <p:txBody>
+          <a:bodyPr vert="horz" lIns="91440" tIns="45720" rIns="91440" bIns="45720" rtlCol="0" anchor="ctr">
+            <a:normAutofit/>
+          </a:bodyPr>
+          <a:lstStyle>
+            <a:lvl1pPr algn="l" defTabSz="914400" rtl="0" eaLnBrk="1" latinLnBrk="0" hangingPunct="1">
+              <a:lnSpc>
+                <a:spcPct val="90000"/>
+              </a:lnSpc>
+              <a:spcBef>
+                <a:spcPct val="0"/>
+              </a:spcBef>
+              <a:buNone/>
+              <a:defRPr sz="4400" kern="1200">
+                <a:solidFill>
+                  <a:schemeClr val="tx1"/>
+                </a:solidFill>
+                <a:latin typeface="+mj-lt"/>
+                <a:ea typeface="+mj-ea"/>
+                <a:cs typeface="+mj-cs"/>
+              </a:defRPr>
+            </a:lvl1pPr>
+          </a:lstStyle>
+          <a:p>
+            <a:r>
+              <a:rPr lang="en-US" sz="3600" b="1" dirty="0">
+                <a:solidFill>
+                  <a:srgbClr val="F8981C"/>
+                </a:solidFill>
+              </a:rPr>
+              <a:t>Tools</a:t>
+            </a:r>
+          </a:p>
+        </p:txBody>
+      </p:sp>
+      <p:sp>
+        <p:nvSpPr>
+          <p:cNvPr id="6" name="Rectangle 2">
+            <a:extLst>
+              <a:ext uri="{FF2B5EF4-FFF2-40B4-BE49-F238E27FC236}">
+                <a16:creationId xmlns:a16="http://schemas.microsoft.com/office/drawing/2014/main" id="{BBCC21A0-2438-C164-7D0B-B65D46E7BE94}"/>
+              </a:ext>
+            </a:extLst>
+          </p:cNvPr>
+          <p:cNvSpPr>
+            <a:spLocks noGrp="1" noChangeArrowheads="1"/>
           </p:cNvSpPr>
           <p:nvPr>
             <p:ph idx="1"/>
           </p:nvPr>
         </p:nvSpPr>
-        <p:spPr/>
-        <p:txBody>
-          <a:bodyPr/>
+        <p:spPr bwMode="auto">
+          <a:xfrm>
+            <a:off x="929640" y="2223761"/>
+            <a:ext cx="10332720" cy="4401205"/>
+          </a:xfrm>
+          <a:prstGeom prst="rect">
+            <a:avLst/>
+          </a:prstGeom>
+          <a:noFill/>
+          <a:ln>
+            <a:noFill/>
+          </a:ln>
+          <a:effectLst/>
+          <a:extLst>
+            <a:ext uri="{909E8E84-426E-40DD-AFC4-6F175D3DCCD1}">
+              <a14:hiddenFill xmlns:a14="http://schemas.microsoft.com/office/drawing/2010/main">
+                <a:solidFill>
+                  <a:schemeClr val="accent1"/>
+                </a:solidFill>
+              </a14:hiddenFill>
+            </a:ext>
+            <a:ext uri="{91240B29-F687-4F45-9708-019B960494DF}">
+              <a14:hiddenLine xmlns:a14="http://schemas.microsoft.com/office/drawing/2010/main" w="9525">
+                <a:solidFill>
+                  <a:schemeClr val="tx1"/>
+                </a:solidFill>
+                <a:miter lim="800000"/>
+                <a:headEnd/>
+                <a:tailEnd/>
+              </a14:hiddenLine>
+            </a:ext>
+            <a:ext uri="{AF507438-7753-43E0-B8FC-AC1667EBCBE1}">
+              <a14:hiddenEffects xmlns:a14="http://schemas.microsoft.com/office/drawing/2010/main">
+                <a:effectLst>
+                  <a:outerShdw dist="35921" dir="2700000" algn="ctr" rotWithShape="0">
+                    <a:schemeClr val="bg2"/>
+                  </a:outerShdw>
+                </a:effectLst>
+              </a14:hiddenEffects>
+            </a:ext>
+          </a:extLst>
+        </p:spPr>
+        <p:txBody>
+          <a:bodyPr vert="horz" wrap="square" lIns="91440" tIns="45720" rIns="91440" bIns="45720" numCol="1" anchor="ctr" anchorCtr="0" compatLnSpc="1">
+            <a:prstTxWarp prst="textNoShape">
+              <a:avLst/>
+            </a:prstTxWarp>
+            <a:spAutoFit/>
+          </a:bodyPr>
           <a:lstStyle/>
           <a:p>
-            <a:pPr algn="just"/>
-            <a:r>
-              <a:rPr lang="en-US" dirty="0"/>
-              <a:t>Describe shortly the nature of your project outcome. </a:t>
-            </a:r>
-          </a:p>
-          <a:p>
-            <a:pPr algn="just"/>
-            <a:r>
-              <a:rPr lang="en-US" dirty="0"/>
-              <a:t>Whether it’s a Advance Technology/ Product / Framework/ Solution to the existing Problem or a novel research, etc. </a:t>
+            <a:pPr marL="0" marR="0" lvl="0" indent="0" algn="l" defTabSz="914400" rtl="0" eaLnBrk="0" fontAlgn="base" latinLnBrk="0" hangingPunct="0">
+              <a:lnSpc>
+                <a:spcPct val="100000"/>
+              </a:lnSpc>
+              <a:spcBef>
+                <a:spcPct val="0"/>
+              </a:spcBef>
+              <a:spcAft>
+                <a:spcPct val="0"/>
+              </a:spcAft>
+              <a:buClrTx/>
+              <a:buSzTx/>
+              <a:buFontTx/>
+              <a:buChar char="•"/>
+              <a:tabLst/>
+            </a:pPr>
+            <a:r>
+              <a:rPr kumimoji="0" lang="en-US" altLang="en-US" b="1" i="0" u="none" strike="noStrike" cap="none" normalizeH="0" baseline="0" dirty="0">
+                <a:ln>
+                  <a:noFill/>
+                </a:ln>
+                <a:solidFill>
+                  <a:schemeClr val="tx1"/>
+                </a:solidFill>
+                <a:effectLst/>
+              </a:rPr>
+              <a:t>Visual Studio Code(VS Code):</a:t>
+            </a:r>
+            <a:br>
+              <a:rPr kumimoji="0" lang="en-US" altLang="en-US" b="0" i="0" u="none" strike="noStrike" cap="none" normalizeH="0" baseline="0" dirty="0">
+                <a:ln>
+                  <a:noFill/>
+                </a:ln>
+                <a:solidFill>
+                  <a:schemeClr val="tx1"/>
+                </a:solidFill>
+                <a:effectLst/>
+              </a:rPr>
+            </a:br>
+            <a:r>
+              <a:rPr kumimoji="0" lang="en-US" altLang="en-US" b="0" i="0" u="none" strike="noStrike" cap="none" normalizeH="0" baseline="0" dirty="0">
+                <a:ln>
+                  <a:noFill/>
+                </a:ln>
+                <a:solidFill>
+                  <a:schemeClr val="tx1"/>
+                </a:solidFill>
+                <a:effectLst/>
+              </a:rPr>
+              <a:t>	Lightweight code editor with extensions.</a:t>
+            </a:r>
+          </a:p>
+          <a:p>
+            <a:pPr marL="0" marR="0" lvl="0" indent="0" algn="l" defTabSz="914400" rtl="0" eaLnBrk="0" fontAlgn="base" latinLnBrk="0" hangingPunct="0">
+              <a:lnSpc>
+                <a:spcPct val="100000"/>
+              </a:lnSpc>
+              <a:spcBef>
+                <a:spcPct val="0"/>
+              </a:spcBef>
+              <a:spcAft>
+                <a:spcPct val="0"/>
+              </a:spcAft>
+              <a:buClrTx/>
+              <a:buSzTx/>
+              <a:buFontTx/>
+              <a:buChar char="•"/>
+              <a:tabLst/>
+            </a:pPr>
+            <a:r>
+              <a:rPr kumimoji="0" lang="en-US" altLang="en-US" b="1" i="0" u="none" strike="noStrike" cap="none" normalizeH="0" baseline="0" dirty="0">
+                <a:ln>
+                  <a:noFill/>
+                </a:ln>
+                <a:solidFill>
+                  <a:schemeClr val="tx1"/>
+                </a:solidFill>
+                <a:effectLst/>
+              </a:rPr>
+              <a:t>Figma:</a:t>
+            </a:r>
+            <a:br>
+              <a:rPr kumimoji="0" lang="en-US" altLang="en-US" b="0" i="0" u="none" strike="noStrike" cap="none" normalizeH="0" baseline="0" dirty="0">
+                <a:ln>
+                  <a:noFill/>
+                </a:ln>
+                <a:solidFill>
+                  <a:schemeClr val="tx1"/>
+                </a:solidFill>
+                <a:effectLst/>
+              </a:rPr>
+            </a:br>
+            <a:r>
+              <a:rPr kumimoji="0" lang="en-US" altLang="en-US" b="0" i="0" u="none" strike="noStrike" cap="none" normalizeH="0" baseline="0" dirty="0">
+                <a:ln>
+                  <a:noFill/>
+                </a:ln>
+                <a:solidFill>
+                  <a:schemeClr val="tx1"/>
+                </a:solidFill>
+                <a:effectLst/>
+              </a:rPr>
+              <a:t>	Design tool for collaborative UI/UX creation.</a:t>
+            </a:r>
+          </a:p>
+          <a:p>
+            <a:pPr marL="0" marR="0" lvl="0" indent="0" algn="l" defTabSz="914400" rtl="0" eaLnBrk="0" fontAlgn="base" latinLnBrk="0" hangingPunct="0">
+              <a:lnSpc>
+                <a:spcPct val="100000"/>
+              </a:lnSpc>
+              <a:spcBef>
+                <a:spcPct val="0"/>
+              </a:spcBef>
+              <a:spcAft>
+                <a:spcPct val="0"/>
+              </a:spcAft>
+              <a:buClrTx/>
+              <a:buSzTx/>
+              <a:buFontTx/>
+              <a:buChar char="•"/>
+              <a:tabLst/>
+            </a:pPr>
+            <a:r>
+              <a:rPr kumimoji="0" lang="en-US" altLang="en-US" b="1" i="0" u="none" strike="noStrike" cap="none" normalizeH="0" baseline="0" dirty="0">
+                <a:ln>
+                  <a:noFill/>
+                </a:ln>
+                <a:solidFill>
+                  <a:schemeClr val="tx1"/>
+                </a:solidFill>
+                <a:effectLst/>
+              </a:rPr>
+              <a:t>Miro:</a:t>
+            </a:r>
+            <a:br>
+              <a:rPr kumimoji="0" lang="en-US" altLang="en-US" b="0" i="0" u="none" strike="noStrike" cap="none" normalizeH="0" baseline="0" dirty="0">
+                <a:ln>
+                  <a:noFill/>
+                </a:ln>
+                <a:solidFill>
+                  <a:schemeClr val="tx1"/>
+                </a:solidFill>
+                <a:effectLst/>
+              </a:rPr>
+            </a:br>
+            <a:r>
+              <a:rPr kumimoji="0" lang="en-US" altLang="en-US" b="0" i="0" u="none" strike="noStrike" cap="none" normalizeH="0" baseline="0" dirty="0">
+                <a:ln>
+                  <a:noFill/>
+                </a:ln>
+                <a:solidFill>
+                  <a:schemeClr val="tx1"/>
+                </a:solidFill>
+                <a:effectLst/>
+              </a:rPr>
+              <a:t>	</a:t>
+            </a:r>
+            <a:r>
+              <a:rPr lang="en-US" altLang="en-US" dirty="0"/>
+              <a:t>C</a:t>
+            </a:r>
+            <a:r>
+              <a:rPr kumimoji="0" lang="en-US" altLang="en-US" b="0" i="0" u="none" strike="noStrike" cap="none" normalizeH="0" baseline="0" dirty="0">
+                <a:ln>
+                  <a:noFill/>
+                </a:ln>
+                <a:solidFill>
+                  <a:schemeClr val="tx1"/>
+                </a:solidFill>
+                <a:effectLst/>
+              </a:rPr>
+              <a:t>ollaborative whiteboard platform for mind mapping.</a:t>
+            </a:r>
+          </a:p>
+          <a:p>
+            <a:pPr marL="0" marR="0" lvl="0" indent="0" algn="l" defTabSz="914400" rtl="0" eaLnBrk="0" fontAlgn="base" latinLnBrk="0" hangingPunct="0">
+              <a:lnSpc>
+                <a:spcPct val="100000"/>
+              </a:lnSpc>
+              <a:spcBef>
+                <a:spcPct val="0"/>
+              </a:spcBef>
+              <a:spcAft>
+                <a:spcPct val="0"/>
+              </a:spcAft>
+              <a:buClrTx/>
+              <a:buSzTx/>
+              <a:buFontTx/>
+              <a:buChar char="•"/>
+              <a:tabLst/>
+            </a:pPr>
+            <a:r>
+              <a:rPr kumimoji="0" lang="en-US" altLang="en-US" b="1" i="0" u="none" strike="noStrike" cap="none" normalizeH="0" baseline="0" dirty="0">
+                <a:ln>
+                  <a:noFill/>
+                </a:ln>
+                <a:solidFill>
+                  <a:schemeClr val="tx1"/>
+                </a:solidFill>
+                <a:effectLst/>
+              </a:rPr>
+              <a:t>Draw.io:</a:t>
+            </a:r>
+            <a:br>
+              <a:rPr kumimoji="0" lang="en-US" altLang="en-US" b="0" i="0" u="none" strike="noStrike" cap="none" normalizeH="0" baseline="0" dirty="0">
+                <a:ln>
+                  <a:noFill/>
+                </a:ln>
+                <a:solidFill>
+                  <a:schemeClr val="tx1"/>
+                </a:solidFill>
+                <a:effectLst/>
+              </a:rPr>
+            </a:br>
+            <a:r>
+              <a:rPr kumimoji="0" lang="en-US" altLang="en-US" b="0" i="0" u="none" strike="noStrike" cap="none" normalizeH="0" baseline="0" dirty="0">
+                <a:ln>
+                  <a:noFill/>
+                </a:ln>
+                <a:solidFill>
+                  <a:schemeClr val="tx1"/>
+                </a:solidFill>
+                <a:effectLst/>
+              </a:rPr>
+              <a:t>	Diagramming tool for flowcharts and architecture.</a:t>
+            </a:r>
+          </a:p>
+          <a:p>
+            <a:pPr marL="0" marR="0" lvl="0" indent="0" algn="l" defTabSz="914400" rtl="0" eaLnBrk="0" fontAlgn="base" latinLnBrk="0" hangingPunct="0">
+              <a:lnSpc>
+                <a:spcPct val="100000"/>
+              </a:lnSpc>
+              <a:spcBef>
+                <a:spcPct val="0"/>
+              </a:spcBef>
+              <a:spcAft>
+                <a:spcPct val="0"/>
+              </a:spcAft>
+              <a:buClrTx/>
+              <a:buSzTx/>
+              <a:buFontTx/>
+              <a:buChar char="•"/>
+              <a:tabLst/>
+            </a:pPr>
+            <a:r>
+              <a:rPr kumimoji="0" lang="en-US" altLang="en-US" b="1" i="0" u="none" strike="noStrike" cap="none" normalizeH="0" baseline="0" dirty="0">
+                <a:ln>
+                  <a:noFill/>
+                </a:ln>
+                <a:solidFill>
+                  <a:schemeClr val="tx1"/>
+                </a:solidFill>
+                <a:effectLst/>
+              </a:rPr>
+              <a:t>Adobe Illustrator:</a:t>
+            </a:r>
+            <a:br>
+              <a:rPr kumimoji="0" lang="en-US" altLang="en-US" b="0" i="0" u="none" strike="noStrike" cap="none" normalizeH="0" baseline="0" dirty="0">
+                <a:ln>
+                  <a:noFill/>
+                </a:ln>
+                <a:solidFill>
+                  <a:schemeClr val="tx1"/>
+                </a:solidFill>
+                <a:effectLst/>
+              </a:rPr>
+            </a:br>
+            <a:r>
+              <a:rPr kumimoji="0" lang="en-US" altLang="en-US" b="0" i="0" u="none" strike="noStrike" cap="none" normalizeH="0" baseline="0" dirty="0">
+                <a:ln>
+                  <a:noFill/>
+                </a:ln>
+                <a:solidFill>
+                  <a:schemeClr val="tx1"/>
+                </a:solidFill>
+                <a:effectLst/>
+              </a:rPr>
+              <a:t>	Vector graphics editor for designs.</a:t>
             </a:r>
           </a:p>
         </p:txBody>
@@ -6600,7 +7248,7 @@
     </p:spTree>
     <p:extLst>
       <p:ext uri="{BB962C8B-B14F-4D97-AF65-F5344CB8AC3E}">
-        <p14:creationId xmlns:p14="http://schemas.microsoft.com/office/powerpoint/2010/main" val="1857402067"/>
+        <p14:creationId xmlns:p14="http://schemas.microsoft.com/office/powerpoint/2010/main" val="1158291609"/>
       </p:ext>
     </p:extLst>
   </p:cSld>
@@ -6637,6 +7285,1282 @@
             <p:ph type="title"/>
           </p:nvPr>
         </p:nvSpPr>
+        <p:spPr>
+          <a:xfrm>
+            <a:off x="838200" y="365125"/>
+            <a:ext cx="10515600" cy="980959"/>
+          </a:xfrm>
+        </p:spPr>
+        <p:txBody>
+          <a:bodyPr/>
+          <a:lstStyle/>
+          <a:p>
+            <a:r>
+              <a:rPr lang="en-US" b="1" dirty="0">
+                <a:solidFill>
+                  <a:srgbClr val="36ABF3"/>
+                </a:solidFill>
+              </a:rPr>
+              <a:t>Tools and Technologies</a:t>
+            </a:r>
+          </a:p>
+        </p:txBody>
+      </p:sp>
+      <p:cxnSp>
+        <p:nvCxnSpPr>
+          <p:cNvPr id="10" name="Straight Connector 9">
+            <a:extLst>
+              <a:ext uri="{FF2B5EF4-FFF2-40B4-BE49-F238E27FC236}">
+                <a16:creationId xmlns:a16="http://schemas.microsoft.com/office/drawing/2014/main" id="{5C4D56EA-8905-CAFF-FA8B-91B461D57C36}"/>
+              </a:ext>
+            </a:extLst>
+          </p:cNvPr>
+          <p:cNvCxnSpPr>
+            <a:cxnSpLocks/>
+          </p:cNvCxnSpPr>
+          <p:nvPr/>
+        </p:nvCxnSpPr>
+        <p:spPr>
+          <a:xfrm>
+            <a:off x="929640" y="1237129"/>
+            <a:ext cx="10332720" cy="0"/>
+          </a:xfrm>
+          <a:prstGeom prst="line">
+            <a:avLst/>
+          </a:prstGeom>
+          <a:ln w="28575"/>
+        </p:spPr>
+        <p:style>
+          <a:lnRef idx="3">
+            <a:schemeClr val="dk1"/>
+          </a:lnRef>
+          <a:fillRef idx="0">
+            <a:schemeClr val="dk1"/>
+          </a:fillRef>
+          <a:effectRef idx="2">
+            <a:schemeClr val="dk1"/>
+          </a:effectRef>
+          <a:fontRef idx="minor">
+            <a:schemeClr val="tx1"/>
+          </a:fontRef>
+        </p:style>
+      </p:cxnSp>
+      <p:sp>
+        <p:nvSpPr>
+          <p:cNvPr id="4" name="Title 1">
+            <a:extLst>
+              <a:ext uri="{FF2B5EF4-FFF2-40B4-BE49-F238E27FC236}">
+                <a16:creationId xmlns:a16="http://schemas.microsoft.com/office/drawing/2014/main" id="{7ED9CE21-68A5-DE6F-C9B3-F22A1957B184}"/>
+              </a:ext>
+            </a:extLst>
+          </p:cNvPr>
+          <p:cNvSpPr txBox="1">
+            <a:spLocks/>
+          </p:cNvSpPr>
+          <p:nvPr/>
+        </p:nvSpPr>
+        <p:spPr>
+          <a:xfrm>
+            <a:off x="838200" y="1305381"/>
+            <a:ext cx="10515600" cy="959083"/>
+          </a:xfrm>
+          <a:prstGeom prst="rect">
+            <a:avLst/>
+          </a:prstGeom>
+        </p:spPr>
+        <p:txBody>
+          <a:bodyPr vert="horz" lIns="91440" tIns="45720" rIns="91440" bIns="45720" rtlCol="0" anchor="ctr">
+            <a:normAutofit/>
+          </a:bodyPr>
+          <a:lstStyle>
+            <a:lvl1pPr algn="l" defTabSz="914400" rtl="0" eaLnBrk="1" latinLnBrk="0" hangingPunct="1">
+              <a:lnSpc>
+                <a:spcPct val="90000"/>
+              </a:lnSpc>
+              <a:spcBef>
+                <a:spcPct val="0"/>
+              </a:spcBef>
+              <a:buNone/>
+              <a:defRPr sz="4400" kern="1200">
+                <a:solidFill>
+                  <a:schemeClr val="tx1"/>
+                </a:solidFill>
+                <a:latin typeface="+mj-lt"/>
+                <a:ea typeface="+mj-ea"/>
+                <a:cs typeface="+mj-cs"/>
+              </a:defRPr>
+            </a:lvl1pPr>
+          </a:lstStyle>
+          <a:p>
+            <a:r>
+              <a:rPr lang="en-US" sz="3600" b="1" dirty="0">
+                <a:solidFill>
+                  <a:srgbClr val="F8981C"/>
+                </a:solidFill>
+              </a:rPr>
+              <a:t>Frontend Technologies</a:t>
+            </a:r>
+          </a:p>
+        </p:txBody>
+      </p:sp>
+      <p:sp>
+        <p:nvSpPr>
+          <p:cNvPr id="6" name="Rectangle 2">
+            <a:extLst>
+              <a:ext uri="{FF2B5EF4-FFF2-40B4-BE49-F238E27FC236}">
+                <a16:creationId xmlns:a16="http://schemas.microsoft.com/office/drawing/2014/main" id="{BBCC21A0-2438-C164-7D0B-B65D46E7BE94}"/>
+              </a:ext>
+            </a:extLst>
+          </p:cNvPr>
+          <p:cNvSpPr>
+            <a:spLocks noGrp="1" noChangeArrowheads="1"/>
+          </p:cNvSpPr>
+          <p:nvPr>
+            <p:ph idx="1"/>
+          </p:nvPr>
+        </p:nvSpPr>
+        <p:spPr bwMode="auto">
+          <a:xfrm>
+            <a:off x="838200" y="2221472"/>
+            <a:ext cx="5670177" cy="3929281"/>
+          </a:xfrm>
+          <a:prstGeom prst="rect">
+            <a:avLst/>
+          </a:prstGeom>
+          <a:noFill/>
+          <a:ln>
+            <a:noFill/>
+          </a:ln>
+          <a:effectLst/>
+          <a:extLst>
+            <a:ext uri="{909E8E84-426E-40DD-AFC4-6F175D3DCCD1}">
+              <a14:hiddenFill xmlns:a14="http://schemas.microsoft.com/office/drawing/2010/main">
+                <a:solidFill>
+                  <a:schemeClr val="accent1"/>
+                </a:solidFill>
+              </a14:hiddenFill>
+            </a:ext>
+            <a:ext uri="{91240B29-F687-4F45-9708-019B960494DF}">
+              <a14:hiddenLine xmlns:a14="http://schemas.microsoft.com/office/drawing/2010/main" w="9525">
+                <a:solidFill>
+                  <a:schemeClr val="tx1"/>
+                </a:solidFill>
+                <a:miter lim="800000"/>
+                <a:headEnd/>
+                <a:tailEnd/>
+              </a14:hiddenLine>
+            </a:ext>
+            <a:ext uri="{AF507438-7753-43E0-B8FC-AC1667EBCBE1}">
+              <a14:hiddenEffects xmlns:a14="http://schemas.microsoft.com/office/drawing/2010/main">
+                <a:effectLst>
+                  <a:outerShdw dist="35921" dir="2700000" algn="ctr" rotWithShape="0">
+                    <a:schemeClr val="bg2"/>
+                  </a:outerShdw>
+                </a:effectLst>
+              </a14:hiddenEffects>
+            </a:ext>
+          </a:extLst>
+        </p:spPr>
+        <p:txBody>
+          <a:bodyPr vert="horz" wrap="square" lIns="91440" tIns="45720" rIns="91440" bIns="45720" numCol="1" anchor="ctr" anchorCtr="0" compatLnSpc="1">
+            <a:prstTxWarp prst="textNoShape">
+              <a:avLst/>
+            </a:prstTxWarp>
+            <a:spAutoFit/>
+          </a:bodyPr>
+          <a:lstStyle/>
+          <a:p>
+            <a:pPr>
+              <a:buFont typeface="Arial" panose="020B0604020202020204" pitchFamily="34" charset="0"/>
+              <a:buChar char="•"/>
+            </a:pPr>
+            <a:r>
+              <a:rPr lang="en-US" sz="2400" b="1" dirty="0"/>
+              <a:t>HTML5:</a:t>
+            </a:r>
+            <a:br>
+              <a:rPr lang="en-US" sz="2400" dirty="0"/>
+            </a:br>
+            <a:r>
+              <a:rPr lang="en-US" sz="2400" dirty="0"/>
+              <a:t>Structuring web content.</a:t>
+            </a:r>
+          </a:p>
+          <a:p>
+            <a:pPr>
+              <a:buFont typeface="Arial" panose="020B0604020202020204" pitchFamily="34" charset="0"/>
+              <a:buChar char="•"/>
+            </a:pPr>
+            <a:r>
+              <a:rPr lang="en-US" sz="2400" b="1" dirty="0"/>
+              <a:t>CSS3:</a:t>
+            </a:r>
+            <a:br>
+              <a:rPr lang="en-US" sz="2400" dirty="0"/>
+            </a:br>
+            <a:r>
+              <a:rPr lang="en-US" sz="2400" dirty="0"/>
+              <a:t>Styling HTML elements.</a:t>
+            </a:r>
+          </a:p>
+          <a:p>
+            <a:pPr>
+              <a:buFont typeface="Arial" panose="020B0604020202020204" pitchFamily="34" charset="0"/>
+              <a:buChar char="•"/>
+            </a:pPr>
+            <a:r>
+              <a:rPr lang="en-US" sz="2400" b="1" dirty="0"/>
+              <a:t>Tailwind CSS:</a:t>
+            </a:r>
+            <a:br>
+              <a:rPr lang="en-US" sz="2400" dirty="0"/>
+            </a:br>
+            <a:r>
+              <a:rPr lang="en-US" sz="2400" dirty="0"/>
+              <a:t>Utility-first CSS framework for fast styling.</a:t>
+            </a:r>
+          </a:p>
+          <a:p>
+            <a:pPr>
+              <a:buFont typeface="Arial" panose="020B0604020202020204" pitchFamily="34" charset="0"/>
+              <a:buChar char="•"/>
+            </a:pPr>
+            <a:r>
+              <a:rPr lang="en-US" sz="2400" b="1" dirty="0"/>
+              <a:t>Bootstrap:</a:t>
+            </a:r>
+            <a:br>
+              <a:rPr lang="en-US" sz="2400" dirty="0"/>
+            </a:br>
+            <a:r>
+              <a:rPr lang="en-US" sz="2400" dirty="0"/>
+              <a:t>Responsive components and grid system.</a:t>
+            </a:r>
+          </a:p>
+          <a:p>
+            <a:pPr>
+              <a:buFont typeface="Arial" panose="020B0604020202020204" pitchFamily="34" charset="0"/>
+              <a:buChar char="•"/>
+            </a:pPr>
+            <a:r>
+              <a:rPr lang="en-US" sz="2400" b="1" dirty="0"/>
+              <a:t>JavaScript:</a:t>
+            </a:r>
+            <a:br>
+              <a:rPr lang="en-US" sz="2400" dirty="0"/>
+            </a:br>
+            <a:r>
+              <a:rPr lang="en-US" sz="2400" dirty="0"/>
+              <a:t>Logic and dynamic web interactions.</a:t>
+            </a:r>
+          </a:p>
+        </p:txBody>
+      </p:sp>
+      <p:sp>
+        <p:nvSpPr>
+          <p:cNvPr id="3" name="Rectangle 2">
+            <a:extLst>
+              <a:ext uri="{FF2B5EF4-FFF2-40B4-BE49-F238E27FC236}">
+                <a16:creationId xmlns:a16="http://schemas.microsoft.com/office/drawing/2014/main" id="{C7EE3E11-E7F7-2F29-5DD3-6BC8D3AB4BC7}"/>
+              </a:ext>
+            </a:extLst>
+          </p:cNvPr>
+          <p:cNvSpPr txBox="1">
+            <a:spLocks noChangeArrowheads="1"/>
+          </p:cNvSpPr>
+          <p:nvPr/>
+        </p:nvSpPr>
+        <p:spPr bwMode="auto">
+          <a:xfrm>
+            <a:off x="6508377" y="2269154"/>
+            <a:ext cx="5499847" cy="4057521"/>
+          </a:xfrm>
+          <a:prstGeom prst="rect">
+            <a:avLst/>
+          </a:prstGeom>
+          <a:noFill/>
+          <a:ln>
+            <a:noFill/>
+          </a:ln>
+          <a:effectLst/>
+          <a:extLst>
+            <a:ext uri="{909E8E84-426E-40DD-AFC4-6F175D3DCCD1}">
+              <a14:hiddenFill xmlns:a14="http://schemas.microsoft.com/office/drawing/2010/main">
+                <a:solidFill>
+                  <a:schemeClr val="accent1"/>
+                </a:solidFill>
+              </a14:hiddenFill>
+            </a:ext>
+            <a:ext uri="{91240B29-F687-4F45-9708-019B960494DF}">
+              <a14:hiddenLine xmlns:a14="http://schemas.microsoft.com/office/drawing/2010/main" w="9525">
+                <a:solidFill>
+                  <a:schemeClr val="tx1"/>
+                </a:solidFill>
+                <a:miter lim="800000"/>
+                <a:headEnd/>
+                <a:tailEnd/>
+              </a14:hiddenLine>
+            </a:ext>
+            <a:ext uri="{AF507438-7753-43E0-B8FC-AC1667EBCBE1}">
+              <a14:hiddenEffects xmlns:a14="http://schemas.microsoft.com/office/drawing/2010/main">
+                <a:effectLst>
+                  <a:outerShdw dist="35921" dir="2700000" algn="ctr" rotWithShape="0">
+                    <a:schemeClr val="bg2"/>
+                  </a:outerShdw>
+                </a:effectLst>
+              </a14:hiddenEffects>
+            </a:ext>
+          </a:extLst>
+        </p:spPr>
+        <p:txBody>
+          <a:bodyPr vert="horz" wrap="square" lIns="91440" tIns="45720" rIns="91440" bIns="45720" numCol="1" rtlCol="0" anchor="ctr" anchorCtr="0" compatLnSpc="1">
+            <a:prstTxWarp prst="textNoShape">
+              <a:avLst/>
+            </a:prstTxWarp>
+            <a:spAutoFit/>
+          </a:bodyPr>
+          <a:lstStyle>
+            <a:lvl1pPr marL="228600" indent="-228600" algn="l" defTabSz="914400" rtl="0" eaLnBrk="1" latinLnBrk="0" hangingPunct="1">
+              <a:lnSpc>
+                <a:spcPct val="90000"/>
+              </a:lnSpc>
+              <a:spcBef>
+                <a:spcPts val="1000"/>
+              </a:spcBef>
+              <a:buFont typeface="Arial" panose="020B0604020202020204" pitchFamily="34" charset="0"/>
+              <a:buChar char="•"/>
+              <a:defRPr sz="2800" kern="1200">
+                <a:solidFill>
+                  <a:schemeClr val="tx1"/>
+                </a:solidFill>
+                <a:latin typeface="+mn-lt"/>
+                <a:ea typeface="+mn-ea"/>
+                <a:cs typeface="+mn-cs"/>
+              </a:defRPr>
+            </a:lvl1pPr>
+            <a:lvl2pPr marL="685800" indent="-228600" algn="l" defTabSz="914400" rtl="0" eaLnBrk="1" latinLnBrk="0" hangingPunct="1">
+              <a:lnSpc>
+                <a:spcPct val="90000"/>
+              </a:lnSpc>
+              <a:spcBef>
+                <a:spcPts val="500"/>
+              </a:spcBef>
+              <a:buFont typeface="Arial" panose="020B0604020202020204" pitchFamily="34" charset="0"/>
+              <a:buChar char="•"/>
+              <a:defRPr sz="2400" kern="1200">
+                <a:solidFill>
+                  <a:schemeClr val="tx1"/>
+                </a:solidFill>
+                <a:latin typeface="+mn-lt"/>
+                <a:ea typeface="+mn-ea"/>
+                <a:cs typeface="+mn-cs"/>
+              </a:defRPr>
+            </a:lvl2pPr>
+            <a:lvl3pPr marL="1143000" indent="-228600" algn="l" defTabSz="914400" rtl="0" eaLnBrk="1" latinLnBrk="0" hangingPunct="1">
+              <a:lnSpc>
+                <a:spcPct val="90000"/>
+              </a:lnSpc>
+              <a:spcBef>
+                <a:spcPts val="500"/>
+              </a:spcBef>
+              <a:buFont typeface="Arial" panose="020B0604020202020204" pitchFamily="34" charset="0"/>
+              <a:buChar char="•"/>
+              <a:defRPr sz="2000" kern="1200">
+                <a:solidFill>
+                  <a:schemeClr val="tx1"/>
+                </a:solidFill>
+                <a:latin typeface="+mn-lt"/>
+                <a:ea typeface="+mn-ea"/>
+                <a:cs typeface="+mn-cs"/>
+              </a:defRPr>
+            </a:lvl3pPr>
+            <a:lvl4pPr marL="1600200" indent="-228600" algn="l" defTabSz="914400" rtl="0" eaLnBrk="1" latinLnBrk="0" hangingPunct="1">
+              <a:lnSpc>
+                <a:spcPct val="90000"/>
+              </a:lnSpc>
+              <a:spcBef>
+                <a:spcPts val="500"/>
+              </a:spcBef>
+              <a:buFont typeface="Arial" panose="020B0604020202020204" pitchFamily="34" charset="0"/>
+              <a:buChar char="•"/>
+              <a:defRPr sz="1800" kern="1200">
+                <a:solidFill>
+                  <a:schemeClr val="tx1"/>
+                </a:solidFill>
+                <a:latin typeface="+mn-lt"/>
+                <a:ea typeface="+mn-ea"/>
+                <a:cs typeface="+mn-cs"/>
+              </a:defRPr>
+            </a:lvl4pPr>
+            <a:lvl5pPr marL="2057400" indent="-228600" algn="l" defTabSz="914400" rtl="0" eaLnBrk="1" latinLnBrk="0" hangingPunct="1">
+              <a:lnSpc>
+                <a:spcPct val="90000"/>
+              </a:lnSpc>
+              <a:spcBef>
+                <a:spcPts val="500"/>
+              </a:spcBef>
+              <a:buFont typeface="Arial" panose="020B0604020202020204" pitchFamily="34" charset="0"/>
+              <a:buChar char="•"/>
+              <a:defRPr sz="1800" kern="1200">
+                <a:solidFill>
+                  <a:schemeClr val="tx1"/>
+                </a:solidFill>
+                <a:latin typeface="+mn-lt"/>
+                <a:ea typeface="+mn-ea"/>
+                <a:cs typeface="+mn-cs"/>
+              </a:defRPr>
+            </a:lvl5pPr>
+            <a:lvl6pPr marL="2514600" indent="-228600" algn="l" defTabSz="914400" rtl="0" eaLnBrk="1" latinLnBrk="0" hangingPunct="1">
+              <a:lnSpc>
+                <a:spcPct val="90000"/>
+              </a:lnSpc>
+              <a:spcBef>
+                <a:spcPts val="500"/>
+              </a:spcBef>
+              <a:buFont typeface="Arial" panose="020B0604020202020204" pitchFamily="34" charset="0"/>
+              <a:buChar char="•"/>
+              <a:defRPr sz="1800" kern="1200">
+                <a:solidFill>
+                  <a:schemeClr val="tx1"/>
+                </a:solidFill>
+                <a:latin typeface="+mn-lt"/>
+                <a:ea typeface="+mn-ea"/>
+                <a:cs typeface="+mn-cs"/>
+              </a:defRPr>
+            </a:lvl6pPr>
+            <a:lvl7pPr marL="2971800" indent="-228600" algn="l" defTabSz="914400" rtl="0" eaLnBrk="1" latinLnBrk="0" hangingPunct="1">
+              <a:lnSpc>
+                <a:spcPct val="90000"/>
+              </a:lnSpc>
+              <a:spcBef>
+                <a:spcPts val="500"/>
+              </a:spcBef>
+              <a:buFont typeface="Arial" panose="020B0604020202020204" pitchFamily="34" charset="0"/>
+              <a:buChar char="•"/>
+              <a:defRPr sz="1800" kern="1200">
+                <a:solidFill>
+                  <a:schemeClr val="tx1"/>
+                </a:solidFill>
+                <a:latin typeface="+mn-lt"/>
+                <a:ea typeface="+mn-ea"/>
+                <a:cs typeface="+mn-cs"/>
+              </a:defRPr>
+            </a:lvl7pPr>
+            <a:lvl8pPr marL="3429000" indent="-228600" algn="l" defTabSz="914400" rtl="0" eaLnBrk="1" latinLnBrk="0" hangingPunct="1">
+              <a:lnSpc>
+                <a:spcPct val="90000"/>
+              </a:lnSpc>
+              <a:spcBef>
+                <a:spcPts val="500"/>
+              </a:spcBef>
+              <a:buFont typeface="Arial" panose="020B0604020202020204" pitchFamily="34" charset="0"/>
+              <a:buChar char="•"/>
+              <a:defRPr sz="1800" kern="1200">
+                <a:solidFill>
+                  <a:schemeClr val="tx1"/>
+                </a:solidFill>
+                <a:latin typeface="+mn-lt"/>
+                <a:ea typeface="+mn-ea"/>
+                <a:cs typeface="+mn-cs"/>
+              </a:defRPr>
+            </a:lvl8pPr>
+            <a:lvl9pPr marL="3886200" indent="-228600" algn="l" defTabSz="914400" rtl="0" eaLnBrk="1" latinLnBrk="0" hangingPunct="1">
+              <a:lnSpc>
+                <a:spcPct val="90000"/>
+              </a:lnSpc>
+              <a:spcBef>
+                <a:spcPts val="500"/>
+              </a:spcBef>
+              <a:buFont typeface="Arial" panose="020B0604020202020204" pitchFamily="34" charset="0"/>
+              <a:buChar char="•"/>
+              <a:defRPr sz="1800" kern="1200">
+                <a:solidFill>
+                  <a:schemeClr val="tx1"/>
+                </a:solidFill>
+                <a:latin typeface="+mn-lt"/>
+                <a:ea typeface="+mn-ea"/>
+                <a:cs typeface="+mn-cs"/>
+              </a:defRPr>
+            </a:lvl9pPr>
+          </a:lstStyle>
+          <a:p>
+            <a:r>
+              <a:rPr lang="en-US" sz="2400" b="1" dirty="0"/>
+              <a:t>React JS:</a:t>
+            </a:r>
+            <a:br>
+              <a:rPr lang="en-US" sz="2400" dirty="0"/>
+            </a:br>
+            <a:r>
+              <a:rPr lang="en-US" sz="2400" dirty="0"/>
+              <a:t>Building efficient SPAs.</a:t>
+            </a:r>
+          </a:p>
+          <a:p>
+            <a:r>
+              <a:rPr lang="en-US" sz="2400" b="1" dirty="0"/>
+              <a:t>Redux Toolkit:</a:t>
+            </a:r>
+            <a:br>
+              <a:rPr lang="en-US" sz="2400" dirty="0"/>
+            </a:br>
+            <a:r>
+              <a:rPr lang="en-US" sz="2400" dirty="0"/>
+              <a:t>Centralized state management for React.</a:t>
+            </a:r>
+          </a:p>
+          <a:p>
+            <a:r>
+              <a:rPr lang="en-US" sz="2400" b="1" dirty="0"/>
+              <a:t>Material UI:</a:t>
+            </a:r>
+            <a:br>
+              <a:rPr lang="en-US" sz="2400" dirty="0"/>
+            </a:br>
+            <a:r>
+              <a:rPr lang="en-US" sz="2400" dirty="0"/>
+              <a:t>UI Components Library.</a:t>
+            </a:r>
+          </a:p>
+          <a:p>
+            <a:r>
+              <a:rPr lang="en-US" sz="2400" b="1" dirty="0"/>
+              <a:t>React Hook Form:</a:t>
+            </a:r>
+            <a:br>
+              <a:rPr lang="en-US" sz="2400" dirty="0"/>
+            </a:br>
+            <a:r>
+              <a:rPr lang="en-US" sz="2400" dirty="0"/>
+              <a:t>Simplifies form handling and validation.</a:t>
+            </a:r>
+          </a:p>
+          <a:p>
+            <a:r>
+              <a:rPr lang="en-US" sz="2400" b="1" dirty="0"/>
+              <a:t>TanStack query:</a:t>
+            </a:r>
+          </a:p>
+          <a:p>
+            <a:pPr marL="0" indent="0">
+              <a:buNone/>
+            </a:pPr>
+            <a:r>
+              <a:rPr lang="en-US" sz="2400" dirty="0"/>
+              <a:t>    Efficient API data management</a:t>
+            </a:r>
+          </a:p>
+        </p:txBody>
+      </p:sp>
+    </p:spTree>
+    <p:extLst>
+      <p:ext uri="{BB962C8B-B14F-4D97-AF65-F5344CB8AC3E}">
+        <p14:creationId xmlns:p14="http://schemas.microsoft.com/office/powerpoint/2010/main" val="2123551491"/>
+      </p:ext>
+    </p:extLst>
+  </p:cSld>
+  <p:clrMapOvr>
+    <a:masterClrMapping/>
+  </p:clrMapOvr>
+</p:sld>
+</file>
+
+<file path=ppt/slides/slide24.xml><?xml version="1.0" encoding="utf-8"?>
+<p:sld xmlns:a="http://schemas.openxmlformats.org/drawingml/2006/main" xmlns:r="http://schemas.openxmlformats.org/officeDocument/2006/relationships" xmlns:p="http://schemas.openxmlformats.org/presentationml/2006/main">
+  <p:cSld>
+    <p:spTree>
+      <p:nvGrpSpPr>
+        <p:cNvPr id="1" name=""/>
+        <p:cNvGrpSpPr/>
+        <p:nvPr/>
+      </p:nvGrpSpPr>
+      <p:grpSpPr>
+        <a:xfrm>
+          <a:off x="0" y="0"/>
+          <a:ext cx="0" cy="0"/>
+          <a:chOff x="0" y="0"/>
+          <a:chExt cx="0" cy="0"/>
+        </a:xfrm>
+      </p:grpSpPr>
+      <p:sp>
+        <p:nvSpPr>
+          <p:cNvPr id="2" name="Title 1"/>
+          <p:cNvSpPr>
+            <a:spLocks noGrp="1"/>
+          </p:cNvSpPr>
+          <p:nvPr>
+            <p:ph type="title"/>
+          </p:nvPr>
+        </p:nvSpPr>
+        <p:spPr>
+          <a:xfrm>
+            <a:off x="838200" y="365125"/>
+            <a:ext cx="10515600" cy="980959"/>
+          </a:xfrm>
+        </p:spPr>
+        <p:txBody>
+          <a:bodyPr/>
+          <a:lstStyle/>
+          <a:p>
+            <a:r>
+              <a:rPr lang="en-US" b="1" dirty="0">
+                <a:solidFill>
+                  <a:srgbClr val="36ABF3"/>
+                </a:solidFill>
+              </a:rPr>
+              <a:t>Tools and Technologies</a:t>
+            </a:r>
+          </a:p>
+        </p:txBody>
+      </p:sp>
+      <p:cxnSp>
+        <p:nvCxnSpPr>
+          <p:cNvPr id="10" name="Straight Connector 9">
+            <a:extLst>
+              <a:ext uri="{FF2B5EF4-FFF2-40B4-BE49-F238E27FC236}">
+                <a16:creationId xmlns:a16="http://schemas.microsoft.com/office/drawing/2014/main" id="{5C4D56EA-8905-CAFF-FA8B-91B461D57C36}"/>
+              </a:ext>
+            </a:extLst>
+          </p:cNvPr>
+          <p:cNvCxnSpPr>
+            <a:cxnSpLocks/>
+          </p:cNvCxnSpPr>
+          <p:nvPr/>
+        </p:nvCxnSpPr>
+        <p:spPr>
+          <a:xfrm>
+            <a:off x="929640" y="1237129"/>
+            <a:ext cx="10332720" cy="0"/>
+          </a:xfrm>
+          <a:prstGeom prst="line">
+            <a:avLst/>
+          </a:prstGeom>
+          <a:ln w="28575"/>
+        </p:spPr>
+        <p:style>
+          <a:lnRef idx="3">
+            <a:schemeClr val="dk1"/>
+          </a:lnRef>
+          <a:fillRef idx="0">
+            <a:schemeClr val="dk1"/>
+          </a:fillRef>
+          <a:effectRef idx="2">
+            <a:schemeClr val="dk1"/>
+          </a:effectRef>
+          <a:fontRef idx="minor">
+            <a:schemeClr val="tx1"/>
+          </a:fontRef>
+        </p:style>
+      </p:cxnSp>
+      <p:sp>
+        <p:nvSpPr>
+          <p:cNvPr id="4" name="Title 1">
+            <a:extLst>
+              <a:ext uri="{FF2B5EF4-FFF2-40B4-BE49-F238E27FC236}">
+                <a16:creationId xmlns:a16="http://schemas.microsoft.com/office/drawing/2014/main" id="{7ED9CE21-68A5-DE6F-C9B3-F22A1957B184}"/>
+              </a:ext>
+            </a:extLst>
+          </p:cNvPr>
+          <p:cNvSpPr txBox="1">
+            <a:spLocks/>
+          </p:cNvSpPr>
+          <p:nvPr/>
+        </p:nvSpPr>
+        <p:spPr>
+          <a:xfrm>
+            <a:off x="838200" y="1305381"/>
+            <a:ext cx="10515600" cy="959083"/>
+          </a:xfrm>
+          <a:prstGeom prst="rect">
+            <a:avLst/>
+          </a:prstGeom>
+        </p:spPr>
+        <p:txBody>
+          <a:bodyPr vert="horz" lIns="91440" tIns="45720" rIns="91440" bIns="45720" rtlCol="0" anchor="ctr">
+            <a:normAutofit/>
+          </a:bodyPr>
+          <a:lstStyle>
+            <a:lvl1pPr algn="l" defTabSz="914400" rtl="0" eaLnBrk="1" latinLnBrk="0" hangingPunct="1">
+              <a:lnSpc>
+                <a:spcPct val="90000"/>
+              </a:lnSpc>
+              <a:spcBef>
+                <a:spcPct val="0"/>
+              </a:spcBef>
+              <a:buNone/>
+              <a:defRPr sz="4400" kern="1200">
+                <a:solidFill>
+                  <a:schemeClr val="tx1"/>
+                </a:solidFill>
+                <a:latin typeface="+mj-lt"/>
+                <a:ea typeface="+mj-ea"/>
+                <a:cs typeface="+mj-cs"/>
+              </a:defRPr>
+            </a:lvl1pPr>
+          </a:lstStyle>
+          <a:p>
+            <a:r>
+              <a:rPr lang="en-US" sz="3600" b="1" dirty="0">
+                <a:solidFill>
+                  <a:srgbClr val="F8981C"/>
+                </a:solidFill>
+              </a:rPr>
+              <a:t>Backend Technologies</a:t>
+            </a:r>
+          </a:p>
+        </p:txBody>
+      </p:sp>
+      <p:sp>
+        <p:nvSpPr>
+          <p:cNvPr id="6" name="Rectangle 2">
+            <a:extLst>
+              <a:ext uri="{FF2B5EF4-FFF2-40B4-BE49-F238E27FC236}">
+                <a16:creationId xmlns:a16="http://schemas.microsoft.com/office/drawing/2014/main" id="{BBCC21A0-2438-C164-7D0B-B65D46E7BE94}"/>
+              </a:ext>
+            </a:extLst>
+          </p:cNvPr>
+          <p:cNvSpPr>
+            <a:spLocks noGrp="1" noChangeArrowheads="1"/>
+          </p:cNvSpPr>
+          <p:nvPr>
+            <p:ph idx="1"/>
+          </p:nvPr>
+        </p:nvSpPr>
+        <p:spPr bwMode="auto">
+          <a:xfrm>
+            <a:off x="929640" y="2069340"/>
+            <a:ext cx="10332720" cy="1771767"/>
+          </a:xfrm>
+          <a:prstGeom prst="rect">
+            <a:avLst/>
+          </a:prstGeom>
+          <a:noFill/>
+          <a:ln>
+            <a:noFill/>
+          </a:ln>
+          <a:effectLst/>
+          <a:extLst>
+            <a:ext uri="{909E8E84-426E-40DD-AFC4-6F175D3DCCD1}">
+              <a14:hiddenFill xmlns:a14="http://schemas.microsoft.com/office/drawing/2010/main">
+                <a:solidFill>
+                  <a:schemeClr val="accent1"/>
+                </a:solidFill>
+              </a14:hiddenFill>
+            </a:ext>
+            <a:ext uri="{91240B29-F687-4F45-9708-019B960494DF}">
+              <a14:hiddenLine xmlns:a14="http://schemas.microsoft.com/office/drawing/2010/main" w="9525">
+                <a:solidFill>
+                  <a:schemeClr val="tx1"/>
+                </a:solidFill>
+                <a:miter lim="800000"/>
+                <a:headEnd/>
+                <a:tailEnd/>
+              </a14:hiddenLine>
+            </a:ext>
+            <a:ext uri="{AF507438-7753-43E0-B8FC-AC1667EBCBE1}">
+              <a14:hiddenEffects xmlns:a14="http://schemas.microsoft.com/office/drawing/2010/main">
+                <a:effectLst>
+                  <a:outerShdw dist="35921" dir="2700000" algn="ctr" rotWithShape="0">
+                    <a:schemeClr val="bg2"/>
+                  </a:outerShdw>
+                </a:effectLst>
+              </a14:hiddenEffects>
+            </a:ext>
+          </a:extLst>
+        </p:spPr>
+        <p:txBody>
+          <a:bodyPr vert="horz" wrap="square" lIns="91440" tIns="45720" rIns="91440" bIns="45720" numCol="1" anchor="ctr" anchorCtr="0" compatLnSpc="1">
+            <a:prstTxWarp prst="textNoShape">
+              <a:avLst/>
+            </a:prstTxWarp>
+            <a:spAutoFit/>
+          </a:bodyPr>
+          <a:lstStyle/>
+          <a:p>
+            <a:pPr>
+              <a:buFont typeface="Arial" panose="020B0604020202020204" pitchFamily="34" charset="0"/>
+              <a:buChar char="•"/>
+            </a:pPr>
+            <a:r>
+              <a:rPr lang="en-US" b="1" dirty="0"/>
+              <a:t>Node JS:</a:t>
+            </a:r>
+            <a:br>
+              <a:rPr lang="en-US" dirty="0"/>
+            </a:br>
+            <a:r>
+              <a:rPr lang="en-US" dirty="0"/>
+              <a:t>	Scalable server-side JavaScript runtime.</a:t>
+            </a:r>
+          </a:p>
+          <a:p>
+            <a:pPr>
+              <a:buFont typeface="Arial" panose="020B0604020202020204" pitchFamily="34" charset="0"/>
+              <a:buChar char="•"/>
+            </a:pPr>
+            <a:r>
+              <a:rPr lang="en-US" b="1" dirty="0"/>
+              <a:t>Express JS:</a:t>
+            </a:r>
+            <a:br>
+              <a:rPr lang="en-US" dirty="0"/>
+            </a:br>
+            <a:r>
+              <a:rPr lang="en-US" dirty="0"/>
+              <a:t>	Minimalist Node.js web framework.</a:t>
+            </a:r>
+          </a:p>
+        </p:txBody>
+      </p:sp>
+      <p:sp>
+        <p:nvSpPr>
+          <p:cNvPr id="3" name="Title 1">
+            <a:extLst>
+              <a:ext uri="{FF2B5EF4-FFF2-40B4-BE49-F238E27FC236}">
+                <a16:creationId xmlns:a16="http://schemas.microsoft.com/office/drawing/2014/main" id="{1CF411AE-77B1-671F-4952-F0D3958ACB32}"/>
+              </a:ext>
+            </a:extLst>
+          </p:cNvPr>
+          <p:cNvSpPr txBox="1">
+            <a:spLocks/>
+          </p:cNvSpPr>
+          <p:nvPr/>
+        </p:nvSpPr>
+        <p:spPr>
+          <a:xfrm>
+            <a:off x="838200" y="3697989"/>
+            <a:ext cx="10515600" cy="959083"/>
+          </a:xfrm>
+          <a:prstGeom prst="rect">
+            <a:avLst/>
+          </a:prstGeom>
+        </p:spPr>
+        <p:txBody>
+          <a:bodyPr vert="horz" lIns="91440" tIns="45720" rIns="91440" bIns="45720" rtlCol="0" anchor="ctr">
+            <a:normAutofit/>
+          </a:bodyPr>
+          <a:lstStyle>
+            <a:lvl1pPr algn="l" defTabSz="914400" rtl="0" eaLnBrk="1" latinLnBrk="0" hangingPunct="1">
+              <a:lnSpc>
+                <a:spcPct val="90000"/>
+              </a:lnSpc>
+              <a:spcBef>
+                <a:spcPct val="0"/>
+              </a:spcBef>
+              <a:buNone/>
+              <a:defRPr sz="4400" kern="1200">
+                <a:solidFill>
+                  <a:schemeClr val="tx1"/>
+                </a:solidFill>
+                <a:latin typeface="+mj-lt"/>
+                <a:ea typeface="+mj-ea"/>
+                <a:cs typeface="+mj-cs"/>
+              </a:defRPr>
+            </a:lvl1pPr>
+          </a:lstStyle>
+          <a:p>
+            <a:r>
+              <a:rPr lang="en-US" sz="3600" b="1" dirty="0">
+                <a:solidFill>
+                  <a:srgbClr val="F8981C"/>
+                </a:solidFill>
+              </a:rPr>
+              <a:t>Database</a:t>
+            </a:r>
+          </a:p>
+        </p:txBody>
+      </p:sp>
+      <p:sp>
+        <p:nvSpPr>
+          <p:cNvPr id="7" name="Rectangle 2">
+            <a:extLst>
+              <a:ext uri="{FF2B5EF4-FFF2-40B4-BE49-F238E27FC236}">
+                <a16:creationId xmlns:a16="http://schemas.microsoft.com/office/drawing/2014/main" id="{E398315F-324B-6AEE-429E-AB60A6A9E997}"/>
+              </a:ext>
+            </a:extLst>
+          </p:cNvPr>
+          <p:cNvSpPr txBox="1">
+            <a:spLocks noChangeArrowheads="1"/>
+          </p:cNvSpPr>
+          <p:nvPr/>
+        </p:nvSpPr>
+        <p:spPr bwMode="auto">
+          <a:xfrm>
+            <a:off x="929640" y="4388748"/>
+            <a:ext cx="10332720" cy="1771767"/>
+          </a:xfrm>
+          <a:prstGeom prst="rect">
+            <a:avLst/>
+          </a:prstGeom>
+          <a:noFill/>
+          <a:ln>
+            <a:noFill/>
+          </a:ln>
+          <a:effectLst/>
+          <a:extLst>
+            <a:ext uri="{909E8E84-426E-40DD-AFC4-6F175D3DCCD1}">
+              <a14:hiddenFill xmlns:a14="http://schemas.microsoft.com/office/drawing/2010/main">
+                <a:solidFill>
+                  <a:schemeClr val="accent1"/>
+                </a:solidFill>
+              </a14:hiddenFill>
+            </a:ext>
+            <a:ext uri="{91240B29-F687-4F45-9708-019B960494DF}">
+              <a14:hiddenLine xmlns:a14="http://schemas.microsoft.com/office/drawing/2010/main" w="9525">
+                <a:solidFill>
+                  <a:schemeClr val="tx1"/>
+                </a:solidFill>
+                <a:miter lim="800000"/>
+                <a:headEnd/>
+                <a:tailEnd/>
+              </a14:hiddenLine>
+            </a:ext>
+            <a:ext uri="{AF507438-7753-43E0-B8FC-AC1667EBCBE1}">
+              <a14:hiddenEffects xmlns:a14="http://schemas.microsoft.com/office/drawing/2010/main">
+                <a:effectLst>
+                  <a:outerShdw dist="35921" dir="2700000" algn="ctr" rotWithShape="0">
+                    <a:schemeClr val="bg2"/>
+                  </a:outerShdw>
+                </a:effectLst>
+              </a14:hiddenEffects>
+            </a:ext>
+          </a:extLst>
+        </p:spPr>
+        <p:txBody>
+          <a:bodyPr vert="horz" wrap="square" lIns="91440" tIns="45720" rIns="91440" bIns="45720" numCol="1" rtlCol="0" anchor="ctr" anchorCtr="0" compatLnSpc="1">
+            <a:prstTxWarp prst="textNoShape">
+              <a:avLst/>
+            </a:prstTxWarp>
+            <a:spAutoFit/>
+          </a:bodyPr>
+          <a:lstStyle>
+            <a:lvl1pPr marL="228600" indent="-228600" algn="l" defTabSz="914400" rtl="0" eaLnBrk="1" latinLnBrk="0" hangingPunct="1">
+              <a:lnSpc>
+                <a:spcPct val="90000"/>
+              </a:lnSpc>
+              <a:spcBef>
+                <a:spcPts val="1000"/>
+              </a:spcBef>
+              <a:buFont typeface="Arial" panose="020B0604020202020204" pitchFamily="34" charset="0"/>
+              <a:buChar char="•"/>
+              <a:defRPr sz="2800" kern="1200">
+                <a:solidFill>
+                  <a:schemeClr val="tx1"/>
+                </a:solidFill>
+                <a:latin typeface="+mn-lt"/>
+                <a:ea typeface="+mn-ea"/>
+                <a:cs typeface="+mn-cs"/>
+              </a:defRPr>
+            </a:lvl1pPr>
+            <a:lvl2pPr marL="685800" indent="-228600" algn="l" defTabSz="914400" rtl="0" eaLnBrk="1" latinLnBrk="0" hangingPunct="1">
+              <a:lnSpc>
+                <a:spcPct val="90000"/>
+              </a:lnSpc>
+              <a:spcBef>
+                <a:spcPts val="500"/>
+              </a:spcBef>
+              <a:buFont typeface="Arial" panose="020B0604020202020204" pitchFamily="34" charset="0"/>
+              <a:buChar char="•"/>
+              <a:defRPr sz="2400" kern="1200">
+                <a:solidFill>
+                  <a:schemeClr val="tx1"/>
+                </a:solidFill>
+                <a:latin typeface="+mn-lt"/>
+                <a:ea typeface="+mn-ea"/>
+                <a:cs typeface="+mn-cs"/>
+              </a:defRPr>
+            </a:lvl2pPr>
+            <a:lvl3pPr marL="1143000" indent="-228600" algn="l" defTabSz="914400" rtl="0" eaLnBrk="1" latinLnBrk="0" hangingPunct="1">
+              <a:lnSpc>
+                <a:spcPct val="90000"/>
+              </a:lnSpc>
+              <a:spcBef>
+                <a:spcPts val="500"/>
+              </a:spcBef>
+              <a:buFont typeface="Arial" panose="020B0604020202020204" pitchFamily="34" charset="0"/>
+              <a:buChar char="•"/>
+              <a:defRPr sz="2000" kern="1200">
+                <a:solidFill>
+                  <a:schemeClr val="tx1"/>
+                </a:solidFill>
+                <a:latin typeface="+mn-lt"/>
+                <a:ea typeface="+mn-ea"/>
+                <a:cs typeface="+mn-cs"/>
+              </a:defRPr>
+            </a:lvl3pPr>
+            <a:lvl4pPr marL="1600200" indent="-228600" algn="l" defTabSz="914400" rtl="0" eaLnBrk="1" latinLnBrk="0" hangingPunct="1">
+              <a:lnSpc>
+                <a:spcPct val="90000"/>
+              </a:lnSpc>
+              <a:spcBef>
+                <a:spcPts val="500"/>
+              </a:spcBef>
+              <a:buFont typeface="Arial" panose="020B0604020202020204" pitchFamily="34" charset="0"/>
+              <a:buChar char="•"/>
+              <a:defRPr sz="1800" kern="1200">
+                <a:solidFill>
+                  <a:schemeClr val="tx1"/>
+                </a:solidFill>
+                <a:latin typeface="+mn-lt"/>
+                <a:ea typeface="+mn-ea"/>
+                <a:cs typeface="+mn-cs"/>
+              </a:defRPr>
+            </a:lvl4pPr>
+            <a:lvl5pPr marL="2057400" indent="-228600" algn="l" defTabSz="914400" rtl="0" eaLnBrk="1" latinLnBrk="0" hangingPunct="1">
+              <a:lnSpc>
+                <a:spcPct val="90000"/>
+              </a:lnSpc>
+              <a:spcBef>
+                <a:spcPts val="500"/>
+              </a:spcBef>
+              <a:buFont typeface="Arial" panose="020B0604020202020204" pitchFamily="34" charset="0"/>
+              <a:buChar char="•"/>
+              <a:defRPr sz="1800" kern="1200">
+                <a:solidFill>
+                  <a:schemeClr val="tx1"/>
+                </a:solidFill>
+                <a:latin typeface="+mn-lt"/>
+                <a:ea typeface="+mn-ea"/>
+                <a:cs typeface="+mn-cs"/>
+              </a:defRPr>
+            </a:lvl5pPr>
+            <a:lvl6pPr marL="2514600" indent="-228600" algn="l" defTabSz="914400" rtl="0" eaLnBrk="1" latinLnBrk="0" hangingPunct="1">
+              <a:lnSpc>
+                <a:spcPct val="90000"/>
+              </a:lnSpc>
+              <a:spcBef>
+                <a:spcPts val="500"/>
+              </a:spcBef>
+              <a:buFont typeface="Arial" panose="020B0604020202020204" pitchFamily="34" charset="0"/>
+              <a:buChar char="•"/>
+              <a:defRPr sz="1800" kern="1200">
+                <a:solidFill>
+                  <a:schemeClr val="tx1"/>
+                </a:solidFill>
+                <a:latin typeface="+mn-lt"/>
+                <a:ea typeface="+mn-ea"/>
+                <a:cs typeface="+mn-cs"/>
+              </a:defRPr>
+            </a:lvl6pPr>
+            <a:lvl7pPr marL="2971800" indent="-228600" algn="l" defTabSz="914400" rtl="0" eaLnBrk="1" latinLnBrk="0" hangingPunct="1">
+              <a:lnSpc>
+                <a:spcPct val="90000"/>
+              </a:lnSpc>
+              <a:spcBef>
+                <a:spcPts val="500"/>
+              </a:spcBef>
+              <a:buFont typeface="Arial" panose="020B0604020202020204" pitchFamily="34" charset="0"/>
+              <a:buChar char="•"/>
+              <a:defRPr sz="1800" kern="1200">
+                <a:solidFill>
+                  <a:schemeClr val="tx1"/>
+                </a:solidFill>
+                <a:latin typeface="+mn-lt"/>
+                <a:ea typeface="+mn-ea"/>
+                <a:cs typeface="+mn-cs"/>
+              </a:defRPr>
+            </a:lvl7pPr>
+            <a:lvl8pPr marL="3429000" indent="-228600" algn="l" defTabSz="914400" rtl="0" eaLnBrk="1" latinLnBrk="0" hangingPunct="1">
+              <a:lnSpc>
+                <a:spcPct val="90000"/>
+              </a:lnSpc>
+              <a:spcBef>
+                <a:spcPts val="500"/>
+              </a:spcBef>
+              <a:buFont typeface="Arial" panose="020B0604020202020204" pitchFamily="34" charset="0"/>
+              <a:buChar char="•"/>
+              <a:defRPr sz="1800" kern="1200">
+                <a:solidFill>
+                  <a:schemeClr val="tx1"/>
+                </a:solidFill>
+                <a:latin typeface="+mn-lt"/>
+                <a:ea typeface="+mn-ea"/>
+                <a:cs typeface="+mn-cs"/>
+              </a:defRPr>
+            </a:lvl8pPr>
+            <a:lvl9pPr marL="3886200" indent="-228600" algn="l" defTabSz="914400" rtl="0" eaLnBrk="1" latinLnBrk="0" hangingPunct="1">
+              <a:lnSpc>
+                <a:spcPct val="90000"/>
+              </a:lnSpc>
+              <a:spcBef>
+                <a:spcPts val="500"/>
+              </a:spcBef>
+              <a:buFont typeface="Arial" panose="020B0604020202020204" pitchFamily="34" charset="0"/>
+              <a:buChar char="•"/>
+              <a:defRPr sz="1800" kern="1200">
+                <a:solidFill>
+                  <a:schemeClr val="tx1"/>
+                </a:solidFill>
+                <a:latin typeface="+mn-lt"/>
+                <a:ea typeface="+mn-ea"/>
+                <a:cs typeface="+mn-cs"/>
+              </a:defRPr>
+            </a:lvl9pPr>
+          </a:lstStyle>
+          <a:p>
+            <a:pPr>
+              <a:buFont typeface="Arial" panose="020B0604020202020204" pitchFamily="34" charset="0"/>
+              <a:buChar char="•"/>
+            </a:pPr>
+            <a:r>
+              <a:rPr lang="en-US" b="1" dirty="0"/>
+              <a:t>MongoDB:</a:t>
+            </a:r>
+            <a:br>
+              <a:rPr lang="en-US" dirty="0"/>
+            </a:br>
+            <a:r>
+              <a:rPr lang="en-US" dirty="0"/>
+              <a:t>	Scalable NoSQL database for unstructured data.</a:t>
+            </a:r>
+          </a:p>
+          <a:p>
+            <a:pPr>
+              <a:buFont typeface="Arial" panose="020B0604020202020204" pitchFamily="34" charset="0"/>
+              <a:buChar char="•"/>
+            </a:pPr>
+            <a:r>
+              <a:rPr lang="en-US" b="1" dirty="0"/>
+              <a:t>Mongoose:</a:t>
+            </a:r>
+            <a:br>
+              <a:rPr lang="en-US" dirty="0"/>
+            </a:br>
+            <a:r>
+              <a:rPr lang="en-US" dirty="0"/>
+              <a:t>	ODM(Object Document Mapper) for MongoDB.</a:t>
+            </a:r>
+          </a:p>
+        </p:txBody>
+      </p:sp>
+    </p:spTree>
+    <p:extLst>
+      <p:ext uri="{BB962C8B-B14F-4D97-AF65-F5344CB8AC3E}">
+        <p14:creationId xmlns:p14="http://schemas.microsoft.com/office/powerpoint/2010/main" val="2090728091"/>
+      </p:ext>
+    </p:extLst>
+  </p:cSld>
+  <p:clrMapOvr>
+    <a:masterClrMapping/>
+  </p:clrMapOvr>
+</p:sld>
+</file>
+
+<file path=ppt/slides/slide25.xml><?xml version="1.0" encoding="utf-8"?>
+<p:sld xmlns:a="http://schemas.openxmlformats.org/drawingml/2006/main" xmlns:r="http://schemas.openxmlformats.org/officeDocument/2006/relationships" xmlns:p="http://schemas.openxmlformats.org/presentationml/2006/main">
+  <p:cSld>
+    <p:spTree>
+      <p:nvGrpSpPr>
+        <p:cNvPr id="1" name=""/>
+        <p:cNvGrpSpPr/>
+        <p:nvPr/>
+      </p:nvGrpSpPr>
+      <p:grpSpPr>
+        <a:xfrm>
+          <a:off x="0" y="0"/>
+          <a:ext cx="0" cy="0"/>
+          <a:chOff x="0" y="0"/>
+          <a:chExt cx="0" cy="0"/>
+        </a:xfrm>
+      </p:grpSpPr>
+      <p:sp>
+        <p:nvSpPr>
+          <p:cNvPr id="2" name="Title 1"/>
+          <p:cNvSpPr>
+            <a:spLocks noGrp="1"/>
+          </p:cNvSpPr>
+          <p:nvPr>
+            <p:ph type="title"/>
+          </p:nvPr>
+        </p:nvSpPr>
+        <p:spPr/>
+        <p:txBody>
+          <a:bodyPr/>
+          <a:lstStyle/>
+          <a:p>
+            <a:r>
+              <a:rPr lang="en-US" b="1" dirty="0">
+                <a:solidFill>
+                  <a:schemeClr val="accent1">
+                    <a:lumMod val="75000"/>
+                  </a:schemeClr>
+                </a:solidFill>
+              </a:rPr>
+              <a:t>Final Outcome</a:t>
+            </a:r>
+          </a:p>
+        </p:txBody>
+      </p:sp>
+      <p:sp>
+        <p:nvSpPr>
+          <p:cNvPr id="3" name="Content Placeholder 2"/>
+          <p:cNvSpPr>
+            <a:spLocks noGrp="1"/>
+          </p:cNvSpPr>
+          <p:nvPr>
+            <p:ph idx="1"/>
+          </p:nvPr>
+        </p:nvSpPr>
+        <p:spPr/>
+        <p:txBody>
+          <a:bodyPr/>
+          <a:lstStyle/>
+          <a:p>
+            <a:pPr algn="just"/>
+            <a:r>
+              <a:rPr lang="en-US" dirty="0"/>
+              <a:t>Describe shortly the nature of your project outcome. </a:t>
+            </a:r>
+          </a:p>
+          <a:p>
+            <a:pPr algn="just"/>
+            <a:r>
+              <a:rPr lang="en-US" dirty="0"/>
+              <a:t>Whether it’s a Advance Technology/ Product / Framework/ Solution to the existing Problem or a novel research, etc. </a:t>
+            </a:r>
+          </a:p>
+        </p:txBody>
+      </p:sp>
+    </p:spTree>
+    <p:extLst>
+      <p:ext uri="{BB962C8B-B14F-4D97-AF65-F5344CB8AC3E}">
+        <p14:creationId xmlns:p14="http://schemas.microsoft.com/office/powerpoint/2010/main" val="1857402067"/>
+      </p:ext>
+    </p:extLst>
+  </p:cSld>
+  <p:clrMapOvr>
+    <a:masterClrMapping/>
+  </p:clrMapOvr>
+</p:sld>
+</file>
+
+<file path=ppt/slides/slide26.xml><?xml version="1.0" encoding="utf-8"?>
+<p:sld xmlns:a="http://schemas.openxmlformats.org/drawingml/2006/main" xmlns:r="http://schemas.openxmlformats.org/officeDocument/2006/relationships" xmlns:p="http://schemas.openxmlformats.org/presentationml/2006/main">
+  <p:cSld>
+    <p:spTree>
+      <p:nvGrpSpPr>
+        <p:cNvPr id="1" name=""/>
+        <p:cNvGrpSpPr/>
+        <p:nvPr/>
+      </p:nvGrpSpPr>
+      <p:grpSpPr>
+        <a:xfrm>
+          <a:off x="0" y="0"/>
+          <a:ext cx="0" cy="0"/>
+          <a:chOff x="0" y="0"/>
+          <a:chExt cx="0" cy="0"/>
+        </a:xfrm>
+      </p:grpSpPr>
+      <p:sp>
+        <p:nvSpPr>
+          <p:cNvPr id="2" name="Title 1"/>
+          <p:cNvSpPr>
+            <a:spLocks noGrp="1"/>
+          </p:cNvSpPr>
+          <p:nvPr>
+            <p:ph type="title"/>
+          </p:nvPr>
+        </p:nvSpPr>
         <p:spPr/>
         <p:txBody>
           <a:bodyPr/>
@@ -6732,7 +8656,7 @@
 </p:sld>
 </file>
 
-<file path=ppt/slides/slide24.xml><?xml version="1.0" encoding="utf-8"?>
+<file path=ppt/slides/slide27.xml><?xml version="1.0" encoding="utf-8"?>
 <p:sld xmlns:a="http://schemas.openxmlformats.org/drawingml/2006/main" xmlns:r="http://schemas.openxmlformats.org/officeDocument/2006/relationships" xmlns:p="http://schemas.openxmlformats.org/presentationml/2006/main">
   <p:cSld>
     <p:spTree>

</xml_diff>

<commit_message>
Update Tools and Technologies
</commit_message>
<xml_diff>
--- a/4- Idea Evaluation/Idea Evaluation Slides (Filled).pptx
+++ b/4- Idea Evaluation/Idea Evaluation Slides (Filled).pptx
@@ -30,7 +30,7 @@
     <p:sldId id="266" r:id="rId21"/>
     <p:sldId id="267" r:id="rId22"/>
     <p:sldId id="284" r:id="rId23"/>
-    <p:sldId id="285" r:id="rId24"/>
+    <p:sldId id="287" r:id="rId24"/>
     <p:sldId id="286" r:id="rId25"/>
     <p:sldId id="268" r:id="rId26"/>
     <p:sldId id="261" r:id="rId27"/>
@@ -6980,7 +6980,7 @@
               <a:tabLst/>
             </a:pPr>
             <a:r>
-              <a:rPr kumimoji="0" lang="en-US" altLang="en-US" b="1" i="0" u="none" strike="noStrike" cap="none" normalizeH="0" baseline="0" dirty="0">
+              <a:rPr kumimoji="0" lang="en-US" altLang="en-US" i="0" u="none" strike="noStrike" cap="none" normalizeH="0" baseline="0" dirty="0">
                 <a:ln>
                   <a:noFill/>
                 </a:ln>
@@ -6992,7 +6992,7 @@
               <a:t>Visual Studio Code(VS Code):</a:t>
             </a:r>
             <a:br>
-              <a:rPr kumimoji="0" lang="en-US" altLang="en-US" b="0" i="0" u="none" strike="noStrike" cap="none" normalizeH="0" baseline="0" dirty="0">
+              <a:rPr kumimoji="0" lang="en-US" altLang="en-US" i="0" u="none" strike="noStrike" cap="none" normalizeH="0" baseline="0" dirty="0">
                 <a:ln>
                   <a:noFill/>
                 </a:ln>
@@ -7003,7 +7003,7 @@
               </a:rPr>
             </a:br>
             <a:r>
-              <a:rPr kumimoji="0" lang="en-US" altLang="en-US" b="0" i="0" u="none" strike="noStrike" cap="none" normalizeH="0" baseline="0" dirty="0">
+              <a:rPr kumimoji="0" lang="en-US" altLang="en-US" i="0" u="none" strike="noStrike" cap="none" normalizeH="0" baseline="0" dirty="0">
                 <a:ln>
                   <a:noFill/>
                 </a:ln>
@@ -7033,7 +7033,7 @@
               <a:tabLst/>
             </a:pPr>
             <a:r>
-              <a:rPr kumimoji="0" lang="en-US" altLang="en-US" b="1" i="0" u="none" strike="noStrike" cap="none" normalizeH="0" baseline="0" dirty="0">
+              <a:rPr kumimoji="0" lang="en-US" altLang="en-US" i="0" u="none" strike="noStrike" cap="none" normalizeH="0" baseline="0" dirty="0">
                 <a:ln>
                   <a:noFill/>
                 </a:ln>
@@ -7045,7 +7045,7 @@
               <a:t>Figma:</a:t>
             </a:r>
             <a:br>
-              <a:rPr kumimoji="0" lang="en-US" altLang="en-US" b="0" i="0" u="none" strike="noStrike" cap="none" normalizeH="0" baseline="0" dirty="0">
+              <a:rPr kumimoji="0" lang="en-US" altLang="en-US" i="0" u="none" strike="noStrike" cap="none" normalizeH="0" baseline="0" dirty="0">
                 <a:ln>
                   <a:noFill/>
                 </a:ln>
@@ -7056,7 +7056,7 @@
               </a:rPr>
             </a:br>
             <a:r>
-              <a:rPr kumimoji="0" lang="en-US" altLang="en-US" b="0" i="0" u="none" strike="noStrike" cap="none" normalizeH="0" baseline="0" dirty="0">
+              <a:rPr kumimoji="0" lang="en-US" altLang="en-US" i="0" u="none" strike="noStrike" cap="none" normalizeH="0" baseline="0" dirty="0">
                 <a:ln>
                   <a:noFill/>
                 </a:ln>
@@ -7086,7 +7086,7 @@
               <a:tabLst/>
             </a:pPr>
             <a:r>
-              <a:rPr kumimoji="0" lang="en-US" altLang="en-US" b="1" i="0" u="none" strike="noStrike" cap="none" normalizeH="0" baseline="0" dirty="0">
+              <a:rPr kumimoji="0" lang="en-US" altLang="en-US" i="0" u="none" strike="noStrike" cap="none" normalizeH="0" baseline="0" dirty="0">
                 <a:ln>
                   <a:noFill/>
                 </a:ln>
@@ -7098,7 +7098,7 @@
               <a:t>Miro:</a:t>
             </a:r>
             <a:br>
-              <a:rPr kumimoji="0" lang="en-US" altLang="en-US" b="0" i="0" u="none" strike="noStrike" cap="none" normalizeH="0" baseline="0" dirty="0">
+              <a:rPr kumimoji="0" lang="en-US" altLang="en-US" i="0" u="none" strike="noStrike" cap="none" normalizeH="0" baseline="0" dirty="0">
                 <a:ln>
                   <a:noFill/>
                 </a:ln>
@@ -7109,7 +7109,7 @@
               </a:rPr>
             </a:br>
             <a:r>
-              <a:rPr kumimoji="0" lang="en-US" altLang="en-US" b="0" i="0" u="none" strike="noStrike" cap="none" normalizeH="0" baseline="0" dirty="0">
+              <a:rPr kumimoji="0" lang="en-US" altLang="en-US" i="0" u="none" strike="noStrike" cap="none" normalizeH="0" baseline="0" dirty="0">
                 <a:ln>
                   <a:noFill/>
                 </a:ln>
@@ -7125,7 +7125,7 @@
               <a:t>C</a:t>
             </a:r>
             <a:r>
-              <a:rPr kumimoji="0" lang="en-US" altLang="en-US" b="0" i="0" u="none" strike="noStrike" cap="none" normalizeH="0" baseline="0" dirty="0">
+              <a:rPr kumimoji="0" lang="en-US" altLang="en-US" i="0" u="none" strike="noStrike" cap="none" normalizeH="0" baseline="0" dirty="0">
                 <a:ln>
                   <a:noFill/>
                 </a:ln>
@@ -7155,7 +7155,7 @@
               <a:tabLst/>
             </a:pPr>
             <a:r>
-              <a:rPr kumimoji="0" lang="en-US" altLang="en-US" b="1" i="0" u="none" strike="noStrike" cap="none" normalizeH="0" baseline="0" dirty="0">
+              <a:rPr kumimoji="0" lang="en-US" altLang="en-US" i="0" u="none" strike="noStrike" cap="none" normalizeH="0" baseline="0" dirty="0">
                 <a:ln>
                   <a:noFill/>
                 </a:ln>
@@ -7167,7 +7167,7 @@
               <a:t>Draw.io:</a:t>
             </a:r>
             <a:br>
-              <a:rPr kumimoji="0" lang="en-US" altLang="en-US" b="0" i="0" u="none" strike="noStrike" cap="none" normalizeH="0" baseline="0" dirty="0">
+              <a:rPr kumimoji="0" lang="en-US" altLang="en-US" i="0" u="none" strike="noStrike" cap="none" normalizeH="0" baseline="0" dirty="0">
                 <a:ln>
                   <a:noFill/>
                 </a:ln>
@@ -7178,7 +7178,7 @@
               </a:rPr>
             </a:br>
             <a:r>
-              <a:rPr kumimoji="0" lang="en-US" altLang="en-US" b="0" i="0" u="none" strike="noStrike" cap="none" normalizeH="0" baseline="0" dirty="0">
+              <a:rPr kumimoji="0" lang="en-US" altLang="en-US" i="0" u="none" strike="noStrike" cap="none" normalizeH="0" baseline="0" dirty="0">
                 <a:ln>
                   <a:noFill/>
                 </a:ln>
@@ -7208,7 +7208,7 @@
               <a:tabLst/>
             </a:pPr>
             <a:r>
-              <a:rPr kumimoji="0" lang="en-US" altLang="en-US" b="1" i="0" u="none" strike="noStrike" cap="none" normalizeH="0" baseline="0" dirty="0">
+              <a:rPr kumimoji="0" lang="en-US" altLang="en-US" i="0" u="none" strike="noStrike" cap="none" normalizeH="0" baseline="0" dirty="0">
                 <a:ln>
                   <a:noFill/>
                 </a:ln>
@@ -7220,7 +7220,7 @@
               <a:t>Adobe Illustrator:</a:t>
             </a:r>
             <a:br>
-              <a:rPr kumimoji="0" lang="en-US" altLang="en-US" b="0" i="0" u="none" strike="noStrike" cap="none" normalizeH="0" baseline="0" dirty="0">
+              <a:rPr kumimoji="0" lang="en-US" altLang="en-US" i="0" u="none" strike="noStrike" cap="none" normalizeH="0" baseline="0" dirty="0">
                 <a:ln>
                   <a:noFill/>
                 </a:ln>
@@ -7231,7 +7231,7 @@
               </a:rPr>
             </a:br>
             <a:r>
-              <a:rPr kumimoji="0" lang="en-US" altLang="en-US" b="0" i="0" u="none" strike="noStrike" cap="none" normalizeH="0" baseline="0" dirty="0">
+              <a:rPr kumimoji="0" lang="en-US" altLang="en-US" i="0" u="none" strike="noStrike" cap="none" normalizeH="0" baseline="0" dirty="0">
                 <a:ln>
                   <a:noFill/>
                 </a:ln>
@@ -7403,459 +7403,416 @@
           </a:p>
         </p:txBody>
       </p:sp>
-      <p:sp>
-        <p:nvSpPr>
-          <p:cNvPr id="6" name="Rectangle 2">
+      <p:graphicFrame>
+        <p:nvGraphicFramePr>
+          <p:cNvPr id="5" name="Content Placeholder 4">
             <a:extLst>
               <a:ext uri="{FF2B5EF4-FFF2-40B4-BE49-F238E27FC236}">
-                <a16:creationId xmlns:a16="http://schemas.microsoft.com/office/drawing/2014/main" id="{BBCC21A0-2438-C164-7D0B-B65D46E7BE94}"/>
+                <a16:creationId xmlns:a16="http://schemas.microsoft.com/office/drawing/2014/main" id="{82410373-2BEE-E5A8-B72A-D0F3DB8B5D3C}"/>
               </a:ext>
             </a:extLst>
           </p:cNvPr>
-          <p:cNvSpPr>
-            <a:spLocks noGrp="1" noChangeArrowheads="1"/>
-          </p:cNvSpPr>
+          <p:cNvGraphicFramePr>
+            <a:graphicFrameLocks noGrp="1"/>
+          </p:cNvGraphicFramePr>
           <p:nvPr>
             <p:ph idx="1"/>
-          </p:nvPr>
-        </p:nvSpPr>
-        <p:spPr bwMode="auto">
+            <p:extLst>
+              <p:ext uri="{D42A27DB-BD31-4B8C-83A1-F6EECF244321}">
+                <p14:modId xmlns:p14="http://schemas.microsoft.com/office/powerpoint/2010/main" val="992260995"/>
+              </p:ext>
+            </p:extLst>
+          </p:nvPr>
+        </p:nvGraphicFramePr>
+        <p:xfrm>
+          <a:off x="929640" y="2109134"/>
+          <a:ext cx="10332720" cy="2590800"/>
+        </p:xfrm>
+        <a:graphic>
+          <a:graphicData uri="http://schemas.openxmlformats.org/drawingml/2006/table">
+            <a:tbl>
+              <a:tblPr firstRow="1" bandRow="1">
+                <a:tableStyleId>{2D5ABB26-0587-4C30-8999-92F81FD0307C}</a:tableStyleId>
+              </a:tblPr>
+              <a:tblGrid>
+                <a:gridCol w="5166360">
+                  <a:extLst>
+                    <a:ext uri="{9D8B030D-6E8A-4147-A177-3AD203B41FA5}">
+                      <a16:colId xmlns:a16="http://schemas.microsoft.com/office/drawing/2014/main" val="15918566"/>
+                    </a:ext>
+                  </a:extLst>
+                </a:gridCol>
+                <a:gridCol w="5166360">
+                  <a:extLst>
+                    <a:ext uri="{9D8B030D-6E8A-4147-A177-3AD203B41FA5}">
+                      <a16:colId xmlns:a16="http://schemas.microsoft.com/office/drawing/2014/main" val="211346087"/>
+                    </a:ext>
+                  </a:extLst>
+                </a:gridCol>
+              </a:tblGrid>
+              <a:tr h="370840">
+                <a:tc>
+                  <a:txBody>
+                    <a:bodyPr/>
+                    <a:lstStyle/>
+                    <a:p>
+                      <a:pPr marL="457200" indent="-457200" algn="l">
+                        <a:buFont typeface="Arial" panose="020B0604020202020204" pitchFamily="34" charset="0"/>
+                        <a:buChar char="•"/>
+                      </a:pPr>
+                      <a:r>
+                        <a:rPr lang="en-US" sz="2800" b="0" dirty="0"/>
+                        <a:t>HTML5</a:t>
+                      </a:r>
+                      <a:endParaRPr lang="en-US" sz="3600" b="0" dirty="0"/>
+                    </a:p>
+                  </a:txBody>
+                  <a:tcPr anchor="ctr"/>
+                </a:tc>
+                <a:tc>
+                  <a:txBody>
+                    <a:bodyPr/>
+                    <a:lstStyle/>
+                    <a:p>
+                      <a:pPr marL="457200" indent="-457200" algn="l">
+                        <a:buFont typeface="Arial" panose="020B0604020202020204" pitchFamily="34" charset="0"/>
+                        <a:buChar char="•"/>
+                      </a:pPr>
+                      <a:r>
+                        <a:rPr lang="en-US" sz="2800" b="0" dirty="0"/>
+                        <a:t>React JS</a:t>
+                      </a:r>
+                    </a:p>
+                  </a:txBody>
+                  <a:tcPr anchor="ctr"/>
+                </a:tc>
+                <a:extLst>
+                  <a:ext uri="{0D108BD9-81ED-4DB2-BD59-A6C34878D82A}">
+                    <a16:rowId xmlns:a16="http://schemas.microsoft.com/office/drawing/2014/main" val="1617297119"/>
+                  </a:ext>
+                </a:extLst>
+              </a:tr>
+              <a:tr h="370840">
+                <a:tc>
+                  <a:txBody>
+                    <a:bodyPr/>
+                    <a:lstStyle/>
+                    <a:p>
+                      <a:pPr marL="457200" indent="-457200" algn="l">
+                        <a:buFont typeface="Arial" panose="020B0604020202020204" pitchFamily="34" charset="0"/>
+                        <a:buChar char="•"/>
+                      </a:pPr>
+                      <a:r>
+                        <a:rPr lang="en-US" sz="2800" b="0" dirty="0"/>
+                        <a:t>CSS3</a:t>
+                      </a:r>
+                    </a:p>
+                  </a:txBody>
+                  <a:tcPr anchor="ctr"/>
+                </a:tc>
+                <a:tc>
+                  <a:txBody>
+                    <a:bodyPr/>
+                    <a:lstStyle/>
+                    <a:p>
+                      <a:pPr marL="457200" indent="-457200" algn="l">
+                        <a:buFont typeface="Arial" panose="020B0604020202020204" pitchFamily="34" charset="0"/>
+                        <a:buChar char="•"/>
+                      </a:pPr>
+                      <a:r>
+                        <a:rPr lang="en-US" sz="2800" b="0" dirty="0"/>
+                        <a:t>Redux To0lkit</a:t>
+                      </a:r>
+                    </a:p>
+                  </a:txBody>
+                  <a:tcPr anchor="ctr"/>
+                </a:tc>
+                <a:extLst>
+                  <a:ext uri="{0D108BD9-81ED-4DB2-BD59-A6C34878D82A}">
+                    <a16:rowId xmlns:a16="http://schemas.microsoft.com/office/drawing/2014/main" val="3851489381"/>
+                  </a:ext>
+                </a:extLst>
+              </a:tr>
+              <a:tr h="370840">
+                <a:tc>
+                  <a:txBody>
+                    <a:bodyPr/>
+                    <a:lstStyle/>
+                    <a:p>
+                      <a:pPr marL="457200" indent="-457200" algn="l">
+                        <a:buFont typeface="Arial" panose="020B0604020202020204" pitchFamily="34" charset="0"/>
+                        <a:buChar char="•"/>
+                      </a:pPr>
+                      <a:r>
+                        <a:rPr lang="en-US" sz="2800" b="0" dirty="0"/>
+                        <a:t>Tailwind CSS</a:t>
+                      </a:r>
+                    </a:p>
+                  </a:txBody>
+                  <a:tcPr anchor="ctr"/>
+                </a:tc>
+                <a:tc>
+                  <a:txBody>
+                    <a:bodyPr/>
+                    <a:lstStyle/>
+                    <a:p>
+                      <a:pPr marL="457200" indent="-457200" algn="l">
+                        <a:buFont typeface="Arial" panose="020B0604020202020204" pitchFamily="34" charset="0"/>
+                        <a:buChar char="•"/>
+                      </a:pPr>
+                      <a:r>
+                        <a:rPr lang="en-US" sz="2800" b="0" dirty="0"/>
+                        <a:t>Material UI</a:t>
+                      </a:r>
+                    </a:p>
+                  </a:txBody>
+                  <a:tcPr anchor="ctr"/>
+                </a:tc>
+                <a:extLst>
+                  <a:ext uri="{0D108BD9-81ED-4DB2-BD59-A6C34878D82A}">
+                    <a16:rowId xmlns:a16="http://schemas.microsoft.com/office/drawing/2014/main" val="1206340285"/>
+                  </a:ext>
+                </a:extLst>
+              </a:tr>
+              <a:tr h="370840">
+                <a:tc>
+                  <a:txBody>
+                    <a:bodyPr/>
+                    <a:lstStyle/>
+                    <a:p>
+                      <a:pPr marL="457200" indent="-457200" algn="l">
+                        <a:buFont typeface="Arial" panose="020B0604020202020204" pitchFamily="34" charset="0"/>
+                        <a:buChar char="•"/>
+                      </a:pPr>
+                      <a:r>
+                        <a:rPr lang="en-US" sz="2800" b="0" dirty="0"/>
+                        <a:t>Bootstrap</a:t>
+                      </a:r>
+                    </a:p>
+                  </a:txBody>
+                  <a:tcPr anchor="ctr"/>
+                </a:tc>
+                <a:tc>
+                  <a:txBody>
+                    <a:bodyPr/>
+                    <a:lstStyle/>
+                    <a:p>
+                      <a:pPr marL="457200" indent="-457200" algn="l">
+                        <a:buFont typeface="Arial" panose="020B0604020202020204" pitchFamily="34" charset="0"/>
+                        <a:buChar char="•"/>
+                      </a:pPr>
+                      <a:r>
+                        <a:rPr lang="en-US" sz="2800" b="0" dirty="0"/>
+                        <a:t>React Hook Form</a:t>
+                      </a:r>
+                    </a:p>
+                  </a:txBody>
+                  <a:tcPr anchor="ctr"/>
+                </a:tc>
+                <a:extLst>
+                  <a:ext uri="{0D108BD9-81ED-4DB2-BD59-A6C34878D82A}">
+                    <a16:rowId xmlns:a16="http://schemas.microsoft.com/office/drawing/2014/main" val="4280524363"/>
+                  </a:ext>
+                </a:extLst>
+              </a:tr>
+              <a:tr h="370840">
+                <a:tc>
+                  <a:txBody>
+                    <a:bodyPr/>
+                    <a:lstStyle/>
+                    <a:p>
+                      <a:pPr marL="457200" indent="-457200" algn="l">
+                        <a:buFont typeface="Arial" panose="020B0604020202020204" pitchFamily="34" charset="0"/>
+                        <a:buChar char="•"/>
+                      </a:pPr>
+                      <a:r>
+                        <a:rPr lang="en-US" sz="2800" b="0" dirty="0"/>
+                        <a:t>JavaScript</a:t>
+                      </a:r>
+                    </a:p>
+                  </a:txBody>
+                  <a:tcPr anchor="ctr"/>
+                </a:tc>
+                <a:tc>
+                  <a:txBody>
+                    <a:bodyPr/>
+                    <a:lstStyle/>
+                    <a:p>
+                      <a:pPr marL="457200" indent="-457200" algn="l">
+                        <a:buFont typeface="Arial" panose="020B0604020202020204" pitchFamily="34" charset="0"/>
+                        <a:buChar char="•"/>
+                      </a:pPr>
+                      <a:r>
+                        <a:rPr lang="en-US" sz="2800" b="0" dirty="0"/>
+                        <a:t>TanStack Query</a:t>
+                      </a:r>
+                    </a:p>
+                  </a:txBody>
+                  <a:tcPr anchor="ctr"/>
+                </a:tc>
+                <a:extLst>
+                  <a:ext uri="{0D108BD9-81ED-4DB2-BD59-A6C34878D82A}">
+                    <a16:rowId xmlns:a16="http://schemas.microsoft.com/office/drawing/2014/main" val="3620011164"/>
+                  </a:ext>
+                </a:extLst>
+              </a:tr>
+            </a:tbl>
+          </a:graphicData>
+        </a:graphic>
+      </p:graphicFrame>
+      <p:sp>
+        <p:nvSpPr>
+          <p:cNvPr id="7" name="Title 1">
+            <a:extLst>
+              <a:ext uri="{FF2B5EF4-FFF2-40B4-BE49-F238E27FC236}">
+                <a16:creationId xmlns:a16="http://schemas.microsoft.com/office/drawing/2014/main" id="{B590FB48-470E-0EC3-1487-5C8457ED9D1D}"/>
+              </a:ext>
+            </a:extLst>
+          </p:cNvPr>
+          <p:cNvSpPr txBox="1">
+            <a:spLocks/>
+          </p:cNvSpPr>
+          <p:nvPr/>
+        </p:nvSpPr>
+        <p:spPr>
           <a:xfrm>
-            <a:off x="838200" y="2221472"/>
-            <a:ext cx="5670177" cy="3929281"/>
+            <a:off x="929640" y="4565627"/>
+            <a:ext cx="10515600" cy="959083"/>
           </a:xfrm>
           <a:prstGeom prst="rect">
             <a:avLst/>
           </a:prstGeom>
-          <a:noFill/>
-          <a:ln>
-            <a:noFill/>
-          </a:ln>
-          <a:effectLst/>
-          <a:extLst>
-            <a:ext uri="{909E8E84-426E-40DD-AFC4-6F175D3DCCD1}">
-              <a14:hiddenFill xmlns:a14="http://schemas.microsoft.com/office/drawing/2010/main">
-                <a:solidFill>
-                  <a:schemeClr val="accent1"/>
-                </a:solidFill>
-              </a14:hiddenFill>
-            </a:ext>
-            <a:ext uri="{91240B29-F687-4F45-9708-019B960494DF}">
-              <a14:hiddenLine xmlns:a14="http://schemas.microsoft.com/office/drawing/2010/main" w="9525">
-                <a:solidFill>
-                  <a:schemeClr val="tx1"/>
-                </a:solidFill>
-                <a:miter lim="800000"/>
-                <a:headEnd/>
-                <a:tailEnd/>
-              </a14:hiddenLine>
-            </a:ext>
-            <a:ext uri="{AF507438-7753-43E0-B8FC-AC1667EBCBE1}">
-              <a14:hiddenEffects xmlns:a14="http://schemas.microsoft.com/office/drawing/2010/main">
-                <a:effectLst>
-                  <a:outerShdw dist="35921" dir="2700000" algn="ctr" rotWithShape="0">
-                    <a:schemeClr val="bg2"/>
-                  </a:outerShdw>
-                </a:effectLst>
-              </a14:hiddenEffects>
-            </a:ext>
-          </a:extLst>
         </p:spPr>
         <p:txBody>
-          <a:bodyPr vert="horz" wrap="square" lIns="91440" tIns="45720" rIns="91440" bIns="45720" numCol="1" anchor="ctr" anchorCtr="0" compatLnSpc="1">
-            <a:prstTxWarp prst="textNoShape">
-              <a:avLst/>
-            </a:prstTxWarp>
-            <a:spAutoFit/>
-          </a:bodyPr>
-          <a:lstStyle/>
-          <a:p>
-            <a:pPr>
-              <a:buFont typeface="Arial" panose="020B0604020202020204" pitchFamily="34" charset="0"/>
-              <a:buChar char="•"/>
-            </a:pPr>
-            <a:r>
-              <a:rPr lang="en-US" sz="2400" b="1" dirty="0"/>
-              <a:t>HTML5:</a:t>
-            </a:r>
-            <a:br>
-              <a:rPr lang="en-US" sz="2400" dirty="0"/>
-            </a:br>
-            <a:r>
-              <a:rPr lang="en-US" sz="2400" dirty="0"/>
-              <a:t>Structuring web content.</a:t>
-            </a:r>
-          </a:p>
-          <a:p>
-            <a:pPr>
-              <a:buFont typeface="Arial" panose="020B0604020202020204" pitchFamily="34" charset="0"/>
-              <a:buChar char="•"/>
-            </a:pPr>
-            <a:r>
-              <a:rPr lang="en-US" sz="2400" b="1" dirty="0"/>
-              <a:t>CSS3:</a:t>
-            </a:r>
-            <a:br>
-              <a:rPr lang="en-US" sz="2400" dirty="0"/>
-            </a:br>
-            <a:r>
-              <a:rPr lang="en-US" sz="2400" dirty="0"/>
-              <a:t>Styling HTML elements.</a:t>
-            </a:r>
-          </a:p>
-          <a:p>
-            <a:pPr>
-              <a:buFont typeface="Arial" panose="020B0604020202020204" pitchFamily="34" charset="0"/>
-              <a:buChar char="•"/>
-            </a:pPr>
-            <a:r>
-              <a:rPr lang="en-US" sz="2400" b="1" dirty="0"/>
-              <a:t>Tailwind CSS:</a:t>
-            </a:r>
-            <a:br>
-              <a:rPr lang="en-US" sz="2400" dirty="0"/>
-            </a:br>
-            <a:r>
-              <a:rPr lang="en-US" sz="2400" dirty="0"/>
-              <a:t>Utility-first CSS framework for fast styling.</a:t>
-            </a:r>
-          </a:p>
-          <a:p>
-            <a:pPr>
-              <a:buFont typeface="Arial" panose="020B0604020202020204" pitchFamily="34" charset="0"/>
-              <a:buChar char="•"/>
-            </a:pPr>
-            <a:r>
-              <a:rPr lang="en-US" sz="2400" b="1" dirty="0"/>
-              <a:t>Bootstrap:</a:t>
-            </a:r>
-            <a:br>
-              <a:rPr lang="en-US" sz="2400" dirty="0"/>
-            </a:br>
-            <a:r>
-              <a:rPr lang="en-US" sz="2400" dirty="0"/>
-              <a:t>Responsive components and grid system.</a:t>
-            </a:r>
-          </a:p>
-          <a:p>
-            <a:pPr>
-              <a:buFont typeface="Arial" panose="020B0604020202020204" pitchFamily="34" charset="0"/>
-              <a:buChar char="•"/>
-            </a:pPr>
-            <a:r>
-              <a:rPr lang="en-US" sz="2400" b="1" dirty="0"/>
-              <a:t>JavaScript:</a:t>
-            </a:r>
-            <a:br>
-              <a:rPr lang="en-US" sz="2400" dirty="0"/>
-            </a:br>
-            <a:r>
-              <a:rPr lang="en-US" sz="2400" dirty="0"/>
-              <a:t>Logic and dynamic web interactions.</a:t>
-            </a:r>
-          </a:p>
-        </p:txBody>
-      </p:sp>
-      <p:sp>
-        <p:nvSpPr>
-          <p:cNvPr id="3" name="Rectangle 2">
-            <a:extLst>
-              <a:ext uri="{FF2B5EF4-FFF2-40B4-BE49-F238E27FC236}">
-                <a16:creationId xmlns:a16="http://schemas.microsoft.com/office/drawing/2014/main" id="{C7EE3E11-E7F7-2F29-5DD3-6BC8D3AB4BC7}"/>
-              </a:ext>
-            </a:extLst>
-          </p:cNvPr>
-          <p:cNvSpPr txBox="1">
-            <a:spLocks noChangeArrowheads="1"/>
-          </p:cNvSpPr>
-          <p:nvPr/>
-        </p:nvSpPr>
-        <p:spPr bwMode="auto">
-          <a:xfrm>
-            <a:off x="6508377" y="2269154"/>
-            <a:ext cx="5499847" cy="4057521"/>
-          </a:xfrm>
-          <a:prstGeom prst="rect">
-            <a:avLst/>
-          </a:prstGeom>
-          <a:noFill/>
-          <a:ln>
-            <a:noFill/>
-          </a:ln>
-          <a:effectLst/>
-          <a:extLst>
-            <a:ext uri="{909E8E84-426E-40DD-AFC4-6F175D3DCCD1}">
-              <a14:hiddenFill xmlns:a14="http://schemas.microsoft.com/office/drawing/2010/main">
-                <a:solidFill>
-                  <a:schemeClr val="accent1"/>
-                </a:solidFill>
-              </a14:hiddenFill>
-            </a:ext>
-            <a:ext uri="{91240B29-F687-4F45-9708-019B960494DF}">
-              <a14:hiddenLine xmlns:a14="http://schemas.microsoft.com/office/drawing/2010/main" w="9525">
-                <a:solidFill>
-                  <a:schemeClr val="tx1"/>
-                </a:solidFill>
-                <a:miter lim="800000"/>
-                <a:headEnd/>
-                <a:tailEnd/>
-              </a14:hiddenLine>
-            </a:ext>
-            <a:ext uri="{AF507438-7753-43E0-B8FC-AC1667EBCBE1}">
-              <a14:hiddenEffects xmlns:a14="http://schemas.microsoft.com/office/drawing/2010/main">
-                <a:effectLst>
-                  <a:outerShdw dist="35921" dir="2700000" algn="ctr" rotWithShape="0">
-                    <a:schemeClr val="bg2"/>
-                  </a:outerShdw>
-                </a:effectLst>
-              </a14:hiddenEffects>
-            </a:ext>
-          </a:extLst>
-        </p:spPr>
-        <p:txBody>
-          <a:bodyPr vert="horz" wrap="square" lIns="91440" tIns="45720" rIns="91440" bIns="45720" numCol="1" rtlCol="0" anchor="ctr" anchorCtr="0" compatLnSpc="1">
-            <a:prstTxWarp prst="textNoShape">
-              <a:avLst/>
-            </a:prstTxWarp>
-            <a:spAutoFit/>
+          <a:bodyPr vert="horz" lIns="91440" tIns="45720" rIns="91440" bIns="45720" rtlCol="0" anchor="ctr">
+            <a:normAutofit/>
           </a:bodyPr>
           <a:lstStyle>
-            <a:lvl1pPr marL="228600" indent="-228600" algn="l" defTabSz="914400" rtl="0" eaLnBrk="1" latinLnBrk="0" hangingPunct="1">
+            <a:lvl1pPr algn="l" defTabSz="914400" rtl="0" eaLnBrk="1" latinLnBrk="0" hangingPunct="1">
               <a:lnSpc>
                 <a:spcPct val="90000"/>
               </a:lnSpc>
               <a:spcBef>
-                <a:spcPts val="1000"/>
+                <a:spcPct val="0"/>
               </a:spcBef>
-              <a:buFont typeface="Arial" panose="020B0604020202020204" pitchFamily="34" charset="0"/>
-              <a:buChar char="•"/>
-              <a:defRPr sz="2800" kern="1200">
+              <a:buNone/>
+              <a:defRPr sz="4400" kern="1200">
                 <a:solidFill>
                   <a:schemeClr val="tx1"/>
                 </a:solidFill>
-                <a:latin typeface="+mn-lt"/>
-                <a:ea typeface="+mn-ea"/>
-                <a:cs typeface="+mn-cs"/>
+                <a:latin typeface="+mj-lt"/>
+                <a:ea typeface="+mj-ea"/>
+                <a:cs typeface="+mj-cs"/>
               </a:defRPr>
             </a:lvl1pPr>
-            <a:lvl2pPr marL="685800" indent="-228600" algn="l" defTabSz="914400" rtl="0" eaLnBrk="1" latinLnBrk="0" hangingPunct="1">
-              <a:lnSpc>
-                <a:spcPct val="90000"/>
-              </a:lnSpc>
-              <a:spcBef>
-                <a:spcPts val="500"/>
-              </a:spcBef>
-              <a:buFont typeface="Arial" panose="020B0604020202020204" pitchFamily="34" charset="0"/>
-              <a:buChar char="•"/>
-              <a:defRPr sz="2400" kern="1200">
+          </a:lstStyle>
+          <a:p>
+            <a:r>
+              <a:rPr lang="en-US" sz="3600" b="1" dirty="0">
                 <a:solidFill>
-                  <a:schemeClr val="tx1"/>
+                  <a:srgbClr val="F8981C"/>
                 </a:solidFill>
-                <a:latin typeface="+mn-lt"/>
-                <a:ea typeface="+mn-ea"/>
-                <a:cs typeface="+mn-cs"/>
-              </a:defRPr>
-            </a:lvl2pPr>
-            <a:lvl3pPr marL="1143000" indent="-228600" algn="l" defTabSz="914400" rtl="0" eaLnBrk="1" latinLnBrk="0" hangingPunct="1">
-              <a:lnSpc>
-                <a:spcPct val="90000"/>
-              </a:lnSpc>
-              <a:spcBef>
-                <a:spcPts val="500"/>
-              </a:spcBef>
-              <a:buFont typeface="Arial" panose="020B0604020202020204" pitchFamily="34" charset="0"/>
-              <a:buChar char="•"/>
-              <a:defRPr sz="2000" kern="1200">
-                <a:solidFill>
-                  <a:schemeClr val="tx1"/>
-                </a:solidFill>
-                <a:latin typeface="+mn-lt"/>
-                <a:ea typeface="+mn-ea"/>
-                <a:cs typeface="+mn-cs"/>
-              </a:defRPr>
-            </a:lvl3pPr>
-            <a:lvl4pPr marL="1600200" indent="-228600" algn="l" defTabSz="914400" rtl="0" eaLnBrk="1" latinLnBrk="0" hangingPunct="1">
-              <a:lnSpc>
-                <a:spcPct val="90000"/>
-              </a:lnSpc>
-              <a:spcBef>
-                <a:spcPts val="500"/>
-              </a:spcBef>
-              <a:buFont typeface="Arial" panose="020B0604020202020204" pitchFamily="34" charset="0"/>
-              <a:buChar char="•"/>
-              <a:defRPr sz="1800" kern="1200">
-                <a:solidFill>
-                  <a:schemeClr val="tx1"/>
-                </a:solidFill>
-                <a:latin typeface="+mn-lt"/>
-                <a:ea typeface="+mn-ea"/>
-                <a:cs typeface="+mn-cs"/>
-              </a:defRPr>
-            </a:lvl4pPr>
-            <a:lvl5pPr marL="2057400" indent="-228600" algn="l" defTabSz="914400" rtl="0" eaLnBrk="1" latinLnBrk="0" hangingPunct="1">
-              <a:lnSpc>
-                <a:spcPct val="90000"/>
-              </a:lnSpc>
-              <a:spcBef>
-                <a:spcPts val="500"/>
-              </a:spcBef>
-              <a:buFont typeface="Arial" panose="020B0604020202020204" pitchFamily="34" charset="0"/>
-              <a:buChar char="•"/>
-              <a:defRPr sz="1800" kern="1200">
-                <a:solidFill>
-                  <a:schemeClr val="tx1"/>
-                </a:solidFill>
-                <a:latin typeface="+mn-lt"/>
-                <a:ea typeface="+mn-ea"/>
-                <a:cs typeface="+mn-cs"/>
-              </a:defRPr>
-            </a:lvl5pPr>
-            <a:lvl6pPr marL="2514600" indent="-228600" algn="l" defTabSz="914400" rtl="0" eaLnBrk="1" latinLnBrk="0" hangingPunct="1">
-              <a:lnSpc>
-                <a:spcPct val="90000"/>
-              </a:lnSpc>
-              <a:spcBef>
-                <a:spcPts val="500"/>
-              </a:spcBef>
-              <a:buFont typeface="Arial" panose="020B0604020202020204" pitchFamily="34" charset="0"/>
-              <a:buChar char="•"/>
-              <a:defRPr sz="1800" kern="1200">
-                <a:solidFill>
-                  <a:schemeClr val="tx1"/>
-                </a:solidFill>
-                <a:latin typeface="+mn-lt"/>
-                <a:ea typeface="+mn-ea"/>
-                <a:cs typeface="+mn-cs"/>
-              </a:defRPr>
-            </a:lvl6pPr>
-            <a:lvl7pPr marL="2971800" indent="-228600" algn="l" defTabSz="914400" rtl="0" eaLnBrk="1" latinLnBrk="0" hangingPunct="1">
-              <a:lnSpc>
-                <a:spcPct val="90000"/>
-              </a:lnSpc>
-              <a:spcBef>
-                <a:spcPts val="500"/>
-              </a:spcBef>
-              <a:buFont typeface="Arial" panose="020B0604020202020204" pitchFamily="34" charset="0"/>
-              <a:buChar char="•"/>
-              <a:defRPr sz="1800" kern="1200">
-                <a:solidFill>
-                  <a:schemeClr val="tx1"/>
-                </a:solidFill>
-                <a:latin typeface="+mn-lt"/>
-                <a:ea typeface="+mn-ea"/>
-                <a:cs typeface="+mn-cs"/>
-              </a:defRPr>
-            </a:lvl7pPr>
-            <a:lvl8pPr marL="3429000" indent="-228600" algn="l" defTabSz="914400" rtl="0" eaLnBrk="1" latinLnBrk="0" hangingPunct="1">
-              <a:lnSpc>
-                <a:spcPct val="90000"/>
-              </a:lnSpc>
-              <a:spcBef>
-                <a:spcPts val="500"/>
-              </a:spcBef>
-              <a:buFont typeface="Arial" panose="020B0604020202020204" pitchFamily="34" charset="0"/>
-              <a:buChar char="•"/>
-              <a:defRPr sz="1800" kern="1200">
-                <a:solidFill>
-                  <a:schemeClr val="tx1"/>
-                </a:solidFill>
-                <a:latin typeface="+mn-lt"/>
-                <a:ea typeface="+mn-ea"/>
-                <a:cs typeface="+mn-cs"/>
-              </a:defRPr>
-            </a:lvl8pPr>
-            <a:lvl9pPr marL="3886200" indent="-228600" algn="l" defTabSz="914400" rtl="0" eaLnBrk="1" latinLnBrk="0" hangingPunct="1">
-              <a:lnSpc>
-                <a:spcPct val="90000"/>
-              </a:lnSpc>
-              <a:spcBef>
-                <a:spcPts val="500"/>
-              </a:spcBef>
-              <a:buFont typeface="Arial" panose="020B0604020202020204" pitchFamily="34" charset="0"/>
-              <a:buChar char="•"/>
-              <a:defRPr sz="1800" kern="1200">
-                <a:solidFill>
-                  <a:schemeClr val="tx1"/>
-                </a:solidFill>
-                <a:latin typeface="+mn-lt"/>
-                <a:ea typeface="+mn-ea"/>
-                <a:cs typeface="+mn-cs"/>
-              </a:defRPr>
-            </a:lvl9pPr>
-          </a:lstStyle>
-          <a:p>
-            <a:r>
-              <a:rPr lang="en-US" sz="2400" b="1" dirty="0"/>
-              <a:t>React JS:</a:t>
-            </a:r>
-            <a:br>
-              <a:rPr lang="en-US" sz="2400" dirty="0"/>
-            </a:br>
-            <a:r>
-              <a:rPr lang="en-US" sz="2400" dirty="0"/>
-              <a:t>Building efficient SPAs.</a:t>
-            </a:r>
-          </a:p>
-          <a:p>
-            <a:r>
-              <a:rPr lang="en-US" sz="2400" b="1" dirty="0"/>
-              <a:t>Redux Toolkit:</a:t>
-            </a:r>
-            <a:br>
-              <a:rPr lang="en-US" sz="2400" dirty="0"/>
-            </a:br>
-            <a:r>
-              <a:rPr lang="en-US" sz="2400" dirty="0"/>
-              <a:t>Centralized state management for React.</a:t>
-            </a:r>
-          </a:p>
-          <a:p>
-            <a:r>
-              <a:rPr lang="en-US" sz="2400" b="1" dirty="0"/>
-              <a:t>Material UI:</a:t>
-            </a:r>
-            <a:br>
-              <a:rPr lang="en-US" sz="2400" dirty="0"/>
-            </a:br>
-            <a:r>
-              <a:rPr lang="en-US" sz="2400" dirty="0"/>
-              <a:t>UI Components Library.</a:t>
-            </a:r>
-          </a:p>
-          <a:p>
-            <a:r>
-              <a:rPr lang="en-US" sz="2400" b="1" dirty="0"/>
-              <a:t>React Hook Form:</a:t>
-            </a:r>
-            <a:br>
-              <a:rPr lang="en-US" sz="2400" dirty="0"/>
-            </a:br>
-            <a:r>
-              <a:rPr lang="en-US" sz="2400" dirty="0"/>
-              <a:t>Simplifies form handling and validation.</a:t>
-            </a:r>
-          </a:p>
-          <a:p>
-            <a:r>
-              <a:rPr lang="en-US" sz="2400" b="1" dirty="0"/>
-              <a:t>TanStack query:</a:t>
-            </a:r>
-          </a:p>
-          <a:p>
-            <a:pPr marL="0" indent="0">
-              <a:buNone/>
-            </a:pPr>
-            <a:r>
-              <a:rPr lang="en-US" sz="2400" dirty="0"/>
-              <a:t>    Efficient API data management</a:t>
-            </a:r>
-          </a:p>
-        </p:txBody>
-      </p:sp>
+              </a:rPr>
+              <a:t>Backend Technologies</a:t>
+            </a:r>
+          </a:p>
+        </p:txBody>
+      </p:sp>
+      <p:graphicFrame>
+        <p:nvGraphicFramePr>
+          <p:cNvPr id="9" name="Table 8">
+            <a:extLst>
+              <a:ext uri="{FF2B5EF4-FFF2-40B4-BE49-F238E27FC236}">
+                <a16:creationId xmlns:a16="http://schemas.microsoft.com/office/drawing/2014/main" id="{61CE0A60-0211-1A2F-7439-6C2A1F7FBE7A}"/>
+              </a:ext>
+            </a:extLst>
+          </p:cNvPr>
+          <p:cNvGraphicFramePr>
+            <a:graphicFrameLocks noGrp="1"/>
+          </p:cNvGraphicFramePr>
+          <p:nvPr>
+            <p:extLst>
+              <p:ext uri="{D42A27DB-BD31-4B8C-83A1-F6EECF244321}">
+                <p14:modId xmlns:p14="http://schemas.microsoft.com/office/powerpoint/2010/main" val="314722539"/>
+              </p:ext>
+            </p:extLst>
+          </p:nvPr>
+        </p:nvGraphicFramePr>
+        <p:xfrm>
+          <a:off x="1021080" y="5499068"/>
+          <a:ext cx="10241280" cy="518160"/>
+        </p:xfrm>
+        <a:graphic>
+          <a:graphicData uri="http://schemas.openxmlformats.org/drawingml/2006/table">
+            <a:tbl>
+              <a:tblPr firstRow="1" bandRow="1">
+                <a:tableStyleId>{2D5ABB26-0587-4C30-8999-92F81FD0307C}</a:tableStyleId>
+              </a:tblPr>
+              <a:tblGrid>
+                <a:gridCol w="5120640">
+                  <a:extLst>
+                    <a:ext uri="{9D8B030D-6E8A-4147-A177-3AD203B41FA5}">
+                      <a16:colId xmlns:a16="http://schemas.microsoft.com/office/drawing/2014/main" val="2451291361"/>
+                    </a:ext>
+                  </a:extLst>
+                </a:gridCol>
+                <a:gridCol w="5120640">
+                  <a:extLst>
+                    <a:ext uri="{9D8B030D-6E8A-4147-A177-3AD203B41FA5}">
+                      <a16:colId xmlns:a16="http://schemas.microsoft.com/office/drawing/2014/main" val="71425336"/>
+                    </a:ext>
+                  </a:extLst>
+                </a:gridCol>
+              </a:tblGrid>
+              <a:tr h="370840">
+                <a:tc>
+                  <a:txBody>
+                    <a:bodyPr/>
+                    <a:lstStyle/>
+                    <a:p>
+                      <a:pPr marL="457200" indent="-457200">
+                        <a:buFont typeface="Arial" panose="020B0604020202020204" pitchFamily="34" charset="0"/>
+                        <a:buChar char="•"/>
+                      </a:pPr>
+                      <a:r>
+                        <a:rPr lang="en-US" sz="2800" b="0" dirty="0"/>
+                        <a:t>Node JS</a:t>
+                      </a:r>
+                    </a:p>
+                  </a:txBody>
+                  <a:tcPr anchor="ctr"/>
+                </a:tc>
+                <a:tc>
+                  <a:txBody>
+                    <a:bodyPr/>
+                    <a:lstStyle/>
+                    <a:p>
+                      <a:pPr marL="457200" indent="-457200">
+                        <a:buFont typeface="Arial" panose="020B0604020202020204" pitchFamily="34" charset="0"/>
+                        <a:buChar char="•"/>
+                      </a:pPr>
+                      <a:r>
+                        <a:rPr lang="en-US" sz="2800" b="0" dirty="0"/>
+                        <a:t>Express JS</a:t>
+                      </a:r>
+                    </a:p>
+                  </a:txBody>
+                  <a:tcPr anchor="ctr"/>
+                </a:tc>
+                <a:extLst>
+                  <a:ext uri="{0D108BD9-81ED-4DB2-BD59-A6C34878D82A}">
+                    <a16:rowId xmlns:a16="http://schemas.microsoft.com/office/drawing/2014/main" val="988029020"/>
+                  </a:ext>
+                </a:extLst>
+              </a:tr>
+            </a:tbl>
+          </a:graphicData>
+        </a:graphic>
+      </p:graphicFrame>
     </p:spTree>
     <p:extLst>
       <p:ext uri="{BB962C8B-B14F-4D97-AF65-F5344CB8AC3E}">
-        <p14:creationId xmlns:p14="http://schemas.microsoft.com/office/powerpoint/2010/main" val="2123551491"/>
+        <p14:creationId xmlns:p14="http://schemas.microsoft.com/office/powerpoint/2010/main" val="711526983"/>
       </p:ext>
     </p:extLst>
   </p:cSld>
@@ -8005,113 +7962,103 @@
                   <a:srgbClr val="F8981C"/>
                 </a:solidFill>
               </a:rPr>
-              <a:t>Backend Technologies</a:t>
-            </a:r>
-          </a:p>
-        </p:txBody>
-      </p:sp>
-      <p:sp>
-        <p:nvSpPr>
-          <p:cNvPr id="6" name="Rectangle 2">
+              <a:t>Database</a:t>
+            </a:r>
+          </a:p>
+        </p:txBody>
+      </p:sp>
+      <p:graphicFrame>
+        <p:nvGraphicFramePr>
+          <p:cNvPr id="5" name="Content Placeholder 4">
             <a:extLst>
               <a:ext uri="{FF2B5EF4-FFF2-40B4-BE49-F238E27FC236}">
-                <a16:creationId xmlns:a16="http://schemas.microsoft.com/office/drawing/2014/main" id="{BBCC21A0-2438-C164-7D0B-B65D46E7BE94}"/>
+                <a16:creationId xmlns:a16="http://schemas.microsoft.com/office/drawing/2014/main" id="{F1A33728-9637-DBE7-6131-5A7FEE96FB96}"/>
               </a:ext>
             </a:extLst>
           </p:cNvPr>
-          <p:cNvSpPr>
-            <a:spLocks noGrp="1" noChangeArrowheads="1"/>
-          </p:cNvSpPr>
+          <p:cNvGraphicFramePr>
+            <a:graphicFrameLocks noGrp="1"/>
+          </p:cNvGraphicFramePr>
           <p:nvPr>
             <p:ph idx="1"/>
-          </p:nvPr>
-        </p:nvSpPr>
-        <p:spPr bwMode="auto">
-          <a:xfrm>
-            <a:off x="929640" y="2069340"/>
-            <a:ext cx="10332720" cy="1771767"/>
-          </a:xfrm>
-          <a:prstGeom prst="rect">
-            <a:avLst/>
-          </a:prstGeom>
-          <a:noFill/>
-          <a:ln>
-            <a:noFill/>
-          </a:ln>
-          <a:effectLst/>
-          <a:extLst>
-            <a:ext uri="{909E8E84-426E-40DD-AFC4-6F175D3DCCD1}">
-              <a14:hiddenFill xmlns:a14="http://schemas.microsoft.com/office/drawing/2010/main">
-                <a:solidFill>
-                  <a:schemeClr val="accent1"/>
-                </a:solidFill>
-              </a14:hiddenFill>
-            </a:ext>
-            <a:ext uri="{91240B29-F687-4F45-9708-019B960494DF}">
-              <a14:hiddenLine xmlns:a14="http://schemas.microsoft.com/office/drawing/2010/main" w="9525">
-                <a:solidFill>
-                  <a:schemeClr val="tx1"/>
-                </a:solidFill>
-                <a:miter lim="800000"/>
-                <a:headEnd/>
-                <a:tailEnd/>
-              </a14:hiddenLine>
-            </a:ext>
-            <a:ext uri="{AF507438-7753-43E0-B8FC-AC1667EBCBE1}">
-              <a14:hiddenEffects xmlns:a14="http://schemas.microsoft.com/office/drawing/2010/main">
-                <a:effectLst>
-                  <a:outerShdw dist="35921" dir="2700000" algn="ctr" rotWithShape="0">
-                    <a:schemeClr val="bg2"/>
-                  </a:outerShdw>
-                </a:effectLst>
-              </a14:hiddenEffects>
-            </a:ext>
-          </a:extLst>
-        </p:spPr>
-        <p:txBody>
-          <a:bodyPr vert="horz" wrap="square" lIns="91440" tIns="45720" rIns="91440" bIns="45720" numCol="1" anchor="ctr" anchorCtr="0" compatLnSpc="1">
-            <a:prstTxWarp prst="textNoShape">
-              <a:avLst/>
-            </a:prstTxWarp>
-            <a:spAutoFit/>
-          </a:bodyPr>
-          <a:lstStyle/>
-          <a:p>
-            <a:pPr>
-              <a:buFont typeface="Arial" panose="020B0604020202020204" pitchFamily="34" charset="0"/>
-              <a:buChar char="•"/>
-            </a:pPr>
-            <a:r>
-              <a:rPr lang="en-US" b="1" dirty="0"/>
-              <a:t>Node JS:</a:t>
-            </a:r>
-            <a:br>
-              <a:rPr lang="en-US" dirty="0"/>
-            </a:br>
-            <a:r>
-              <a:rPr lang="en-US" dirty="0"/>
-              <a:t>	Scalable server-side JavaScript runtime.</a:t>
-            </a:r>
-          </a:p>
-          <a:p>
-            <a:pPr>
-              <a:buFont typeface="Arial" panose="020B0604020202020204" pitchFamily="34" charset="0"/>
-              <a:buChar char="•"/>
-            </a:pPr>
-            <a:r>
-              <a:rPr lang="en-US" b="1" dirty="0"/>
-              <a:t>Express JS:</a:t>
-            </a:r>
-            <a:br>
-              <a:rPr lang="en-US" dirty="0"/>
-            </a:br>
-            <a:r>
-              <a:rPr lang="en-US" dirty="0"/>
-              <a:t>	Minimalist Node.js web framework.</a:t>
-            </a:r>
-          </a:p>
-        </p:txBody>
-      </p:sp>
+            <p:extLst>
+              <p:ext uri="{D42A27DB-BD31-4B8C-83A1-F6EECF244321}">
+                <p14:modId xmlns:p14="http://schemas.microsoft.com/office/powerpoint/2010/main" val="1037160345"/>
+              </p:ext>
+            </p:extLst>
+          </p:nvPr>
+        </p:nvGraphicFramePr>
+        <p:xfrm>
+          <a:off x="838200" y="2036843"/>
+          <a:ext cx="10515600" cy="518160"/>
+        </p:xfrm>
+        <a:graphic>
+          <a:graphicData uri="http://schemas.openxmlformats.org/drawingml/2006/table">
+            <a:tbl>
+              <a:tblPr firstRow="1" bandRow="1">
+                <a:tableStyleId>{2D5ABB26-0587-4C30-8999-92F81FD0307C}</a:tableStyleId>
+              </a:tblPr>
+              <a:tblGrid>
+                <a:gridCol w="5257800">
+                  <a:extLst>
+                    <a:ext uri="{9D8B030D-6E8A-4147-A177-3AD203B41FA5}">
+                      <a16:colId xmlns:a16="http://schemas.microsoft.com/office/drawing/2014/main" val="1331891827"/>
+                    </a:ext>
+                  </a:extLst>
+                </a:gridCol>
+                <a:gridCol w="5257800">
+                  <a:extLst>
+                    <a:ext uri="{9D8B030D-6E8A-4147-A177-3AD203B41FA5}">
+                      <a16:colId xmlns:a16="http://schemas.microsoft.com/office/drawing/2014/main" val="3628667460"/>
+                    </a:ext>
+                  </a:extLst>
+                </a:gridCol>
+              </a:tblGrid>
+              <a:tr h="370840">
+                <a:tc>
+                  <a:txBody>
+                    <a:bodyPr/>
+                    <a:lstStyle/>
+                    <a:p>
+                      <a:pPr marL="457200" indent="-457200">
+                        <a:buFont typeface="Arial" panose="020B0604020202020204" pitchFamily="34" charset="0"/>
+                        <a:buChar char="•"/>
+                      </a:pPr>
+                      <a:r>
+                        <a:rPr lang="en-US" sz="2800" b="0" dirty="0"/>
+                        <a:t>MongoDB</a:t>
+                      </a:r>
+                    </a:p>
+                  </a:txBody>
+                  <a:tcPr/>
+                </a:tc>
+                <a:tc>
+                  <a:txBody>
+                    <a:bodyPr/>
+                    <a:lstStyle/>
+                    <a:p>
+                      <a:pPr marL="457200" indent="-457200">
+                        <a:buFont typeface="Arial" panose="020B0604020202020204" pitchFamily="34" charset="0"/>
+                        <a:buChar char="•"/>
+                      </a:pPr>
+                      <a:r>
+                        <a:rPr lang="en-US" sz="2800" b="0" dirty="0"/>
+                        <a:t>Mongoose</a:t>
+                      </a:r>
+                    </a:p>
+                  </a:txBody>
+                  <a:tcPr/>
+                </a:tc>
+                <a:extLst>
+                  <a:ext uri="{0D108BD9-81ED-4DB2-BD59-A6C34878D82A}">
+                    <a16:rowId xmlns:a16="http://schemas.microsoft.com/office/drawing/2014/main" val="674006637"/>
+                  </a:ext>
+                </a:extLst>
+              </a:tr>
+            </a:tbl>
+          </a:graphicData>
+        </a:graphic>
+      </p:graphicFrame>
       <p:sp>
         <p:nvSpPr>
           <p:cNvPr id="3" name="Title 1">
@@ -8165,274 +8112,99 @@
                   <a:srgbClr val="F8981C"/>
                 </a:solidFill>
               </a:rPr>
-              <a:t>Database</a:t>
-            </a:r>
-          </a:p>
-        </p:txBody>
-      </p:sp>
-      <p:sp>
-        <p:nvSpPr>
-          <p:cNvPr id="7" name="Rectangle 2">
+              <a:t>Authentication and Authorization</a:t>
+            </a:r>
+          </a:p>
+        </p:txBody>
+      </p:sp>
+      <p:graphicFrame>
+        <p:nvGraphicFramePr>
+          <p:cNvPr id="8" name="Table 7">
             <a:extLst>
               <a:ext uri="{FF2B5EF4-FFF2-40B4-BE49-F238E27FC236}">
-                <a16:creationId xmlns:a16="http://schemas.microsoft.com/office/drawing/2014/main" id="{E398315F-324B-6AEE-429E-AB60A6A9E997}"/>
+                <a16:creationId xmlns:a16="http://schemas.microsoft.com/office/drawing/2014/main" id="{D1560694-58E8-30CB-F9B7-AA0FB6521A7E}"/>
               </a:ext>
             </a:extLst>
           </p:cNvPr>
-          <p:cNvSpPr txBox="1">
-            <a:spLocks noChangeArrowheads="1"/>
-          </p:cNvSpPr>
-          <p:nvPr/>
-        </p:nvSpPr>
-        <p:spPr bwMode="auto">
-          <a:xfrm>
-            <a:off x="929640" y="4388748"/>
-            <a:ext cx="10332720" cy="1771767"/>
-          </a:xfrm>
-          <a:prstGeom prst="rect">
-            <a:avLst/>
-          </a:prstGeom>
-          <a:noFill/>
-          <a:ln>
-            <a:noFill/>
-          </a:ln>
-          <a:effectLst/>
-          <a:extLst>
-            <a:ext uri="{909E8E84-426E-40DD-AFC4-6F175D3DCCD1}">
-              <a14:hiddenFill xmlns:a14="http://schemas.microsoft.com/office/drawing/2010/main">
-                <a:solidFill>
-                  <a:schemeClr val="accent1"/>
-                </a:solidFill>
-              </a14:hiddenFill>
-            </a:ext>
-            <a:ext uri="{91240B29-F687-4F45-9708-019B960494DF}">
-              <a14:hiddenLine xmlns:a14="http://schemas.microsoft.com/office/drawing/2010/main" w="9525">
-                <a:solidFill>
-                  <a:schemeClr val="tx1"/>
-                </a:solidFill>
-                <a:miter lim="800000"/>
-                <a:headEnd/>
-                <a:tailEnd/>
-              </a14:hiddenLine>
-            </a:ext>
-            <a:ext uri="{AF507438-7753-43E0-B8FC-AC1667EBCBE1}">
-              <a14:hiddenEffects xmlns:a14="http://schemas.microsoft.com/office/drawing/2010/main">
-                <a:effectLst>
-                  <a:outerShdw dist="35921" dir="2700000" algn="ctr" rotWithShape="0">
-                    <a:schemeClr val="bg2"/>
-                  </a:outerShdw>
-                </a:effectLst>
-              </a14:hiddenEffects>
-            </a:ext>
-          </a:extLst>
-        </p:spPr>
-        <p:txBody>
-          <a:bodyPr vert="horz" wrap="square" lIns="91440" tIns="45720" rIns="91440" bIns="45720" numCol="1" rtlCol="0" anchor="ctr" anchorCtr="0" compatLnSpc="1">
-            <a:prstTxWarp prst="textNoShape">
-              <a:avLst/>
-            </a:prstTxWarp>
-            <a:spAutoFit/>
-          </a:bodyPr>
-          <a:lstStyle>
-            <a:lvl1pPr marL="228600" indent="-228600" algn="l" defTabSz="914400" rtl="0" eaLnBrk="1" latinLnBrk="0" hangingPunct="1">
-              <a:lnSpc>
-                <a:spcPct val="90000"/>
-              </a:lnSpc>
-              <a:spcBef>
-                <a:spcPts val="1000"/>
-              </a:spcBef>
-              <a:buFont typeface="Arial" panose="020B0604020202020204" pitchFamily="34" charset="0"/>
-              <a:buChar char="•"/>
-              <a:defRPr sz="2800" kern="1200">
-                <a:solidFill>
-                  <a:schemeClr val="tx1"/>
-                </a:solidFill>
-                <a:latin typeface="+mn-lt"/>
-                <a:ea typeface="+mn-ea"/>
-                <a:cs typeface="+mn-cs"/>
-              </a:defRPr>
-            </a:lvl1pPr>
-            <a:lvl2pPr marL="685800" indent="-228600" algn="l" defTabSz="914400" rtl="0" eaLnBrk="1" latinLnBrk="0" hangingPunct="1">
-              <a:lnSpc>
-                <a:spcPct val="90000"/>
-              </a:lnSpc>
-              <a:spcBef>
-                <a:spcPts val="500"/>
-              </a:spcBef>
-              <a:buFont typeface="Arial" panose="020B0604020202020204" pitchFamily="34" charset="0"/>
-              <a:buChar char="•"/>
-              <a:defRPr sz="2400" kern="1200">
-                <a:solidFill>
-                  <a:schemeClr val="tx1"/>
-                </a:solidFill>
-                <a:latin typeface="+mn-lt"/>
-                <a:ea typeface="+mn-ea"/>
-                <a:cs typeface="+mn-cs"/>
-              </a:defRPr>
-            </a:lvl2pPr>
-            <a:lvl3pPr marL="1143000" indent="-228600" algn="l" defTabSz="914400" rtl="0" eaLnBrk="1" latinLnBrk="0" hangingPunct="1">
-              <a:lnSpc>
-                <a:spcPct val="90000"/>
-              </a:lnSpc>
-              <a:spcBef>
-                <a:spcPts val="500"/>
-              </a:spcBef>
-              <a:buFont typeface="Arial" panose="020B0604020202020204" pitchFamily="34" charset="0"/>
-              <a:buChar char="•"/>
-              <a:defRPr sz="2000" kern="1200">
-                <a:solidFill>
-                  <a:schemeClr val="tx1"/>
-                </a:solidFill>
-                <a:latin typeface="+mn-lt"/>
-                <a:ea typeface="+mn-ea"/>
-                <a:cs typeface="+mn-cs"/>
-              </a:defRPr>
-            </a:lvl3pPr>
-            <a:lvl4pPr marL="1600200" indent="-228600" algn="l" defTabSz="914400" rtl="0" eaLnBrk="1" latinLnBrk="0" hangingPunct="1">
-              <a:lnSpc>
-                <a:spcPct val="90000"/>
-              </a:lnSpc>
-              <a:spcBef>
-                <a:spcPts val="500"/>
-              </a:spcBef>
-              <a:buFont typeface="Arial" panose="020B0604020202020204" pitchFamily="34" charset="0"/>
-              <a:buChar char="•"/>
-              <a:defRPr sz="1800" kern="1200">
-                <a:solidFill>
-                  <a:schemeClr val="tx1"/>
-                </a:solidFill>
-                <a:latin typeface="+mn-lt"/>
-                <a:ea typeface="+mn-ea"/>
-                <a:cs typeface="+mn-cs"/>
-              </a:defRPr>
-            </a:lvl4pPr>
-            <a:lvl5pPr marL="2057400" indent="-228600" algn="l" defTabSz="914400" rtl="0" eaLnBrk="1" latinLnBrk="0" hangingPunct="1">
-              <a:lnSpc>
-                <a:spcPct val="90000"/>
-              </a:lnSpc>
-              <a:spcBef>
-                <a:spcPts val="500"/>
-              </a:spcBef>
-              <a:buFont typeface="Arial" panose="020B0604020202020204" pitchFamily="34" charset="0"/>
-              <a:buChar char="•"/>
-              <a:defRPr sz="1800" kern="1200">
-                <a:solidFill>
-                  <a:schemeClr val="tx1"/>
-                </a:solidFill>
-                <a:latin typeface="+mn-lt"/>
-                <a:ea typeface="+mn-ea"/>
-                <a:cs typeface="+mn-cs"/>
-              </a:defRPr>
-            </a:lvl5pPr>
-            <a:lvl6pPr marL="2514600" indent="-228600" algn="l" defTabSz="914400" rtl="0" eaLnBrk="1" latinLnBrk="0" hangingPunct="1">
-              <a:lnSpc>
-                <a:spcPct val="90000"/>
-              </a:lnSpc>
-              <a:spcBef>
-                <a:spcPts val="500"/>
-              </a:spcBef>
-              <a:buFont typeface="Arial" panose="020B0604020202020204" pitchFamily="34" charset="0"/>
-              <a:buChar char="•"/>
-              <a:defRPr sz="1800" kern="1200">
-                <a:solidFill>
-                  <a:schemeClr val="tx1"/>
-                </a:solidFill>
-                <a:latin typeface="+mn-lt"/>
-                <a:ea typeface="+mn-ea"/>
-                <a:cs typeface="+mn-cs"/>
-              </a:defRPr>
-            </a:lvl6pPr>
-            <a:lvl7pPr marL="2971800" indent="-228600" algn="l" defTabSz="914400" rtl="0" eaLnBrk="1" latinLnBrk="0" hangingPunct="1">
-              <a:lnSpc>
-                <a:spcPct val="90000"/>
-              </a:lnSpc>
-              <a:spcBef>
-                <a:spcPts val="500"/>
-              </a:spcBef>
-              <a:buFont typeface="Arial" panose="020B0604020202020204" pitchFamily="34" charset="0"/>
-              <a:buChar char="•"/>
-              <a:defRPr sz="1800" kern="1200">
-                <a:solidFill>
-                  <a:schemeClr val="tx1"/>
-                </a:solidFill>
-                <a:latin typeface="+mn-lt"/>
-                <a:ea typeface="+mn-ea"/>
-                <a:cs typeface="+mn-cs"/>
-              </a:defRPr>
-            </a:lvl7pPr>
-            <a:lvl8pPr marL="3429000" indent="-228600" algn="l" defTabSz="914400" rtl="0" eaLnBrk="1" latinLnBrk="0" hangingPunct="1">
-              <a:lnSpc>
-                <a:spcPct val="90000"/>
-              </a:lnSpc>
-              <a:spcBef>
-                <a:spcPts val="500"/>
-              </a:spcBef>
-              <a:buFont typeface="Arial" panose="020B0604020202020204" pitchFamily="34" charset="0"/>
-              <a:buChar char="•"/>
-              <a:defRPr sz="1800" kern="1200">
-                <a:solidFill>
-                  <a:schemeClr val="tx1"/>
-                </a:solidFill>
-                <a:latin typeface="+mn-lt"/>
-                <a:ea typeface="+mn-ea"/>
-                <a:cs typeface="+mn-cs"/>
-              </a:defRPr>
-            </a:lvl8pPr>
-            <a:lvl9pPr marL="3886200" indent="-228600" algn="l" defTabSz="914400" rtl="0" eaLnBrk="1" latinLnBrk="0" hangingPunct="1">
-              <a:lnSpc>
-                <a:spcPct val="90000"/>
-              </a:lnSpc>
-              <a:spcBef>
-                <a:spcPts val="500"/>
-              </a:spcBef>
-              <a:buFont typeface="Arial" panose="020B0604020202020204" pitchFamily="34" charset="0"/>
-              <a:buChar char="•"/>
-              <a:defRPr sz="1800" kern="1200">
-                <a:solidFill>
-                  <a:schemeClr val="tx1"/>
-                </a:solidFill>
-                <a:latin typeface="+mn-lt"/>
-                <a:ea typeface="+mn-ea"/>
-                <a:cs typeface="+mn-cs"/>
-              </a:defRPr>
-            </a:lvl9pPr>
-          </a:lstStyle>
-          <a:p>
-            <a:pPr>
-              <a:buFont typeface="Arial" panose="020B0604020202020204" pitchFamily="34" charset="0"/>
-              <a:buChar char="•"/>
-            </a:pPr>
-            <a:r>
-              <a:rPr lang="en-US" b="1" dirty="0"/>
-              <a:t>MongoDB:</a:t>
-            </a:r>
-            <a:br>
-              <a:rPr lang="en-US" dirty="0"/>
-            </a:br>
-            <a:r>
-              <a:rPr lang="en-US" dirty="0"/>
-              <a:t>	Scalable NoSQL database for unstructured data.</a:t>
-            </a:r>
-          </a:p>
-          <a:p>
-            <a:pPr>
-              <a:buFont typeface="Arial" panose="020B0604020202020204" pitchFamily="34" charset="0"/>
-              <a:buChar char="•"/>
-            </a:pPr>
-            <a:r>
-              <a:rPr lang="en-US" b="1" dirty="0"/>
-              <a:t>Mongoose:</a:t>
-            </a:r>
-            <a:br>
-              <a:rPr lang="en-US" dirty="0"/>
-            </a:br>
-            <a:r>
-              <a:rPr lang="en-US" dirty="0"/>
-              <a:t>	ODM(Object Document Mapper) for MongoDB.</a:t>
-            </a:r>
-          </a:p>
-        </p:txBody>
-      </p:sp>
+          <p:cNvGraphicFramePr>
+            <a:graphicFrameLocks noGrp="1"/>
+          </p:cNvGraphicFramePr>
+          <p:nvPr>
+            <p:extLst>
+              <p:ext uri="{D42A27DB-BD31-4B8C-83A1-F6EECF244321}">
+                <p14:modId xmlns:p14="http://schemas.microsoft.com/office/powerpoint/2010/main" val="4085749177"/>
+              </p:ext>
+            </p:extLst>
+          </p:nvPr>
+        </p:nvGraphicFramePr>
+        <p:xfrm>
+          <a:off x="929640" y="4591685"/>
+          <a:ext cx="10332720" cy="518160"/>
+        </p:xfrm>
+        <a:graphic>
+          <a:graphicData uri="http://schemas.openxmlformats.org/drawingml/2006/table">
+            <a:tbl>
+              <a:tblPr firstRow="1" bandRow="1">
+                <a:tableStyleId>{2D5ABB26-0587-4C30-8999-92F81FD0307C}</a:tableStyleId>
+              </a:tblPr>
+              <a:tblGrid>
+                <a:gridCol w="5166360">
+                  <a:extLst>
+                    <a:ext uri="{9D8B030D-6E8A-4147-A177-3AD203B41FA5}">
+                      <a16:colId xmlns:a16="http://schemas.microsoft.com/office/drawing/2014/main" val="2453894290"/>
+                    </a:ext>
+                  </a:extLst>
+                </a:gridCol>
+                <a:gridCol w="5166360">
+                  <a:extLst>
+                    <a:ext uri="{9D8B030D-6E8A-4147-A177-3AD203B41FA5}">
+                      <a16:colId xmlns:a16="http://schemas.microsoft.com/office/drawing/2014/main" val="3229102298"/>
+                    </a:ext>
+                  </a:extLst>
+                </a:gridCol>
+              </a:tblGrid>
+              <a:tr h="370840">
+                <a:tc>
+                  <a:txBody>
+                    <a:bodyPr/>
+                    <a:lstStyle/>
+                    <a:p>
+                      <a:pPr marL="457200" indent="-457200">
+                        <a:buFont typeface="Arial" panose="020B0604020202020204" pitchFamily="34" charset="0"/>
+                        <a:buChar char="•"/>
+                      </a:pPr>
+                      <a:r>
+                        <a:rPr lang="en-US" sz="2800" b="0" dirty="0"/>
+                        <a:t>Clerk</a:t>
+                      </a:r>
+                    </a:p>
+                  </a:txBody>
+                  <a:tcPr/>
+                </a:tc>
+                <a:tc>
+                  <a:txBody>
+                    <a:bodyPr/>
+                    <a:lstStyle/>
+                    <a:p>
+                      <a:pPr marL="457200" indent="-457200">
+                        <a:buFont typeface="Arial" panose="020B0604020202020204" pitchFamily="34" charset="0"/>
+                        <a:buChar char="•"/>
+                      </a:pPr>
+                      <a:endParaRPr lang="en-US" sz="2800" b="0" dirty="0"/>
+                    </a:p>
+                  </a:txBody>
+                  <a:tcPr/>
+                </a:tc>
+                <a:extLst>
+                  <a:ext uri="{0D108BD9-81ED-4DB2-BD59-A6C34878D82A}">
+                    <a16:rowId xmlns:a16="http://schemas.microsoft.com/office/drawing/2014/main" val="3119260527"/>
+                  </a:ext>
+                </a:extLst>
+              </a:tr>
+            </a:tbl>
+          </a:graphicData>
+        </a:graphic>
+      </p:graphicFrame>
     </p:spTree>
     <p:extLst>
       <p:ext uri="{BB962C8B-B14F-4D97-AF65-F5344CB8AC3E}">

</xml_diff>